<commit_message>
updated presentation and data
</commit_message>
<xml_diff>
--- a/presentations/Table_Analyzer_Overview.pptx
+++ b/presentations/Table_Analyzer_Overview.pptx
@@ -6,7 +6,8 @@
   </p:sldMasterIdLst>
   <p:sldIdLst>
     <p:sldId id="256" r:id="rId2"/>
-    <p:sldId id="257" r:id="rId3"/>
+    <p:sldId id="258" r:id="rId3"/>
+    <p:sldId id="257" r:id="rId4"/>
   </p:sldIdLst>
   <p:sldSz cx="9144000" cy="6858000" type="screen4x3"/>
   <p:notesSz cx="6858000" cy="9144000"/>
@@ -303,7 +304,7 @@
           <a:p>
             <a:fld id="{5BCAD085-E8A6-8845-BD4E-CB4CCA059FC4}" type="datetimeFigureOut">
               <a:rPr lang="en-US" smtClean="0"/>
-              <a:t>11/9/2025</a:t>
+              <a:t>11/24/25</a:t>
             </a:fld>
             <a:endParaRPr lang="en-US"/>
           </a:p>
@@ -471,7 +472,7 @@
           <a:p>
             <a:fld id="{5BCAD085-E8A6-8845-BD4E-CB4CCA059FC4}" type="datetimeFigureOut">
               <a:rPr lang="en-US" smtClean="0"/>
-              <a:t>11/9/2025</a:t>
+              <a:t>11/24/25</a:t>
             </a:fld>
             <a:endParaRPr lang="en-US"/>
           </a:p>
@@ -649,7 +650,7 @@
           <a:p>
             <a:fld id="{5BCAD085-E8A6-8845-BD4E-CB4CCA059FC4}" type="datetimeFigureOut">
               <a:rPr lang="en-US" smtClean="0"/>
-              <a:t>11/9/2025</a:t>
+              <a:t>11/24/25</a:t>
             </a:fld>
             <a:endParaRPr lang="en-US"/>
           </a:p>
@@ -817,7 +818,7 @@
           <a:p>
             <a:fld id="{5BCAD085-E8A6-8845-BD4E-CB4CCA059FC4}" type="datetimeFigureOut">
               <a:rPr lang="en-US" smtClean="0"/>
-              <a:t>11/9/2025</a:t>
+              <a:t>11/24/25</a:t>
             </a:fld>
             <a:endParaRPr lang="en-US"/>
           </a:p>
@@ -1062,7 +1063,7 @@
           <a:p>
             <a:fld id="{5BCAD085-E8A6-8845-BD4E-CB4CCA059FC4}" type="datetimeFigureOut">
               <a:rPr lang="en-US" smtClean="0"/>
-              <a:t>11/9/2025</a:t>
+              <a:t>11/24/25</a:t>
             </a:fld>
             <a:endParaRPr lang="en-US"/>
           </a:p>
@@ -1347,7 +1348,7 @@
           <a:p>
             <a:fld id="{5BCAD085-E8A6-8845-BD4E-CB4CCA059FC4}" type="datetimeFigureOut">
               <a:rPr lang="en-US" smtClean="0"/>
-              <a:t>11/9/2025</a:t>
+              <a:t>11/24/25</a:t>
             </a:fld>
             <a:endParaRPr lang="en-US"/>
           </a:p>
@@ -1766,7 +1767,7 @@
           <a:p>
             <a:fld id="{5BCAD085-E8A6-8845-BD4E-CB4CCA059FC4}" type="datetimeFigureOut">
               <a:rPr lang="en-US" smtClean="0"/>
-              <a:t>11/9/2025</a:t>
+              <a:t>11/24/25</a:t>
             </a:fld>
             <a:endParaRPr lang="en-US"/>
           </a:p>
@@ -1883,7 +1884,7 @@
           <a:p>
             <a:fld id="{5BCAD085-E8A6-8845-BD4E-CB4CCA059FC4}" type="datetimeFigureOut">
               <a:rPr lang="en-US" smtClean="0"/>
-              <a:t>11/9/2025</a:t>
+              <a:t>11/24/25</a:t>
             </a:fld>
             <a:endParaRPr lang="en-US"/>
           </a:p>
@@ -1978,7 +1979,7 @@
           <a:p>
             <a:fld id="{5BCAD085-E8A6-8845-BD4E-CB4CCA059FC4}" type="datetimeFigureOut">
               <a:rPr lang="en-US" smtClean="0"/>
-              <a:t>11/9/2025</a:t>
+              <a:t>11/24/25</a:t>
             </a:fld>
             <a:endParaRPr lang="en-US"/>
           </a:p>
@@ -2253,7 +2254,7 @@
           <a:p>
             <a:fld id="{5BCAD085-E8A6-8845-BD4E-CB4CCA059FC4}" type="datetimeFigureOut">
               <a:rPr lang="en-US" smtClean="0"/>
-              <a:t>11/9/2025</a:t>
+              <a:t>11/24/25</a:t>
             </a:fld>
             <a:endParaRPr lang="en-US"/>
           </a:p>
@@ -2505,7 +2506,7 @@
           <a:p>
             <a:fld id="{5BCAD085-E8A6-8845-BD4E-CB4CCA059FC4}" type="datetimeFigureOut">
               <a:rPr lang="en-US" smtClean="0"/>
-              <a:t>11/9/2025</a:t>
+              <a:t>11/24/25</a:t>
             </a:fld>
             <a:endParaRPr lang="en-US"/>
           </a:p>
@@ -2570,9 +2571,21 @@
 <p:sldMaster xmlns:a="http://schemas.openxmlformats.org/drawingml/2006/main" xmlns:r="http://schemas.openxmlformats.org/officeDocument/2006/relationships" xmlns:p="http://schemas.openxmlformats.org/presentationml/2006/main">
   <p:cSld>
     <p:bg>
-      <p:bgRef idx="1001">
-        <a:schemeClr val="bg1"/>
-      </p:bgRef>
+      <p:bgPr>
+        <a:gradFill flip="none" rotWithShape="1">
+          <a:gsLst>
+            <a:gs pos="0">
+              <a:srgbClr val="F0F7FF"/>
+            </a:gs>
+            <a:gs pos="100000">
+              <a:srgbClr val="DCECFA"/>
+            </a:gs>
+          </a:gsLst>
+          <a:lin ang="0" scaled="0"/>
+          <a:tileRect/>
+        </a:gradFill>
+        <a:effectLst/>
+      </p:bgPr>
     </p:bg>
     <p:spTree>
       <p:nvGrpSpPr>
@@ -2716,7 +2729,7 @@
           <a:p>
             <a:fld id="{5BCAD085-E8A6-8845-BD4E-CB4CCA059FC4}" type="datetimeFigureOut">
               <a:rPr lang="en-US" smtClean="0"/>
-              <a:t>11/9/2025</a:t>
+              <a:t>11/24/25</a:t>
             </a:fld>
             <a:endParaRPr lang="en-US"/>
           </a:p>
@@ -3077,22 +3090,6 @@
 <file path=ppt/slides/slide1.xml><?xml version="1.0" encoding="utf-8"?>
 <p:sld xmlns:a="http://schemas.openxmlformats.org/drawingml/2006/main" xmlns:r="http://schemas.openxmlformats.org/officeDocument/2006/relationships" xmlns:p="http://schemas.openxmlformats.org/presentationml/2006/main">
   <p:cSld>
-    <p:bg>
-      <p:bgPr>
-        <a:gradFill rotWithShape="1">
-          <a:gsLst>
-            <a:gs pos="0">
-              <a:srgbClr val="F0F7FF"/>
-            </a:gs>
-            <a:gs pos="100000">
-              <a:srgbClr val="DCECFA"/>
-            </a:gs>
-          </a:gsLst>
-          <a:lin scaled="0"/>
-        </a:gradFill>
-        <a:effectLst/>
-      </p:bgPr>
-    </p:bg>
     <p:spTree>
       <p:nvGrpSpPr>
         <p:cNvPr id="1" name=""/>
@@ -3129,7 +3126,7 @@
           </a:bodyPr>
           <a:lstStyle/>
           <a:p>
-            <a:endParaRPr/>
+            <a:endParaRPr dirty="0"/>
           </a:p>
           <a:p>
             <a:pPr algn="ctr">
@@ -3140,6 +3137,7 @@
               </a:defRPr>
             </a:pPr>
             <a:r>
+              <a:rPr dirty="0"/>
               <a:t>Table Analyzer</a:t>
             </a:r>
           </a:p>
@@ -3246,22 +3244,101 @@
 <file path=ppt/slides/slide2.xml><?xml version="1.0" encoding="utf-8"?>
 <p:sld xmlns:a="http://schemas.openxmlformats.org/drawingml/2006/main" xmlns:r="http://schemas.openxmlformats.org/officeDocument/2006/relationships" xmlns:p="http://schemas.openxmlformats.org/presentationml/2006/main">
   <p:cSld>
-    <p:bg>
-      <p:bgPr>
-        <a:gradFill rotWithShape="1">
-          <a:gsLst>
-            <a:gs pos="0">
-              <a:srgbClr val="F0F7FF"/>
-            </a:gs>
-            <a:gs pos="100000">
-              <a:srgbClr val="E1F0FA"/>
-            </a:gs>
-          </a:gsLst>
-          <a:lin scaled="0"/>
-        </a:gradFill>
-        <a:effectLst/>
-      </p:bgPr>
-    </p:bg>
+    <p:spTree>
+      <p:nvGrpSpPr>
+        <p:cNvPr id="1" name="">
+          <a:extLst>
+            <a:ext uri="{FF2B5EF4-FFF2-40B4-BE49-F238E27FC236}">
+              <a16:creationId xmlns:a16="http://schemas.microsoft.com/office/drawing/2014/main" id="{89CBC87B-D5FA-3788-37B7-B5FF88A24B7E}"/>
+            </a:ext>
+          </a:extLst>
+        </p:cNvPr>
+        <p:cNvGrpSpPr/>
+        <p:nvPr/>
+      </p:nvGrpSpPr>
+      <p:grpSpPr>
+        <a:xfrm>
+          <a:off x="0" y="0"/>
+          <a:ext cx="0" cy="0"/>
+          <a:chOff x="0" y="0"/>
+          <a:chExt cx="0" cy="0"/>
+        </a:xfrm>
+      </p:grpSpPr>
+      <p:sp>
+        <p:nvSpPr>
+          <p:cNvPr id="2" name="TextBox 1">
+            <a:extLst>
+              <a:ext uri="{FF2B5EF4-FFF2-40B4-BE49-F238E27FC236}">
+                <a16:creationId xmlns:a16="http://schemas.microsoft.com/office/drawing/2014/main" id="{1C34A4BA-C93F-F175-CB79-50A8F3032521}"/>
+              </a:ext>
+            </a:extLst>
+          </p:cNvPr>
+          <p:cNvSpPr txBox="1"/>
+          <p:nvPr/>
+        </p:nvSpPr>
+        <p:spPr>
+          <a:xfrm>
+            <a:off x="795528" y="210312"/>
+            <a:ext cx="7772400" cy="1015663"/>
+          </a:xfrm>
+          <a:prstGeom prst="rect">
+            <a:avLst/>
+          </a:prstGeom>
+          <a:noFill/>
+        </p:spPr>
+        <p:txBody>
+          <a:bodyPr wrap="square">
+            <a:spAutoFit/>
+          </a:bodyPr>
+          <a:lstStyle/>
+          <a:p>
+            <a:endParaRPr dirty="0"/>
+          </a:p>
+          <a:p>
+            <a:pPr>
+              <a:defRPr sz="2400" b="1">
+                <a:solidFill>
+                  <a:srgbClr val="1E3246"/>
+                </a:solidFill>
+              </a:defRPr>
+            </a:pPr>
+            <a:r>
+              <a:rPr lang="de-DE" dirty="0"/>
+              <a:t>Who am I</a:t>
+            </a:r>
+            <a:endParaRPr dirty="0"/>
+          </a:p>
+          <a:p>
+            <a:pPr lvl="1">
+              <a:defRPr sz="1800">
+                <a:solidFill>
+                  <a:srgbClr val="3C3C3C"/>
+                </a:solidFill>
+              </a:defRPr>
+            </a:pPr>
+            <a:r>
+              <a:rPr dirty="0"/>
+              <a:t>•</a:t>
+            </a:r>
+          </a:p>
+        </p:txBody>
+      </p:sp>
+    </p:spTree>
+    <p:extLst>
+      <p:ext uri="{BB962C8B-B14F-4D97-AF65-F5344CB8AC3E}">
+        <p14:creationId xmlns:p14="http://schemas.microsoft.com/office/powerpoint/2010/main" val="3850551531"/>
+      </p:ext>
+    </p:extLst>
+  </p:cSld>
+  <p:clrMapOvr>
+    <a:masterClrMapping/>
+  </p:clrMapOvr>
+</p:sld>
+</file>
+
+<file path=ppt/slides/slide3.xml><?xml version="1.0" encoding="utf-8"?>
+<p:sld xmlns:a="http://schemas.openxmlformats.org/drawingml/2006/main" xmlns:r="http://schemas.openxmlformats.org/officeDocument/2006/relationships" xmlns:p="http://schemas.openxmlformats.org/presentationml/2006/main">
+  <p:cSld>
     <p:spTree>
       <p:nvGrpSpPr>
         <p:cNvPr id="1" name=""/>

</xml_diff>

<commit_message>
removed orphan function in submodule base size
</commit_message>
<xml_diff>
--- a/presentations/Table_Analyzer_Overview.pptx
+++ b/presentations/Table_Analyzer_Overview.pptx
@@ -4,6 +4,9 @@
   <p:sldMasterIdLst>
     <p:sldMasterId id="2147483648" r:id="rId1"/>
   </p:sldMasterIdLst>
+  <p:notesMasterIdLst>
+    <p:notesMasterId r:id="rId5"/>
+  </p:notesMasterIdLst>
   <p:sldIdLst>
     <p:sldId id="256" r:id="rId2"/>
     <p:sldId id="258" r:id="rId3"/>
@@ -123,6 +126,439 @@
     </p:ext>
   </p:extLst>
 </p:presentation>
+</file>
+
+<file path=ppt/notesMasters/notesMaster1.xml><?xml version="1.0" encoding="utf-8"?>
+<p:notesMaster xmlns:a="http://schemas.openxmlformats.org/drawingml/2006/main" xmlns:r="http://schemas.openxmlformats.org/officeDocument/2006/relationships" xmlns:p="http://schemas.openxmlformats.org/presentationml/2006/main">
+  <p:cSld>
+    <p:bg>
+      <p:bgRef idx="1001">
+        <a:schemeClr val="bg1"/>
+      </p:bgRef>
+    </p:bg>
+    <p:spTree>
+      <p:nvGrpSpPr>
+        <p:cNvPr id="1" name=""/>
+        <p:cNvGrpSpPr/>
+        <p:nvPr/>
+      </p:nvGrpSpPr>
+      <p:grpSpPr>
+        <a:xfrm>
+          <a:off x="0" y="0"/>
+          <a:ext cx="0" cy="0"/>
+          <a:chOff x="0" y="0"/>
+          <a:chExt cx="0" cy="0"/>
+        </a:xfrm>
+      </p:grpSpPr>
+      <p:sp>
+        <p:nvSpPr>
+          <p:cNvPr id="2" name="Header Placeholder 1"/>
+          <p:cNvSpPr>
+            <a:spLocks noGrp="1"/>
+          </p:cNvSpPr>
+          <p:nvPr>
+            <p:ph type="hdr" sz="quarter"/>
+          </p:nvPr>
+        </p:nvSpPr>
+        <p:spPr>
+          <a:xfrm>
+            <a:off x="0" y="0"/>
+            <a:ext cx="2971800" cy="458788"/>
+          </a:xfrm>
+          <a:prstGeom prst="rect">
+            <a:avLst/>
+          </a:prstGeom>
+        </p:spPr>
+        <p:txBody>
+          <a:bodyPr vert="horz" lIns="91440" tIns="45720" rIns="91440" bIns="45720" rtlCol="0"/>
+          <a:lstStyle>
+            <a:lvl1pPr algn="l">
+              <a:defRPr sz="1200"/>
+            </a:lvl1pPr>
+          </a:lstStyle>
+          <a:p>
+            <a:endParaRPr lang="en-US"/>
+          </a:p>
+        </p:txBody>
+      </p:sp>
+      <p:sp>
+        <p:nvSpPr>
+          <p:cNvPr id="3" name="Date Placeholder 2"/>
+          <p:cNvSpPr>
+            <a:spLocks noGrp="1"/>
+          </p:cNvSpPr>
+          <p:nvPr>
+            <p:ph type="dt" idx="1"/>
+          </p:nvPr>
+        </p:nvSpPr>
+        <p:spPr>
+          <a:xfrm>
+            <a:off x="3884613" y="0"/>
+            <a:ext cx="2971800" cy="458788"/>
+          </a:xfrm>
+          <a:prstGeom prst="rect">
+            <a:avLst/>
+          </a:prstGeom>
+        </p:spPr>
+        <p:txBody>
+          <a:bodyPr vert="horz" lIns="91440" tIns="45720" rIns="91440" bIns="45720" rtlCol="0"/>
+          <a:lstStyle>
+            <a:lvl1pPr algn="r">
+              <a:defRPr sz="1200"/>
+            </a:lvl1pPr>
+          </a:lstStyle>
+          <a:p>
+            <a:fld id="{404C4D2F-30A8-1C43-8374-9D9D8BF63153}" type="datetimeFigureOut">
+              <a:rPr lang="en-US" smtClean="0"/>
+              <a:t>11/24/25</a:t>
+            </a:fld>
+            <a:endParaRPr lang="en-US"/>
+          </a:p>
+        </p:txBody>
+      </p:sp>
+      <p:sp>
+        <p:nvSpPr>
+          <p:cNvPr id="4" name="Slide Image Placeholder 3"/>
+          <p:cNvSpPr>
+            <a:spLocks noGrp="1" noRot="1" noChangeAspect="1"/>
+          </p:cNvSpPr>
+          <p:nvPr>
+            <p:ph type="sldImg" idx="2"/>
+          </p:nvPr>
+        </p:nvSpPr>
+        <p:spPr>
+          <a:xfrm>
+            <a:off x="1371600" y="1143000"/>
+            <a:ext cx="4114800" cy="3086100"/>
+          </a:xfrm>
+          <a:prstGeom prst="rect">
+            <a:avLst/>
+          </a:prstGeom>
+          <a:noFill/>
+          <a:ln w="12700">
+            <a:solidFill>
+              <a:prstClr val="black"/>
+            </a:solidFill>
+          </a:ln>
+        </p:spPr>
+        <p:txBody>
+          <a:bodyPr vert="horz" lIns="91440" tIns="45720" rIns="91440" bIns="45720" rtlCol="0" anchor="ctr"/>
+          <a:lstStyle/>
+          <a:p>
+            <a:endParaRPr lang="en-US"/>
+          </a:p>
+        </p:txBody>
+      </p:sp>
+      <p:sp>
+        <p:nvSpPr>
+          <p:cNvPr id="5" name="Notes Placeholder 4"/>
+          <p:cNvSpPr>
+            <a:spLocks noGrp="1"/>
+          </p:cNvSpPr>
+          <p:nvPr>
+            <p:ph type="body" sz="quarter" idx="3"/>
+          </p:nvPr>
+        </p:nvSpPr>
+        <p:spPr>
+          <a:xfrm>
+            <a:off x="685800" y="4400550"/>
+            <a:ext cx="5486400" cy="3600450"/>
+          </a:xfrm>
+          <a:prstGeom prst="rect">
+            <a:avLst/>
+          </a:prstGeom>
+        </p:spPr>
+        <p:txBody>
+          <a:bodyPr vert="horz" lIns="91440" tIns="45720" rIns="91440" bIns="45720" rtlCol="0"/>
+          <a:lstStyle/>
+          <a:p>
+            <a:pPr lvl="0"/>
+            <a:r>
+              <a:rPr lang="en-US"/>
+              <a:t>Click to edit Master text styles</a:t>
+            </a:r>
+          </a:p>
+          <a:p>
+            <a:pPr lvl="1"/>
+            <a:r>
+              <a:rPr lang="en-US"/>
+              <a:t>Second level</a:t>
+            </a:r>
+          </a:p>
+          <a:p>
+            <a:pPr lvl="2"/>
+            <a:r>
+              <a:rPr lang="en-US"/>
+              <a:t>Third level</a:t>
+            </a:r>
+          </a:p>
+          <a:p>
+            <a:pPr lvl="3"/>
+            <a:r>
+              <a:rPr lang="en-US"/>
+              <a:t>Fourth level</a:t>
+            </a:r>
+          </a:p>
+          <a:p>
+            <a:pPr lvl="4"/>
+            <a:r>
+              <a:rPr lang="en-US"/>
+              <a:t>Fifth level</a:t>
+            </a:r>
+          </a:p>
+        </p:txBody>
+      </p:sp>
+      <p:sp>
+        <p:nvSpPr>
+          <p:cNvPr id="6" name="Footer Placeholder 5"/>
+          <p:cNvSpPr>
+            <a:spLocks noGrp="1"/>
+          </p:cNvSpPr>
+          <p:nvPr>
+            <p:ph type="ftr" sz="quarter" idx="4"/>
+          </p:nvPr>
+        </p:nvSpPr>
+        <p:spPr>
+          <a:xfrm>
+            <a:off x="0" y="8685213"/>
+            <a:ext cx="2971800" cy="458787"/>
+          </a:xfrm>
+          <a:prstGeom prst="rect">
+            <a:avLst/>
+          </a:prstGeom>
+        </p:spPr>
+        <p:txBody>
+          <a:bodyPr vert="horz" lIns="91440" tIns="45720" rIns="91440" bIns="45720" rtlCol="0" anchor="b"/>
+          <a:lstStyle>
+            <a:lvl1pPr algn="l">
+              <a:defRPr sz="1200"/>
+            </a:lvl1pPr>
+          </a:lstStyle>
+          <a:p>
+            <a:endParaRPr lang="en-US"/>
+          </a:p>
+        </p:txBody>
+      </p:sp>
+      <p:sp>
+        <p:nvSpPr>
+          <p:cNvPr id="7" name="Slide Number Placeholder 6"/>
+          <p:cNvSpPr>
+            <a:spLocks noGrp="1"/>
+          </p:cNvSpPr>
+          <p:nvPr>
+            <p:ph type="sldNum" sz="quarter" idx="5"/>
+          </p:nvPr>
+        </p:nvSpPr>
+        <p:spPr>
+          <a:xfrm>
+            <a:off x="3884613" y="8685213"/>
+            <a:ext cx="2971800" cy="458787"/>
+          </a:xfrm>
+          <a:prstGeom prst="rect">
+            <a:avLst/>
+          </a:prstGeom>
+        </p:spPr>
+        <p:txBody>
+          <a:bodyPr vert="horz" lIns="91440" tIns="45720" rIns="91440" bIns="45720" rtlCol="0" anchor="b"/>
+          <a:lstStyle>
+            <a:lvl1pPr algn="r">
+              <a:defRPr sz="1200"/>
+            </a:lvl1pPr>
+          </a:lstStyle>
+          <a:p>
+            <a:fld id="{3B911241-7DC5-2249-8C77-6E6B4E462127}" type="slidenum">
+              <a:rPr lang="en-US" smtClean="0"/>
+              <a:t>‹#›</a:t>
+            </a:fld>
+            <a:endParaRPr lang="en-US"/>
+          </a:p>
+        </p:txBody>
+      </p:sp>
+    </p:spTree>
+    <p:extLst>
+      <p:ext uri="{BB962C8B-B14F-4D97-AF65-F5344CB8AC3E}">
+        <p14:creationId xmlns:p14="http://schemas.microsoft.com/office/powerpoint/2010/main" val="317516216"/>
+      </p:ext>
+    </p:extLst>
+  </p:cSld>
+  <p:clrMap bg1="lt1" tx1="dk1" bg2="lt2" tx2="dk2" accent1="accent1" accent2="accent2" accent3="accent3" accent4="accent4" accent5="accent5" accent6="accent6" hlink="hlink" folHlink="folHlink"/>
+  <p:notesStyle>
+    <a:lvl1pPr marL="0" algn="l" defTabSz="914400" rtl="0" eaLnBrk="1" latinLnBrk="0" hangingPunct="1">
+      <a:defRPr sz="1200" kern="1200">
+        <a:solidFill>
+          <a:schemeClr val="tx1"/>
+        </a:solidFill>
+        <a:latin typeface="+mn-lt"/>
+        <a:ea typeface="+mn-ea"/>
+        <a:cs typeface="+mn-cs"/>
+      </a:defRPr>
+    </a:lvl1pPr>
+    <a:lvl2pPr marL="457200" algn="l" defTabSz="914400" rtl="0" eaLnBrk="1" latinLnBrk="0" hangingPunct="1">
+      <a:defRPr sz="1200" kern="1200">
+        <a:solidFill>
+          <a:schemeClr val="tx1"/>
+        </a:solidFill>
+        <a:latin typeface="+mn-lt"/>
+        <a:ea typeface="+mn-ea"/>
+        <a:cs typeface="+mn-cs"/>
+      </a:defRPr>
+    </a:lvl2pPr>
+    <a:lvl3pPr marL="914400" algn="l" defTabSz="914400" rtl="0" eaLnBrk="1" latinLnBrk="0" hangingPunct="1">
+      <a:defRPr sz="1200" kern="1200">
+        <a:solidFill>
+          <a:schemeClr val="tx1"/>
+        </a:solidFill>
+        <a:latin typeface="+mn-lt"/>
+        <a:ea typeface="+mn-ea"/>
+        <a:cs typeface="+mn-cs"/>
+      </a:defRPr>
+    </a:lvl3pPr>
+    <a:lvl4pPr marL="1371600" algn="l" defTabSz="914400" rtl="0" eaLnBrk="1" latinLnBrk="0" hangingPunct="1">
+      <a:defRPr sz="1200" kern="1200">
+        <a:solidFill>
+          <a:schemeClr val="tx1"/>
+        </a:solidFill>
+        <a:latin typeface="+mn-lt"/>
+        <a:ea typeface="+mn-ea"/>
+        <a:cs typeface="+mn-cs"/>
+      </a:defRPr>
+    </a:lvl4pPr>
+    <a:lvl5pPr marL="1828800" algn="l" defTabSz="914400" rtl="0" eaLnBrk="1" latinLnBrk="0" hangingPunct="1">
+      <a:defRPr sz="1200" kern="1200">
+        <a:solidFill>
+          <a:schemeClr val="tx1"/>
+        </a:solidFill>
+        <a:latin typeface="+mn-lt"/>
+        <a:ea typeface="+mn-ea"/>
+        <a:cs typeface="+mn-cs"/>
+      </a:defRPr>
+    </a:lvl5pPr>
+    <a:lvl6pPr marL="2286000" algn="l" defTabSz="914400" rtl="0" eaLnBrk="1" latinLnBrk="0" hangingPunct="1">
+      <a:defRPr sz="1200" kern="1200">
+        <a:solidFill>
+          <a:schemeClr val="tx1"/>
+        </a:solidFill>
+        <a:latin typeface="+mn-lt"/>
+        <a:ea typeface="+mn-ea"/>
+        <a:cs typeface="+mn-cs"/>
+      </a:defRPr>
+    </a:lvl6pPr>
+    <a:lvl7pPr marL="2743200" algn="l" defTabSz="914400" rtl="0" eaLnBrk="1" latinLnBrk="0" hangingPunct="1">
+      <a:defRPr sz="1200" kern="1200">
+        <a:solidFill>
+          <a:schemeClr val="tx1"/>
+        </a:solidFill>
+        <a:latin typeface="+mn-lt"/>
+        <a:ea typeface="+mn-ea"/>
+        <a:cs typeface="+mn-cs"/>
+      </a:defRPr>
+    </a:lvl7pPr>
+    <a:lvl8pPr marL="3200400" algn="l" defTabSz="914400" rtl="0" eaLnBrk="1" latinLnBrk="0" hangingPunct="1">
+      <a:defRPr sz="1200" kern="1200">
+        <a:solidFill>
+          <a:schemeClr val="tx1"/>
+        </a:solidFill>
+        <a:latin typeface="+mn-lt"/>
+        <a:ea typeface="+mn-ea"/>
+        <a:cs typeface="+mn-cs"/>
+      </a:defRPr>
+    </a:lvl8pPr>
+    <a:lvl9pPr marL="3657600" algn="l" defTabSz="914400" rtl="0" eaLnBrk="1" latinLnBrk="0" hangingPunct="1">
+      <a:defRPr sz="1200" kern="1200">
+        <a:solidFill>
+          <a:schemeClr val="tx1"/>
+        </a:solidFill>
+        <a:latin typeface="+mn-lt"/>
+        <a:ea typeface="+mn-ea"/>
+        <a:cs typeface="+mn-cs"/>
+      </a:defRPr>
+    </a:lvl9pPr>
+  </p:notesStyle>
+</p:notesMaster>
+</file>
+
+<file path=ppt/notesSlides/notesSlide1.xml><?xml version="1.0" encoding="utf-8"?>
+<p:notes xmlns:a="http://schemas.openxmlformats.org/drawingml/2006/main" xmlns:r="http://schemas.openxmlformats.org/officeDocument/2006/relationships" xmlns:p="http://schemas.openxmlformats.org/presentationml/2006/main">
+  <p:cSld>
+    <p:spTree>
+      <p:nvGrpSpPr>
+        <p:cNvPr id="1" name=""/>
+        <p:cNvGrpSpPr/>
+        <p:nvPr/>
+      </p:nvGrpSpPr>
+      <p:grpSpPr>
+        <a:xfrm>
+          <a:off x="0" y="0"/>
+          <a:ext cx="0" cy="0"/>
+          <a:chOff x="0" y="0"/>
+          <a:chExt cx="0" cy="0"/>
+        </a:xfrm>
+      </p:grpSpPr>
+      <p:sp>
+        <p:nvSpPr>
+          <p:cNvPr id="2" name="Slide Image Placeholder 1"/>
+          <p:cNvSpPr>
+            <a:spLocks noGrp="1" noRot="1" noChangeAspect="1"/>
+          </p:cNvSpPr>
+          <p:nvPr>
+            <p:ph type="sldImg"/>
+          </p:nvPr>
+        </p:nvSpPr>
+        <p:spPr/>
+      </p:sp>
+      <p:sp>
+        <p:nvSpPr>
+          <p:cNvPr id="3" name="Notes Placeholder 2"/>
+          <p:cNvSpPr>
+            <a:spLocks noGrp="1"/>
+          </p:cNvSpPr>
+          <p:nvPr>
+            <p:ph type="body" idx="1"/>
+          </p:nvPr>
+        </p:nvSpPr>
+        <p:spPr/>
+        <p:txBody>
+          <a:bodyPr/>
+          <a:lstStyle/>
+          <a:p>
+            <a:endParaRPr lang="en-US" dirty="0"/>
+          </a:p>
+        </p:txBody>
+      </p:sp>
+      <p:sp>
+        <p:nvSpPr>
+          <p:cNvPr id="4" name="Slide Number Placeholder 3"/>
+          <p:cNvSpPr>
+            <a:spLocks noGrp="1"/>
+          </p:cNvSpPr>
+          <p:nvPr>
+            <p:ph type="sldNum" sz="quarter" idx="5"/>
+          </p:nvPr>
+        </p:nvSpPr>
+        <p:spPr/>
+        <p:txBody>
+          <a:bodyPr/>
+          <a:lstStyle/>
+          <a:p>
+            <a:fld id="{3B911241-7DC5-2249-8C77-6E6B4E462127}" type="slidenum">
+              <a:rPr lang="en-US" smtClean="0"/>
+              <a:t>2</a:t>
+            </a:fld>
+            <a:endParaRPr lang="en-US"/>
+          </a:p>
+        </p:txBody>
+      </p:sp>
+    </p:spTree>
+    <p:extLst>
+      <p:ext uri="{BB962C8B-B14F-4D97-AF65-F5344CB8AC3E}">
+        <p14:creationId xmlns:p14="http://schemas.microsoft.com/office/powerpoint/2010/main" val="1311732677"/>
+      </p:ext>
+    </p:extLst>
+  </p:cSld>
+  <p:clrMapOvr>
+    <a:masterClrMapping/>
+  </p:clrMapOvr>
+</p:notes>
 </file>
 
 <file path=ppt/slideLayouts/slideLayout1.xml><?xml version="1.0" encoding="utf-8"?>
@@ -3278,8 +3714,8 @@
         </p:nvSpPr>
         <p:spPr>
           <a:xfrm>
-            <a:off x="795528" y="210312"/>
-            <a:ext cx="7772400" cy="1015663"/>
+            <a:off x="858591" y="612844"/>
+            <a:ext cx="7772400" cy="4801314"/>
           </a:xfrm>
           <a:prstGeom prst="rect">
             <a:avLst/>
@@ -3292,33 +3728,120 @@
           </a:bodyPr>
           <a:lstStyle/>
           <a:p>
-            <a:endParaRPr dirty="0"/>
-          </a:p>
-          <a:p>
-            <a:pPr>
-              <a:defRPr sz="2400" b="1">
-                <a:solidFill>
-                  <a:srgbClr val="1E3246"/>
-                </a:solidFill>
-              </a:defRPr>
+            <a:r>
+              <a:rPr lang="en-US" sz="2400" b="1" dirty="0"/>
+              <a:t>Who am I</a:t>
+            </a:r>
+          </a:p>
+          <a:p>
+            <a:pPr marL="285750" indent="-285750">
+              <a:buFont typeface="Arial" panose="020B0604020202020204" pitchFamily="34" charset="0"/>
+              <a:buChar char="•"/>
             </a:pPr>
             <a:r>
-              <a:rPr lang="de-DE" dirty="0"/>
-              <a:t>Who am I</a:t>
-            </a:r>
-            <a:endParaRPr dirty="0"/>
-          </a:p>
-          <a:p>
-            <a:pPr lvl="1">
-              <a:defRPr sz="1800">
-                <a:solidFill>
-                  <a:srgbClr val="3C3C3C"/>
-                </a:solidFill>
-              </a:defRPr>
+              <a:rPr lang="en-US" dirty="0"/>
+              <a:t>Bioinformatician specializing in genomics, neuroinformatics, and high-throughput data analysis</a:t>
+            </a:r>
+          </a:p>
+          <a:p>
+            <a:pPr marL="285750" indent="-285750">
+              <a:buFont typeface="Arial" panose="020B0604020202020204" pitchFamily="34" charset="0"/>
+              <a:buChar char="•"/>
             </a:pPr>
             <a:r>
-              <a:rPr dirty="0"/>
-              <a:t>•</a:t>
+              <a:rPr lang="en-US" dirty="0"/>
+              <a:t>Researcher at </a:t>
+            </a:r>
+            <a:r>
+              <a:rPr lang="en-US" b="1" dirty="0" err="1"/>
+              <a:t>Vetmeduni</a:t>
+            </a:r>
+            <a:r>
+              <a:rPr lang="en-US" b="1" dirty="0"/>
+              <a:t> Wien</a:t>
+            </a:r>
+            <a:r>
+              <a:rPr lang="en-US" dirty="0"/>
+              <a:t> and </a:t>
+            </a:r>
+            <a:r>
+              <a:rPr lang="en-US" b="1" dirty="0" err="1"/>
+              <a:t>a:head</a:t>
+            </a:r>
+            <a:r>
+              <a:rPr lang="en-US" b="1" dirty="0"/>
+              <a:t> Bio</a:t>
+            </a:r>
+            <a:r>
+              <a:rPr lang="en-US" dirty="0"/>
+              <a:t> with &gt;10 years experience in evolutionary genomics and pathogen biology</a:t>
+            </a:r>
+          </a:p>
+          <a:p>
+            <a:pPr marL="285750" indent="-285750">
+              <a:buFont typeface="Arial" panose="020B0604020202020204" pitchFamily="34" charset="0"/>
+              <a:buChar char="•"/>
+            </a:pPr>
+            <a:r>
+              <a:rPr lang="en-US" dirty="0"/>
+              <a:t>Experience in biological signal processing, microscopy image analysis</a:t>
+            </a:r>
+          </a:p>
+          <a:p>
+            <a:pPr marL="285750" indent="-285750">
+              <a:buFont typeface="Arial" panose="020B0604020202020204" pitchFamily="34" charset="0"/>
+              <a:buChar char="•"/>
+            </a:pPr>
+            <a:r>
+              <a:rPr lang="en-US" dirty="0"/>
+              <a:t>Developer of R/</a:t>
+            </a:r>
+            <a:r>
+              <a:rPr lang="en-US" dirty="0" err="1"/>
+              <a:t>Streamlit</a:t>
+            </a:r>
+            <a:r>
+              <a:rPr lang="en-US" dirty="0"/>
+              <a:t> applications for biological data analysis</a:t>
+            </a:r>
+          </a:p>
+          <a:p>
+            <a:pPr marL="285750" indent="-285750">
+              <a:buFont typeface="Arial" panose="020B0604020202020204" pitchFamily="34" charset="0"/>
+              <a:buChar char="•"/>
+            </a:pPr>
+            <a:r>
+              <a:rPr lang="en-US" dirty="0"/>
+              <a:t>Passionate about transforming complex datasets into clear, interpretable, publication-ready insights</a:t>
+            </a:r>
+          </a:p>
+          <a:p>
+            <a:endParaRPr lang="en-US" sz="2400" b="1" dirty="0"/>
+          </a:p>
+          <a:p>
+            <a:r>
+              <a:rPr lang="en-US" sz="2400" b="1" dirty="0"/>
+              <a:t>My research</a:t>
+            </a:r>
+          </a:p>
+          <a:p>
+            <a:pPr marL="285750" indent="-285750">
+              <a:buFont typeface="Arial" panose="020B0604020202020204" pitchFamily="34" charset="0"/>
+              <a:buChar char="•"/>
+            </a:pPr>
+            <a:r>
+              <a:rPr lang="en-US" dirty="0"/>
+              <a:t>Genomics of bacterial, viral, and protozoan pathogens in veterinary medicine, focusing on evolution, virulence factors, antimicrobial resistance, and outbreak characterization using NGS.</a:t>
+            </a:r>
+          </a:p>
+          <a:p>
+            <a:pPr marL="285750" indent="-285750">
+              <a:buFont typeface="Arial" panose="020B0604020202020204" pitchFamily="34" charset="0"/>
+              <a:buChar char="•"/>
+            </a:pPr>
+            <a:r>
+              <a:rPr lang="en-US" dirty="0"/>
+              <a:t>Development of pipelines and apps to extract and analyze functional and morphological metrics from brain-organoid activity data</a:t>
             </a:r>
           </a:p>
         </p:txBody>
@@ -3333,6 +3856,428 @@
   <p:clrMapOvr>
     <a:masterClrMapping/>
   </p:clrMapOvr>
+  <p:timing>
+    <p:tnLst>
+      <p:par>
+        <p:cTn id="1" dur="indefinite" restart="never" nodeType="tmRoot">
+          <p:childTnLst>
+            <p:seq concurrent="1" nextAc="seek">
+              <p:cTn id="2" dur="indefinite" nodeType="mainSeq">
+                <p:childTnLst>
+                  <p:par>
+                    <p:cTn id="3" fill="hold">
+                      <p:stCondLst>
+                        <p:cond delay="indefinite"/>
+                      </p:stCondLst>
+                      <p:childTnLst>
+                        <p:par>
+                          <p:cTn id="4" fill="hold">
+                            <p:stCondLst>
+                              <p:cond delay="0"/>
+                            </p:stCondLst>
+                            <p:childTnLst>
+                              <p:par>
+                                <p:cTn id="5" presetID="1" presetClass="entr" presetSubtype="0" fill="hold" nodeType="clickEffect">
+                                  <p:stCondLst>
+                                    <p:cond delay="0"/>
+                                  </p:stCondLst>
+                                  <p:childTnLst>
+                                    <p:set>
+                                      <p:cBhvr>
+                                        <p:cTn id="6" dur="1" fill="hold">
+                                          <p:stCondLst>
+                                            <p:cond delay="0"/>
+                                          </p:stCondLst>
+                                        </p:cTn>
+                                        <p:tgtEl>
+                                          <p:spTgt spid="2">
+                                            <p:txEl>
+                                              <p:pRg st="1" end="1"/>
+                                            </p:txEl>
+                                          </p:spTgt>
+                                        </p:tgtEl>
+                                        <p:attrNameLst>
+                                          <p:attrName>style.visibility</p:attrName>
+                                        </p:attrNameLst>
+                                      </p:cBhvr>
+                                      <p:to>
+                                        <p:strVal val="visible"/>
+                                      </p:to>
+                                    </p:set>
+                                  </p:childTnLst>
+                                </p:cTn>
+                              </p:par>
+                            </p:childTnLst>
+                          </p:cTn>
+                        </p:par>
+                      </p:childTnLst>
+                    </p:cTn>
+                  </p:par>
+                  <p:par>
+                    <p:cTn id="7" fill="hold">
+                      <p:stCondLst>
+                        <p:cond delay="indefinite"/>
+                      </p:stCondLst>
+                      <p:childTnLst>
+                        <p:par>
+                          <p:cTn id="8" fill="hold">
+                            <p:stCondLst>
+                              <p:cond delay="0"/>
+                            </p:stCondLst>
+                            <p:childTnLst>
+                              <p:par>
+                                <p:cTn id="9" presetID="1" presetClass="entr" presetSubtype="0" fill="hold" nodeType="clickEffect">
+                                  <p:stCondLst>
+                                    <p:cond delay="0"/>
+                                  </p:stCondLst>
+                                  <p:childTnLst>
+                                    <p:set>
+                                      <p:cBhvr>
+                                        <p:cTn id="10" dur="1" fill="hold">
+                                          <p:stCondLst>
+                                            <p:cond delay="0"/>
+                                          </p:stCondLst>
+                                        </p:cTn>
+                                        <p:tgtEl>
+                                          <p:spTgt spid="2">
+                                            <p:txEl>
+                                              <p:pRg st="2" end="2"/>
+                                            </p:txEl>
+                                          </p:spTgt>
+                                        </p:tgtEl>
+                                        <p:attrNameLst>
+                                          <p:attrName>style.visibility</p:attrName>
+                                        </p:attrNameLst>
+                                      </p:cBhvr>
+                                      <p:to>
+                                        <p:strVal val="visible"/>
+                                      </p:to>
+                                    </p:set>
+                                  </p:childTnLst>
+                                </p:cTn>
+                              </p:par>
+                            </p:childTnLst>
+                          </p:cTn>
+                        </p:par>
+                      </p:childTnLst>
+                    </p:cTn>
+                  </p:par>
+                  <p:par>
+                    <p:cTn id="11" fill="hold">
+                      <p:stCondLst>
+                        <p:cond delay="indefinite"/>
+                      </p:stCondLst>
+                      <p:childTnLst>
+                        <p:par>
+                          <p:cTn id="12" fill="hold">
+                            <p:stCondLst>
+                              <p:cond delay="0"/>
+                            </p:stCondLst>
+                            <p:childTnLst>
+                              <p:par>
+                                <p:cTn id="13" presetID="1" presetClass="entr" presetSubtype="0" fill="hold" nodeType="clickEffect">
+                                  <p:stCondLst>
+                                    <p:cond delay="0"/>
+                                  </p:stCondLst>
+                                  <p:childTnLst>
+                                    <p:set>
+                                      <p:cBhvr>
+                                        <p:cTn id="14" dur="1" fill="hold">
+                                          <p:stCondLst>
+                                            <p:cond delay="0"/>
+                                          </p:stCondLst>
+                                        </p:cTn>
+                                        <p:tgtEl>
+                                          <p:spTgt spid="2">
+                                            <p:txEl>
+                                              <p:pRg st="3" end="3"/>
+                                            </p:txEl>
+                                          </p:spTgt>
+                                        </p:tgtEl>
+                                        <p:attrNameLst>
+                                          <p:attrName>style.visibility</p:attrName>
+                                        </p:attrNameLst>
+                                      </p:cBhvr>
+                                      <p:to>
+                                        <p:strVal val="visible"/>
+                                      </p:to>
+                                    </p:set>
+                                  </p:childTnLst>
+                                </p:cTn>
+                              </p:par>
+                            </p:childTnLst>
+                          </p:cTn>
+                        </p:par>
+                      </p:childTnLst>
+                    </p:cTn>
+                  </p:par>
+                  <p:par>
+                    <p:cTn id="15" fill="hold">
+                      <p:stCondLst>
+                        <p:cond delay="indefinite"/>
+                      </p:stCondLst>
+                      <p:childTnLst>
+                        <p:par>
+                          <p:cTn id="16" fill="hold">
+                            <p:stCondLst>
+                              <p:cond delay="0"/>
+                            </p:stCondLst>
+                            <p:childTnLst>
+                              <p:par>
+                                <p:cTn id="17" presetID="1" presetClass="entr" presetSubtype="0" fill="hold" nodeType="clickEffect">
+                                  <p:stCondLst>
+                                    <p:cond delay="0"/>
+                                  </p:stCondLst>
+                                  <p:childTnLst>
+                                    <p:set>
+                                      <p:cBhvr>
+                                        <p:cTn id="18" dur="1" fill="hold">
+                                          <p:stCondLst>
+                                            <p:cond delay="0"/>
+                                          </p:stCondLst>
+                                        </p:cTn>
+                                        <p:tgtEl>
+                                          <p:spTgt spid="2">
+                                            <p:txEl>
+                                              <p:pRg st="4" end="4"/>
+                                            </p:txEl>
+                                          </p:spTgt>
+                                        </p:tgtEl>
+                                        <p:attrNameLst>
+                                          <p:attrName>style.visibility</p:attrName>
+                                        </p:attrNameLst>
+                                      </p:cBhvr>
+                                      <p:to>
+                                        <p:strVal val="visible"/>
+                                      </p:to>
+                                    </p:set>
+                                  </p:childTnLst>
+                                </p:cTn>
+                              </p:par>
+                            </p:childTnLst>
+                          </p:cTn>
+                        </p:par>
+                      </p:childTnLst>
+                    </p:cTn>
+                  </p:par>
+                  <p:par>
+                    <p:cTn id="19" fill="hold">
+                      <p:stCondLst>
+                        <p:cond delay="indefinite"/>
+                      </p:stCondLst>
+                      <p:childTnLst>
+                        <p:par>
+                          <p:cTn id="20" fill="hold">
+                            <p:stCondLst>
+                              <p:cond delay="0"/>
+                            </p:stCondLst>
+                            <p:childTnLst>
+                              <p:par>
+                                <p:cTn id="21" presetID="1" presetClass="entr" presetSubtype="0" fill="hold" nodeType="clickEffect">
+                                  <p:stCondLst>
+                                    <p:cond delay="0"/>
+                                  </p:stCondLst>
+                                  <p:childTnLst>
+                                    <p:set>
+                                      <p:cBhvr>
+                                        <p:cTn id="22" dur="1" fill="hold">
+                                          <p:stCondLst>
+                                            <p:cond delay="0"/>
+                                          </p:stCondLst>
+                                        </p:cTn>
+                                        <p:tgtEl>
+                                          <p:spTgt spid="2">
+                                            <p:txEl>
+                                              <p:pRg st="5" end="5"/>
+                                            </p:txEl>
+                                          </p:spTgt>
+                                        </p:tgtEl>
+                                        <p:attrNameLst>
+                                          <p:attrName>style.visibility</p:attrName>
+                                        </p:attrNameLst>
+                                      </p:cBhvr>
+                                      <p:to>
+                                        <p:strVal val="visible"/>
+                                      </p:to>
+                                    </p:set>
+                                  </p:childTnLst>
+                                </p:cTn>
+                              </p:par>
+                            </p:childTnLst>
+                          </p:cTn>
+                        </p:par>
+                      </p:childTnLst>
+                    </p:cTn>
+                  </p:par>
+                  <p:par>
+                    <p:cTn id="23" fill="hold">
+                      <p:stCondLst>
+                        <p:cond delay="indefinite"/>
+                      </p:stCondLst>
+                      <p:childTnLst>
+                        <p:par>
+                          <p:cTn id="24" fill="hold">
+                            <p:stCondLst>
+                              <p:cond delay="0"/>
+                            </p:stCondLst>
+                            <p:childTnLst>
+                              <p:par>
+                                <p:cTn id="25" presetID="1" presetClass="entr" presetSubtype="0" fill="hold" nodeType="clickEffect">
+                                  <p:stCondLst>
+                                    <p:cond delay="0"/>
+                                  </p:stCondLst>
+                                  <p:childTnLst>
+                                    <p:set>
+                                      <p:cBhvr>
+                                        <p:cTn id="26" dur="1" fill="hold">
+                                          <p:stCondLst>
+                                            <p:cond delay="0"/>
+                                          </p:stCondLst>
+                                        </p:cTn>
+                                        <p:tgtEl>
+                                          <p:spTgt spid="2">
+                                            <p:txEl>
+                                              <p:pRg st="7" end="7"/>
+                                            </p:txEl>
+                                          </p:spTgt>
+                                        </p:tgtEl>
+                                        <p:attrNameLst>
+                                          <p:attrName>style.visibility</p:attrName>
+                                        </p:attrNameLst>
+                                      </p:cBhvr>
+                                      <p:to>
+                                        <p:strVal val="visible"/>
+                                      </p:to>
+                                    </p:set>
+                                  </p:childTnLst>
+                                </p:cTn>
+                              </p:par>
+                            </p:childTnLst>
+                          </p:cTn>
+                        </p:par>
+                      </p:childTnLst>
+                    </p:cTn>
+                  </p:par>
+                  <p:par>
+                    <p:cTn id="27" fill="hold">
+                      <p:stCondLst>
+                        <p:cond delay="indefinite"/>
+                      </p:stCondLst>
+                      <p:childTnLst>
+                        <p:par>
+                          <p:cTn id="28" fill="hold">
+                            <p:stCondLst>
+                              <p:cond delay="0"/>
+                            </p:stCondLst>
+                            <p:childTnLst>
+                              <p:par>
+                                <p:cTn id="29" presetID="1" presetClass="entr" presetSubtype="0" fill="hold" nodeType="clickEffect">
+                                  <p:stCondLst>
+                                    <p:cond delay="0"/>
+                                  </p:stCondLst>
+                                  <p:childTnLst>
+                                    <p:set>
+                                      <p:cBhvr>
+                                        <p:cTn id="30" dur="1" fill="hold">
+                                          <p:stCondLst>
+                                            <p:cond delay="0"/>
+                                          </p:stCondLst>
+                                        </p:cTn>
+                                        <p:tgtEl>
+                                          <p:spTgt spid="2">
+                                            <p:txEl>
+                                              <p:pRg st="8" end="8"/>
+                                            </p:txEl>
+                                          </p:spTgt>
+                                        </p:tgtEl>
+                                        <p:attrNameLst>
+                                          <p:attrName>style.visibility</p:attrName>
+                                        </p:attrNameLst>
+                                      </p:cBhvr>
+                                      <p:to>
+                                        <p:strVal val="visible"/>
+                                      </p:to>
+                                    </p:set>
+                                  </p:childTnLst>
+                                </p:cTn>
+                              </p:par>
+                            </p:childTnLst>
+                          </p:cTn>
+                        </p:par>
+                      </p:childTnLst>
+                    </p:cTn>
+                  </p:par>
+                  <p:par>
+                    <p:cTn id="31" fill="hold">
+                      <p:stCondLst>
+                        <p:cond delay="indefinite"/>
+                      </p:stCondLst>
+                      <p:childTnLst>
+                        <p:par>
+                          <p:cTn id="32" fill="hold">
+                            <p:stCondLst>
+                              <p:cond delay="0"/>
+                            </p:stCondLst>
+                            <p:childTnLst>
+                              <p:par>
+                                <p:cTn id="33" presetID="1" presetClass="entr" presetSubtype="0" fill="hold" nodeType="clickEffect">
+                                  <p:stCondLst>
+                                    <p:cond delay="0"/>
+                                  </p:stCondLst>
+                                  <p:childTnLst>
+                                    <p:set>
+                                      <p:cBhvr>
+                                        <p:cTn id="34" dur="1" fill="hold">
+                                          <p:stCondLst>
+                                            <p:cond delay="0"/>
+                                          </p:stCondLst>
+                                        </p:cTn>
+                                        <p:tgtEl>
+                                          <p:spTgt spid="2">
+                                            <p:txEl>
+                                              <p:pRg st="9" end="9"/>
+                                            </p:txEl>
+                                          </p:spTgt>
+                                        </p:tgtEl>
+                                        <p:attrNameLst>
+                                          <p:attrName>style.visibility</p:attrName>
+                                        </p:attrNameLst>
+                                      </p:cBhvr>
+                                      <p:to>
+                                        <p:strVal val="visible"/>
+                                      </p:to>
+                                    </p:set>
+                                  </p:childTnLst>
+                                </p:cTn>
+                              </p:par>
+                            </p:childTnLst>
+                          </p:cTn>
+                        </p:par>
+                      </p:childTnLst>
+                    </p:cTn>
+                  </p:par>
+                </p:childTnLst>
+              </p:cTn>
+              <p:prevCondLst>
+                <p:cond evt="onPrev" delay="0">
+                  <p:tgtEl>
+                    <p:sldTgt/>
+                  </p:tgtEl>
+                </p:cond>
+              </p:prevCondLst>
+              <p:nextCondLst>
+                <p:cond evt="onNext" delay="0">
+                  <p:tgtEl>
+                    <p:sldTgt/>
+                  </p:tgtEl>
+                </p:cond>
+              </p:nextCondLst>
+            </p:seq>
+          </p:childTnLst>
+        </p:cTn>
+      </p:par>
+    </p:tnLst>
+  </p:timing>
 </p:sld>
 </file>
 
@@ -3362,7 +4307,7 @@
         <p:spPr>
           <a:xfrm>
             <a:off x="795528" y="210312"/>
-            <a:ext cx="7772400" cy="5486400"/>
+            <a:ext cx="7772400" cy="6001643"/>
           </a:xfrm>
           <a:prstGeom prst="rect">
             <a:avLst/>
@@ -3386,9 +4331,22 @@
               </a:defRPr>
             </a:pPr>
             <a:r>
-              <a:rPr dirty="0"/>
-              <a:t>Overview</a:t>
-            </a:r>
+              <a:rPr lang="de-DE" dirty="0" err="1"/>
+              <a:t>What</a:t>
+            </a:r>
+            <a:r>
+              <a:rPr lang="de-DE" dirty="0"/>
+              <a:t> </a:t>
+            </a:r>
+            <a:r>
+              <a:rPr lang="de-DE" dirty="0" err="1"/>
+              <a:t>is</a:t>
+            </a:r>
+            <a:r>
+              <a:rPr lang="de-DE" dirty="0"/>
+              <a:t> Table Analyzer</a:t>
+            </a:r>
+            <a:endParaRPr dirty="0"/>
           </a:p>
           <a:p>
             <a:pPr lvl="1">
@@ -3428,6 +4386,21 @@
               <a:rPr dirty="0"/>
               <a:t>• Designed for clarity, reproducibility, and speed</a:t>
             </a:r>
+            <a:endParaRPr lang="de-DE" dirty="0"/>
+          </a:p>
+          <a:p>
+            <a:pPr lvl="1">
+              <a:defRPr sz="1800">
+                <a:solidFill>
+                  <a:srgbClr val="3C3C3C"/>
+                </a:solidFill>
+              </a:defRPr>
+            </a:pPr>
+            <a:r>
+              <a:rPr lang="en-US" dirty="0"/>
+              <a:t>• Based on a modern, model-based statistical framework (ANOVA, LM, LMM)</a:t>
+            </a:r>
+            <a:endParaRPr dirty="0"/>
           </a:p>
           <a:p>
             <a:pPr>
@@ -3615,7 +4588,7 @@
                                         <p:tgtEl>
                                           <p:spTgt spid="2">
                                             <p:txEl>
-                                              <p:pRg st="5" end="5"/>
+                                              <p:pRg st="6" end="6"/>
                                             </p:txEl>
                                           </p:spTgt>
                                         </p:tgtEl>
@@ -3646,7 +4619,7 @@
                                         <p:tgtEl>
                                           <p:spTgt spid="2">
                                             <p:txEl>
-                                              <p:pRg st="6" end="6"/>
+                                              <p:pRg st="7" end="7"/>
                                             </p:txEl>
                                           </p:spTgt>
                                         </p:tgtEl>
@@ -3677,7 +4650,7 @@
                                         <p:tgtEl>
                                           <p:spTgt spid="2">
                                             <p:txEl>
-                                              <p:pRg st="7" end="7"/>
+                                              <p:pRg st="8" end="8"/>
                                             </p:txEl>
                                           </p:spTgt>
                                         </p:tgtEl>
@@ -3708,7 +4681,7 @@
                                         <p:tgtEl>
                                           <p:spTgt spid="2">
                                             <p:txEl>
-                                              <p:pRg st="8" end="8"/>
+                                              <p:pRg st="9" end="9"/>
                                             </p:txEl>
                                           </p:spTgt>
                                         </p:tgtEl>
@@ -3757,7 +4730,7 @@
                                         <p:tgtEl>
                                           <p:spTgt spid="2">
                                             <p:txEl>
-                                              <p:pRg st="9" end="9"/>
+                                              <p:pRg st="10" end="10"/>
                                             </p:txEl>
                                           </p:spTgt>
                                         </p:tgtEl>
@@ -3788,7 +4761,7 @@
                                         <p:tgtEl>
                                           <p:spTgt spid="2">
                                             <p:txEl>
-                                              <p:pRg st="10" end="10"/>
+                                              <p:pRg st="11" end="11"/>
                                             </p:txEl>
                                           </p:spTgt>
                                         </p:tgtEl>
@@ -3819,7 +4792,7 @@
                                         <p:tgtEl>
                                           <p:spTgt spid="2">
                                             <p:txEl>
-                                              <p:pRg st="11" end="11"/>
+                                              <p:pRg st="12" end="12"/>
                                             </p:txEl>
                                           </p:spTgt>
                                         </p:tgtEl>
@@ -3868,7 +4841,7 @@
                                         <p:tgtEl>
                                           <p:spTgt spid="2">
                                             <p:txEl>
-                                              <p:pRg st="12" end="12"/>
+                                              <p:pRg st="13" end="13"/>
                                             </p:txEl>
                                           </p:spTgt>
                                         </p:tgtEl>
@@ -3899,7 +4872,7 @@
                                         <p:tgtEl>
                                           <p:spTgt spid="2">
                                             <p:txEl>
-                                              <p:pRg st="13" end="13"/>
+                                              <p:pRg st="14" end="14"/>
                                             </p:txEl>
                                           </p:spTgt>
                                         </p:tgtEl>
@@ -3930,7 +4903,7 @@
                                         <p:tgtEl>
                                           <p:spTgt spid="2">
                                             <p:txEl>
-                                              <p:pRg st="14" end="14"/>
+                                              <p:pRg st="15" end="15"/>
                                             </p:txEl>
                                           </p:spTgt>
                                         </p:tgtEl>
@@ -3961,7 +4934,7 @@
                                         <p:tgtEl>
                                           <p:spTgt spid="2">
                                             <p:txEl>
-                                              <p:pRg st="15" end="15"/>
+                                              <p:pRg st="16" end="16"/>
                                             </p:txEl>
                                           </p:spTgt>
                                         </p:tgtEl>
@@ -4325,4 +5298,319 @@
   </a:objectDefaults>
   <a:extraClrSchemeLst/>
 </a:theme>
+</file>
+
+<file path=ppt/theme/theme2.xml><?xml version="1.0" encoding="utf-8"?>
+<a:theme xmlns:a="http://schemas.openxmlformats.org/drawingml/2006/main" name="Office Theme">
+  <a:themeElements>
+    <a:clrScheme name="Office">
+      <a:dk1>
+        <a:sysClr val="windowText" lastClr="000000"/>
+      </a:dk1>
+      <a:lt1>
+        <a:sysClr val="window" lastClr="FFFFFF"/>
+      </a:lt1>
+      <a:dk2>
+        <a:srgbClr val="0E2841"/>
+      </a:dk2>
+      <a:lt2>
+        <a:srgbClr val="E8E8E8"/>
+      </a:lt2>
+      <a:accent1>
+        <a:srgbClr val="156082"/>
+      </a:accent1>
+      <a:accent2>
+        <a:srgbClr val="E97132"/>
+      </a:accent2>
+      <a:accent3>
+        <a:srgbClr val="196B24"/>
+      </a:accent3>
+      <a:accent4>
+        <a:srgbClr val="0F9ED5"/>
+      </a:accent4>
+      <a:accent5>
+        <a:srgbClr val="A02B93"/>
+      </a:accent5>
+      <a:accent6>
+        <a:srgbClr val="4EA72E"/>
+      </a:accent6>
+      <a:hlink>
+        <a:srgbClr val="467886"/>
+      </a:hlink>
+      <a:folHlink>
+        <a:srgbClr val="96607D"/>
+      </a:folHlink>
+    </a:clrScheme>
+    <a:fontScheme name="Office">
+      <a:majorFont>
+        <a:latin typeface="Aptos Display" panose="02110004020202020204"/>
+        <a:ea typeface=""/>
+        <a:cs typeface=""/>
+        <a:font script="Jpan" typeface="游ゴシック Light"/>
+        <a:font script="Hang" typeface="맑은 고딕"/>
+        <a:font script="Hans" typeface="等线 Light"/>
+        <a:font script="Hant" typeface="新細明體"/>
+        <a:font script="Arab" typeface="Times New Roman"/>
+        <a:font script="Hebr" typeface="Times New Roman"/>
+        <a:font script="Thai" typeface="Angsana New"/>
+        <a:font script="Ethi" typeface="Nyala"/>
+        <a:font script="Beng" typeface="Vrinda"/>
+        <a:font script="Gujr" typeface="Shruti"/>
+        <a:font script="Khmr" typeface="MoolBoran"/>
+        <a:font script="Knda" typeface="Tunga"/>
+        <a:font script="Guru" typeface="Raavi"/>
+        <a:font script="Cans" typeface="Euphemia"/>
+        <a:font script="Cher" typeface="Plantagenet Cherokee"/>
+        <a:font script="Yiii" typeface="Microsoft Yi Baiti"/>
+        <a:font script="Tibt" typeface="Microsoft Himalaya"/>
+        <a:font script="Thaa" typeface="MV Boli"/>
+        <a:font script="Deva" typeface="Mangal"/>
+        <a:font script="Telu" typeface="Gautami"/>
+        <a:font script="Taml" typeface="Latha"/>
+        <a:font script="Syrc" typeface="Estrangelo Edessa"/>
+        <a:font script="Orya" typeface="Kalinga"/>
+        <a:font script="Mlym" typeface="Kartika"/>
+        <a:font script="Laoo" typeface="DokChampa"/>
+        <a:font script="Sinh" typeface="Iskoola Pota"/>
+        <a:font script="Mong" typeface="Mongolian Baiti"/>
+        <a:font script="Viet" typeface="Times New Roman"/>
+        <a:font script="Uigh" typeface="Microsoft Uighur"/>
+        <a:font script="Geor" typeface="Sylfaen"/>
+        <a:font script="Armn" typeface="Arial"/>
+        <a:font script="Bugi" typeface="Leelawadee UI"/>
+        <a:font script="Bopo" typeface="Microsoft JhengHei"/>
+        <a:font script="Java" typeface="Javanese Text"/>
+        <a:font script="Lisu" typeface="Segoe UI"/>
+        <a:font script="Mymr" typeface="Myanmar Text"/>
+        <a:font script="Nkoo" typeface="Ebrima"/>
+        <a:font script="Olck" typeface="Nirmala UI"/>
+        <a:font script="Osma" typeface="Ebrima"/>
+        <a:font script="Phag" typeface="Phagspa"/>
+        <a:font script="Syrn" typeface="Estrangelo Edessa"/>
+        <a:font script="Syrj" typeface="Estrangelo Edessa"/>
+        <a:font script="Syre" typeface="Estrangelo Edessa"/>
+        <a:font script="Sora" typeface="Nirmala UI"/>
+        <a:font script="Tale" typeface="Microsoft Tai Le"/>
+        <a:font script="Talu" typeface="Microsoft New Tai Lue"/>
+        <a:font script="Tfng" typeface="Ebrima"/>
+      </a:majorFont>
+      <a:minorFont>
+        <a:latin typeface="Aptos" panose="02110004020202020204"/>
+        <a:ea typeface=""/>
+        <a:cs typeface=""/>
+        <a:font script="Jpan" typeface="游ゴシック"/>
+        <a:font script="Hang" typeface="맑은 고딕"/>
+        <a:font script="Hans" typeface="等线"/>
+        <a:font script="Hant" typeface="新細明體"/>
+        <a:font script="Arab" typeface="Arial"/>
+        <a:font script="Hebr" typeface="Arial"/>
+        <a:font script="Thai" typeface="Cordia New"/>
+        <a:font script="Ethi" typeface="Nyala"/>
+        <a:font script="Beng" typeface="Vrinda"/>
+        <a:font script="Gujr" typeface="Shruti"/>
+        <a:font script="Khmr" typeface="DaunPenh"/>
+        <a:font script="Knda" typeface="Tunga"/>
+        <a:font script="Guru" typeface="Raavi"/>
+        <a:font script="Cans" typeface="Euphemia"/>
+        <a:font script="Cher" typeface="Plantagenet Cherokee"/>
+        <a:font script="Yiii" typeface="Microsoft Yi Baiti"/>
+        <a:font script="Tibt" typeface="Microsoft Himalaya"/>
+        <a:font script="Thaa" typeface="MV Boli"/>
+        <a:font script="Deva" typeface="Mangal"/>
+        <a:font script="Telu" typeface="Gautami"/>
+        <a:font script="Taml" typeface="Latha"/>
+        <a:font script="Syrc" typeface="Estrangelo Edessa"/>
+        <a:font script="Orya" typeface="Kalinga"/>
+        <a:font script="Mlym" typeface="Kartika"/>
+        <a:font script="Laoo" typeface="DokChampa"/>
+        <a:font script="Sinh" typeface="Iskoola Pota"/>
+        <a:font script="Mong" typeface="Mongolian Baiti"/>
+        <a:font script="Viet" typeface="Arial"/>
+        <a:font script="Uigh" typeface="Microsoft Uighur"/>
+        <a:font script="Geor" typeface="Sylfaen"/>
+        <a:font script="Armn" typeface="Arial"/>
+        <a:font script="Bugi" typeface="Leelawadee UI"/>
+        <a:font script="Bopo" typeface="Microsoft JhengHei"/>
+        <a:font script="Java" typeface="Javanese Text"/>
+        <a:font script="Lisu" typeface="Segoe UI"/>
+        <a:font script="Mymr" typeface="Myanmar Text"/>
+        <a:font script="Nkoo" typeface="Ebrima"/>
+        <a:font script="Olck" typeface="Nirmala UI"/>
+        <a:font script="Osma" typeface="Ebrima"/>
+        <a:font script="Phag" typeface="Phagspa"/>
+        <a:font script="Syrn" typeface="Estrangelo Edessa"/>
+        <a:font script="Syrj" typeface="Estrangelo Edessa"/>
+        <a:font script="Syre" typeface="Estrangelo Edessa"/>
+        <a:font script="Sora" typeface="Nirmala UI"/>
+        <a:font script="Tale" typeface="Microsoft Tai Le"/>
+        <a:font script="Talu" typeface="Microsoft New Tai Lue"/>
+        <a:font script="Tfng" typeface="Ebrima"/>
+      </a:minorFont>
+    </a:fontScheme>
+    <a:fmtScheme name="Office">
+      <a:fillStyleLst>
+        <a:solidFill>
+          <a:schemeClr val="phClr"/>
+        </a:solidFill>
+        <a:gradFill rotWithShape="1">
+          <a:gsLst>
+            <a:gs pos="0">
+              <a:schemeClr val="phClr">
+                <a:lumMod val="110000"/>
+                <a:satMod val="105000"/>
+                <a:tint val="67000"/>
+              </a:schemeClr>
+            </a:gs>
+            <a:gs pos="50000">
+              <a:schemeClr val="phClr">
+                <a:lumMod val="105000"/>
+                <a:satMod val="103000"/>
+                <a:tint val="73000"/>
+              </a:schemeClr>
+            </a:gs>
+            <a:gs pos="100000">
+              <a:schemeClr val="phClr">
+                <a:lumMod val="105000"/>
+                <a:satMod val="109000"/>
+                <a:tint val="81000"/>
+              </a:schemeClr>
+            </a:gs>
+          </a:gsLst>
+          <a:lin ang="5400000" scaled="0"/>
+        </a:gradFill>
+        <a:gradFill rotWithShape="1">
+          <a:gsLst>
+            <a:gs pos="0">
+              <a:schemeClr val="phClr">
+                <a:satMod val="103000"/>
+                <a:lumMod val="102000"/>
+                <a:tint val="94000"/>
+              </a:schemeClr>
+            </a:gs>
+            <a:gs pos="50000">
+              <a:schemeClr val="phClr">
+                <a:satMod val="110000"/>
+                <a:lumMod val="100000"/>
+                <a:shade val="100000"/>
+              </a:schemeClr>
+            </a:gs>
+            <a:gs pos="100000">
+              <a:schemeClr val="phClr">
+                <a:lumMod val="99000"/>
+                <a:satMod val="120000"/>
+                <a:shade val="78000"/>
+              </a:schemeClr>
+            </a:gs>
+          </a:gsLst>
+          <a:lin ang="5400000" scaled="0"/>
+        </a:gradFill>
+      </a:fillStyleLst>
+      <a:lnStyleLst>
+        <a:ln w="12700" cap="flat" cmpd="sng" algn="ctr">
+          <a:solidFill>
+            <a:schemeClr val="phClr"/>
+          </a:solidFill>
+          <a:prstDash val="solid"/>
+          <a:miter lim="800000"/>
+        </a:ln>
+        <a:ln w="19050" cap="flat" cmpd="sng" algn="ctr">
+          <a:solidFill>
+            <a:schemeClr val="phClr"/>
+          </a:solidFill>
+          <a:prstDash val="solid"/>
+          <a:miter lim="800000"/>
+        </a:ln>
+        <a:ln w="25400" cap="flat" cmpd="sng" algn="ctr">
+          <a:solidFill>
+            <a:schemeClr val="phClr"/>
+          </a:solidFill>
+          <a:prstDash val="solid"/>
+          <a:miter lim="800000"/>
+        </a:ln>
+      </a:lnStyleLst>
+      <a:effectStyleLst>
+        <a:effectStyle>
+          <a:effectLst/>
+        </a:effectStyle>
+        <a:effectStyle>
+          <a:effectLst/>
+        </a:effectStyle>
+        <a:effectStyle>
+          <a:effectLst>
+            <a:outerShdw blurRad="57150" dist="19050" dir="5400000" algn="ctr" rotWithShape="0">
+              <a:srgbClr val="000000">
+                <a:alpha val="63000"/>
+              </a:srgbClr>
+            </a:outerShdw>
+          </a:effectLst>
+        </a:effectStyle>
+      </a:effectStyleLst>
+      <a:bgFillStyleLst>
+        <a:solidFill>
+          <a:schemeClr val="phClr"/>
+        </a:solidFill>
+        <a:solidFill>
+          <a:schemeClr val="phClr">
+            <a:tint val="95000"/>
+            <a:satMod val="170000"/>
+          </a:schemeClr>
+        </a:solidFill>
+        <a:gradFill rotWithShape="1">
+          <a:gsLst>
+            <a:gs pos="0">
+              <a:schemeClr val="phClr">
+                <a:tint val="93000"/>
+                <a:satMod val="150000"/>
+                <a:shade val="98000"/>
+                <a:lumMod val="102000"/>
+              </a:schemeClr>
+            </a:gs>
+            <a:gs pos="50000">
+              <a:schemeClr val="phClr">
+                <a:tint val="98000"/>
+                <a:satMod val="130000"/>
+                <a:shade val="90000"/>
+                <a:lumMod val="103000"/>
+              </a:schemeClr>
+            </a:gs>
+            <a:gs pos="100000">
+              <a:schemeClr val="phClr">
+                <a:shade val="63000"/>
+                <a:satMod val="120000"/>
+              </a:schemeClr>
+            </a:gs>
+          </a:gsLst>
+          <a:lin ang="5400000" scaled="0"/>
+        </a:gradFill>
+      </a:bgFillStyleLst>
+    </a:fmtScheme>
+  </a:themeElements>
+  <a:objectDefaults>
+    <a:lnDef>
+      <a:spPr/>
+      <a:bodyPr/>
+      <a:lstStyle/>
+      <a:style>
+        <a:lnRef idx="2">
+          <a:schemeClr val="accent1"/>
+        </a:lnRef>
+        <a:fillRef idx="0">
+          <a:schemeClr val="accent1"/>
+        </a:fillRef>
+        <a:effectRef idx="1">
+          <a:schemeClr val="accent1"/>
+        </a:effectRef>
+        <a:fontRef idx="minor">
+          <a:schemeClr val="tx1"/>
+        </a:fontRef>
+      </a:style>
+    </a:lnDef>
+  </a:objectDefaults>
+  <a:extraClrSchemeLst/>
+  <a:extLst>
+    <a:ext uri="{05A4C25C-085E-4340-85A3-A5531E510DB2}">
+      <thm15:themeFamily xmlns:thm15="http://schemas.microsoft.com/office/thememl/2012/main" name="Office Theme" id="{2E142A2C-CD16-42D6-873A-C26D2A0506FA}" vid="{1BDDFF52-6CD6-40A5-AB3C-68EB2F1E4D0A}"/>
+    </a:ext>
+  </a:extLst>
+</a:theme>
 </file>
</xml_diff>

<commit_message>
added edit column types button
</commit_message>
<xml_diff>
--- a/presentations/Table_Analyzer_Overview.pptx
+++ b/presentations/Table_Analyzer_Overview.pptx
@@ -5,12 +5,16 @@
     <p:sldMasterId id="2147483648" r:id="rId1"/>
   </p:sldMasterIdLst>
   <p:notesMasterIdLst>
-    <p:notesMasterId r:id="rId5"/>
+    <p:notesMasterId r:id="rId9"/>
   </p:notesMasterIdLst>
   <p:sldIdLst>
     <p:sldId id="256" r:id="rId2"/>
     <p:sldId id="258" r:id="rId3"/>
     <p:sldId id="257" r:id="rId4"/>
+    <p:sldId id="262" r:id="rId5"/>
+    <p:sldId id="259" r:id="rId6"/>
+    <p:sldId id="260" r:id="rId7"/>
+    <p:sldId id="263" r:id="rId8"/>
   </p:sldIdLst>
   <p:sldSz cx="9144000" cy="6858000" type="screen4x3"/>
   <p:notesSz cx="6858000" cy="9144000"/>
@@ -4977,6 +4981,663 @@
       </p:par>
     </p:tnLst>
   </p:timing>
+</p:sld>
+</file>
+
+<file path=ppt/slides/slide4.xml><?xml version="1.0" encoding="utf-8"?>
+<p:sld xmlns:a="http://schemas.openxmlformats.org/drawingml/2006/main" xmlns:r="http://schemas.openxmlformats.org/officeDocument/2006/relationships" xmlns:p="http://schemas.openxmlformats.org/presentationml/2006/main">
+  <p:cSld>
+    <p:spTree>
+      <p:nvGrpSpPr>
+        <p:cNvPr id="1" name=""/>
+        <p:cNvGrpSpPr/>
+        <p:nvPr/>
+      </p:nvGrpSpPr>
+      <p:grpSpPr>
+        <a:xfrm>
+          <a:off x="0" y="0"/>
+          <a:ext cx="0" cy="0"/>
+          <a:chOff x="0" y="0"/>
+          <a:chExt cx="0" cy="0"/>
+        </a:xfrm>
+      </p:grpSpPr>
+      <p:sp>
+        <p:nvSpPr>
+          <p:cNvPr id="2" name="Title 1">
+            <a:extLst>
+              <a:ext uri="{FF2B5EF4-FFF2-40B4-BE49-F238E27FC236}">
+                <a16:creationId xmlns:a16="http://schemas.microsoft.com/office/drawing/2014/main" id="{71348000-8DB4-EFA8-B151-AF1410B425FC}"/>
+              </a:ext>
+            </a:extLst>
+          </p:cNvPr>
+          <p:cNvSpPr>
+            <a:spLocks noGrp="1"/>
+          </p:cNvSpPr>
+          <p:nvPr>
+            <p:ph type="title"/>
+          </p:nvPr>
+        </p:nvSpPr>
+        <p:spPr/>
+        <p:txBody>
+          <a:bodyPr/>
+          <a:lstStyle/>
+          <a:p>
+            <a:r>
+              <a:rPr lang="en-US" dirty="0"/>
+              <a:t>NOTES on LMM</a:t>
+            </a:r>
+          </a:p>
+        </p:txBody>
+      </p:sp>
+    </p:spTree>
+    <p:extLst>
+      <p:ext uri="{BB962C8B-B14F-4D97-AF65-F5344CB8AC3E}">
+        <p14:creationId xmlns:p14="http://schemas.microsoft.com/office/powerpoint/2010/main" val="346991280"/>
+      </p:ext>
+    </p:extLst>
+  </p:cSld>
+  <p:clrMapOvr>
+    <a:masterClrMapping/>
+  </p:clrMapOvr>
+</p:sld>
+</file>
+
+<file path=ppt/slides/slide5.xml><?xml version="1.0" encoding="utf-8"?>
+<p:sld xmlns:a="http://schemas.openxmlformats.org/drawingml/2006/main" xmlns:r="http://schemas.openxmlformats.org/officeDocument/2006/relationships" xmlns:p="http://schemas.openxmlformats.org/presentationml/2006/main">
+  <p:cSld>
+    <p:spTree>
+      <p:nvGrpSpPr>
+        <p:cNvPr id="1" name=""/>
+        <p:cNvGrpSpPr/>
+        <p:nvPr/>
+      </p:nvGrpSpPr>
+      <p:grpSpPr>
+        <a:xfrm>
+          <a:off x="0" y="0"/>
+          <a:ext cx="0" cy="0"/>
+          <a:chOff x="0" y="0"/>
+          <a:chExt cx="0" cy="0"/>
+        </a:xfrm>
+      </p:grpSpPr>
+      <p:sp>
+        <p:nvSpPr>
+          <p:cNvPr id="3" name="TextBox 2">
+            <a:extLst>
+              <a:ext uri="{FF2B5EF4-FFF2-40B4-BE49-F238E27FC236}">
+                <a16:creationId xmlns:a16="http://schemas.microsoft.com/office/drawing/2014/main" id="{184EEA22-109C-8598-D181-3B420FE4ECED}"/>
+              </a:ext>
+            </a:extLst>
+          </p:cNvPr>
+          <p:cNvSpPr txBox="1"/>
+          <p:nvPr/>
+        </p:nvSpPr>
+        <p:spPr>
+          <a:xfrm>
+            <a:off x="635876" y="117693"/>
+            <a:ext cx="8019393" cy="6740307"/>
+          </a:xfrm>
+          <a:prstGeom prst="rect">
+            <a:avLst/>
+          </a:prstGeom>
+          <a:noFill/>
+        </p:spPr>
+        <p:txBody>
+          <a:bodyPr wrap="square">
+            <a:spAutoFit/>
+          </a:bodyPr>
+          <a:lstStyle/>
+          <a:p>
+            <a:pPr>
+              <a:buNone/>
+            </a:pPr>
+            <a:r>
+              <a:rPr lang="en-US" b="1" dirty="0"/>
+              <a:t>🐔 Random Effects</a:t>
+            </a:r>
+          </a:p>
+          <a:p>
+            <a:pPr>
+              <a:buNone/>
+            </a:pPr>
+            <a:endParaRPr lang="en-US" b="1" dirty="0"/>
+          </a:p>
+          <a:p>
+            <a:pPr>
+              <a:buNone/>
+            </a:pPr>
+            <a:r>
+              <a:rPr lang="en-US" b="1" dirty="0"/>
+              <a:t>What they represent</a:t>
+            </a:r>
+          </a:p>
+          <a:p>
+            <a:pPr>
+              <a:buFont typeface="Arial" panose="020B0604020202020204" pitchFamily="34" charset="0"/>
+              <a:buChar char="•"/>
+            </a:pPr>
+            <a:r>
+              <a:rPr lang="en-US" dirty="0"/>
+              <a:t> They capture </a:t>
+            </a:r>
+            <a:r>
+              <a:rPr lang="en-US" b="1" dirty="0"/>
+              <a:t>natural differences between individual animals</a:t>
+            </a:r>
+            <a:r>
+              <a:rPr lang="en-US" dirty="0"/>
+              <a:t>.</a:t>
+            </a:r>
+          </a:p>
+          <a:p>
+            <a:pPr>
+              <a:buFont typeface="Arial" panose="020B0604020202020204" pitchFamily="34" charset="0"/>
+              <a:buChar char="•"/>
+            </a:pPr>
+            <a:r>
+              <a:rPr lang="en-US" dirty="0"/>
+              <a:t> Every chicken has its own baseline weight or behavior.</a:t>
+            </a:r>
+          </a:p>
+          <a:p>
+            <a:pPr>
+              <a:buFont typeface="Arial" panose="020B0604020202020204" pitchFamily="34" charset="0"/>
+              <a:buChar char="•"/>
+            </a:pPr>
+            <a:r>
+              <a:rPr lang="en-US" dirty="0"/>
+              <a:t> Random effects allow the model to </a:t>
+            </a:r>
+            <a:r>
+              <a:rPr lang="en-US" b="1" dirty="0"/>
+              <a:t>give each animal its own starting level</a:t>
+            </a:r>
+            <a:r>
+              <a:rPr lang="en-US" dirty="0"/>
+              <a:t>, instead of forcing all animals to be identical.</a:t>
+            </a:r>
+          </a:p>
+          <a:p>
+            <a:pPr>
+              <a:buNone/>
+            </a:pPr>
+            <a:endParaRPr lang="en-US" b="1" dirty="0"/>
+          </a:p>
+          <a:p>
+            <a:pPr>
+              <a:buNone/>
+            </a:pPr>
+            <a:r>
+              <a:rPr lang="en-US" b="1" dirty="0"/>
+              <a:t>Why we need them</a:t>
+            </a:r>
+          </a:p>
+          <a:p>
+            <a:pPr>
+              <a:buFont typeface="Arial" panose="020B0604020202020204" pitchFamily="34" charset="0"/>
+              <a:buChar char="•"/>
+            </a:pPr>
+            <a:r>
+              <a:rPr lang="en-US" dirty="0"/>
+              <a:t> Animals in the same treatment group are </a:t>
+            </a:r>
+            <a:r>
+              <a:rPr lang="en-US" i="1" dirty="0"/>
+              <a:t>not</a:t>
+            </a:r>
+            <a:r>
+              <a:rPr lang="en-US" dirty="0"/>
+              <a:t> clones.</a:t>
+            </a:r>
+          </a:p>
+          <a:p>
+            <a:pPr>
+              <a:buFont typeface="Arial" panose="020B0604020202020204" pitchFamily="34" charset="0"/>
+              <a:buChar char="•"/>
+            </a:pPr>
+            <a:r>
+              <a:rPr lang="en-US" dirty="0"/>
+              <a:t> Some chickens naturally grow faster or slower, regardless of treatment.</a:t>
+            </a:r>
+          </a:p>
+          <a:p>
+            <a:pPr>
+              <a:buFont typeface="Arial" panose="020B0604020202020204" pitchFamily="34" charset="0"/>
+              <a:buChar char="•"/>
+            </a:pPr>
+            <a:r>
+              <a:rPr lang="en-US" dirty="0"/>
+              <a:t> Ignoring these differences makes the analysis less accurate, more biased and too optimistic about significance.</a:t>
+            </a:r>
+          </a:p>
+          <a:p>
+            <a:pPr>
+              <a:buNone/>
+            </a:pPr>
+            <a:endParaRPr lang="en-US" b="1" dirty="0"/>
+          </a:p>
+          <a:p>
+            <a:pPr>
+              <a:buNone/>
+            </a:pPr>
+            <a:r>
+              <a:rPr lang="en-US" b="1" dirty="0"/>
+              <a:t>What the model does with them</a:t>
+            </a:r>
+          </a:p>
+          <a:p>
+            <a:pPr>
+              <a:buFont typeface="Arial" panose="020B0604020202020204" pitchFamily="34" charset="0"/>
+              <a:buChar char="•"/>
+            </a:pPr>
+            <a:r>
+              <a:rPr lang="en-US" dirty="0"/>
+              <a:t> The model estimates how much animals </a:t>
+            </a:r>
+            <a:r>
+              <a:rPr lang="en-US" b="1" dirty="0"/>
+              <a:t>differ from each other on average</a:t>
+            </a:r>
+            <a:r>
+              <a:rPr lang="en-US" dirty="0"/>
+              <a:t>.</a:t>
+            </a:r>
+          </a:p>
+          <a:p>
+            <a:pPr>
+              <a:buFont typeface="Arial" panose="020B0604020202020204" pitchFamily="34" charset="0"/>
+              <a:buChar char="•"/>
+            </a:pPr>
+            <a:r>
+              <a:rPr lang="en-US" dirty="0"/>
+              <a:t> It adjusts treatment effects so they are not inflated by animal-to-animal variation.</a:t>
+            </a:r>
+          </a:p>
+          <a:p>
+            <a:pPr>
+              <a:buFont typeface="Arial" panose="020B0604020202020204" pitchFamily="34" charset="0"/>
+              <a:buChar char="•"/>
+            </a:pPr>
+            <a:r>
+              <a:rPr lang="en-US" dirty="0"/>
+              <a:t> The random effect acts like a </a:t>
+            </a:r>
+            <a:r>
+              <a:rPr lang="en-US" b="1" dirty="0"/>
+              <a:t>baseline correction</a:t>
+            </a:r>
+            <a:r>
+              <a:rPr lang="en-US" dirty="0"/>
+              <a:t> for each individual animal.</a:t>
+            </a:r>
+          </a:p>
+          <a:p>
+            <a:pPr>
+              <a:buNone/>
+            </a:pPr>
+            <a:endParaRPr lang="en-US" b="1" dirty="0"/>
+          </a:p>
+          <a:p>
+            <a:pPr>
+              <a:buNone/>
+            </a:pPr>
+            <a:r>
+              <a:rPr lang="en-US" b="1" dirty="0"/>
+              <a:t>Veterinary practice interpretation</a:t>
+            </a:r>
+          </a:p>
+          <a:p>
+            <a:pPr>
+              <a:buFont typeface="Arial" panose="020B0604020202020204" pitchFamily="34" charset="0"/>
+              <a:buChar char="•"/>
+            </a:pPr>
+            <a:r>
+              <a:rPr lang="en-US" dirty="0"/>
+              <a:t> If random-effect variance is large:</a:t>
+            </a:r>
+            <a:br>
+              <a:rPr lang="en-US" dirty="0"/>
+            </a:br>
+            <a:r>
+              <a:rPr lang="en-US" dirty="0"/>
+              <a:t> → animals in the trial vary a lot biologically.</a:t>
+            </a:r>
+          </a:p>
+          <a:p>
+            <a:pPr>
+              <a:buFont typeface="Arial" panose="020B0604020202020204" pitchFamily="34" charset="0"/>
+              <a:buChar char="•"/>
+            </a:pPr>
+            <a:r>
+              <a:rPr lang="en-US" dirty="0"/>
+              <a:t> If it's small:</a:t>
+            </a:r>
+            <a:br>
+              <a:rPr lang="en-US" dirty="0"/>
+            </a:br>
+            <a:r>
+              <a:rPr lang="en-US" dirty="0"/>
+              <a:t> → animals behave very similarly; group differences dominate.</a:t>
+            </a:r>
+          </a:p>
+        </p:txBody>
+      </p:sp>
+    </p:spTree>
+    <p:extLst>
+      <p:ext uri="{BB962C8B-B14F-4D97-AF65-F5344CB8AC3E}">
+        <p14:creationId xmlns:p14="http://schemas.microsoft.com/office/powerpoint/2010/main" val="2723014488"/>
+      </p:ext>
+    </p:extLst>
+  </p:cSld>
+  <p:clrMapOvr>
+    <a:masterClrMapping/>
+  </p:clrMapOvr>
+</p:sld>
+</file>
+
+<file path=ppt/slides/slide6.xml><?xml version="1.0" encoding="utf-8"?>
+<p:sld xmlns:a="http://schemas.openxmlformats.org/drawingml/2006/main" xmlns:r="http://schemas.openxmlformats.org/officeDocument/2006/relationships" xmlns:p="http://schemas.openxmlformats.org/presentationml/2006/main">
+  <p:cSld>
+    <p:spTree>
+      <p:nvGrpSpPr>
+        <p:cNvPr id="1" name=""/>
+        <p:cNvGrpSpPr/>
+        <p:nvPr/>
+      </p:nvGrpSpPr>
+      <p:grpSpPr>
+        <a:xfrm>
+          <a:off x="0" y="0"/>
+          <a:ext cx="0" cy="0"/>
+          <a:chOff x="0" y="0"/>
+          <a:chExt cx="0" cy="0"/>
+        </a:xfrm>
+      </p:grpSpPr>
+      <p:sp>
+        <p:nvSpPr>
+          <p:cNvPr id="3" name="TextBox 2">
+            <a:extLst>
+              <a:ext uri="{FF2B5EF4-FFF2-40B4-BE49-F238E27FC236}">
+                <a16:creationId xmlns:a16="http://schemas.microsoft.com/office/drawing/2014/main" id="{A2C47E32-1372-DB94-ECDF-E801FEE80F01}"/>
+              </a:ext>
+            </a:extLst>
+          </p:cNvPr>
+          <p:cNvSpPr txBox="1"/>
+          <p:nvPr/>
+        </p:nvSpPr>
+        <p:spPr>
+          <a:xfrm>
+            <a:off x="273269" y="181957"/>
+            <a:ext cx="8870731" cy="5909310"/>
+          </a:xfrm>
+          <a:prstGeom prst="rect">
+            <a:avLst/>
+          </a:prstGeom>
+          <a:noFill/>
+        </p:spPr>
+        <p:txBody>
+          <a:bodyPr wrap="square">
+            <a:spAutoFit/>
+          </a:bodyPr>
+          <a:lstStyle/>
+          <a:p>
+            <a:pPr>
+              <a:buNone/>
+            </a:pPr>
+            <a:r>
+              <a:rPr lang="en-US" b="1" dirty="0"/>
+              <a:t>🐔 Intraclass Correlation Coefficient (ICC)</a:t>
+            </a:r>
+          </a:p>
+          <a:p>
+            <a:pPr>
+              <a:buNone/>
+            </a:pPr>
+            <a:endParaRPr lang="en-US" b="1" dirty="0"/>
+          </a:p>
+          <a:p>
+            <a:pPr>
+              <a:buNone/>
+            </a:pPr>
+            <a:r>
+              <a:rPr lang="en-US" b="1" dirty="0"/>
+              <a:t>What ICC measures</a:t>
+            </a:r>
+          </a:p>
+          <a:p>
+            <a:pPr>
+              <a:buFont typeface="Arial" panose="020B0604020202020204" pitchFamily="34" charset="0"/>
+              <a:buChar char="•"/>
+            </a:pPr>
+            <a:r>
+              <a:rPr lang="en-US" dirty="0"/>
+              <a:t> ICC tells you </a:t>
+            </a:r>
+            <a:r>
+              <a:rPr lang="en-US" b="1" dirty="0"/>
+              <a:t>how much of the total variability comes from real biological differences between animals</a:t>
+            </a:r>
+            <a:r>
+              <a:rPr lang="en-US" dirty="0"/>
+              <a:t>.</a:t>
+            </a:r>
+          </a:p>
+          <a:p>
+            <a:pPr>
+              <a:buFont typeface="Arial" panose="020B0604020202020204" pitchFamily="34" charset="0"/>
+              <a:buChar char="•"/>
+            </a:pPr>
+            <a:r>
+              <a:rPr lang="en-US" dirty="0"/>
+              <a:t> It is the </a:t>
+            </a:r>
+            <a:r>
+              <a:rPr lang="en-US" b="1" dirty="0"/>
+              <a:t>proportion of variance explained by the animal itself</a:t>
+            </a:r>
+            <a:r>
+              <a:rPr lang="en-US" dirty="0"/>
+              <a:t>, not by treatment or random noise.</a:t>
+            </a:r>
+          </a:p>
+          <a:p>
+            <a:pPr>
+              <a:buNone/>
+            </a:pPr>
+            <a:endParaRPr lang="en-US" b="1" dirty="0"/>
+          </a:p>
+          <a:p>
+            <a:pPr>
+              <a:buNone/>
+            </a:pPr>
+            <a:r>
+              <a:rPr lang="en-US" b="1" dirty="0"/>
+              <a:t>How to read ICC values</a:t>
+            </a:r>
+          </a:p>
+          <a:p>
+            <a:pPr>
+              <a:buFont typeface="Arial" panose="020B0604020202020204" pitchFamily="34" charset="0"/>
+              <a:buChar char="•"/>
+            </a:pPr>
+            <a:r>
+              <a:rPr lang="en-US" b="1" dirty="0"/>
+              <a:t> ICC ≈ 0.00–0.10 → low animal individuality</a:t>
+            </a:r>
+            <a:br>
+              <a:rPr lang="en-US" dirty="0"/>
+            </a:br>
+            <a:r>
+              <a:rPr lang="en-US" dirty="0"/>
+              <a:t>Animals behave similarly; treatment or noise dominates.</a:t>
+            </a:r>
+          </a:p>
+          <a:p>
+            <a:pPr>
+              <a:buFont typeface="Arial" panose="020B0604020202020204" pitchFamily="34" charset="0"/>
+              <a:buChar char="•"/>
+            </a:pPr>
+            <a:r>
+              <a:rPr lang="en-US" b="1" dirty="0"/>
+              <a:t> ICC ≈ 0.20–0.40 → moderate individuality</a:t>
+            </a:r>
+            <a:br>
+              <a:rPr lang="en-US" dirty="0"/>
+            </a:br>
+            <a:r>
+              <a:rPr lang="en-US" dirty="0"/>
+              <a:t>Animals have meaningful biological differences.</a:t>
+            </a:r>
+            <a:br>
+              <a:rPr lang="en-US" dirty="0"/>
+            </a:br>
+            <a:r>
+              <a:rPr lang="en-US" dirty="0"/>
+              <a:t>This is typical in growth, behavior, physiology.</a:t>
+            </a:r>
+          </a:p>
+          <a:p>
+            <a:pPr>
+              <a:buFont typeface="Arial" panose="020B0604020202020204" pitchFamily="34" charset="0"/>
+              <a:buChar char="•"/>
+            </a:pPr>
+            <a:r>
+              <a:rPr lang="en-US" b="1" dirty="0"/>
+              <a:t> ICC &gt; 0.40 → strong individuality</a:t>
+            </a:r>
+            <a:br>
+              <a:rPr lang="en-US" dirty="0"/>
+            </a:br>
+            <a:r>
+              <a:rPr lang="en-US" dirty="0"/>
+              <a:t>Each animal is quite different, and repeated measurements cluster tightly within each animal.</a:t>
+            </a:r>
+          </a:p>
+          <a:p>
+            <a:pPr>
+              <a:buNone/>
+            </a:pPr>
+            <a:endParaRPr lang="en-US" b="1" dirty="0"/>
+          </a:p>
+          <a:p>
+            <a:pPr>
+              <a:buNone/>
+            </a:pPr>
+            <a:r>
+              <a:rPr lang="en-US" b="1" dirty="0"/>
+              <a:t>What ICC means in practice</a:t>
+            </a:r>
+          </a:p>
+          <a:p>
+            <a:pPr>
+              <a:buFont typeface="Arial" panose="020B0604020202020204" pitchFamily="34" charset="0"/>
+              <a:buChar char="•"/>
+            </a:pPr>
+            <a:r>
+              <a:rPr lang="en-US" dirty="0"/>
+              <a:t> High ICC means repeated measurements from the same animal are </a:t>
+            </a:r>
+            <a:r>
+              <a:rPr lang="en-US" b="1" dirty="0"/>
+              <a:t>more similar to each other</a:t>
+            </a:r>
+            <a:r>
+              <a:rPr lang="en-US" dirty="0"/>
+              <a:t> than to measurements from other animals.</a:t>
+            </a:r>
+          </a:p>
+          <a:p>
+            <a:pPr>
+              <a:buFont typeface="Arial" panose="020B0604020202020204" pitchFamily="34" charset="0"/>
+              <a:buChar char="•"/>
+            </a:pPr>
+            <a:r>
+              <a:rPr lang="en-US" dirty="0"/>
+              <a:t> Low ICC means each animal behaves </a:t>
+            </a:r>
+            <a:r>
+              <a:rPr lang="en-US" b="1" dirty="0"/>
+              <a:t>more like the group</a:t>
+            </a:r>
+            <a:r>
+              <a:rPr lang="en-US" dirty="0"/>
+              <a:t>, with weak individuality.</a:t>
+            </a:r>
+          </a:p>
+        </p:txBody>
+      </p:sp>
+    </p:spTree>
+    <p:extLst>
+      <p:ext uri="{BB962C8B-B14F-4D97-AF65-F5344CB8AC3E}">
+        <p14:creationId xmlns:p14="http://schemas.microsoft.com/office/powerpoint/2010/main" val="2770030396"/>
+      </p:ext>
+    </p:extLst>
+  </p:cSld>
+  <p:clrMapOvr>
+    <a:masterClrMapping/>
+  </p:clrMapOvr>
+</p:sld>
+</file>
+
+<file path=ppt/slides/slide7.xml><?xml version="1.0" encoding="utf-8"?>
+<p:sld xmlns:a="http://schemas.openxmlformats.org/drawingml/2006/main" xmlns:r="http://schemas.openxmlformats.org/officeDocument/2006/relationships" xmlns:p="http://schemas.openxmlformats.org/presentationml/2006/main">
+  <p:cSld>
+    <p:spTree>
+      <p:nvGrpSpPr>
+        <p:cNvPr id="1" name="">
+          <a:extLst>
+            <a:ext uri="{FF2B5EF4-FFF2-40B4-BE49-F238E27FC236}">
+              <a16:creationId xmlns:a16="http://schemas.microsoft.com/office/drawing/2014/main" id="{0422C693-2DDA-4516-F114-168172E1FA93}"/>
+            </a:ext>
+          </a:extLst>
+        </p:cNvPr>
+        <p:cNvGrpSpPr/>
+        <p:nvPr/>
+      </p:nvGrpSpPr>
+      <p:grpSpPr>
+        <a:xfrm>
+          <a:off x="0" y="0"/>
+          <a:ext cx="0" cy="0"/>
+          <a:chOff x="0" y="0"/>
+          <a:chExt cx="0" cy="0"/>
+        </a:xfrm>
+      </p:grpSpPr>
+      <p:sp>
+        <p:nvSpPr>
+          <p:cNvPr id="2" name="Title 1">
+            <a:extLst>
+              <a:ext uri="{FF2B5EF4-FFF2-40B4-BE49-F238E27FC236}">
+                <a16:creationId xmlns:a16="http://schemas.microsoft.com/office/drawing/2014/main" id="{4D3E04D5-C666-B927-1436-9983B7522F01}"/>
+              </a:ext>
+            </a:extLst>
+          </p:cNvPr>
+          <p:cNvSpPr>
+            <a:spLocks noGrp="1"/>
+          </p:cNvSpPr>
+          <p:nvPr>
+            <p:ph type="title"/>
+          </p:nvPr>
+        </p:nvSpPr>
+        <p:spPr/>
+        <p:txBody>
+          <a:bodyPr/>
+          <a:lstStyle/>
+          <a:p>
+            <a:r>
+              <a:rPr lang="en-US" dirty="0"/>
+              <a:t>NOTES on PCA</a:t>
+            </a:r>
+          </a:p>
+        </p:txBody>
+      </p:sp>
+    </p:spTree>
+    <p:extLst>
+      <p:ext uri="{BB962C8B-B14F-4D97-AF65-F5344CB8AC3E}">
+        <p14:creationId xmlns:p14="http://schemas.microsoft.com/office/powerpoint/2010/main" val="1646739362"/>
+      </p:ext>
+    </p:extLst>
+  </p:cSld>
+  <p:clrMapOvr>
+    <a:masterClrMapping/>
+  </p:clrMapOvr>
 </p:sld>
 </file>
 

</xml_diff>

<commit_message>
added input validation checks in all analyses modules
</commit_message>
<xml_diff>
--- a/presentations/Table_Analyzer_Overview.pptx
+++ b/presentations/Table_Analyzer_Overview.pptx
@@ -5,16 +5,20 @@
     <p:sldMasterId id="2147483648" r:id="rId1"/>
   </p:sldMasterIdLst>
   <p:notesMasterIdLst>
-    <p:notesMasterId r:id="rId9"/>
+    <p:notesMasterId r:id="rId13"/>
   </p:notesMasterIdLst>
   <p:sldIdLst>
     <p:sldId id="256" r:id="rId2"/>
     <p:sldId id="258" r:id="rId3"/>
     <p:sldId id="257" r:id="rId4"/>
-    <p:sldId id="262" r:id="rId5"/>
-    <p:sldId id="259" r:id="rId6"/>
-    <p:sldId id="260" r:id="rId7"/>
-    <p:sldId id="263" r:id="rId8"/>
+    <p:sldId id="266" r:id="rId5"/>
+    <p:sldId id="268" r:id="rId6"/>
+    <p:sldId id="269" r:id="rId7"/>
+    <p:sldId id="262" r:id="rId8"/>
+    <p:sldId id="259" r:id="rId9"/>
+    <p:sldId id="260" r:id="rId10"/>
+    <p:sldId id="263" r:id="rId11"/>
+    <p:sldId id="265" r:id="rId12"/>
   </p:sldIdLst>
   <p:sldSz cx="9144000" cy="6858000" type="screen4x3"/>
   <p:notesSz cx="6858000" cy="9144000"/>
@@ -3673,7 +3677,752 @@
           </a:p>
         </p:txBody>
       </p:sp>
+      <p:sp>
+        <p:nvSpPr>
+          <p:cNvPr id="5" name="TextBox 4">
+            <a:extLst>
+              <a:ext uri="{FF2B5EF4-FFF2-40B4-BE49-F238E27FC236}">
+                <a16:creationId xmlns:a16="http://schemas.microsoft.com/office/drawing/2014/main" id="{86A21E52-2E15-6104-6319-CEFB0A6D0FBB}"/>
+              </a:ext>
+            </a:extLst>
+          </p:cNvPr>
+          <p:cNvSpPr txBox="1"/>
+          <p:nvPr/>
+        </p:nvSpPr>
+        <p:spPr>
+          <a:xfrm>
+            <a:off x="3951890" y="5160579"/>
+            <a:ext cx="1236236" cy="369332"/>
+          </a:xfrm>
+          <a:prstGeom prst="rect">
+            <a:avLst/>
+          </a:prstGeom>
+          <a:noFill/>
+        </p:spPr>
+        <p:txBody>
+          <a:bodyPr wrap="none" rtlCol="0">
+            <a:spAutoFit/>
+          </a:bodyPr>
+          <a:lstStyle/>
+          <a:p>
+            <a:r>
+              <a:rPr lang="en-US" dirty="0"/>
+              <a:t>01.12.2025</a:t>
+            </a:r>
+          </a:p>
+        </p:txBody>
+      </p:sp>
     </p:spTree>
+  </p:cSld>
+  <p:clrMapOvr>
+    <a:masterClrMapping/>
+  </p:clrMapOvr>
+</p:sld>
+</file>
+
+<file path=ppt/slides/slide10.xml><?xml version="1.0" encoding="utf-8"?>
+<p:sld xmlns:a="http://schemas.openxmlformats.org/drawingml/2006/main" xmlns:r="http://schemas.openxmlformats.org/officeDocument/2006/relationships" xmlns:p="http://schemas.openxmlformats.org/presentationml/2006/main">
+  <p:cSld>
+    <p:spTree>
+      <p:nvGrpSpPr>
+        <p:cNvPr id="1" name="">
+          <a:extLst>
+            <a:ext uri="{FF2B5EF4-FFF2-40B4-BE49-F238E27FC236}">
+              <a16:creationId xmlns:a16="http://schemas.microsoft.com/office/drawing/2014/main" id="{0422C693-2DDA-4516-F114-168172E1FA93}"/>
+            </a:ext>
+          </a:extLst>
+        </p:cNvPr>
+        <p:cNvGrpSpPr/>
+        <p:nvPr/>
+      </p:nvGrpSpPr>
+      <p:grpSpPr>
+        <a:xfrm>
+          <a:off x="0" y="0"/>
+          <a:ext cx="0" cy="0"/>
+          <a:chOff x="0" y="0"/>
+          <a:chExt cx="0" cy="0"/>
+        </a:xfrm>
+      </p:grpSpPr>
+      <p:sp>
+        <p:nvSpPr>
+          <p:cNvPr id="2" name="Title 1">
+            <a:extLst>
+              <a:ext uri="{FF2B5EF4-FFF2-40B4-BE49-F238E27FC236}">
+                <a16:creationId xmlns:a16="http://schemas.microsoft.com/office/drawing/2014/main" id="{4D3E04D5-C666-B927-1436-9983B7522F01}"/>
+              </a:ext>
+            </a:extLst>
+          </p:cNvPr>
+          <p:cNvSpPr>
+            <a:spLocks noGrp="1"/>
+          </p:cNvSpPr>
+          <p:nvPr>
+            <p:ph type="title"/>
+          </p:nvPr>
+        </p:nvSpPr>
+        <p:spPr/>
+        <p:txBody>
+          <a:bodyPr/>
+          <a:lstStyle/>
+          <a:p>
+            <a:r>
+              <a:rPr lang="en-US" dirty="0"/>
+              <a:t>NOTES on PCA</a:t>
+            </a:r>
+          </a:p>
+        </p:txBody>
+      </p:sp>
+    </p:spTree>
+    <p:extLst>
+      <p:ext uri="{BB962C8B-B14F-4D97-AF65-F5344CB8AC3E}">
+        <p14:creationId xmlns:p14="http://schemas.microsoft.com/office/powerpoint/2010/main" val="1646739362"/>
+      </p:ext>
+    </p:extLst>
+  </p:cSld>
+  <p:clrMapOvr>
+    <a:masterClrMapping/>
+  </p:clrMapOvr>
+</p:sld>
+</file>
+
+<file path=ppt/slides/slide11.xml><?xml version="1.0" encoding="utf-8"?>
+<p:sld xmlns:a="http://schemas.openxmlformats.org/drawingml/2006/main" xmlns:r="http://schemas.openxmlformats.org/officeDocument/2006/relationships" xmlns:p="http://schemas.openxmlformats.org/presentationml/2006/main">
+  <p:cSld>
+    <p:spTree>
+      <p:nvGrpSpPr>
+        <p:cNvPr id="1" name="">
+          <a:extLst>
+            <a:ext uri="{FF2B5EF4-FFF2-40B4-BE49-F238E27FC236}">
+              <a16:creationId xmlns:a16="http://schemas.microsoft.com/office/drawing/2014/main" id="{498961D4-A409-0CCA-2366-A2A339784C35}"/>
+            </a:ext>
+          </a:extLst>
+        </p:cNvPr>
+        <p:cNvGrpSpPr/>
+        <p:nvPr/>
+      </p:nvGrpSpPr>
+      <p:grpSpPr>
+        <a:xfrm>
+          <a:off x="0" y="0"/>
+          <a:ext cx="0" cy="0"/>
+          <a:chOff x="0" y="0"/>
+          <a:chExt cx="0" cy="0"/>
+        </a:xfrm>
+      </p:grpSpPr>
+      <p:sp>
+        <p:nvSpPr>
+          <p:cNvPr id="6" name="TextBox 5">
+            <a:extLst>
+              <a:ext uri="{FF2B5EF4-FFF2-40B4-BE49-F238E27FC236}">
+                <a16:creationId xmlns:a16="http://schemas.microsoft.com/office/drawing/2014/main" id="{BABBF7E7-4397-9A8E-5361-4241BE9843B7}"/>
+              </a:ext>
+            </a:extLst>
+          </p:cNvPr>
+          <p:cNvSpPr txBox="1"/>
+          <p:nvPr/>
+        </p:nvSpPr>
+        <p:spPr>
+          <a:xfrm>
+            <a:off x="204952" y="612844"/>
+            <a:ext cx="7709338" cy="2862322"/>
+          </a:xfrm>
+          <a:prstGeom prst="rect">
+            <a:avLst/>
+          </a:prstGeom>
+          <a:noFill/>
+        </p:spPr>
+        <p:txBody>
+          <a:bodyPr wrap="square">
+            <a:spAutoFit/>
+          </a:bodyPr>
+          <a:lstStyle/>
+          <a:p>
+            <a:pPr>
+              <a:buNone/>
+            </a:pPr>
+            <a:r>
+              <a:rPr lang="en-US" b="1" dirty="0"/>
+              <a:t>🐔 How to Interpret PCA </a:t>
+            </a:r>
+          </a:p>
+          <a:p>
+            <a:pPr>
+              <a:buNone/>
+            </a:pPr>
+            <a:endParaRPr lang="en-US" b="1" dirty="0"/>
+          </a:p>
+          <a:p>
+            <a:pPr>
+              <a:buNone/>
+            </a:pPr>
+            <a:endParaRPr lang="en-US" b="1" dirty="0"/>
+          </a:p>
+          <a:p>
+            <a:pPr>
+              <a:buNone/>
+            </a:pPr>
+            <a:endParaRPr lang="en-US" b="1" dirty="0"/>
+          </a:p>
+          <a:p>
+            <a:pPr>
+              <a:buNone/>
+            </a:pPr>
+            <a:endParaRPr lang="en-US" b="1" dirty="0"/>
+          </a:p>
+          <a:p>
+            <a:pPr>
+              <a:buNone/>
+            </a:pPr>
+            <a:endParaRPr lang="en-US" b="1" dirty="0"/>
+          </a:p>
+          <a:p>
+            <a:pPr>
+              <a:buNone/>
+            </a:pPr>
+            <a:endParaRPr lang="en-US" b="1" dirty="0"/>
+          </a:p>
+          <a:p>
+            <a:pPr>
+              <a:buNone/>
+            </a:pPr>
+            <a:endParaRPr lang="en-US" b="1" dirty="0"/>
+          </a:p>
+          <a:p>
+            <a:pPr>
+              <a:buNone/>
+            </a:pPr>
+            <a:endParaRPr lang="en-US" b="1" dirty="0"/>
+          </a:p>
+          <a:p>
+            <a:pPr>
+              <a:buNone/>
+            </a:pPr>
+            <a:endParaRPr lang="en-US" b="1" dirty="0"/>
+          </a:p>
+        </p:txBody>
+      </p:sp>
+      <p:sp>
+        <p:nvSpPr>
+          <p:cNvPr id="4" name="TextBox 3">
+            <a:extLst>
+              <a:ext uri="{FF2B5EF4-FFF2-40B4-BE49-F238E27FC236}">
+                <a16:creationId xmlns:a16="http://schemas.microsoft.com/office/drawing/2014/main" id="{9D2A610C-E699-6D0E-4A74-F14E40BF6778}"/>
+              </a:ext>
+            </a:extLst>
+          </p:cNvPr>
+          <p:cNvSpPr txBox="1"/>
+          <p:nvPr/>
+        </p:nvSpPr>
+        <p:spPr>
+          <a:xfrm>
+            <a:off x="357351" y="1661747"/>
+            <a:ext cx="4440622" cy="1938992"/>
+          </a:xfrm>
+          <a:prstGeom prst="rect">
+            <a:avLst/>
+          </a:prstGeom>
+          <a:noFill/>
+        </p:spPr>
+        <p:txBody>
+          <a:bodyPr wrap="square">
+            <a:spAutoFit/>
+          </a:bodyPr>
+          <a:lstStyle/>
+          <a:p>
+            <a:pPr algn="l">
+              <a:buNone/>
+            </a:pPr>
+            <a:r>
+              <a:rPr lang="en-US" sz="800" b="0" i="0" dirty="0">
+                <a:solidFill>
+                  <a:srgbClr val="000000"/>
+                </a:solidFill>
+                <a:effectLst/>
+                <a:latin typeface="Fira Mono" panose="020B0509050000020004" pitchFamily="49" charset="0"/>
+              </a:rPr>
+              <a:t>── PCA Summary ──</a:t>
+            </a:r>
+          </a:p>
+          <a:p>
+            <a:pPr algn="l">
+              <a:buNone/>
+            </a:pPr>
+            <a:r>
+              <a:rPr lang="en-US" sz="800" b="0" i="0" dirty="0">
+                <a:solidFill>
+                  <a:srgbClr val="000000"/>
+                </a:solidFill>
+                <a:effectLst/>
+                <a:latin typeface="Fira Mono" panose="020B0509050000020004" pitchFamily="49" charset="0"/>
+              </a:rPr>
+              <a:t>Importance of components:</a:t>
+            </a:r>
+          </a:p>
+          <a:p>
+            <a:pPr algn="l">
+              <a:buNone/>
+            </a:pPr>
+            <a:r>
+              <a:rPr lang="en-US" sz="800" b="0" i="0" dirty="0">
+                <a:solidFill>
+                  <a:srgbClr val="000000"/>
+                </a:solidFill>
+                <a:effectLst/>
+                <a:latin typeface="Fira Mono" panose="020B0509050000020004" pitchFamily="49" charset="0"/>
+              </a:rPr>
+              <a:t>                          PC1    PC2    PC3    PC4     PC5     PC6</a:t>
+            </a:r>
+          </a:p>
+          <a:p>
+            <a:pPr algn="l">
+              <a:buNone/>
+            </a:pPr>
+            <a:r>
+              <a:rPr lang="en-US" sz="800" b="0" i="0" dirty="0">
+                <a:solidFill>
+                  <a:srgbClr val="000000"/>
+                </a:solidFill>
+                <a:effectLst/>
+                <a:latin typeface="Fira Mono" panose="020B0509050000020004" pitchFamily="49" charset="0"/>
+              </a:rPr>
+              <a:t>Standard deviation     1.4475 1.1806 0.9907 0.7925 0.69433 0.64737</a:t>
+            </a:r>
+          </a:p>
+          <a:p>
+            <a:pPr algn="l">
+              <a:buNone/>
+            </a:pPr>
+            <a:r>
+              <a:rPr lang="en-US" sz="800" b="0" i="0" dirty="0">
+                <a:solidFill>
+                  <a:srgbClr val="000000"/>
+                </a:solidFill>
+                <a:effectLst/>
+                <a:latin typeface="Fira Mono" panose="020B0509050000020004" pitchFamily="49" charset="0"/>
+              </a:rPr>
+              <a:t>Proportion of Variance 0.3492 0.2323 0.1636 0.1047 0.08035 0.06985</a:t>
+            </a:r>
+          </a:p>
+          <a:p>
+            <a:pPr algn="l">
+              <a:buNone/>
+            </a:pPr>
+            <a:r>
+              <a:rPr lang="en-US" sz="800" b="0" i="0" dirty="0">
+                <a:solidFill>
+                  <a:srgbClr val="000000"/>
+                </a:solidFill>
+                <a:effectLst/>
+                <a:latin typeface="Fira Mono" panose="020B0509050000020004" pitchFamily="49" charset="0"/>
+              </a:rPr>
+              <a:t>Cumulative Proportion  0.3492 0.5815 0.7451 0.8498 0.93015 1.00000</a:t>
+            </a:r>
+          </a:p>
+          <a:p>
+            <a:pPr algn="l">
+              <a:buNone/>
+            </a:pPr>
+            <a:endParaRPr lang="en-US" sz="800" b="0" i="0" dirty="0">
+              <a:solidFill>
+                <a:srgbClr val="000000"/>
+              </a:solidFill>
+              <a:effectLst/>
+              <a:latin typeface="Fira Mono" panose="020B0509050000020004" pitchFamily="49" charset="0"/>
+            </a:endParaRPr>
+          </a:p>
+          <a:p>
+            <a:pPr algn="l">
+              <a:buNone/>
+            </a:pPr>
+            <a:r>
+              <a:rPr lang="en-US" sz="800" b="0" i="0" dirty="0">
+                <a:solidFill>
+                  <a:srgbClr val="000000"/>
+                </a:solidFill>
+                <a:effectLst/>
+                <a:latin typeface="Fira Mono" panose="020B0509050000020004" pitchFamily="49" charset="0"/>
+              </a:rPr>
+              <a:t>── PCA Loadings (rotation matrix) ──</a:t>
+            </a:r>
+          </a:p>
+          <a:p>
+            <a:pPr algn="l">
+              <a:buNone/>
+            </a:pPr>
+            <a:r>
+              <a:rPr lang="en-US" sz="800" b="0" i="0" dirty="0">
+                <a:solidFill>
+                  <a:srgbClr val="000000"/>
+                </a:solidFill>
+                <a:effectLst/>
+                <a:latin typeface="Fira Mono" panose="020B0509050000020004" pitchFamily="49" charset="0"/>
+              </a:rPr>
+              <a:t>                   PC1    PC2    PC3    PC4    PC5    PC6</a:t>
+            </a:r>
+          </a:p>
+          <a:p>
+            <a:pPr algn="l">
+              <a:buNone/>
+            </a:pPr>
+            <a:r>
+              <a:rPr lang="en-US" sz="800" b="0" i="0" dirty="0" err="1">
+                <a:solidFill>
+                  <a:srgbClr val="000000"/>
+                </a:solidFill>
+                <a:effectLst/>
+                <a:latin typeface="Fira Mono" panose="020B0509050000020004" pitchFamily="49" charset="0"/>
+              </a:rPr>
+              <a:t>Weight_baseline</a:t>
+            </a:r>
+            <a:r>
+              <a:rPr lang="en-US" sz="800" b="0" i="0" dirty="0">
+                <a:solidFill>
+                  <a:srgbClr val="000000"/>
+                </a:solidFill>
+                <a:effectLst/>
+                <a:latin typeface="Fira Mono" panose="020B0509050000020004" pitchFamily="49" charset="0"/>
+              </a:rPr>
+              <a:t> -0.062 -0.227 -0.965  0.046  0.001  0.106</a:t>
+            </a:r>
+          </a:p>
+          <a:p>
+            <a:pPr algn="l">
+              <a:buNone/>
+            </a:pPr>
+            <a:r>
+              <a:rPr lang="en-US" sz="800" b="0" i="0" dirty="0">
+                <a:solidFill>
+                  <a:srgbClr val="000000"/>
+                </a:solidFill>
+                <a:effectLst/>
+                <a:latin typeface="Fira Mono" panose="020B0509050000020004" pitchFamily="49" charset="0"/>
+              </a:rPr>
+              <a:t>Cortisol        -0.587  0.034 -0.057  0.035 -0.013 -0.806</a:t>
+            </a:r>
+          </a:p>
+          <a:p>
+            <a:pPr algn="l">
+              <a:buNone/>
+            </a:pPr>
+            <a:r>
+              <a:rPr lang="en-US" sz="800" b="0" i="0" dirty="0">
+                <a:solidFill>
+                  <a:srgbClr val="000000"/>
+                </a:solidFill>
+                <a:effectLst/>
+                <a:latin typeface="Fira Mono" panose="020B0509050000020004" pitchFamily="49" charset="0"/>
+              </a:rPr>
+              <a:t>Glucose         -0.482 -0.388  0.159  0.048  0.701  0.314</a:t>
+            </a:r>
+          </a:p>
+          <a:p>
+            <a:pPr algn="l">
+              <a:buNone/>
+            </a:pPr>
+            <a:r>
+              <a:rPr lang="en-US" sz="800" b="0" i="0" dirty="0" err="1">
+                <a:solidFill>
+                  <a:srgbClr val="000000"/>
+                </a:solidFill>
+                <a:effectLst/>
+                <a:latin typeface="Fira Mono" panose="020B0509050000020004" pitchFamily="49" charset="0"/>
+              </a:rPr>
+              <a:t>FeedIntake</a:t>
+            </a:r>
+            <a:r>
+              <a:rPr lang="en-US" sz="800" b="0" i="0" dirty="0">
+                <a:solidFill>
+                  <a:srgbClr val="000000"/>
+                </a:solidFill>
+                <a:effectLst/>
+                <a:latin typeface="Fira Mono" panose="020B0509050000020004" pitchFamily="49" charset="0"/>
+              </a:rPr>
+              <a:t>       0.172 -0.662  0.092 -0.685 -0.138 -0.187</a:t>
+            </a:r>
+          </a:p>
+          <a:p>
+            <a:pPr algn="l">
+              <a:buNone/>
+            </a:pPr>
+            <a:r>
+              <a:rPr lang="en-US" sz="800" b="0" i="0" dirty="0" err="1">
+                <a:solidFill>
+                  <a:srgbClr val="000000"/>
+                </a:solidFill>
+                <a:effectLst/>
+                <a:latin typeface="Fira Mono" panose="020B0509050000020004" pitchFamily="49" charset="0"/>
+              </a:rPr>
+              <a:t>HeartRate</a:t>
+            </a:r>
+            <a:r>
+              <a:rPr lang="en-US" sz="800" b="0" i="0" dirty="0">
+                <a:solidFill>
+                  <a:srgbClr val="000000"/>
+                </a:solidFill>
+                <a:effectLst/>
+                <a:latin typeface="Fira Mono" panose="020B0509050000020004" pitchFamily="49" charset="0"/>
+              </a:rPr>
+              <a:t>        0.296 -0.570  0.125  0.719 -0.093 -0.216</a:t>
+            </a:r>
+          </a:p>
+          <a:p>
+            <a:pPr algn="l">
+              <a:buNone/>
+            </a:pPr>
+            <a:r>
+              <a:rPr lang="en-US" sz="800" b="0" i="0" dirty="0" err="1">
+                <a:solidFill>
+                  <a:srgbClr val="000000"/>
+                </a:solidFill>
+                <a:effectLst/>
+                <a:latin typeface="Fira Mono" panose="020B0509050000020004" pitchFamily="49" charset="0"/>
+              </a:rPr>
+              <a:t>BodyTemp</a:t>
+            </a:r>
+            <a:r>
+              <a:rPr lang="en-US" sz="800" b="0" i="0" dirty="0">
+                <a:solidFill>
+                  <a:srgbClr val="000000"/>
+                </a:solidFill>
+                <a:effectLst/>
+                <a:latin typeface="Fira Mono" panose="020B0509050000020004" pitchFamily="49" charset="0"/>
+              </a:rPr>
+              <a:t>        -0.550 -0.185  0.126  0.088 -0.693  0.399</a:t>
+            </a:r>
+          </a:p>
+        </p:txBody>
+      </p:sp>
+      <p:sp>
+        <p:nvSpPr>
+          <p:cNvPr id="10" name="TextBox 9">
+            <a:extLst>
+              <a:ext uri="{FF2B5EF4-FFF2-40B4-BE49-F238E27FC236}">
+                <a16:creationId xmlns:a16="http://schemas.microsoft.com/office/drawing/2014/main" id="{28219FDC-BED7-E0F8-0107-163E3A20E6FD}"/>
+              </a:ext>
+            </a:extLst>
+          </p:cNvPr>
+          <p:cNvSpPr txBox="1"/>
+          <p:nvPr/>
+        </p:nvSpPr>
+        <p:spPr>
+          <a:xfrm>
+            <a:off x="4703380" y="1074509"/>
+            <a:ext cx="4572000" cy="4801314"/>
+          </a:xfrm>
+          <a:prstGeom prst="rect">
+            <a:avLst/>
+          </a:prstGeom>
+          <a:noFill/>
+        </p:spPr>
+        <p:txBody>
+          <a:bodyPr wrap="square">
+            <a:spAutoFit/>
+          </a:bodyPr>
+          <a:lstStyle/>
+          <a:p>
+            <a:r>
+              <a:rPr lang="en-US" b="1" dirty="0"/>
+              <a:t>1. Standard deviations (PC strength)</a:t>
+            </a:r>
+          </a:p>
+          <a:p>
+            <a:r>
+              <a:rPr lang="en-US" dirty="0"/>
+              <a:t>Each principal component has a </a:t>
+            </a:r>
+            <a:r>
+              <a:rPr lang="en-US" b="1" dirty="0"/>
+              <a:t>standard deviation</a:t>
+            </a:r>
+            <a:r>
+              <a:rPr lang="en-US" dirty="0"/>
+              <a:t> showing how widely animals spread along that axis.</a:t>
+            </a:r>
+          </a:p>
+          <a:p>
+            <a:r>
+              <a:rPr lang="en-US" b="1" dirty="0"/>
+              <a:t>Bigger SD = more biological variation captured.</a:t>
+            </a:r>
+            <a:endParaRPr lang="en-US" dirty="0"/>
+          </a:p>
+          <a:p>
+            <a:pPr lvl="1"/>
+            <a:r>
+              <a:rPr lang="en-US" dirty="0"/>
+              <a:t>PC1 SD = </a:t>
+            </a:r>
+            <a:r>
+              <a:rPr lang="en-US" b="1" dirty="0"/>
+              <a:t>1.45</a:t>
+            </a:r>
+            <a:r>
+              <a:rPr lang="en-US" dirty="0"/>
+              <a:t> → strongest pattern</a:t>
+            </a:r>
+          </a:p>
+          <a:p>
+            <a:pPr lvl="1"/>
+            <a:r>
+              <a:rPr lang="en-US" dirty="0"/>
+              <a:t>PC2 SD = </a:t>
+            </a:r>
+            <a:r>
+              <a:rPr lang="en-US" b="1" dirty="0"/>
+              <a:t>1.18</a:t>
+            </a:r>
+            <a:endParaRPr lang="en-US" dirty="0"/>
+          </a:p>
+          <a:p>
+            <a:pPr lvl="1"/>
+            <a:r>
+              <a:rPr lang="en-US" dirty="0"/>
+              <a:t>PC3 SD = </a:t>
+            </a:r>
+            <a:r>
+              <a:rPr lang="en-US" b="1" dirty="0"/>
+              <a:t>0.99</a:t>
+            </a:r>
+          </a:p>
+          <a:p>
+            <a:pPr lvl="1"/>
+            <a:endParaRPr lang="en-US" dirty="0"/>
+          </a:p>
+          <a:p>
+            <a:r>
+              <a:rPr lang="en-US" b="1" dirty="0"/>
+              <a:t>2. Proportion of variance (importance)</a:t>
+            </a:r>
+          </a:p>
+          <a:p>
+            <a:r>
+              <a:rPr lang="en-US" dirty="0"/>
+              <a:t>Tells how much of the entire dataset each PC explains.</a:t>
+            </a:r>
+          </a:p>
+          <a:p>
+            <a:r>
+              <a:rPr lang="en-US" b="1" dirty="0"/>
+              <a:t>PC1 = 35%</a:t>
+            </a:r>
+            <a:r>
+              <a:rPr lang="en-US" dirty="0"/>
+              <a:t>, </a:t>
+            </a:r>
+            <a:r>
+              <a:rPr lang="en-US" b="1" dirty="0"/>
+              <a:t>PC2 = 23%</a:t>
+            </a:r>
+            <a:r>
+              <a:rPr lang="en-US" dirty="0"/>
+              <a:t>, </a:t>
+            </a:r>
+            <a:r>
+              <a:rPr lang="en-US" b="1" dirty="0"/>
+              <a:t>PC3 = 16%</a:t>
+            </a:r>
+            <a:endParaRPr lang="en-US" dirty="0"/>
+          </a:p>
+          <a:p>
+            <a:r>
+              <a:rPr lang="en-US" dirty="0"/>
+              <a:t>PC1 + PC2 = </a:t>
+            </a:r>
+            <a:r>
+              <a:rPr lang="en-US" b="1" dirty="0"/>
+              <a:t>58%</a:t>
+            </a:r>
+            <a:r>
+              <a:rPr lang="en-US" dirty="0"/>
+              <a:t> → more than half of all differences between animals.</a:t>
+            </a:r>
+          </a:p>
+          <a:p>
+            <a:endParaRPr lang="en-US" dirty="0"/>
+          </a:p>
+        </p:txBody>
+      </p:sp>
+      <p:sp>
+        <p:nvSpPr>
+          <p:cNvPr id="12" name="TextBox 11">
+            <a:extLst>
+              <a:ext uri="{FF2B5EF4-FFF2-40B4-BE49-F238E27FC236}">
+                <a16:creationId xmlns:a16="http://schemas.microsoft.com/office/drawing/2014/main" id="{C53B9A57-5078-437C-207C-D3D33CE7D652}"/>
+              </a:ext>
+            </a:extLst>
+          </p:cNvPr>
+          <p:cNvSpPr txBox="1"/>
+          <p:nvPr/>
+        </p:nvSpPr>
+        <p:spPr>
+          <a:xfrm>
+            <a:off x="270642" y="4465482"/>
+            <a:ext cx="4614040" cy="2031325"/>
+          </a:xfrm>
+          <a:prstGeom prst="rect">
+            <a:avLst/>
+          </a:prstGeom>
+          <a:noFill/>
+        </p:spPr>
+        <p:txBody>
+          <a:bodyPr wrap="square">
+            <a:spAutoFit/>
+          </a:bodyPr>
+          <a:lstStyle/>
+          <a:p>
+            <a:r>
+              <a:rPr lang="en-US" b="1" dirty="0"/>
+              <a:t>3. Loadings (what each PC represents biologically)</a:t>
+            </a:r>
+          </a:p>
+          <a:p>
+            <a:r>
+              <a:rPr lang="en-US" dirty="0"/>
+              <a:t>Loadings show </a:t>
+            </a:r>
+            <a:r>
+              <a:rPr lang="en-US" b="1" dirty="0"/>
+              <a:t>how each original measurement contributes</a:t>
+            </a:r>
+            <a:r>
+              <a:rPr lang="en-US" dirty="0"/>
+              <a:t> to a PC.</a:t>
+            </a:r>
+          </a:p>
+          <a:p>
+            <a:r>
+              <a:rPr lang="en-US" b="1" dirty="0"/>
+              <a:t>Large absolute values</a:t>
+            </a:r>
+            <a:r>
+              <a:rPr lang="en-US" dirty="0"/>
+              <a:t> = strong influence.</a:t>
+            </a:r>
+          </a:p>
+          <a:p>
+            <a:r>
+              <a:rPr lang="en-US" b="1" dirty="0"/>
+              <a:t>Same sign</a:t>
+            </a:r>
+            <a:r>
+              <a:rPr lang="en-US" dirty="0"/>
+              <a:t> = variables increase together; </a:t>
+            </a:r>
+            <a:r>
+              <a:rPr lang="en-US" b="1" dirty="0"/>
+              <a:t>opposite sign</a:t>
+            </a:r>
+            <a:r>
+              <a:rPr lang="en-US" dirty="0"/>
+              <a:t> = move in opposite directions.</a:t>
+            </a:r>
+          </a:p>
+        </p:txBody>
+      </p:sp>
+    </p:spTree>
+    <p:extLst>
+      <p:ext uri="{BB962C8B-B14F-4D97-AF65-F5344CB8AC3E}">
+        <p14:creationId xmlns:p14="http://schemas.microsoft.com/office/powerpoint/2010/main" val="2548628455"/>
+      </p:ext>
+    </p:extLst>
   </p:cSld>
   <p:clrMapOvr>
     <a:masterClrMapping/>
@@ -3744,7 +4493,7 @@
             </a:pPr>
             <a:r>
               <a:rPr lang="en-US" dirty="0"/>
-              <a:t>Bioinformatician specializing in genomics, neuroinformatics, and high-throughput data analysis</a:t>
+              <a:t>Bioinformatician specializing in microbial genomics, neuroinformatics, and high-throughput data analysis</a:t>
             </a:r>
           </a:p>
           <a:p>
@@ -3766,7 +4515,7 @@
             </a:r>
             <a:r>
               <a:rPr lang="en-US" dirty="0"/>
-              <a:t> and </a:t>
+              <a:t> and data analyst at </a:t>
             </a:r>
             <a:r>
               <a:rPr lang="en-US" b="1" dirty="0" err="1"/>
@@ -3778,7 +4527,7 @@
             </a:r>
             <a:r>
               <a:rPr lang="en-US" dirty="0"/>
-              <a:t> with &gt;10 years experience in evolutionary genomics and pathogen biology</a:t>
+              <a:t> with &gt;10 years experience</a:t>
             </a:r>
           </a:p>
           <a:p>
@@ -4989,7 +5738,13 @@
   <p:cSld>
     <p:spTree>
       <p:nvGrpSpPr>
-        <p:cNvPr id="1" name=""/>
+        <p:cNvPr id="1" name="">
+          <a:extLst>
+            <a:ext uri="{FF2B5EF4-FFF2-40B4-BE49-F238E27FC236}">
+              <a16:creationId xmlns:a16="http://schemas.microsoft.com/office/drawing/2014/main" id="{CA392F7B-3EF3-7FC5-E2A3-395E2B863D09}"/>
+            </a:ext>
+          </a:extLst>
+        </p:cNvPr>
         <p:cNvGrpSpPr/>
         <p:nvPr/>
       </p:nvGrpSpPr>
@@ -5006,7 +5761,7 @@
           <p:cNvPr id="2" name="Title 1">
             <a:extLst>
               <a:ext uri="{FF2B5EF4-FFF2-40B4-BE49-F238E27FC236}">
-                <a16:creationId xmlns:a16="http://schemas.microsoft.com/office/drawing/2014/main" id="{71348000-8DB4-EFA8-B151-AF1410B425FC}"/>
+                <a16:creationId xmlns:a16="http://schemas.microsoft.com/office/drawing/2014/main" id="{4795750A-75E2-B0E3-2EF7-A0941E209556}"/>
               </a:ext>
             </a:extLst>
           </p:cNvPr>
@@ -5024,7 +5779,7 @@
           <a:p>
             <a:r>
               <a:rPr lang="en-US" dirty="0"/>
-              <a:t>NOTES on LMM</a:t>
+              <a:t>NOTES on DESCRIPTIVE STATISTICS</a:t>
             </a:r>
           </a:p>
         </p:txBody>
@@ -5032,7 +5787,7 @@
     </p:spTree>
     <p:extLst>
       <p:ext uri="{BB962C8B-B14F-4D97-AF65-F5344CB8AC3E}">
-        <p14:creationId xmlns:p14="http://schemas.microsoft.com/office/powerpoint/2010/main" val="346991280"/>
+        <p14:creationId xmlns:p14="http://schemas.microsoft.com/office/powerpoint/2010/main" val="3562210455"/>
       </p:ext>
     </p:extLst>
   </p:cSld>
@@ -5059,272 +5814,40 @@
           <a:chExt cx="0" cy="0"/>
         </a:xfrm>
       </p:grpSpPr>
-      <p:sp>
-        <p:nvSpPr>
-          <p:cNvPr id="3" name="TextBox 2">
+      <p:pic>
+        <p:nvPicPr>
+          <p:cNvPr id="2" name="Picture 1">
             <a:extLst>
               <a:ext uri="{FF2B5EF4-FFF2-40B4-BE49-F238E27FC236}">
-                <a16:creationId xmlns:a16="http://schemas.microsoft.com/office/drawing/2014/main" id="{184EEA22-109C-8598-D181-3B420FE4ECED}"/>
+                <a16:creationId xmlns:a16="http://schemas.microsoft.com/office/drawing/2014/main" id="{34CEDA3D-D375-7049-2BD7-362BEBF2D0E5}"/>
               </a:ext>
             </a:extLst>
           </p:cNvPr>
-          <p:cNvSpPr txBox="1"/>
+          <p:cNvPicPr>
+            <a:picLocks noChangeAspect="1"/>
+          </p:cNvPicPr>
           <p:nvPr/>
-        </p:nvSpPr>
+        </p:nvPicPr>
+        <p:blipFill>
+          <a:blip r:embed="rId2"/>
+          <a:stretch>
+            <a:fillRect/>
+          </a:stretch>
+        </p:blipFill>
         <p:spPr>
           <a:xfrm>
-            <a:off x="635876" y="117693"/>
-            <a:ext cx="8019393" cy="6740307"/>
+            <a:off x="685800" y="838200"/>
+            <a:ext cx="7772400" cy="5181600"/>
           </a:xfrm>
           <a:prstGeom prst="rect">
             <a:avLst/>
           </a:prstGeom>
-          <a:noFill/>
         </p:spPr>
-        <p:txBody>
-          <a:bodyPr wrap="square">
-            <a:spAutoFit/>
-          </a:bodyPr>
-          <a:lstStyle/>
-          <a:p>
-            <a:pPr>
-              <a:buNone/>
-            </a:pPr>
-            <a:r>
-              <a:rPr lang="en-US" b="1" dirty="0"/>
-              <a:t>🐔 Random Effects</a:t>
-            </a:r>
-          </a:p>
-          <a:p>
-            <a:pPr>
-              <a:buNone/>
-            </a:pPr>
-            <a:endParaRPr lang="en-US" b="1" dirty="0"/>
-          </a:p>
-          <a:p>
-            <a:pPr>
-              <a:buNone/>
-            </a:pPr>
-            <a:r>
-              <a:rPr lang="en-US" b="1" dirty="0"/>
-              <a:t>What they represent</a:t>
-            </a:r>
-          </a:p>
-          <a:p>
-            <a:pPr>
-              <a:buFont typeface="Arial" panose="020B0604020202020204" pitchFamily="34" charset="0"/>
-              <a:buChar char="•"/>
-            </a:pPr>
-            <a:r>
-              <a:rPr lang="en-US" dirty="0"/>
-              <a:t> They capture </a:t>
-            </a:r>
-            <a:r>
-              <a:rPr lang="en-US" b="1" dirty="0"/>
-              <a:t>natural differences between individual animals</a:t>
-            </a:r>
-            <a:r>
-              <a:rPr lang="en-US" dirty="0"/>
-              <a:t>.</a:t>
-            </a:r>
-          </a:p>
-          <a:p>
-            <a:pPr>
-              <a:buFont typeface="Arial" panose="020B0604020202020204" pitchFamily="34" charset="0"/>
-              <a:buChar char="•"/>
-            </a:pPr>
-            <a:r>
-              <a:rPr lang="en-US" dirty="0"/>
-              <a:t> Every chicken has its own baseline weight or behavior.</a:t>
-            </a:r>
-          </a:p>
-          <a:p>
-            <a:pPr>
-              <a:buFont typeface="Arial" panose="020B0604020202020204" pitchFamily="34" charset="0"/>
-              <a:buChar char="•"/>
-            </a:pPr>
-            <a:r>
-              <a:rPr lang="en-US" dirty="0"/>
-              <a:t> Random effects allow the model to </a:t>
-            </a:r>
-            <a:r>
-              <a:rPr lang="en-US" b="1" dirty="0"/>
-              <a:t>give each animal its own starting level</a:t>
-            </a:r>
-            <a:r>
-              <a:rPr lang="en-US" dirty="0"/>
-              <a:t>, instead of forcing all animals to be identical.</a:t>
-            </a:r>
-          </a:p>
-          <a:p>
-            <a:pPr>
-              <a:buNone/>
-            </a:pPr>
-            <a:endParaRPr lang="en-US" b="1" dirty="0"/>
-          </a:p>
-          <a:p>
-            <a:pPr>
-              <a:buNone/>
-            </a:pPr>
-            <a:r>
-              <a:rPr lang="en-US" b="1" dirty="0"/>
-              <a:t>Why we need them</a:t>
-            </a:r>
-          </a:p>
-          <a:p>
-            <a:pPr>
-              <a:buFont typeface="Arial" panose="020B0604020202020204" pitchFamily="34" charset="0"/>
-              <a:buChar char="•"/>
-            </a:pPr>
-            <a:r>
-              <a:rPr lang="en-US" dirty="0"/>
-              <a:t> Animals in the same treatment group are </a:t>
-            </a:r>
-            <a:r>
-              <a:rPr lang="en-US" i="1" dirty="0"/>
-              <a:t>not</a:t>
-            </a:r>
-            <a:r>
-              <a:rPr lang="en-US" dirty="0"/>
-              <a:t> clones.</a:t>
-            </a:r>
-          </a:p>
-          <a:p>
-            <a:pPr>
-              <a:buFont typeface="Arial" panose="020B0604020202020204" pitchFamily="34" charset="0"/>
-              <a:buChar char="•"/>
-            </a:pPr>
-            <a:r>
-              <a:rPr lang="en-US" dirty="0"/>
-              <a:t> Some chickens naturally grow faster or slower, regardless of treatment.</a:t>
-            </a:r>
-          </a:p>
-          <a:p>
-            <a:pPr>
-              <a:buFont typeface="Arial" panose="020B0604020202020204" pitchFamily="34" charset="0"/>
-              <a:buChar char="•"/>
-            </a:pPr>
-            <a:r>
-              <a:rPr lang="en-US" dirty="0"/>
-              <a:t> Ignoring these differences makes the analysis less accurate, more biased and too optimistic about significance.</a:t>
-            </a:r>
-          </a:p>
-          <a:p>
-            <a:pPr>
-              <a:buNone/>
-            </a:pPr>
-            <a:endParaRPr lang="en-US" b="1" dirty="0"/>
-          </a:p>
-          <a:p>
-            <a:pPr>
-              <a:buNone/>
-            </a:pPr>
-            <a:r>
-              <a:rPr lang="en-US" b="1" dirty="0"/>
-              <a:t>What the model does with them</a:t>
-            </a:r>
-          </a:p>
-          <a:p>
-            <a:pPr>
-              <a:buFont typeface="Arial" panose="020B0604020202020204" pitchFamily="34" charset="0"/>
-              <a:buChar char="•"/>
-            </a:pPr>
-            <a:r>
-              <a:rPr lang="en-US" dirty="0"/>
-              <a:t> The model estimates how much animals </a:t>
-            </a:r>
-            <a:r>
-              <a:rPr lang="en-US" b="1" dirty="0"/>
-              <a:t>differ from each other on average</a:t>
-            </a:r>
-            <a:r>
-              <a:rPr lang="en-US" dirty="0"/>
-              <a:t>.</a:t>
-            </a:r>
-          </a:p>
-          <a:p>
-            <a:pPr>
-              <a:buFont typeface="Arial" panose="020B0604020202020204" pitchFamily="34" charset="0"/>
-              <a:buChar char="•"/>
-            </a:pPr>
-            <a:r>
-              <a:rPr lang="en-US" dirty="0"/>
-              <a:t> It adjusts treatment effects so they are not inflated by animal-to-animal variation.</a:t>
-            </a:r>
-          </a:p>
-          <a:p>
-            <a:pPr>
-              <a:buFont typeface="Arial" panose="020B0604020202020204" pitchFamily="34" charset="0"/>
-              <a:buChar char="•"/>
-            </a:pPr>
-            <a:r>
-              <a:rPr lang="en-US" dirty="0"/>
-              <a:t> The random effect acts like a </a:t>
-            </a:r>
-            <a:r>
-              <a:rPr lang="en-US" b="1" dirty="0"/>
-              <a:t>baseline correction</a:t>
-            </a:r>
-            <a:r>
-              <a:rPr lang="en-US" dirty="0"/>
-              <a:t> for each individual animal.</a:t>
-            </a:r>
-          </a:p>
-          <a:p>
-            <a:pPr>
-              <a:buNone/>
-            </a:pPr>
-            <a:endParaRPr lang="en-US" b="1" dirty="0"/>
-          </a:p>
-          <a:p>
-            <a:pPr>
-              <a:buNone/>
-            </a:pPr>
-            <a:r>
-              <a:rPr lang="en-US" b="1" dirty="0"/>
-              <a:t>Veterinary practice interpretation</a:t>
-            </a:r>
-          </a:p>
-          <a:p>
-            <a:pPr>
-              <a:buFont typeface="Arial" panose="020B0604020202020204" pitchFamily="34" charset="0"/>
-              <a:buChar char="•"/>
-            </a:pPr>
-            <a:r>
-              <a:rPr lang="en-US" dirty="0"/>
-              <a:t> If random-effect variance is large:</a:t>
-            </a:r>
-            <a:br>
-              <a:rPr lang="en-US" dirty="0"/>
-            </a:br>
-            <a:r>
-              <a:rPr lang="en-US" dirty="0"/>
-              <a:t> → animals in the trial vary a lot biologically.</a:t>
-            </a:r>
-          </a:p>
-          <a:p>
-            <a:pPr>
-              <a:buFont typeface="Arial" panose="020B0604020202020204" pitchFamily="34" charset="0"/>
-              <a:buChar char="•"/>
-            </a:pPr>
-            <a:r>
-              <a:rPr lang="en-US" dirty="0"/>
-              <a:t> If it's small:</a:t>
-            </a:r>
-            <a:br>
-              <a:rPr lang="en-US" dirty="0"/>
-            </a:br>
-            <a:r>
-              <a:rPr lang="en-US" dirty="0"/>
-              <a:t> → animals behave very similarly; group differences dominate.</a:t>
-            </a:r>
-          </a:p>
-        </p:txBody>
-      </p:sp>
+      </p:pic>
     </p:spTree>
     <p:extLst>
       <p:ext uri="{BB962C8B-B14F-4D97-AF65-F5344CB8AC3E}">
-        <p14:creationId xmlns:p14="http://schemas.microsoft.com/office/powerpoint/2010/main" val="2723014488"/>
+        <p14:creationId xmlns:p14="http://schemas.microsoft.com/office/powerpoint/2010/main" val="849029243"/>
       </p:ext>
     </p:extLst>
   </p:cSld>
@@ -5356,7 +5879,7 @@
           <p:cNvPr id="3" name="TextBox 2">
             <a:extLst>
               <a:ext uri="{FF2B5EF4-FFF2-40B4-BE49-F238E27FC236}">
-                <a16:creationId xmlns:a16="http://schemas.microsoft.com/office/drawing/2014/main" id="{A2C47E32-1372-DB94-ECDF-E801FEE80F01}"/>
+                <a16:creationId xmlns:a16="http://schemas.microsoft.com/office/drawing/2014/main" id="{497561EF-BC14-FB89-F5EC-1A4679BB08EE}"/>
               </a:ext>
             </a:extLst>
           </p:cNvPr>
@@ -5365,8 +5888,8 @@
         </p:nvSpPr>
         <p:spPr>
           <a:xfrm>
-            <a:off x="273269" y="181957"/>
-            <a:ext cx="8870731" cy="5909310"/>
+            <a:off x="105103" y="181957"/>
+            <a:ext cx="9301655" cy="6494085"/>
           </a:xfrm>
           <a:prstGeom prst="rect">
             <a:avLst/>
@@ -5383,23 +5906,23 @@
               <a:buNone/>
             </a:pPr>
             <a:r>
-              <a:rPr lang="en-US" b="1" dirty="0"/>
-              <a:t>🐔 Intraclass Correlation Coefficient (ICC)</a:t>
+              <a:rPr lang="en-US" sz="1600" b="1" dirty="0"/>
+              <a:t>🐔 What the Different Statistical Distributions Mean</a:t>
             </a:r>
           </a:p>
           <a:p>
             <a:pPr>
               <a:buNone/>
             </a:pPr>
-            <a:endParaRPr lang="en-US" b="1" dirty="0"/>
+            <a:endParaRPr lang="en-US" sz="1600" b="1" dirty="0"/>
           </a:p>
           <a:p>
             <a:pPr>
               <a:buNone/>
             </a:pPr>
             <a:r>
-              <a:rPr lang="en-US" b="1" dirty="0"/>
-              <a:t>What ICC measures</a:t>
+              <a:rPr lang="en-US" sz="1600" b="1" dirty="0"/>
+              <a:t>Normal distribution</a:t>
             </a:r>
           </a:p>
           <a:p>
@@ -5408,16 +5931,8 @@
               <a:buChar char="•"/>
             </a:pPr>
             <a:r>
-              <a:rPr lang="en-US" dirty="0"/>
-              <a:t> ICC tells you </a:t>
-            </a:r>
-            <a:r>
-              <a:rPr lang="en-US" b="1" dirty="0"/>
-              <a:t>how much of the total variability comes from real biological differences between animals</a:t>
-            </a:r>
-            <a:r>
-              <a:rPr lang="en-US" dirty="0"/>
-              <a:t>.</a:t>
+              <a:rPr lang="en-US" sz="1600" dirty="0"/>
+              <a:t> Classic “bell-shaped” pattern.</a:t>
             </a:r>
           </a:p>
           <a:p>
@@ -5426,31 +5941,8 @@
               <a:buChar char="•"/>
             </a:pPr>
             <a:r>
-              <a:rPr lang="en-US" dirty="0"/>
-              <a:t> It is the </a:t>
-            </a:r>
-            <a:r>
-              <a:rPr lang="en-US" b="1" dirty="0"/>
-              <a:t>proportion of variance explained by the animal itself</a:t>
-            </a:r>
-            <a:r>
-              <a:rPr lang="en-US" dirty="0"/>
-              <a:t>, not by treatment or random noise.</a:t>
-            </a:r>
-          </a:p>
-          <a:p>
-            <a:pPr>
-              <a:buNone/>
-            </a:pPr>
-            <a:endParaRPr lang="en-US" b="1" dirty="0"/>
-          </a:p>
-          <a:p>
-            <a:pPr>
-              <a:buNone/>
-            </a:pPr>
-            <a:r>
-              <a:rPr lang="en-US" b="1" dirty="0"/>
-              <a:t>How to read ICC values</a:t>
+              <a:rPr lang="en-US" sz="1600" dirty="0"/>
+              <a:t> Most animals cluster around an average value.</a:t>
             </a:r>
           </a:p>
           <a:p>
@@ -5459,15 +5951,23 @@
               <a:buChar char="•"/>
             </a:pPr>
             <a:r>
-              <a:rPr lang="en-US" b="1" dirty="0"/>
-              <a:t> ICC ≈ 0.00–0.10 → low animal individuality</a:t>
-            </a:r>
-            <a:br>
-              <a:rPr lang="en-US" dirty="0"/>
-            </a:br>
-            <a:r>
-              <a:rPr lang="en-US" dirty="0"/>
-              <a:t>Animals behave similarly; treatment or noise dominates.</a:t>
+              <a:rPr lang="en-US" sz="1600" dirty="0"/>
+              <a:t> Good for traits with natural biological symmetry (e.g., body weight in a uniform flock).</a:t>
+            </a:r>
+          </a:p>
+          <a:p>
+            <a:pPr>
+              <a:buNone/>
+            </a:pPr>
+            <a:endParaRPr lang="en-US" sz="1600" b="1" dirty="0"/>
+          </a:p>
+          <a:p>
+            <a:pPr>
+              <a:buNone/>
+            </a:pPr>
+            <a:r>
+              <a:rPr lang="en-US" sz="1600" b="1" dirty="0"/>
+              <a:t>Log-normal distribution</a:t>
             </a:r>
           </a:p>
           <a:p>
@@ -5476,22 +5976,8 @@
               <a:buChar char="•"/>
             </a:pPr>
             <a:r>
-              <a:rPr lang="en-US" b="1" dirty="0"/>
-              <a:t> ICC ≈ 0.20–0.40 → moderate individuality</a:t>
-            </a:r>
-            <a:br>
-              <a:rPr lang="en-US" dirty="0"/>
-            </a:br>
-            <a:r>
-              <a:rPr lang="en-US" dirty="0"/>
-              <a:t>Animals have meaningful biological differences.</a:t>
-            </a:r>
-            <a:br>
-              <a:rPr lang="en-US" dirty="0"/>
-            </a:br>
-            <a:r>
-              <a:rPr lang="en-US" dirty="0"/>
-              <a:t>This is typical in growth, behavior, physiology.</a:t>
+              <a:rPr lang="en-US" sz="1600" dirty="0"/>
+              <a:t> Always positive, with a long tail to the right.</a:t>
             </a:r>
           </a:p>
           <a:p>
@@ -5500,30 +5986,8 @@
               <a:buChar char="•"/>
             </a:pPr>
             <a:r>
-              <a:rPr lang="en-US" b="1" dirty="0"/>
-              <a:t> ICC &gt; 0.40 → strong individuality</a:t>
-            </a:r>
-            <a:br>
-              <a:rPr lang="en-US" dirty="0"/>
-            </a:br>
-            <a:r>
-              <a:rPr lang="en-US" dirty="0"/>
-              <a:t>Each animal is quite different, and repeated measurements cluster tightly within each animal.</a:t>
-            </a:r>
-          </a:p>
-          <a:p>
-            <a:pPr>
-              <a:buNone/>
-            </a:pPr>
-            <a:endParaRPr lang="en-US" b="1" dirty="0"/>
-          </a:p>
-          <a:p>
-            <a:pPr>
-              <a:buNone/>
-            </a:pPr>
-            <a:r>
-              <a:rPr lang="en-US" b="1" dirty="0"/>
-              <a:t>What ICC means in practice</a:t>
+              <a:rPr lang="en-US" sz="1600" dirty="0"/>
+              <a:t> Many animals have low values, few animals have very high values.</a:t>
             </a:r>
           </a:p>
           <a:p>
@@ -5532,16 +5996,23 @@
               <a:buChar char="•"/>
             </a:pPr>
             <a:r>
-              <a:rPr lang="en-US" dirty="0"/>
-              <a:t> High ICC means repeated measurements from the same animal are </a:t>
-            </a:r>
-            <a:r>
-              <a:rPr lang="en-US" b="1" dirty="0"/>
-              <a:t>more similar to each other</a:t>
-            </a:r>
-            <a:r>
-              <a:rPr lang="en-US" dirty="0"/>
-              <a:t> than to measurements from other animals.</a:t>
+              <a:rPr lang="en-US" sz="1600" dirty="0"/>
+              <a:t> Typical for hormone levels, parasites, and any measurement that multiplies rather than adds.</a:t>
+            </a:r>
+          </a:p>
+          <a:p>
+            <a:pPr>
+              <a:buNone/>
+            </a:pPr>
+            <a:endParaRPr lang="en-US" sz="1600" b="1" dirty="0"/>
+          </a:p>
+          <a:p>
+            <a:pPr>
+              <a:buNone/>
+            </a:pPr>
+            <a:r>
+              <a:rPr lang="en-US" sz="1600" b="1" dirty="0"/>
+              <a:t>Gamma distribution</a:t>
             </a:r>
           </a:p>
           <a:p>
@@ -5550,16 +6021,118 @@
               <a:buChar char="•"/>
             </a:pPr>
             <a:r>
-              <a:rPr lang="en-US" dirty="0"/>
-              <a:t> Low ICC means each animal behaves </a:t>
-            </a:r>
-            <a:r>
-              <a:rPr lang="en-US" b="1" dirty="0"/>
-              <a:t>more like the group</a:t>
-            </a:r>
-            <a:r>
-              <a:rPr lang="en-US" dirty="0"/>
-              <a:t>, with weak individuality.</a:t>
+              <a:rPr lang="en-US" sz="1600" dirty="0"/>
+              <a:t> Positive-only, skewed to the right.</a:t>
+            </a:r>
+          </a:p>
+          <a:p>
+            <a:pPr>
+              <a:buFont typeface="Arial" panose="020B0604020202020204" pitchFamily="34" charset="0"/>
+              <a:buChar char="•"/>
+            </a:pPr>
+            <a:r>
+              <a:rPr lang="en-US" sz="1600" dirty="0"/>
+              <a:t> Suited for measurements that cannot go below zero and vary a lot.</a:t>
+            </a:r>
+          </a:p>
+          <a:p>
+            <a:pPr>
+              <a:buFont typeface="Arial" panose="020B0604020202020204" pitchFamily="34" charset="0"/>
+              <a:buChar char="•"/>
+            </a:pPr>
+            <a:r>
+              <a:rPr lang="en-US" sz="1600" dirty="0"/>
+              <a:t> Common for time-to-event data, inflammation markers, or enzyme activities.</a:t>
+            </a:r>
+          </a:p>
+          <a:p>
+            <a:pPr>
+              <a:buNone/>
+            </a:pPr>
+            <a:endParaRPr lang="en-US" sz="1600" b="1" dirty="0"/>
+          </a:p>
+          <a:p>
+            <a:pPr>
+              <a:buNone/>
+            </a:pPr>
+            <a:r>
+              <a:rPr lang="en-US" sz="1600" b="1" dirty="0"/>
+              <a:t>Weibull distribution</a:t>
+            </a:r>
+          </a:p>
+          <a:p>
+            <a:pPr>
+              <a:buFont typeface="Arial" panose="020B0604020202020204" pitchFamily="34" charset="0"/>
+              <a:buChar char="•"/>
+            </a:pPr>
+            <a:r>
+              <a:rPr lang="en-US" sz="1600" dirty="0"/>
+              <a:t> Flexible shape; can model early risk or late risk.</a:t>
+            </a:r>
+          </a:p>
+          <a:p>
+            <a:pPr>
+              <a:buFont typeface="Arial" panose="020B0604020202020204" pitchFamily="34" charset="0"/>
+              <a:buChar char="•"/>
+            </a:pPr>
+            <a:r>
+              <a:rPr lang="en-US" sz="1600" dirty="0"/>
+              <a:t> Widely used in survival analysis.</a:t>
+            </a:r>
+          </a:p>
+          <a:p>
+            <a:pPr>
+              <a:buFont typeface="Arial" panose="020B0604020202020204" pitchFamily="34" charset="0"/>
+              <a:buChar char="•"/>
+            </a:pPr>
+            <a:r>
+              <a:rPr lang="en-US" sz="1600" dirty="0"/>
+              <a:t> Good for time until disease, time until failure, or longevity studies.</a:t>
+            </a:r>
+          </a:p>
+          <a:p>
+            <a:pPr>
+              <a:buNone/>
+            </a:pPr>
+            <a:endParaRPr lang="en-US" sz="1600" b="1" dirty="0"/>
+          </a:p>
+          <a:p>
+            <a:pPr>
+              <a:buNone/>
+            </a:pPr>
+            <a:r>
+              <a:rPr lang="en-US" sz="1600" b="1" dirty="0"/>
+              <a:t>Exponential distribution</a:t>
+            </a:r>
+          </a:p>
+          <a:p>
+            <a:pPr>
+              <a:buFont typeface="Arial" panose="020B0604020202020204" pitchFamily="34" charset="0"/>
+              <a:buChar char="•"/>
+            </a:pPr>
+            <a:r>
+              <a:rPr lang="en-US" sz="1600" dirty="0"/>
+              <a:t> Memoryless “time-to-event” model.</a:t>
+            </a:r>
+          </a:p>
+          <a:p>
+            <a:pPr>
+              <a:buFont typeface="Arial" panose="020B0604020202020204" pitchFamily="34" charset="0"/>
+              <a:buChar char="•"/>
+            </a:pPr>
+            <a:r>
+              <a:rPr lang="en-US" sz="1600" dirty="0"/>
+              <a:t> Describes processes where the chance of an event is constant over time.</a:t>
+            </a:r>
+          </a:p>
+          <a:p>
+            <a:pPr>
+              <a:buFont typeface="Arial" panose="020B0604020202020204" pitchFamily="34" charset="0"/>
+              <a:buChar char="•"/>
+            </a:pPr>
+            <a:r>
+              <a:rPr lang="en-US" sz="1600" dirty="0"/>
+              <a:t> Useful for modeling infection waiting times or time until the next occurrence.</a:t>
             </a:r>
           </a:p>
         </p:txBody>
@@ -5567,7 +6140,7 @@
     </p:spTree>
     <p:extLst>
       <p:ext uri="{BB962C8B-B14F-4D97-AF65-F5344CB8AC3E}">
-        <p14:creationId xmlns:p14="http://schemas.microsoft.com/office/powerpoint/2010/main" val="2770030396"/>
+        <p14:creationId xmlns:p14="http://schemas.microsoft.com/office/powerpoint/2010/main" val="2519704046"/>
       </p:ext>
     </p:extLst>
   </p:cSld>
@@ -5582,13 +6155,7 @@
   <p:cSld>
     <p:spTree>
       <p:nvGrpSpPr>
-        <p:cNvPr id="1" name="">
-          <a:extLst>
-            <a:ext uri="{FF2B5EF4-FFF2-40B4-BE49-F238E27FC236}">
-              <a16:creationId xmlns:a16="http://schemas.microsoft.com/office/drawing/2014/main" id="{0422C693-2DDA-4516-F114-168172E1FA93}"/>
-            </a:ext>
-          </a:extLst>
-        </p:cNvPr>
+        <p:cNvPr id="1" name=""/>
         <p:cNvGrpSpPr/>
         <p:nvPr/>
       </p:nvGrpSpPr>
@@ -5605,7 +6172,7 @@
           <p:cNvPr id="2" name="Title 1">
             <a:extLst>
               <a:ext uri="{FF2B5EF4-FFF2-40B4-BE49-F238E27FC236}">
-                <a16:creationId xmlns:a16="http://schemas.microsoft.com/office/drawing/2014/main" id="{4D3E04D5-C666-B927-1436-9983B7522F01}"/>
+                <a16:creationId xmlns:a16="http://schemas.microsoft.com/office/drawing/2014/main" id="{71348000-8DB4-EFA8-B151-AF1410B425FC}"/>
               </a:ext>
             </a:extLst>
           </p:cNvPr>
@@ -5623,7 +6190,7 @@
           <a:p>
             <a:r>
               <a:rPr lang="en-US" dirty="0"/>
-              <a:t>NOTES on PCA</a:t>
+              <a:t>NOTES on LMM</a:t>
             </a:r>
           </a:p>
         </p:txBody>
@@ -5631,7 +6198,542 @@
     </p:spTree>
     <p:extLst>
       <p:ext uri="{BB962C8B-B14F-4D97-AF65-F5344CB8AC3E}">
-        <p14:creationId xmlns:p14="http://schemas.microsoft.com/office/powerpoint/2010/main" val="1646739362"/>
+        <p14:creationId xmlns:p14="http://schemas.microsoft.com/office/powerpoint/2010/main" val="346991280"/>
+      </p:ext>
+    </p:extLst>
+  </p:cSld>
+  <p:clrMapOvr>
+    <a:masterClrMapping/>
+  </p:clrMapOvr>
+</p:sld>
+</file>
+
+<file path=ppt/slides/slide8.xml><?xml version="1.0" encoding="utf-8"?>
+<p:sld xmlns:a="http://schemas.openxmlformats.org/drawingml/2006/main" xmlns:r="http://schemas.openxmlformats.org/officeDocument/2006/relationships" xmlns:p="http://schemas.openxmlformats.org/presentationml/2006/main">
+  <p:cSld>
+    <p:spTree>
+      <p:nvGrpSpPr>
+        <p:cNvPr id="1" name=""/>
+        <p:cNvGrpSpPr/>
+        <p:nvPr/>
+      </p:nvGrpSpPr>
+      <p:grpSpPr>
+        <a:xfrm>
+          <a:off x="0" y="0"/>
+          <a:ext cx="0" cy="0"/>
+          <a:chOff x="0" y="0"/>
+          <a:chExt cx="0" cy="0"/>
+        </a:xfrm>
+      </p:grpSpPr>
+      <p:sp>
+        <p:nvSpPr>
+          <p:cNvPr id="3" name="TextBox 2">
+            <a:extLst>
+              <a:ext uri="{FF2B5EF4-FFF2-40B4-BE49-F238E27FC236}">
+                <a16:creationId xmlns:a16="http://schemas.microsoft.com/office/drawing/2014/main" id="{184EEA22-109C-8598-D181-3B420FE4ECED}"/>
+              </a:ext>
+            </a:extLst>
+          </p:cNvPr>
+          <p:cNvSpPr txBox="1"/>
+          <p:nvPr/>
+        </p:nvSpPr>
+        <p:spPr>
+          <a:xfrm>
+            <a:off x="635876" y="117693"/>
+            <a:ext cx="8019393" cy="6740307"/>
+          </a:xfrm>
+          <a:prstGeom prst="rect">
+            <a:avLst/>
+          </a:prstGeom>
+          <a:noFill/>
+        </p:spPr>
+        <p:txBody>
+          <a:bodyPr wrap="square">
+            <a:spAutoFit/>
+          </a:bodyPr>
+          <a:lstStyle/>
+          <a:p>
+            <a:pPr>
+              <a:buNone/>
+            </a:pPr>
+            <a:r>
+              <a:rPr lang="en-US" b="1" dirty="0"/>
+              <a:t>🐔 Random Effects</a:t>
+            </a:r>
+          </a:p>
+          <a:p>
+            <a:pPr>
+              <a:buNone/>
+            </a:pPr>
+            <a:endParaRPr lang="en-US" b="1" dirty="0"/>
+          </a:p>
+          <a:p>
+            <a:pPr>
+              <a:buNone/>
+            </a:pPr>
+            <a:r>
+              <a:rPr lang="en-US" b="1" dirty="0"/>
+              <a:t>What they represent</a:t>
+            </a:r>
+          </a:p>
+          <a:p>
+            <a:pPr>
+              <a:buFont typeface="Arial" panose="020B0604020202020204" pitchFamily="34" charset="0"/>
+              <a:buChar char="•"/>
+            </a:pPr>
+            <a:r>
+              <a:rPr lang="en-US" dirty="0"/>
+              <a:t> They capture </a:t>
+            </a:r>
+            <a:r>
+              <a:rPr lang="en-US" b="1" dirty="0"/>
+              <a:t>natural differences between individual animals</a:t>
+            </a:r>
+            <a:r>
+              <a:rPr lang="en-US" dirty="0"/>
+              <a:t>.</a:t>
+            </a:r>
+          </a:p>
+          <a:p>
+            <a:pPr>
+              <a:buFont typeface="Arial" panose="020B0604020202020204" pitchFamily="34" charset="0"/>
+              <a:buChar char="•"/>
+            </a:pPr>
+            <a:r>
+              <a:rPr lang="en-US" dirty="0"/>
+              <a:t> Every chicken has its own baseline weight or behavior.</a:t>
+            </a:r>
+          </a:p>
+          <a:p>
+            <a:pPr>
+              <a:buFont typeface="Arial" panose="020B0604020202020204" pitchFamily="34" charset="0"/>
+              <a:buChar char="•"/>
+            </a:pPr>
+            <a:r>
+              <a:rPr lang="en-US" dirty="0"/>
+              <a:t> Random effects allow the model to </a:t>
+            </a:r>
+            <a:r>
+              <a:rPr lang="en-US" b="1" dirty="0"/>
+              <a:t>give each animal its own starting level</a:t>
+            </a:r>
+            <a:r>
+              <a:rPr lang="en-US" dirty="0"/>
+              <a:t>, instead of forcing all animals to be identical.</a:t>
+            </a:r>
+          </a:p>
+          <a:p>
+            <a:pPr>
+              <a:buNone/>
+            </a:pPr>
+            <a:endParaRPr lang="en-US" b="1" dirty="0"/>
+          </a:p>
+          <a:p>
+            <a:pPr>
+              <a:buNone/>
+            </a:pPr>
+            <a:r>
+              <a:rPr lang="en-US" b="1" dirty="0"/>
+              <a:t>Why we need them</a:t>
+            </a:r>
+          </a:p>
+          <a:p>
+            <a:pPr>
+              <a:buFont typeface="Arial" panose="020B0604020202020204" pitchFamily="34" charset="0"/>
+              <a:buChar char="•"/>
+            </a:pPr>
+            <a:r>
+              <a:rPr lang="en-US" dirty="0"/>
+              <a:t> Animals in the same treatment group are </a:t>
+            </a:r>
+            <a:r>
+              <a:rPr lang="en-US" i="1" dirty="0"/>
+              <a:t>not</a:t>
+            </a:r>
+            <a:r>
+              <a:rPr lang="en-US" dirty="0"/>
+              <a:t> clones.</a:t>
+            </a:r>
+          </a:p>
+          <a:p>
+            <a:pPr>
+              <a:buFont typeface="Arial" panose="020B0604020202020204" pitchFamily="34" charset="0"/>
+              <a:buChar char="•"/>
+            </a:pPr>
+            <a:r>
+              <a:rPr lang="en-US" dirty="0"/>
+              <a:t> Some chickens naturally grow faster or slower, regardless of treatment.</a:t>
+            </a:r>
+          </a:p>
+          <a:p>
+            <a:pPr>
+              <a:buFont typeface="Arial" panose="020B0604020202020204" pitchFamily="34" charset="0"/>
+              <a:buChar char="•"/>
+            </a:pPr>
+            <a:r>
+              <a:rPr lang="en-US" dirty="0"/>
+              <a:t> Ignoring these differences makes the analysis less accurate, more biased and too optimistic about significance.</a:t>
+            </a:r>
+          </a:p>
+          <a:p>
+            <a:pPr>
+              <a:buNone/>
+            </a:pPr>
+            <a:endParaRPr lang="en-US" b="1" dirty="0"/>
+          </a:p>
+          <a:p>
+            <a:pPr>
+              <a:buNone/>
+            </a:pPr>
+            <a:r>
+              <a:rPr lang="en-US" b="1" dirty="0"/>
+              <a:t>What the model does with them</a:t>
+            </a:r>
+          </a:p>
+          <a:p>
+            <a:pPr>
+              <a:buFont typeface="Arial" panose="020B0604020202020204" pitchFamily="34" charset="0"/>
+              <a:buChar char="•"/>
+            </a:pPr>
+            <a:r>
+              <a:rPr lang="en-US" dirty="0"/>
+              <a:t> The model estimates how much animals </a:t>
+            </a:r>
+            <a:r>
+              <a:rPr lang="en-US" b="1" dirty="0"/>
+              <a:t>differ from each other on average</a:t>
+            </a:r>
+            <a:r>
+              <a:rPr lang="en-US" dirty="0"/>
+              <a:t>.</a:t>
+            </a:r>
+          </a:p>
+          <a:p>
+            <a:pPr>
+              <a:buFont typeface="Arial" panose="020B0604020202020204" pitchFamily="34" charset="0"/>
+              <a:buChar char="•"/>
+            </a:pPr>
+            <a:r>
+              <a:rPr lang="en-US" dirty="0"/>
+              <a:t> It adjusts treatment effects so they are not inflated by animal-to-animal variation.</a:t>
+            </a:r>
+          </a:p>
+          <a:p>
+            <a:pPr>
+              <a:buFont typeface="Arial" panose="020B0604020202020204" pitchFamily="34" charset="0"/>
+              <a:buChar char="•"/>
+            </a:pPr>
+            <a:r>
+              <a:rPr lang="en-US" dirty="0"/>
+              <a:t> The random effect acts like a </a:t>
+            </a:r>
+            <a:r>
+              <a:rPr lang="en-US" b="1" dirty="0"/>
+              <a:t>baseline correction</a:t>
+            </a:r>
+            <a:r>
+              <a:rPr lang="en-US" dirty="0"/>
+              <a:t> for each individual animal.</a:t>
+            </a:r>
+          </a:p>
+          <a:p>
+            <a:pPr>
+              <a:buNone/>
+            </a:pPr>
+            <a:endParaRPr lang="en-US" b="1" dirty="0"/>
+          </a:p>
+          <a:p>
+            <a:pPr>
+              <a:buNone/>
+            </a:pPr>
+            <a:r>
+              <a:rPr lang="en-US" b="1" dirty="0"/>
+              <a:t>Veterinary practice interpretation</a:t>
+            </a:r>
+          </a:p>
+          <a:p>
+            <a:pPr>
+              <a:buFont typeface="Arial" panose="020B0604020202020204" pitchFamily="34" charset="0"/>
+              <a:buChar char="•"/>
+            </a:pPr>
+            <a:r>
+              <a:rPr lang="en-US" dirty="0"/>
+              <a:t> If random-effect variance is large:</a:t>
+            </a:r>
+            <a:br>
+              <a:rPr lang="en-US" dirty="0"/>
+            </a:br>
+            <a:r>
+              <a:rPr lang="en-US" dirty="0"/>
+              <a:t> → animals in the trial vary a lot biologically.</a:t>
+            </a:r>
+          </a:p>
+          <a:p>
+            <a:pPr>
+              <a:buFont typeface="Arial" panose="020B0604020202020204" pitchFamily="34" charset="0"/>
+              <a:buChar char="•"/>
+            </a:pPr>
+            <a:r>
+              <a:rPr lang="en-US" dirty="0"/>
+              <a:t> If it's small:</a:t>
+            </a:r>
+            <a:br>
+              <a:rPr lang="en-US" dirty="0"/>
+            </a:br>
+            <a:r>
+              <a:rPr lang="en-US" dirty="0"/>
+              <a:t> → animals behave very similarly; group differences dominate.</a:t>
+            </a:r>
+          </a:p>
+        </p:txBody>
+      </p:sp>
+    </p:spTree>
+    <p:extLst>
+      <p:ext uri="{BB962C8B-B14F-4D97-AF65-F5344CB8AC3E}">
+        <p14:creationId xmlns:p14="http://schemas.microsoft.com/office/powerpoint/2010/main" val="2723014488"/>
+      </p:ext>
+    </p:extLst>
+  </p:cSld>
+  <p:clrMapOvr>
+    <a:masterClrMapping/>
+  </p:clrMapOvr>
+</p:sld>
+</file>
+
+<file path=ppt/slides/slide9.xml><?xml version="1.0" encoding="utf-8"?>
+<p:sld xmlns:a="http://schemas.openxmlformats.org/drawingml/2006/main" xmlns:r="http://schemas.openxmlformats.org/officeDocument/2006/relationships" xmlns:p="http://schemas.openxmlformats.org/presentationml/2006/main">
+  <p:cSld>
+    <p:spTree>
+      <p:nvGrpSpPr>
+        <p:cNvPr id="1" name=""/>
+        <p:cNvGrpSpPr/>
+        <p:nvPr/>
+      </p:nvGrpSpPr>
+      <p:grpSpPr>
+        <a:xfrm>
+          <a:off x="0" y="0"/>
+          <a:ext cx="0" cy="0"/>
+          <a:chOff x="0" y="0"/>
+          <a:chExt cx="0" cy="0"/>
+        </a:xfrm>
+      </p:grpSpPr>
+      <p:sp>
+        <p:nvSpPr>
+          <p:cNvPr id="3" name="TextBox 2">
+            <a:extLst>
+              <a:ext uri="{FF2B5EF4-FFF2-40B4-BE49-F238E27FC236}">
+                <a16:creationId xmlns:a16="http://schemas.microsoft.com/office/drawing/2014/main" id="{A2C47E32-1372-DB94-ECDF-E801FEE80F01}"/>
+              </a:ext>
+            </a:extLst>
+          </p:cNvPr>
+          <p:cNvSpPr txBox="1"/>
+          <p:nvPr/>
+        </p:nvSpPr>
+        <p:spPr>
+          <a:xfrm>
+            <a:off x="273269" y="181957"/>
+            <a:ext cx="8870731" cy="5909310"/>
+          </a:xfrm>
+          <a:prstGeom prst="rect">
+            <a:avLst/>
+          </a:prstGeom>
+          <a:noFill/>
+        </p:spPr>
+        <p:txBody>
+          <a:bodyPr wrap="square">
+            <a:spAutoFit/>
+          </a:bodyPr>
+          <a:lstStyle/>
+          <a:p>
+            <a:pPr>
+              <a:buNone/>
+            </a:pPr>
+            <a:r>
+              <a:rPr lang="en-US" b="1" dirty="0"/>
+              <a:t>🐔 Intraclass Correlation Coefficient (ICC)</a:t>
+            </a:r>
+          </a:p>
+          <a:p>
+            <a:pPr>
+              <a:buNone/>
+            </a:pPr>
+            <a:endParaRPr lang="en-US" b="1" dirty="0"/>
+          </a:p>
+          <a:p>
+            <a:pPr>
+              <a:buNone/>
+            </a:pPr>
+            <a:r>
+              <a:rPr lang="en-US" b="1" dirty="0"/>
+              <a:t>What ICC measures</a:t>
+            </a:r>
+          </a:p>
+          <a:p>
+            <a:pPr>
+              <a:buFont typeface="Arial" panose="020B0604020202020204" pitchFamily="34" charset="0"/>
+              <a:buChar char="•"/>
+            </a:pPr>
+            <a:r>
+              <a:rPr lang="en-US" dirty="0"/>
+              <a:t> ICC tells you </a:t>
+            </a:r>
+            <a:r>
+              <a:rPr lang="en-US" b="1" dirty="0"/>
+              <a:t>how much of the total variability comes from real biological differences between animals</a:t>
+            </a:r>
+            <a:r>
+              <a:rPr lang="en-US" dirty="0"/>
+              <a:t>.</a:t>
+            </a:r>
+          </a:p>
+          <a:p>
+            <a:pPr>
+              <a:buFont typeface="Arial" panose="020B0604020202020204" pitchFamily="34" charset="0"/>
+              <a:buChar char="•"/>
+            </a:pPr>
+            <a:r>
+              <a:rPr lang="en-US" dirty="0"/>
+              <a:t> It is the </a:t>
+            </a:r>
+            <a:r>
+              <a:rPr lang="en-US" b="1" dirty="0"/>
+              <a:t>proportion of variance explained by the animal itself</a:t>
+            </a:r>
+            <a:r>
+              <a:rPr lang="en-US" dirty="0"/>
+              <a:t>, not by treatment or random noise.</a:t>
+            </a:r>
+          </a:p>
+          <a:p>
+            <a:pPr>
+              <a:buNone/>
+            </a:pPr>
+            <a:endParaRPr lang="en-US" b="1" dirty="0"/>
+          </a:p>
+          <a:p>
+            <a:pPr>
+              <a:buNone/>
+            </a:pPr>
+            <a:r>
+              <a:rPr lang="en-US" b="1" dirty="0"/>
+              <a:t>How to read ICC values</a:t>
+            </a:r>
+          </a:p>
+          <a:p>
+            <a:pPr>
+              <a:buFont typeface="Arial" panose="020B0604020202020204" pitchFamily="34" charset="0"/>
+              <a:buChar char="•"/>
+            </a:pPr>
+            <a:r>
+              <a:rPr lang="en-US" b="1" dirty="0"/>
+              <a:t> ICC ≈ 0.00–0.10 → low animal individuality</a:t>
+            </a:r>
+            <a:br>
+              <a:rPr lang="en-US" dirty="0"/>
+            </a:br>
+            <a:r>
+              <a:rPr lang="en-US" dirty="0"/>
+              <a:t>Animals behave similarly; treatment or noise dominates.</a:t>
+            </a:r>
+          </a:p>
+          <a:p>
+            <a:pPr>
+              <a:buFont typeface="Arial" panose="020B0604020202020204" pitchFamily="34" charset="0"/>
+              <a:buChar char="•"/>
+            </a:pPr>
+            <a:r>
+              <a:rPr lang="en-US" b="1" dirty="0"/>
+              <a:t> ICC ≈ 0.20–0.40 → moderate individuality</a:t>
+            </a:r>
+            <a:br>
+              <a:rPr lang="en-US" dirty="0"/>
+            </a:br>
+            <a:r>
+              <a:rPr lang="en-US" dirty="0"/>
+              <a:t>Animals have meaningful biological differences.</a:t>
+            </a:r>
+            <a:br>
+              <a:rPr lang="en-US" dirty="0"/>
+            </a:br>
+            <a:r>
+              <a:rPr lang="en-US" dirty="0"/>
+              <a:t>This is typical in growth, behavior, physiology.</a:t>
+            </a:r>
+          </a:p>
+          <a:p>
+            <a:pPr>
+              <a:buFont typeface="Arial" panose="020B0604020202020204" pitchFamily="34" charset="0"/>
+              <a:buChar char="•"/>
+            </a:pPr>
+            <a:r>
+              <a:rPr lang="en-US" b="1" dirty="0"/>
+              <a:t> ICC &gt; 0.40 → strong individuality</a:t>
+            </a:r>
+            <a:br>
+              <a:rPr lang="en-US" dirty="0"/>
+            </a:br>
+            <a:r>
+              <a:rPr lang="en-US" dirty="0"/>
+              <a:t>Each animal is quite different, and repeated measurements cluster tightly within each animal.</a:t>
+            </a:r>
+          </a:p>
+          <a:p>
+            <a:pPr>
+              <a:buNone/>
+            </a:pPr>
+            <a:endParaRPr lang="en-US" b="1" dirty="0"/>
+          </a:p>
+          <a:p>
+            <a:pPr>
+              <a:buNone/>
+            </a:pPr>
+            <a:r>
+              <a:rPr lang="en-US" b="1" dirty="0"/>
+              <a:t>What ICC means in practice</a:t>
+            </a:r>
+          </a:p>
+          <a:p>
+            <a:pPr>
+              <a:buFont typeface="Arial" panose="020B0604020202020204" pitchFamily="34" charset="0"/>
+              <a:buChar char="•"/>
+            </a:pPr>
+            <a:r>
+              <a:rPr lang="en-US" dirty="0"/>
+              <a:t> High ICC means repeated measurements from the same animal are </a:t>
+            </a:r>
+            <a:r>
+              <a:rPr lang="en-US" b="1" dirty="0"/>
+              <a:t>more similar to each other</a:t>
+            </a:r>
+            <a:r>
+              <a:rPr lang="en-US" dirty="0"/>
+              <a:t> than to measurements from other animals.</a:t>
+            </a:r>
+          </a:p>
+          <a:p>
+            <a:pPr>
+              <a:buFont typeface="Arial" panose="020B0604020202020204" pitchFamily="34" charset="0"/>
+              <a:buChar char="•"/>
+            </a:pPr>
+            <a:r>
+              <a:rPr lang="en-US" dirty="0"/>
+              <a:t> Low ICC means each animal behaves </a:t>
+            </a:r>
+            <a:r>
+              <a:rPr lang="en-US" b="1" dirty="0"/>
+              <a:t>more like the group</a:t>
+            </a:r>
+            <a:r>
+              <a:rPr lang="en-US" dirty="0"/>
+              <a:t>, with weak individuality.</a:t>
+            </a:r>
+          </a:p>
+        </p:txBody>
+      </p:sp>
+    </p:spTree>
+    <p:extLst>
+      <p:ext uri="{BB962C8B-B14F-4D97-AF65-F5344CB8AC3E}">
+        <p14:creationId xmlns:p14="http://schemas.microsoft.com/office/powerpoint/2010/main" val="2770030396"/>
       </p:ext>
     </p:extLst>
   </p:cSld>

</xml_diff>

<commit_message>
removed max width checks in app.R and added guess_max to excel reading
</commit_message>
<xml_diff>
--- a/presentations/Table_Analyzer_Overview.pptx
+++ b/presentations/Table_Analyzer_Overview.pptx
@@ -5,20 +5,22 @@
     <p:sldMasterId id="2147483648" r:id="rId1"/>
   </p:sldMasterIdLst>
   <p:notesMasterIdLst>
-    <p:notesMasterId r:id="rId13"/>
+    <p:notesMasterId r:id="rId15"/>
   </p:notesMasterIdLst>
   <p:sldIdLst>
     <p:sldId id="256" r:id="rId2"/>
     <p:sldId id="258" r:id="rId3"/>
     <p:sldId id="257" r:id="rId4"/>
-    <p:sldId id="266" r:id="rId5"/>
-    <p:sldId id="268" r:id="rId6"/>
-    <p:sldId id="269" r:id="rId7"/>
-    <p:sldId id="262" r:id="rId8"/>
-    <p:sldId id="259" r:id="rId9"/>
-    <p:sldId id="260" r:id="rId10"/>
-    <p:sldId id="263" r:id="rId11"/>
-    <p:sldId id="265" r:id="rId12"/>
+    <p:sldId id="270" r:id="rId5"/>
+    <p:sldId id="271" r:id="rId6"/>
+    <p:sldId id="266" r:id="rId7"/>
+    <p:sldId id="268" r:id="rId8"/>
+    <p:sldId id="269" r:id="rId9"/>
+    <p:sldId id="262" r:id="rId10"/>
+    <p:sldId id="259" r:id="rId11"/>
+    <p:sldId id="260" r:id="rId12"/>
+    <p:sldId id="263" r:id="rId13"/>
+    <p:sldId id="265" r:id="rId14"/>
   </p:sldIdLst>
   <p:sldSz cx="9144000" cy="6858000" type="screen4x3"/>
   <p:notesSz cx="6858000" cy="9144000"/>
@@ -3712,6 +3714,58 @@
           </a:p>
         </p:txBody>
       </p:sp>
+      <p:sp>
+        <p:nvSpPr>
+          <p:cNvPr id="7" name="TextBox 6">
+            <a:extLst>
+              <a:ext uri="{FF2B5EF4-FFF2-40B4-BE49-F238E27FC236}">
+                <a16:creationId xmlns:a16="http://schemas.microsoft.com/office/drawing/2014/main" id="{71EE6ADB-DAF4-0B29-7460-62CEEA33A01A}"/>
+              </a:ext>
+            </a:extLst>
+          </p:cNvPr>
+          <p:cNvSpPr txBox="1"/>
+          <p:nvPr/>
+        </p:nvSpPr>
+        <p:spPr>
+          <a:xfrm>
+            <a:off x="1635947" y="3342289"/>
+            <a:ext cx="7104358" cy="369332"/>
+          </a:xfrm>
+          <a:prstGeom prst="rect">
+            <a:avLst/>
+          </a:prstGeom>
+          <a:noFill/>
+        </p:spPr>
+        <p:txBody>
+          <a:bodyPr wrap="square">
+            <a:spAutoFit/>
+          </a:bodyPr>
+          <a:lstStyle/>
+          <a:p>
+            <a:pPr lvl="1">
+              <a:defRPr sz="1800">
+                <a:solidFill>
+                  <a:srgbClr val="3C3C3C"/>
+                </a:solidFill>
+              </a:defRPr>
+            </a:pPr>
+            <a:r>
+              <a:rPr lang="de-DE" dirty="0">
+                <a:solidFill>
+                  <a:srgbClr val="7030A0"/>
+                </a:solidFill>
+                <a:hlinkClick r:id="rId2"/>
+              </a:rPr>
+              <a:t>https://nicola-palmieri.shinyapps.io/tableanalyzer/</a:t>
+            </a:r>
+            <a:endParaRPr lang="de-DE" dirty="0">
+              <a:solidFill>
+                <a:srgbClr val="7030A0"/>
+              </a:solidFill>
+            </a:endParaRPr>
+          </a:p>
+        </p:txBody>
+      </p:sp>
     </p:spTree>
   </p:cSld>
   <p:clrMapOvr>
@@ -3721,6 +3775,541 @@
 </file>
 
 <file path=ppt/slides/slide10.xml><?xml version="1.0" encoding="utf-8"?>
+<p:sld xmlns:a="http://schemas.openxmlformats.org/drawingml/2006/main" xmlns:r="http://schemas.openxmlformats.org/officeDocument/2006/relationships" xmlns:p="http://schemas.openxmlformats.org/presentationml/2006/main">
+  <p:cSld>
+    <p:spTree>
+      <p:nvGrpSpPr>
+        <p:cNvPr id="1" name=""/>
+        <p:cNvGrpSpPr/>
+        <p:nvPr/>
+      </p:nvGrpSpPr>
+      <p:grpSpPr>
+        <a:xfrm>
+          <a:off x="0" y="0"/>
+          <a:ext cx="0" cy="0"/>
+          <a:chOff x="0" y="0"/>
+          <a:chExt cx="0" cy="0"/>
+        </a:xfrm>
+      </p:grpSpPr>
+      <p:sp>
+        <p:nvSpPr>
+          <p:cNvPr id="3" name="TextBox 2">
+            <a:extLst>
+              <a:ext uri="{FF2B5EF4-FFF2-40B4-BE49-F238E27FC236}">
+                <a16:creationId xmlns:a16="http://schemas.microsoft.com/office/drawing/2014/main" id="{184EEA22-109C-8598-D181-3B420FE4ECED}"/>
+              </a:ext>
+            </a:extLst>
+          </p:cNvPr>
+          <p:cNvSpPr txBox="1"/>
+          <p:nvPr/>
+        </p:nvSpPr>
+        <p:spPr>
+          <a:xfrm>
+            <a:off x="635876" y="117693"/>
+            <a:ext cx="8019393" cy="6740307"/>
+          </a:xfrm>
+          <a:prstGeom prst="rect">
+            <a:avLst/>
+          </a:prstGeom>
+          <a:noFill/>
+        </p:spPr>
+        <p:txBody>
+          <a:bodyPr wrap="square">
+            <a:spAutoFit/>
+          </a:bodyPr>
+          <a:lstStyle/>
+          <a:p>
+            <a:pPr>
+              <a:buNone/>
+            </a:pPr>
+            <a:r>
+              <a:rPr lang="en-US" b="1" dirty="0"/>
+              <a:t>🐔 Random Effects</a:t>
+            </a:r>
+          </a:p>
+          <a:p>
+            <a:pPr>
+              <a:buNone/>
+            </a:pPr>
+            <a:endParaRPr lang="en-US" b="1" dirty="0"/>
+          </a:p>
+          <a:p>
+            <a:pPr>
+              <a:buNone/>
+            </a:pPr>
+            <a:r>
+              <a:rPr lang="en-US" b="1" dirty="0"/>
+              <a:t>What they represent</a:t>
+            </a:r>
+          </a:p>
+          <a:p>
+            <a:pPr>
+              <a:buFont typeface="Arial" panose="020B0604020202020204" pitchFamily="34" charset="0"/>
+              <a:buChar char="•"/>
+            </a:pPr>
+            <a:r>
+              <a:rPr lang="en-US" dirty="0"/>
+              <a:t> They capture </a:t>
+            </a:r>
+            <a:r>
+              <a:rPr lang="en-US" b="1" dirty="0"/>
+              <a:t>natural differences between individual animals</a:t>
+            </a:r>
+            <a:r>
+              <a:rPr lang="en-US" dirty="0"/>
+              <a:t>.</a:t>
+            </a:r>
+          </a:p>
+          <a:p>
+            <a:pPr>
+              <a:buFont typeface="Arial" panose="020B0604020202020204" pitchFamily="34" charset="0"/>
+              <a:buChar char="•"/>
+            </a:pPr>
+            <a:r>
+              <a:rPr lang="en-US" dirty="0"/>
+              <a:t> Every chicken has its own baseline weight or behavior.</a:t>
+            </a:r>
+          </a:p>
+          <a:p>
+            <a:pPr>
+              <a:buFont typeface="Arial" panose="020B0604020202020204" pitchFamily="34" charset="0"/>
+              <a:buChar char="•"/>
+            </a:pPr>
+            <a:r>
+              <a:rPr lang="en-US" dirty="0"/>
+              <a:t> Random effects allow the model to </a:t>
+            </a:r>
+            <a:r>
+              <a:rPr lang="en-US" b="1" dirty="0"/>
+              <a:t>give each animal its own starting level</a:t>
+            </a:r>
+            <a:r>
+              <a:rPr lang="en-US" dirty="0"/>
+              <a:t>, instead of forcing all animals to be identical.</a:t>
+            </a:r>
+          </a:p>
+          <a:p>
+            <a:pPr>
+              <a:buNone/>
+            </a:pPr>
+            <a:endParaRPr lang="en-US" b="1" dirty="0"/>
+          </a:p>
+          <a:p>
+            <a:pPr>
+              <a:buNone/>
+            </a:pPr>
+            <a:r>
+              <a:rPr lang="en-US" b="1" dirty="0"/>
+              <a:t>Why we need them</a:t>
+            </a:r>
+          </a:p>
+          <a:p>
+            <a:pPr>
+              <a:buFont typeface="Arial" panose="020B0604020202020204" pitchFamily="34" charset="0"/>
+              <a:buChar char="•"/>
+            </a:pPr>
+            <a:r>
+              <a:rPr lang="en-US" dirty="0"/>
+              <a:t> Animals in the same treatment group are </a:t>
+            </a:r>
+            <a:r>
+              <a:rPr lang="en-US" i="1" dirty="0"/>
+              <a:t>not</a:t>
+            </a:r>
+            <a:r>
+              <a:rPr lang="en-US" dirty="0"/>
+              <a:t> clones.</a:t>
+            </a:r>
+          </a:p>
+          <a:p>
+            <a:pPr>
+              <a:buFont typeface="Arial" panose="020B0604020202020204" pitchFamily="34" charset="0"/>
+              <a:buChar char="•"/>
+            </a:pPr>
+            <a:r>
+              <a:rPr lang="en-US" dirty="0"/>
+              <a:t> Some chickens naturally grow faster or slower, regardless of treatment.</a:t>
+            </a:r>
+          </a:p>
+          <a:p>
+            <a:pPr>
+              <a:buFont typeface="Arial" panose="020B0604020202020204" pitchFamily="34" charset="0"/>
+              <a:buChar char="•"/>
+            </a:pPr>
+            <a:r>
+              <a:rPr lang="en-US" dirty="0"/>
+              <a:t> Ignoring these differences makes the analysis less accurate, more biased and too optimistic about significance.</a:t>
+            </a:r>
+          </a:p>
+          <a:p>
+            <a:pPr>
+              <a:buNone/>
+            </a:pPr>
+            <a:endParaRPr lang="en-US" b="1" dirty="0"/>
+          </a:p>
+          <a:p>
+            <a:pPr>
+              <a:buNone/>
+            </a:pPr>
+            <a:r>
+              <a:rPr lang="en-US" b="1" dirty="0"/>
+              <a:t>What the model does with them</a:t>
+            </a:r>
+          </a:p>
+          <a:p>
+            <a:pPr>
+              <a:buFont typeface="Arial" panose="020B0604020202020204" pitchFamily="34" charset="0"/>
+              <a:buChar char="•"/>
+            </a:pPr>
+            <a:r>
+              <a:rPr lang="en-US" dirty="0"/>
+              <a:t> The model estimates how much animals </a:t>
+            </a:r>
+            <a:r>
+              <a:rPr lang="en-US" b="1" dirty="0"/>
+              <a:t>differ from each other on average</a:t>
+            </a:r>
+            <a:r>
+              <a:rPr lang="en-US" dirty="0"/>
+              <a:t>.</a:t>
+            </a:r>
+          </a:p>
+          <a:p>
+            <a:pPr>
+              <a:buFont typeface="Arial" panose="020B0604020202020204" pitchFamily="34" charset="0"/>
+              <a:buChar char="•"/>
+            </a:pPr>
+            <a:r>
+              <a:rPr lang="en-US" dirty="0"/>
+              <a:t> It adjusts treatment effects so they are not inflated by animal-to-animal variation.</a:t>
+            </a:r>
+          </a:p>
+          <a:p>
+            <a:pPr>
+              <a:buFont typeface="Arial" panose="020B0604020202020204" pitchFamily="34" charset="0"/>
+              <a:buChar char="•"/>
+            </a:pPr>
+            <a:r>
+              <a:rPr lang="en-US" dirty="0"/>
+              <a:t> The random effect acts like a </a:t>
+            </a:r>
+            <a:r>
+              <a:rPr lang="en-US" b="1" dirty="0"/>
+              <a:t>baseline correction</a:t>
+            </a:r>
+            <a:r>
+              <a:rPr lang="en-US" dirty="0"/>
+              <a:t> for each individual animal.</a:t>
+            </a:r>
+          </a:p>
+          <a:p>
+            <a:pPr>
+              <a:buNone/>
+            </a:pPr>
+            <a:endParaRPr lang="en-US" b="1" dirty="0"/>
+          </a:p>
+          <a:p>
+            <a:pPr>
+              <a:buNone/>
+            </a:pPr>
+            <a:r>
+              <a:rPr lang="en-US" b="1" dirty="0"/>
+              <a:t>Veterinary practice interpretation</a:t>
+            </a:r>
+          </a:p>
+          <a:p>
+            <a:pPr>
+              <a:buFont typeface="Arial" panose="020B0604020202020204" pitchFamily="34" charset="0"/>
+              <a:buChar char="•"/>
+            </a:pPr>
+            <a:r>
+              <a:rPr lang="en-US" dirty="0"/>
+              <a:t> If random-effect variance is large:</a:t>
+            </a:r>
+            <a:br>
+              <a:rPr lang="en-US" dirty="0"/>
+            </a:br>
+            <a:r>
+              <a:rPr lang="en-US" dirty="0"/>
+              <a:t> → animals in the trial vary a lot biologically.</a:t>
+            </a:r>
+          </a:p>
+          <a:p>
+            <a:pPr>
+              <a:buFont typeface="Arial" panose="020B0604020202020204" pitchFamily="34" charset="0"/>
+              <a:buChar char="•"/>
+            </a:pPr>
+            <a:r>
+              <a:rPr lang="en-US" dirty="0"/>
+              <a:t> If it's small:</a:t>
+            </a:r>
+            <a:br>
+              <a:rPr lang="en-US" dirty="0"/>
+            </a:br>
+            <a:r>
+              <a:rPr lang="en-US" dirty="0"/>
+              <a:t> → animals behave very similarly; group differences dominate.</a:t>
+            </a:r>
+          </a:p>
+        </p:txBody>
+      </p:sp>
+    </p:spTree>
+    <p:extLst>
+      <p:ext uri="{BB962C8B-B14F-4D97-AF65-F5344CB8AC3E}">
+        <p14:creationId xmlns:p14="http://schemas.microsoft.com/office/powerpoint/2010/main" val="2723014488"/>
+      </p:ext>
+    </p:extLst>
+  </p:cSld>
+  <p:clrMapOvr>
+    <a:masterClrMapping/>
+  </p:clrMapOvr>
+</p:sld>
+</file>
+
+<file path=ppt/slides/slide11.xml><?xml version="1.0" encoding="utf-8"?>
+<p:sld xmlns:a="http://schemas.openxmlformats.org/drawingml/2006/main" xmlns:r="http://schemas.openxmlformats.org/officeDocument/2006/relationships" xmlns:p="http://schemas.openxmlformats.org/presentationml/2006/main">
+  <p:cSld>
+    <p:spTree>
+      <p:nvGrpSpPr>
+        <p:cNvPr id="1" name=""/>
+        <p:cNvGrpSpPr/>
+        <p:nvPr/>
+      </p:nvGrpSpPr>
+      <p:grpSpPr>
+        <a:xfrm>
+          <a:off x="0" y="0"/>
+          <a:ext cx="0" cy="0"/>
+          <a:chOff x="0" y="0"/>
+          <a:chExt cx="0" cy="0"/>
+        </a:xfrm>
+      </p:grpSpPr>
+      <p:sp>
+        <p:nvSpPr>
+          <p:cNvPr id="3" name="TextBox 2">
+            <a:extLst>
+              <a:ext uri="{FF2B5EF4-FFF2-40B4-BE49-F238E27FC236}">
+                <a16:creationId xmlns:a16="http://schemas.microsoft.com/office/drawing/2014/main" id="{A2C47E32-1372-DB94-ECDF-E801FEE80F01}"/>
+              </a:ext>
+            </a:extLst>
+          </p:cNvPr>
+          <p:cNvSpPr txBox="1"/>
+          <p:nvPr/>
+        </p:nvSpPr>
+        <p:spPr>
+          <a:xfrm>
+            <a:off x="273269" y="181957"/>
+            <a:ext cx="8870731" cy="5909310"/>
+          </a:xfrm>
+          <a:prstGeom prst="rect">
+            <a:avLst/>
+          </a:prstGeom>
+          <a:noFill/>
+        </p:spPr>
+        <p:txBody>
+          <a:bodyPr wrap="square">
+            <a:spAutoFit/>
+          </a:bodyPr>
+          <a:lstStyle/>
+          <a:p>
+            <a:pPr>
+              <a:buNone/>
+            </a:pPr>
+            <a:r>
+              <a:rPr lang="en-US" b="1" dirty="0"/>
+              <a:t>🐔 Intraclass Correlation Coefficient (ICC)</a:t>
+            </a:r>
+          </a:p>
+          <a:p>
+            <a:pPr>
+              <a:buNone/>
+            </a:pPr>
+            <a:endParaRPr lang="en-US" b="1" dirty="0"/>
+          </a:p>
+          <a:p>
+            <a:pPr>
+              <a:buNone/>
+            </a:pPr>
+            <a:r>
+              <a:rPr lang="en-US" b="1" dirty="0"/>
+              <a:t>What ICC measures</a:t>
+            </a:r>
+          </a:p>
+          <a:p>
+            <a:pPr>
+              <a:buFont typeface="Arial" panose="020B0604020202020204" pitchFamily="34" charset="0"/>
+              <a:buChar char="•"/>
+            </a:pPr>
+            <a:r>
+              <a:rPr lang="en-US" dirty="0"/>
+              <a:t> ICC tells you </a:t>
+            </a:r>
+            <a:r>
+              <a:rPr lang="en-US" b="1" dirty="0"/>
+              <a:t>how much of the total variability comes from real biological differences between animals</a:t>
+            </a:r>
+            <a:r>
+              <a:rPr lang="en-US" dirty="0"/>
+              <a:t>.</a:t>
+            </a:r>
+          </a:p>
+          <a:p>
+            <a:pPr>
+              <a:buFont typeface="Arial" panose="020B0604020202020204" pitchFamily="34" charset="0"/>
+              <a:buChar char="•"/>
+            </a:pPr>
+            <a:r>
+              <a:rPr lang="en-US" dirty="0"/>
+              <a:t> It is the </a:t>
+            </a:r>
+            <a:r>
+              <a:rPr lang="en-US" b="1" dirty="0"/>
+              <a:t>proportion of variance explained by the animal itself</a:t>
+            </a:r>
+            <a:r>
+              <a:rPr lang="en-US" dirty="0"/>
+              <a:t>, not by treatment or random noise.</a:t>
+            </a:r>
+          </a:p>
+          <a:p>
+            <a:pPr>
+              <a:buNone/>
+            </a:pPr>
+            <a:endParaRPr lang="en-US" b="1" dirty="0"/>
+          </a:p>
+          <a:p>
+            <a:pPr>
+              <a:buNone/>
+            </a:pPr>
+            <a:r>
+              <a:rPr lang="en-US" b="1" dirty="0"/>
+              <a:t>How to read ICC values</a:t>
+            </a:r>
+          </a:p>
+          <a:p>
+            <a:pPr>
+              <a:buFont typeface="Arial" panose="020B0604020202020204" pitchFamily="34" charset="0"/>
+              <a:buChar char="•"/>
+            </a:pPr>
+            <a:r>
+              <a:rPr lang="en-US" b="1" dirty="0"/>
+              <a:t> ICC ≈ 0.00–0.10 → low animal individuality</a:t>
+            </a:r>
+            <a:br>
+              <a:rPr lang="en-US" dirty="0"/>
+            </a:br>
+            <a:r>
+              <a:rPr lang="en-US" dirty="0"/>
+              <a:t>Animals behave similarly; treatment or noise dominates.</a:t>
+            </a:r>
+          </a:p>
+          <a:p>
+            <a:pPr>
+              <a:buFont typeface="Arial" panose="020B0604020202020204" pitchFamily="34" charset="0"/>
+              <a:buChar char="•"/>
+            </a:pPr>
+            <a:r>
+              <a:rPr lang="en-US" b="1" dirty="0"/>
+              <a:t> ICC ≈ 0.20–0.40 → moderate individuality</a:t>
+            </a:r>
+            <a:br>
+              <a:rPr lang="en-US" dirty="0"/>
+            </a:br>
+            <a:r>
+              <a:rPr lang="en-US" dirty="0"/>
+              <a:t>Animals have meaningful biological differences.</a:t>
+            </a:r>
+            <a:br>
+              <a:rPr lang="en-US" dirty="0"/>
+            </a:br>
+            <a:r>
+              <a:rPr lang="en-US" dirty="0"/>
+              <a:t>This is typical in growth, behavior, physiology.</a:t>
+            </a:r>
+          </a:p>
+          <a:p>
+            <a:pPr>
+              <a:buFont typeface="Arial" panose="020B0604020202020204" pitchFamily="34" charset="0"/>
+              <a:buChar char="•"/>
+            </a:pPr>
+            <a:r>
+              <a:rPr lang="en-US" b="1" dirty="0"/>
+              <a:t> ICC &gt; 0.40 → strong individuality</a:t>
+            </a:r>
+            <a:br>
+              <a:rPr lang="en-US" dirty="0"/>
+            </a:br>
+            <a:r>
+              <a:rPr lang="en-US" dirty="0"/>
+              <a:t>Each animal is quite different, and repeated measurements cluster tightly within each animal.</a:t>
+            </a:r>
+          </a:p>
+          <a:p>
+            <a:pPr>
+              <a:buNone/>
+            </a:pPr>
+            <a:endParaRPr lang="en-US" b="1" dirty="0"/>
+          </a:p>
+          <a:p>
+            <a:pPr>
+              <a:buNone/>
+            </a:pPr>
+            <a:r>
+              <a:rPr lang="en-US" b="1" dirty="0"/>
+              <a:t>What ICC means in practice</a:t>
+            </a:r>
+          </a:p>
+          <a:p>
+            <a:pPr>
+              <a:buFont typeface="Arial" panose="020B0604020202020204" pitchFamily="34" charset="0"/>
+              <a:buChar char="•"/>
+            </a:pPr>
+            <a:r>
+              <a:rPr lang="en-US" dirty="0"/>
+              <a:t> High ICC means repeated measurements from the same animal are </a:t>
+            </a:r>
+            <a:r>
+              <a:rPr lang="en-US" b="1" dirty="0"/>
+              <a:t>more similar to each other</a:t>
+            </a:r>
+            <a:r>
+              <a:rPr lang="en-US" dirty="0"/>
+              <a:t> than to measurements from other animals.</a:t>
+            </a:r>
+          </a:p>
+          <a:p>
+            <a:pPr>
+              <a:buFont typeface="Arial" panose="020B0604020202020204" pitchFamily="34" charset="0"/>
+              <a:buChar char="•"/>
+            </a:pPr>
+            <a:r>
+              <a:rPr lang="en-US" dirty="0"/>
+              <a:t> Low ICC means each animal behaves </a:t>
+            </a:r>
+            <a:r>
+              <a:rPr lang="en-US" b="1" dirty="0"/>
+              <a:t>more like the group</a:t>
+            </a:r>
+            <a:r>
+              <a:rPr lang="en-US" dirty="0"/>
+              <a:t>, with weak individuality.</a:t>
+            </a:r>
+          </a:p>
+        </p:txBody>
+      </p:sp>
+    </p:spTree>
+    <p:extLst>
+      <p:ext uri="{BB962C8B-B14F-4D97-AF65-F5344CB8AC3E}">
+        <p14:creationId xmlns:p14="http://schemas.microsoft.com/office/powerpoint/2010/main" val="2770030396"/>
+      </p:ext>
+    </p:extLst>
+  </p:cSld>
+  <p:clrMapOvr>
+    <a:masterClrMapping/>
+  </p:clrMapOvr>
+</p:sld>
+</file>
+
+<file path=ppt/slides/slide12.xml><?xml version="1.0" encoding="utf-8"?>
 <p:sld xmlns:a="http://schemas.openxmlformats.org/drawingml/2006/main" xmlns:r="http://schemas.openxmlformats.org/officeDocument/2006/relationships" xmlns:p="http://schemas.openxmlformats.org/presentationml/2006/main">
   <p:cSld>
     <p:spTree>
@@ -3784,7 +4373,7 @@
 </p:sld>
 </file>
 
-<file path=ppt/slides/slide11.xml><?xml version="1.0" encoding="utf-8"?>
+<file path=ppt/slides/slide13.xml><?xml version="1.0" encoding="utf-8"?>
 <p:sld xmlns:a="http://schemas.openxmlformats.org/drawingml/2006/main" xmlns:r="http://schemas.openxmlformats.org/officeDocument/2006/relationships" xmlns:p="http://schemas.openxmlformats.org/presentationml/2006/main">
   <p:cSld>
     <p:spTree>
@@ -4468,7 +5057,7 @@
         <p:spPr>
           <a:xfrm>
             <a:off x="858591" y="612844"/>
-            <a:ext cx="7772400" cy="4801314"/>
+            <a:ext cx="7772400" cy="5078313"/>
           </a:xfrm>
           <a:prstGeom prst="rect">
             <a:avLst/>
@@ -4493,7 +5082,7 @@
             </a:pPr>
             <a:r>
               <a:rPr lang="en-US" dirty="0"/>
-              <a:t>Bioinformatician specializing in microbial genomics, neuroinformatics, and high-throughput data analysis</a:t>
+              <a:t>Bioinformatician specialized in microbial genomics, neuroinformatics, and high-throughput data analysis</a:t>
             </a:r>
           </a:p>
           <a:p>
@@ -4537,7 +5126,7 @@
             </a:pPr>
             <a:r>
               <a:rPr lang="en-US" dirty="0"/>
-              <a:t>Experience in biological signal processing, microscopy image analysis</a:t>
+              <a:t>Experience with omics datasets, biological signal processing, microscopy image analysis</a:t>
             </a:r>
           </a:p>
           <a:p>
@@ -5060,7 +5649,7 @@
         <p:spPr>
           <a:xfrm>
             <a:off x="795528" y="210312"/>
-            <a:ext cx="7772400" cy="6001643"/>
+            <a:ext cx="7772400" cy="5724644"/>
           </a:xfrm>
           <a:prstGeom prst="rect">
             <a:avLst/>
@@ -5193,6 +5782,32 @@
               <a:rPr dirty="0"/>
               <a:t>• Download publication-formatted tables</a:t>
             </a:r>
+            <a:r>
+              <a:rPr lang="de-DE" dirty="0"/>
+              <a:t> and </a:t>
+            </a:r>
+            <a:r>
+              <a:rPr lang="de-DE" dirty="0" err="1"/>
+              <a:t>plots</a:t>
+            </a:r>
+            <a:r>
+              <a:rPr lang="de-DE" dirty="0"/>
+              <a:t> at 300 dpi (PNG)</a:t>
+            </a:r>
+            <a:endParaRPr dirty="0"/>
+          </a:p>
+          <a:p>
+            <a:pPr>
+              <a:defRPr sz="2400" b="1">
+                <a:solidFill>
+                  <a:srgbClr val="1E3246"/>
+                </a:solidFill>
+              </a:defRPr>
+            </a:pPr>
+            <a:r>
+              <a:rPr dirty="0"/>
+              <a:t>What it is not</a:t>
+            </a:r>
           </a:p>
           <a:p>
             <a:pPr lvl="1">
@@ -5204,7 +5819,20 @@
             </a:pPr>
             <a:r>
               <a:rPr dirty="0"/>
-              <a:t>• Export plots at 300 dpi (PNG)</a:t>
+              <a:t>• Not a replacement for Excel, GraphPad Prism, or SPSS</a:t>
+            </a:r>
+          </a:p>
+          <a:p>
+            <a:pPr lvl="1">
+              <a:defRPr sz="1800">
+                <a:solidFill>
+                  <a:srgbClr val="3C3C3C"/>
+                </a:solidFill>
+              </a:defRPr>
+            </a:pPr>
+            <a:r>
+              <a:rPr dirty="0"/>
+              <a:t>• Not intended for data editing or spreadsheet management</a:t>
             </a:r>
           </a:p>
           <a:p>
@@ -5217,8 +5845,37 @@
             </a:pPr>
             <a:r>
               <a:rPr dirty="0"/>
-              <a:t>What it is not</a:t>
-            </a:r>
+              <a:t>Why </a:t>
+            </a:r>
+            <a:r>
+              <a:rPr lang="de-DE" dirty="0" err="1"/>
+              <a:t>should</a:t>
+            </a:r>
+            <a:r>
+              <a:rPr lang="de-DE" dirty="0"/>
+              <a:t> </a:t>
+            </a:r>
+            <a:r>
+              <a:rPr lang="de-DE" dirty="0" err="1"/>
+              <a:t>you</a:t>
+            </a:r>
+            <a:r>
+              <a:rPr lang="de-DE" dirty="0"/>
+              <a:t> </a:t>
+            </a:r>
+            <a:r>
+              <a:rPr lang="de-DE" dirty="0" err="1"/>
+              <a:t>use</a:t>
+            </a:r>
+            <a:r>
+              <a:rPr lang="de-DE" dirty="0"/>
+              <a:t> </a:t>
+            </a:r>
+            <a:r>
+              <a:rPr lang="de-DE" dirty="0" err="1"/>
+              <a:t>it</a:t>
+            </a:r>
+            <a:endParaRPr dirty="0"/>
           </a:p>
           <a:p>
             <a:pPr lvl="1">
@@ -5230,7 +5887,7 @@
             </a:pPr>
             <a:r>
               <a:rPr dirty="0"/>
-              <a:t>• Not a replacement for Excel, GraphPad Prism, or SPSS</a:t>
+              <a:t>• Multiple responses in parallel: run the same model across several outcomes</a:t>
             </a:r>
           </a:p>
           <a:p>
@@ -5243,20 +5900,7 @@
             </a:pPr>
             <a:r>
               <a:rPr dirty="0"/>
-              <a:t>• Not intended for data editing or spreadsheet management</a:t>
-            </a:r>
-          </a:p>
-          <a:p>
-            <a:pPr>
-              <a:defRPr sz="2400" b="1">
-                <a:solidFill>
-                  <a:srgbClr val="1E3246"/>
-                </a:solidFill>
-              </a:defRPr>
-            </a:pPr>
-            <a:r>
-              <a:rPr dirty="0"/>
-              <a:t>Why it speeds up analysis</a:t>
+              <a:t>• Stratification: fit models within groups (batch, treatment, animal group)</a:t>
             </a:r>
           </a:p>
           <a:p>
@@ -5269,34 +5913,49 @@
             </a:pPr>
             <a:r>
               <a:rPr dirty="0"/>
-              <a:t>• Multiple responses in parallel: run the same model across several outcomes</a:t>
-            </a:r>
-          </a:p>
-          <a:p>
-            <a:pPr lvl="1">
-              <a:defRPr sz="1800">
-                <a:solidFill>
-                  <a:srgbClr val="3C3C3C"/>
-                </a:solidFill>
-              </a:defRPr>
-            </a:pPr>
-            <a:r>
-              <a:rPr dirty="0"/>
-              <a:t>• Stratification: fit models within groups (batch, treatment, animal group)</a:t>
-            </a:r>
-          </a:p>
-          <a:p>
-            <a:pPr lvl="1">
-              <a:defRPr sz="1800">
-                <a:solidFill>
-                  <a:srgbClr val="3C3C3C"/>
-                </a:solidFill>
-              </a:defRPr>
-            </a:pPr>
-            <a:r>
-              <a:rPr dirty="0"/>
-              <a:t>• Plots adapt automatically to both multiple responses and stratification</a:t>
-            </a:r>
+              <a:t>• </a:t>
+            </a:r>
+            <a:r>
+              <a:rPr lang="de-DE" dirty="0"/>
+              <a:t>Create </a:t>
+            </a:r>
+            <a:r>
+              <a:rPr lang="de-DE" dirty="0" err="1"/>
+              <a:t>publication-ready</a:t>
+            </a:r>
+            <a:r>
+              <a:rPr lang="de-DE" dirty="0"/>
+              <a:t> </a:t>
+            </a:r>
+            <a:r>
+              <a:rPr lang="de-DE" dirty="0" err="1"/>
+              <a:t>plots</a:t>
+            </a:r>
+            <a:r>
+              <a:rPr lang="de-DE" dirty="0"/>
+              <a:t> and </a:t>
+            </a:r>
+            <a:r>
+              <a:rPr lang="de-DE" dirty="0" err="1"/>
+              <a:t>tables</a:t>
+            </a:r>
+            <a:r>
+              <a:rPr lang="de-DE" dirty="0"/>
+              <a:t> </a:t>
+            </a:r>
+            <a:r>
+              <a:rPr lang="de-DE" dirty="0" err="1"/>
+              <a:t>with</a:t>
+            </a:r>
+            <a:r>
+              <a:rPr lang="de-DE" dirty="0"/>
+              <a:t> minimal </a:t>
+            </a:r>
+            <a:r>
+              <a:rPr lang="de-DE" dirty="0" err="1"/>
+              <a:t>effort</a:t>
+            </a:r>
+            <a:endParaRPr dirty="0"/>
           </a:p>
         </p:txBody>
       </p:sp>
@@ -5341,7 +6000,7 @@
                                         <p:tgtEl>
                                           <p:spTgt spid="2">
                                             <p:txEl>
-                                              <p:pRg st="6" end="6"/>
+                                              <p:pRg st="1" end="1"/>
                                             </p:txEl>
                                           </p:spTgt>
                                         </p:tgtEl>
@@ -5372,7 +6031,7 @@
                                         <p:tgtEl>
                                           <p:spTgt spid="2">
                                             <p:txEl>
-                                              <p:pRg st="7" end="7"/>
+                                              <p:pRg st="2" end="2"/>
                                             </p:txEl>
                                           </p:spTgt>
                                         </p:tgtEl>
@@ -5387,39 +6046,26 @@
                                   </p:childTnLst>
                                 </p:cTn>
                               </p:par>
+                            </p:childTnLst>
+                          </p:cTn>
+                        </p:par>
+                      </p:childTnLst>
+                    </p:cTn>
+                  </p:par>
+                  <p:par>
+                    <p:cTn id="9" fill="hold">
+                      <p:stCondLst>
+                        <p:cond delay="indefinite"/>
+                      </p:stCondLst>
+                      <p:childTnLst>
+                        <p:par>
+                          <p:cTn id="10" fill="hold">
+                            <p:stCondLst>
+                              <p:cond delay="0"/>
+                            </p:stCondLst>
+                            <p:childTnLst>
                               <p:par>
-                                <p:cTn id="9" presetID="1" presetClass="entr" presetSubtype="0" fill="hold" nodeType="withEffect">
-                                  <p:stCondLst>
-                                    <p:cond delay="0"/>
-                                  </p:stCondLst>
-                                  <p:childTnLst>
-                                    <p:set>
-                                      <p:cBhvr>
-                                        <p:cTn id="10" dur="1" fill="hold">
-                                          <p:stCondLst>
-                                            <p:cond delay="0"/>
-                                          </p:stCondLst>
-                                        </p:cTn>
-                                        <p:tgtEl>
-                                          <p:spTgt spid="2">
-                                            <p:txEl>
-                                              <p:pRg st="8" end="8"/>
-                                            </p:txEl>
-                                          </p:spTgt>
-                                        </p:tgtEl>
-                                        <p:attrNameLst>
-                                          <p:attrName>style.visibility</p:attrName>
-                                        </p:attrNameLst>
-                                      </p:cBhvr>
-                                      <p:to>
-                                        <p:strVal val="visible"/>
-                                      </p:to>
-                                    </p:set>
-                                  </p:childTnLst>
-                                </p:cTn>
-                              </p:par>
-                              <p:par>
-                                <p:cTn id="11" presetID="1" presetClass="entr" presetSubtype="0" fill="hold" nodeType="withEffect">
+                                <p:cTn id="11" presetID="1" presetClass="entr" presetSubtype="0" fill="hold" nodeType="clickEffect">
                                   <p:stCondLst>
                                     <p:cond delay="0"/>
                                   </p:stCondLst>
@@ -5434,7 +6080,7 @@
                                         <p:tgtEl>
                                           <p:spTgt spid="2">
                                             <p:txEl>
-                                              <p:pRg st="9" end="9"/>
+                                              <p:pRg st="3" end="3"/>
                                             </p:txEl>
                                           </p:spTgt>
                                         </p:tgtEl>
@@ -5483,7 +6129,7 @@
                                         <p:tgtEl>
                                           <p:spTgt spid="2">
                                             <p:txEl>
-                                              <p:pRg st="10" end="10"/>
+                                              <p:pRg st="4" end="4"/>
                                             </p:txEl>
                                           </p:spTgt>
                                         </p:tgtEl>
@@ -5498,39 +6144,26 @@
                                   </p:childTnLst>
                                 </p:cTn>
                               </p:par>
+                            </p:childTnLst>
+                          </p:cTn>
+                        </p:par>
+                      </p:childTnLst>
+                    </p:cTn>
+                  </p:par>
+                  <p:par>
+                    <p:cTn id="17" fill="hold">
+                      <p:stCondLst>
+                        <p:cond delay="indefinite"/>
+                      </p:stCondLst>
+                      <p:childTnLst>
+                        <p:par>
+                          <p:cTn id="18" fill="hold">
+                            <p:stCondLst>
+                              <p:cond delay="0"/>
+                            </p:stCondLst>
+                            <p:childTnLst>
                               <p:par>
-                                <p:cTn id="17" presetID="1" presetClass="entr" presetSubtype="0" fill="hold" nodeType="withEffect">
-                                  <p:stCondLst>
-                                    <p:cond delay="0"/>
-                                  </p:stCondLst>
-                                  <p:childTnLst>
-                                    <p:set>
-                                      <p:cBhvr>
-                                        <p:cTn id="18" dur="1" fill="hold">
-                                          <p:stCondLst>
-                                            <p:cond delay="0"/>
-                                          </p:stCondLst>
-                                        </p:cTn>
-                                        <p:tgtEl>
-                                          <p:spTgt spid="2">
-                                            <p:txEl>
-                                              <p:pRg st="11" end="11"/>
-                                            </p:txEl>
-                                          </p:spTgt>
-                                        </p:tgtEl>
-                                        <p:attrNameLst>
-                                          <p:attrName>style.visibility</p:attrName>
-                                        </p:attrNameLst>
-                                      </p:cBhvr>
-                                      <p:to>
-                                        <p:strVal val="visible"/>
-                                      </p:to>
-                                    </p:set>
-                                  </p:childTnLst>
-                                </p:cTn>
-                              </p:par>
-                              <p:par>
-                                <p:cTn id="19" presetID="1" presetClass="entr" presetSubtype="0" fill="hold" nodeType="withEffect">
+                                <p:cTn id="19" presetID="1" presetClass="entr" presetSubtype="0" fill="hold" nodeType="clickEffect">
                                   <p:stCondLst>
                                     <p:cond delay="0"/>
                                   </p:stCondLst>
@@ -5545,7 +6178,7 @@
                                         <p:tgtEl>
                                           <p:spTgt spid="2">
                                             <p:txEl>
-                                              <p:pRg st="12" end="12"/>
+                                              <p:pRg st="5" end="5"/>
                                             </p:txEl>
                                           </p:spTgt>
                                         </p:tgtEl>
@@ -5594,7 +6227,7 @@
                                         <p:tgtEl>
                                           <p:spTgt spid="2">
                                             <p:txEl>
-                                              <p:pRg st="13" end="13"/>
+                                              <p:pRg st="6" end="6"/>
                                             </p:txEl>
                                           </p:spTgt>
                                         </p:tgtEl>
@@ -5625,6 +6258,331 @@
                                         <p:tgtEl>
                                           <p:spTgt spid="2">
                                             <p:txEl>
+                                              <p:pRg st="7" end="7"/>
+                                            </p:txEl>
+                                          </p:spTgt>
+                                        </p:tgtEl>
+                                        <p:attrNameLst>
+                                          <p:attrName>style.visibility</p:attrName>
+                                        </p:attrNameLst>
+                                      </p:cBhvr>
+                                      <p:to>
+                                        <p:strVal val="visible"/>
+                                      </p:to>
+                                    </p:set>
+                                  </p:childTnLst>
+                                </p:cTn>
+                              </p:par>
+                            </p:childTnLst>
+                          </p:cTn>
+                        </p:par>
+                      </p:childTnLst>
+                    </p:cTn>
+                  </p:par>
+                  <p:par>
+                    <p:cTn id="27" fill="hold">
+                      <p:stCondLst>
+                        <p:cond delay="indefinite"/>
+                      </p:stCondLst>
+                      <p:childTnLst>
+                        <p:par>
+                          <p:cTn id="28" fill="hold">
+                            <p:stCondLst>
+                              <p:cond delay="0"/>
+                            </p:stCondLst>
+                            <p:childTnLst>
+                              <p:par>
+                                <p:cTn id="29" presetID="1" presetClass="entr" presetSubtype="0" fill="hold" nodeType="clickEffect">
+                                  <p:stCondLst>
+                                    <p:cond delay="0"/>
+                                  </p:stCondLst>
+                                  <p:childTnLst>
+                                    <p:set>
+                                      <p:cBhvr>
+                                        <p:cTn id="30" dur="1" fill="hold">
+                                          <p:stCondLst>
+                                            <p:cond delay="0"/>
+                                          </p:stCondLst>
+                                        </p:cTn>
+                                        <p:tgtEl>
+                                          <p:spTgt spid="2">
+                                            <p:txEl>
+                                              <p:pRg st="8" end="8"/>
+                                            </p:txEl>
+                                          </p:spTgt>
+                                        </p:tgtEl>
+                                        <p:attrNameLst>
+                                          <p:attrName>style.visibility</p:attrName>
+                                        </p:attrNameLst>
+                                      </p:cBhvr>
+                                      <p:to>
+                                        <p:strVal val="visible"/>
+                                      </p:to>
+                                    </p:set>
+                                  </p:childTnLst>
+                                </p:cTn>
+                              </p:par>
+                            </p:childTnLst>
+                          </p:cTn>
+                        </p:par>
+                      </p:childTnLst>
+                    </p:cTn>
+                  </p:par>
+                  <p:par>
+                    <p:cTn id="31" fill="hold">
+                      <p:stCondLst>
+                        <p:cond delay="indefinite"/>
+                      </p:stCondLst>
+                      <p:childTnLst>
+                        <p:par>
+                          <p:cTn id="32" fill="hold">
+                            <p:stCondLst>
+                              <p:cond delay="0"/>
+                            </p:stCondLst>
+                            <p:childTnLst>
+                              <p:par>
+                                <p:cTn id="33" presetID="1" presetClass="entr" presetSubtype="0" fill="hold" nodeType="clickEffect">
+                                  <p:stCondLst>
+                                    <p:cond delay="0"/>
+                                  </p:stCondLst>
+                                  <p:childTnLst>
+                                    <p:set>
+                                      <p:cBhvr>
+                                        <p:cTn id="34" dur="1" fill="hold">
+                                          <p:stCondLst>
+                                            <p:cond delay="0"/>
+                                          </p:stCondLst>
+                                        </p:cTn>
+                                        <p:tgtEl>
+                                          <p:spTgt spid="2">
+                                            <p:txEl>
+                                              <p:pRg st="9" end="9"/>
+                                            </p:txEl>
+                                          </p:spTgt>
+                                        </p:tgtEl>
+                                        <p:attrNameLst>
+                                          <p:attrName>style.visibility</p:attrName>
+                                        </p:attrNameLst>
+                                      </p:cBhvr>
+                                      <p:to>
+                                        <p:strVal val="visible"/>
+                                      </p:to>
+                                    </p:set>
+                                  </p:childTnLst>
+                                </p:cTn>
+                              </p:par>
+                            </p:childTnLst>
+                          </p:cTn>
+                        </p:par>
+                      </p:childTnLst>
+                    </p:cTn>
+                  </p:par>
+                  <p:par>
+                    <p:cTn id="35" fill="hold">
+                      <p:stCondLst>
+                        <p:cond delay="indefinite"/>
+                      </p:stCondLst>
+                      <p:childTnLst>
+                        <p:par>
+                          <p:cTn id="36" fill="hold">
+                            <p:stCondLst>
+                              <p:cond delay="0"/>
+                            </p:stCondLst>
+                            <p:childTnLst>
+                              <p:par>
+                                <p:cTn id="37" presetID="1" presetClass="entr" presetSubtype="0" fill="hold" nodeType="clickEffect">
+                                  <p:stCondLst>
+                                    <p:cond delay="0"/>
+                                  </p:stCondLst>
+                                  <p:childTnLst>
+                                    <p:set>
+                                      <p:cBhvr>
+                                        <p:cTn id="38" dur="1" fill="hold">
+                                          <p:stCondLst>
+                                            <p:cond delay="0"/>
+                                          </p:stCondLst>
+                                        </p:cTn>
+                                        <p:tgtEl>
+                                          <p:spTgt spid="2">
+                                            <p:txEl>
+                                              <p:pRg st="10" end="10"/>
+                                            </p:txEl>
+                                          </p:spTgt>
+                                        </p:tgtEl>
+                                        <p:attrNameLst>
+                                          <p:attrName>style.visibility</p:attrName>
+                                        </p:attrNameLst>
+                                      </p:cBhvr>
+                                      <p:to>
+                                        <p:strVal val="visible"/>
+                                      </p:to>
+                                    </p:set>
+                                  </p:childTnLst>
+                                </p:cTn>
+                              </p:par>
+                            </p:childTnLst>
+                          </p:cTn>
+                        </p:par>
+                      </p:childTnLst>
+                    </p:cTn>
+                  </p:par>
+                  <p:par>
+                    <p:cTn id="39" fill="hold">
+                      <p:stCondLst>
+                        <p:cond delay="indefinite"/>
+                      </p:stCondLst>
+                      <p:childTnLst>
+                        <p:par>
+                          <p:cTn id="40" fill="hold">
+                            <p:stCondLst>
+                              <p:cond delay="0"/>
+                            </p:stCondLst>
+                            <p:childTnLst>
+                              <p:par>
+                                <p:cTn id="41" presetID="1" presetClass="entr" presetSubtype="0" fill="hold" nodeType="clickEffect">
+                                  <p:stCondLst>
+                                    <p:cond delay="0"/>
+                                  </p:stCondLst>
+                                  <p:childTnLst>
+                                    <p:set>
+                                      <p:cBhvr>
+                                        <p:cTn id="42" dur="1" fill="hold">
+                                          <p:stCondLst>
+                                            <p:cond delay="0"/>
+                                          </p:stCondLst>
+                                        </p:cTn>
+                                        <p:tgtEl>
+                                          <p:spTgt spid="2">
+                                            <p:txEl>
+                                              <p:pRg st="11" end="11"/>
+                                            </p:txEl>
+                                          </p:spTgt>
+                                        </p:tgtEl>
+                                        <p:attrNameLst>
+                                          <p:attrName>style.visibility</p:attrName>
+                                        </p:attrNameLst>
+                                      </p:cBhvr>
+                                      <p:to>
+                                        <p:strVal val="visible"/>
+                                      </p:to>
+                                    </p:set>
+                                  </p:childTnLst>
+                                </p:cTn>
+                              </p:par>
+                            </p:childTnLst>
+                          </p:cTn>
+                        </p:par>
+                      </p:childTnLst>
+                    </p:cTn>
+                  </p:par>
+                  <p:par>
+                    <p:cTn id="43" fill="hold">
+                      <p:stCondLst>
+                        <p:cond delay="indefinite"/>
+                      </p:stCondLst>
+                      <p:childTnLst>
+                        <p:par>
+                          <p:cTn id="44" fill="hold">
+                            <p:stCondLst>
+                              <p:cond delay="0"/>
+                            </p:stCondLst>
+                            <p:childTnLst>
+                              <p:par>
+                                <p:cTn id="45" presetID="1" presetClass="entr" presetSubtype="0" fill="hold" nodeType="clickEffect">
+                                  <p:stCondLst>
+                                    <p:cond delay="0"/>
+                                  </p:stCondLst>
+                                  <p:childTnLst>
+                                    <p:set>
+                                      <p:cBhvr>
+                                        <p:cTn id="46" dur="1" fill="hold">
+                                          <p:stCondLst>
+                                            <p:cond delay="0"/>
+                                          </p:stCondLst>
+                                        </p:cTn>
+                                        <p:tgtEl>
+                                          <p:spTgt spid="2">
+                                            <p:txEl>
+                                              <p:pRg st="12" end="12"/>
+                                            </p:txEl>
+                                          </p:spTgt>
+                                        </p:tgtEl>
+                                        <p:attrNameLst>
+                                          <p:attrName>style.visibility</p:attrName>
+                                        </p:attrNameLst>
+                                      </p:cBhvr>
+                                      <p:to>
+                                        <p:strVal val="visible"/>
+                                      </p:to>
+                                    </p:set>
+                                  </p:childTnLst>
+                                </p:cTn>
+                              </p:par>
+                              <p:par>
+                                <p:cTn id="47" presetID="1" presetClass="entr" presetSubtype="0" fill="hold" nodeType="withEffect">
+                                  <p:stCondLst>
+                                    <p:cond delay="0"/>
+                                  </p:stCondLst>
+                                  <p:childTnLst>
+                                    <p:set>
+                                      <p:cBhvr>
+                                        <p:cTn id="48" dur="1" fill="hold">
+                                          <p:stCondLst>
+                                            <p:cond delay="0"/>
+                                          </p:stCondLst>
+                                        </p:cTn>
+                                        <p:tgtEl>
+                                          <p:spTgt spid="2">
+                                            <p:txEl>
+                                              <p:pRg st="13" end="13"/>
+                                            </p:txEl>
+                                          </p:spTgt>
+                                        </p:tgtEl>
+                                        <p:attrNameLst>
+                                          <p:attrName>style.visibility</p:attrName>
+                                        </p:attrNameLst>
+                                      </p:cBhvr>
+                                      <p:to>
+                                        <p:strVal val="visible"/>
+                                      </p:to>
+                                    </p:set>
+                                  </p:childTnLst>
+                                </p:cTn>
+                              </p:par>
+                            </p:childTnLst>
+                          </p:cTn>
+                        </p:par>
+                      </p:childTnLst>
+                    </p:cTn>
+                  </p:par>
+                  <p:par>
+                    <p:cTn id="49" fill="hold">
+                      <p:stCondLst>
+                        <p:cond delay="indefinite"/>
+                      </p:stCondLst>
+                      <p:childTnLst>
+                        <p:par>
+                          <p:cTn id="50" fill="hold">
+                            <p:stCondLst>
+                              <p:cond delay="0"/>
+                            </p:stCondLst>
+                            <p:childTnLst>
+                              <p:par>
+                                <p:cTn id="51" presetID="1" presetClass="entr" presetSubtype="0" fill="hold" nodeType="clickEffect">
+                                  <p:stCondLst>
+                                    <p:cond delay="0"/>
+                                  </p:stCondLst>
+                                  <p:childTnLst>
+                                    <p:set>
+                                      <p:cBhvr>
+                                        <p:cTn id="52" dur="1" fill="hold">
+                                          <p:stCondLst>
+                                            <p:cond delay="0"/>
+                                          </p:stCondLst>
+                                        </p:cTn>
+                                        <p:tgtEl>
+                                          <p:spTgt spid="2">
+                                            <p:txEl>
                                               <p:pRg st="14" end="14"/>
                                             </p:txEl>
                                           </p:spTgt>
@@ -5640,15 +6598,33 @@
                                   </p:childTnLst>
                                 </p:cTn>
                               </p:par>
+                            </p:childTnLst>
+                          </p:cTn>
+                        </p:par>
+                      </p:childTnLst>
+                    </p:cTn>
+                  </p:par>
+                  <p:par>
+                    <p:cTn id="53" fill="hold">
+                      <p:stCondLst>
+                        <p:cond delay="indefinite"/>
+                      </p:stCondLst>
+                      <p:childTnLst>
+                        <p:par>
+                          <p:cTn id="54" fill="hold">
+                            <p:stCondLst>
+                              <p:cond delay="0"/>
+                            </p:stCondLst>
+                            <p:childTnLst>
                               <p:par>
-                                <p:cTn id="27" presetID="1" presetClass="entr" presetSubtype="0" fill="hold" nodeType="withEffect">
+                                <p:cTn id="55" presetID="1" presetClass="entr" presetSubtype="0" fill="hold" nodeType="clickEffect">
                                   <p:stCondLst>
                                     <p:cond delay="0"/>
                                   </p:stCondLst>
                                   <p:childTnLst>
                                     <p:set>
                                       <p:cBhvr>
-                                        <p:cTn id="28" dur="1" fill="hold">
+                                        <p:cTn id="56" dur="1" fill="hold">
                                           <p:stCondLst>
                                             <p:cond delay="0"/>
                                           </p:stCondLst>
@@ -5657,37 +6633,6 @@
                                           <p:spTgt spid="2">
                                             <p:txEl>
                                               <p:pRg st="15" end="15"/>
-                                            </p:txEl>
-                                          </p:spTgt>
-                                        </p:tgtEl>
-                                        <p:attrNameLst>
-                                          <p:attrName>style.visibility</p:attrName>
-                                        </p:attrNameLst>
-                                      </p:cBhvr>
-                                      <p:to>
-                                        <p:strVal val="visible"/>
-                                      </p:to>
-                                    </p:set>
-                                  </p:childTnLst>
-                                </p:cTn>
-                              </p:par>
-                              <p:par>
-                                <p:cTn id="29" presetID="1" presetClass="entr" presetSubtype="0" fill="hold" nodeType="withEffect">
-                                  <p:stCondLst>
-                                    <p:cond delay="0"/>
-                                  </p:stCondLst>
-                                  <p:childTnLst>
-                                    <p:set>
-                                      <p:cBhvr>
-                                        <p:cTn id="30" dur="1" fill="hold">
-                                          <p:stCondLst>
-                                            <p:cond delay="0"/>
-                                          </p:stCondLst>
-                                        </p:cTn>
-                                        <p:tgtEl>
-                                          <p:spTgt spid="2">
-                                            <p:txEl>
-                                              <p:pRg st="16" end="16"/>
                                             </p:txEl>
                                           </p:spTgt>
                                         </p:tgtEl>
@@ -5741,6 +6686,763 @@
         <p:cNvPr id="1" name="">
           <a:extLst>
             <a:ext uri="{FF2B5EF4-FFF2-40B4-BE49-F238E27FC236}">
+              <a16:creationId xmlns:a16="http://schemas.microsoft.com/office/drawing/2014/main" id="{166DAF58-959A-49C5-E6FC-57E1D8A69362}"/>
+            </a:ext>
+          </a:extLst>
+        </p:cNvPr>
+        <p:cNvGrpSpPr/>
+        <p:nvPr/>
+      </p:nvGrpSpPr>
+      <p:grpSpPr>
+        <a:xfrm>
+          <a:off x="0" y="0"/>
+          <a:ext cx="0" cy="0"/>
+          <a:chOff x="0" y="0"/>
+          <a:chExt cx="0" cy="0"/>
+        </a:xfrm>
+      </p:grpSpPr>
+      <p:sp>
+        <p:nvSpPr>
+          <p:cNvPr id="2" name="TextBox 1">
+            <a:extLst>
+              <a:ext uri="{FF2B5EF4-FFF2-40B4-BE49-F238E27FC236}">
+                <a16:creationId xmlns:a16="http://schemas.microsoft.com/office/drawing/2014/main" id="{5E0F4E41-0A25-B1DA-BC47-2283EE43DF45}"/>
+              </a:ext>
+            </a:extLst>
+          </p:cNvPr>
+          <p:cNvSpPr txBox="1"/>
+          <p:nvPr/>
+        </p:nvSpPr>
+        <p:spPr>
+          <a:xfrm>
+            <a:off x="795528" y="210312"/>
+            <a:ext cx="7772400" cy="4985980"/>
+          </a:xfrm>
+          <a:prstGeom prst="rect">
+            <a:avLst/>
+          </a:prstGeom>
+          <a:noFill/>
+        </p:spPr>
+        <p:txBody>
+          <a:bodyPr wrap="square">
+            <a:spAutoFit/>
+          </a:bodyPr>
+          <a:lstStyle/>
+          <a:p>
+            <a:pPr>
+              <a:defRPr sz="2400" b="1">
+                <a:solidFill>
+                  <a:srgbClr val="1E3246"/>
+                </a:solidFill>
+              </a:defRPr>
+            </a:pPr>
+            <a:r>
+              <a:rPr lang="de-DE" sz="2400" b="1" dirty="0">
+                <a:solidFill>
+                  <a:srgbClr val="1E3246"/>
+                </a:solidFill>
+              </a:rPr>
+              <a:t>How </a:t>
+            </a:r>
+            <a:r>
+              <a:rPr lang="de-DE" sz="2400" b="1" dirty="0" err="1">
+                <a:solidFill>
+                  <a:srgbClr val="1E3246"/>
+                </a:solidFill>
+              </a:rPr>
+              <a:t>to</a:t>
+            </a:r>
+            <a:r>
+              <a:rPr lang="de-DE" sz="2400" b="1" dirty="0">
+                <a:solidFill>
+                  <a:srgbClr val="1E3246"/>
+                </a:solidFill>
+              </a:rPr>
+              <a:t> </a:t>
+            </a:r>
+            <a:r>
+              <a:rPr lang="de-DE" sz="2400" b="1" dirty="0" err="1">
+                <a:solidFill>
+                  <a:srgbClr val="1E3246"/>
+                </a:solidFill>
+              </a:rPr>
+              <a:t>install</a:t>
+            </a:r>
+            <a:r>
+              <a:rPr lang="de-DE" sz="2400" b="1" dirty="0">
+                <a:solidFill>
+                  <a:srgbClr val="1E3246"/>
+                </a:solidFill>
+              </a:rPr>
+              <a:t> Table Analyzer (1)</a:t>
+            </a:r>
+          </a:p>
+          <a:p>
+            <a:endParaRPr lang="en-US" b="1" dirty="0"/>
+          </a:p>
+          <a:p>
+            <a:pPr marL="342900" indent="-342900">
+              <a:buAutoNum type="arabicPeriod"/>
+            </a:pPr>
+            <a:r>
+              <a:rPr lang="en-US" sz="2000" b="1" dirty="0"/>
+              <a:t>Install R </a:t>
+            </a:r>
+          </a:p>
+          <a:p>
+            <a:pPr marL="285750" indent="-285750">
+              <a:buFont typeface="Arial" panose="020B0604020202020204" pitchFamily="34" charset="0"/>
+              <a:buChar char="•"/>
+            </a:pPr>
+            <a:r>
+              <a:rPr lang="en-US" sz="2000" dirty="0"/>
+              <a:t>Go to: </a:t>
+            </a:r>
+            <a:r>
+              <a:rPr lang="en-US" sz="2000" b="1" dirty="0"/>
+              <a:t>https://</a:t>
+            </a:r>
+            <a:r>
+              <a:rPr lang="en-US" sz="2000" b="1" dirty="0" err="1"/>
+              <a:t>cran.r-project.org</a:t>
+            </a:r>
+            <a:endParaRPr lang="en-US" sz="2000" dirty="0"/>
+          </a:p>
+          <a:p>
+            <a:pPr marL="285750" indent="-285750">
+              <a:buFont typeface="Arial" panose="020B0604020202020204" pitchFamily="34" charset="0"/>
+              <a:buChar char="•"/>
+            </a:pPr>
+            <a:r>
+              <a:rPr lang="en-US" sz="2000" dirty="0"/>
+              <a:t>Click your operating system (Windows / macOS / Linux)</a:t>
+            </a:r>
+          </a:p>
+          <a:p>
+            <a:pPr marL="285750" indent="-285750">
+              <a:buFont typeface="Arial" panose="020B0604020202020204" pitchFamily="34" charset="0"/>
+              <a:buChar char="•"/>
+            </a:pPr>
+            <a:r>
+              <a:rPr lang="en-US" sz="2000" dirty="0"/>
+              <a:t>Download and install </a:t>
+            </a:r>
+            <a:r>
+              <a:rPr lang="en-US" sz="2000" b="1" dirty="0"/>
+              <a:t>R</a:t>
+            </a:r>
+            <a:r>
+              <a:rPr lang="en-US" sz="2000" dirty="0"/>
+              <a:t> with the default settings</a:t>
+            </a:r>
+          </a:p>
+          <a:p>
+            <a:endParaRPr lang="en-US" sz="2000" b="1" dirty="0"/>
+          </a:p>
+          <a:p>
+            <a:r>
+              <a:rPr lang="en-US" sz="2000" b="1" dirty="0"/>
+              <a:t>2. Install RStudio (the user-friendly interface)</a:t>
+            </a:r>
+          </a:p>
+          <a:p>
+            <a:pPr marL="285750" indent="-285750">
+              <a:buFont typeface="Arial" panose="020B0604020202020204" pitchFamily="34" charset="0"/>
+              <a:buChar char="•"/>
+            </a:pPr>
+            <a:r>
+              <a:rPr lang="en-US" sz="2000" dirty="0"/>
+              <a:t>Go to: </a:t>
+            </a:r>
+            <a:r>
+              <a:rPr lang="en-US" sz="2000" b="1" dirty="0">
+                <a:hlinkClick r:id="rId2"/>
+              </a:rPr>
+              <a:t>https://posit.co/download/rstudio-desktop</a:t>
+            </a:r>
+            <a:endParaRPr lang="en-US" sz="2000" dirty="0"/>
+          </a:p>
+          <a:p>
+            <a:pPr marL="285750" indent="-285750">
+              <a:buFont typeface="Arial" panose="020B0604020202020204" pitchFamily="34" charset="0"/>
+              <a:buChar char="•"/>
+            </a:pPr>
+            <a:r>
+              <a:rPr lang="en-US" sz="2000" dirty="0"/>
+              <a:t>Download </a:t>
+            </a:r>
+            <a:r>
+              <a:rPr lang="en-US" sz="2000" b="1" dirty="0"/>
+              <a:t>RStudio Desktop (free version)</a:t>
+            </a:r>
+            <a:endParaRPr lang="en-US" sz="2000" dirty="0"/>
+          </a:p>
+          <a:p>
+            <a:pPr marL="285750" indent="-285750">
+              <a:buFont typeface="Arial" panose="020B0604020202020204" pitchFamily="34" charset="0"/>
+              <a:buChar char="•"/>
+            </a:pPr>
+            <a:r>
+              <a:rPr lang="en-US" sz="2000" dirty="0"/>
+              <a:t>Install it with the default options</a:t>
+            </a:r>
+          </a:p>
+          <a:p>
+            <a:endParaRPr lang="en-US" sz="2000" b="1" dirty="0"/>
+          </a:p>
+          <a:p>
+            <a:r>
+              <a:rPr lang="en-US" sz="2000" b="1" dirty="0"/>
+              <a:t>3. Download the app from </a:t>
+            </a:r>
+            <a:r>
+              <a:rPr lang="en-US" sz="2000" b="1" dirty="0">
+                <a:hlinkClick r:id="rId3"/>
+              </a:rPr>
+              <a:t>https://github.com/nicola-palmieri/TableAnalyzer</a:t>
+            </a:r>
+            <a:r>
+              <a:rPr lang="en-US" sz="2000" b="1" dirty="0"/>
+              <a:t> and extract the ZIP file</a:t>
+            </a:r>
+          </a:p>
+          <a:p>
+            <a:endParaRPr lang="en-US" b="1" dirty="0"/>
+          </a:p>
+          <a:p>
+            <a:endParaRPr lang="de-DE" dirty="0"/>
+          </a:p>
+        </p:txBody>
+      </p:sp>
+    </p:spTree>
+    <p:extLst>
+      <p:ext uri="{BB962C8B-B14F-4D97-AF65-F5344CB8AC3E}">
+        <p14:creationId xmlns:p14="http://schemas.microsoft.com/office/powerpoint/2010/main" val="2423903674"/>
+      </p:ext>
+    </p:extLst>
+  </p:cSld>
+  <p:clrMapOvr>
+    <a:masterClrMapping/>
+  </p:clrMapOvr>
+</p:sld>
+</file>
+
+<file path=ppt/slides/slide5.xml><?xml version="1.0" encoding="utf-8"?>
+<p:sld xmlns:a="http://schemas.openxmlformats.org/drawingml/2006/main" xmlns:r="http://schemas.openxmlformats.org/officeDocument/2006/relationships" xmlns:p="http://schemas.openxmlformats.org/presentationml/2006/main">
+  <p:cSld>
+    <p:spTree>
+      <p:nvGrpSpPr>
+        <p:cNvPr id="1" name="">
+          <a:extLst>
+            <a:ext uri="{FF2B5EF4-FFF2-40B4-BE49-F238E27FC236}">
+              <a16:creationId xmlns:a16="http://schemas.microsoft.com/office/drawing/2014/main" id="{C3453BA1-B689-5A60-8362-AAF051E6ECF7}"/>
+            </a:ext>
+          </a:extLst>
+        </p:cNvPr>
+        <p:cNvGrpSpPr/>
+        <p:nvPr/>
+      </p:nvGrpSpPr>
+      <p:grpSpPr>
+        <a:xfrm>
+          <a:off x="0" y="0"/>
+          <a:ext cx="0" cy="0"/>
+          <a:chOff x="0" y="0"/>
+          <a:chExt cx="0" cy="0"/>
+        </a:xfrm>
+      </p:grpSpPr>
+      <p:sp>
+        <p:nvSpPr>
+          <p:cNvPr id="2" name="TextBox 1">
+            <a:extLst>
+              <a:ext uri="{FF2B5EF4-FFF2-40B4-BE49-F238E27FC236}">
+                <a16:creationId xmlns:a16="http://schemas.microsoft.com/office/drawing/2014/main" id="{F72D040A-12EB-0E66-DC04-67189E074619}"/>
+              </a:ext>
+            </a:extLst>
+          </p:cNvPr>
+          <p:cNvSpPr txBox="1"/>
+          <p:nvPr/>
+        </p:nvSpPr>
+        <p:spPr>
+          <a:xfrm>
+            <a:off x="795528" y="210312"/>
+            <a:ext cx="7772400" cy="2277547"/>
+          </a:xfrm>
+          <a:prstGeom prst="rect">
+            <a:avLst/>
+          </a:prstGeom>
+          <a:noFill/>
+        </p:spPr>
+        <p:txBody>
+          <a:bodyPr wrap="square">
+            <a:spAutoFit/>
+          </a:bodyPr>
+          <a:lstStyle/>
+          <a:p>
+            <a:pPr>
+              <a:defRPr sz="2400" b="1">
+                <a:solidFill>
+                  <a:srgbClr val="1E3246"/>
+                </a:solidFill>
+              </a:defRPr>
+            </a:pPr>
+            <a:r>
+              <a:rPr lang="de-DE" sz="2400" b="1" dirty="0">
+                <a:solidFill>
+                  <a:srgbClr val="1E3246"/>
+                </a:solidFill>
+              </a:rPr>
+              <a:t>How </a:t>
+            </a:r>
+            <a:r>
+              <a:rPr lang="de-DE" sz="2400" b="1" dirty="0" err="1">
+                <a:solidFill>
+                  <a:srgbClr val="1E3246"/>
+                </a:solidFill>
+              </a:rPr>
+              <a:t>to</a:t>
+            </a:r>
+            <a:r>
+              <a:rPr lang="de-DE" sz="2400" b="1" dirty="0">
+                <a:solidFill>
+                  <a:srgbClr val="1E3246"/>
+                </a:solidFill>
+              </a:rPr>
+              <a:t> </a:t>
+            </a:r>
+            <a:r>
+              <a:rPr lang="de-DE" sz="2400" b="1" dirty="0" err="1">
+                <a:solidFill>
+                  <a:srgbClr val="1E3246"/>
+                </a:solidFill>
+              </a:rPr>
+              <a:t>install</a:t>
+            </a:r>
+            <a:r>
+              <a:rPr lang="de-DE" sz="2400" b="1" dirty="0">
+                <a:solidFill>
+                  <a:srgbClr val="1E3246"/>
+                </a:solidFill>
+              </a:rPr>
+              <a:t> Table Analyzer (2)</a:t>
+            </a:r>
+          </a:p>
+          <a:p>
+            <a:endParaRPr lang="en-US" b="1" dirty="0"/>
+          </a:p>
+          <a:p>
+            <a:r>
+              <a:rPr lang="en-US" sz="2000" b="1" dirty="0"/>
+              <a:t>4. Open </a:t>
+            </a:r>
+            <a:r>
+              <a:rPr lang="en-US" sz="2000" b="1" dirty="0" err="1"/>
+              <a:t>Rstudio</a:t>
+            </a:r>
+            <a:endParaRPr lang="en-US" sz="2000" b="1" dirty="0"/>
+          </a:p>
+          <a:p>
+            <a:pPr marL="285750" indent="-285750">
+              <a:buFont typeface="Arial" panose="020B0604020202020204" pitchFamily="34" charset="0"/>
+              <a:buChar char="•"/>
+            </a:pPr>
+            <a:r>
+              <a:rPr lang="en-US" sz="2000" dirty="0"/>
+              <a:t>Go to File </a:t>
+            </a:r>
+            <a:r>
+              <a:rPr lang="en-US" sz="2000" dirty="0">
+                <a:sym typeface="Wingdings" pitchFamily="2" charset="2"/>
+              </a:rPr>
+              <a:t> New project  Existing directory</a:t>
+            </a:r>
+          </a:p>
+          <a:p>
+            <a:pPr marL="285750" indent="-285750">
+              <a:buFont typeface="Arial" panose="020B0604020202020204" pitchFamily="34" charset="0"/>
+              <a:buChar char="•"/>
+            </a:pPr>
+            <a:r>
+              <a:rPr lang="en-US" sz="2000" dirty="0">
+                <a:sym typeface="Wingdings" pitchFamily="2" charset="2"/>
+              </a:rPr>
+              <a:t>Set the app folder in the path</a:t>
+            </a:r>
+          </a:p>
+          <a:p>
+            <a:pPr marL="285750" indent="-285750">
+              <a:buFont typeface="Arial" panose="020B0604020202020204" pitchFamily="34" charset="0"/>
+              <a:buChar char="•"/>
+            </a:pPr>
+            <a:r>
+              <a:rPr lang="en-US" sz="2000" dirty="0">
+                <a:sym typeface="Wingdings" pitchFamily="2" charset="2"/>
+              </a:rPr>
+              <a:t>Install the app typing the following command in the console</a:t>
+            </a:r>
+            <a:endParaRPr lang="en-US" sz="2000" dirty="0"/>
+          </a:p>
+          <a:p>
+            <a:pPr marL="742950" lvl="1" indent="-285750">
+              <a:buFont typeface="Arial" panose="020B0604020202020204" pitchFamily="34" charset="0"/>
+              <a:buChar char="•"/>
+              <a:defRPr sz="1800">
+                <a:solidFill>
+                  <a:srgbClr val="3C3C3C"/>
+                </a:solidFill>
+              </a:defRPr>
+            </a:pPr>
+            <a:endParaRPr lang="de-DE" sz="2000" dirty="0"/>
+          </a:p>
+        </p:txBody>
+      </p:sp>
+      <p:sp>
+        <p:nvSpPr>
+          <p:cNvPr id="4" name="TextBox 3">
+            <a:extLst>
+              <a:ext uri="{FF2B5EF4-FFF2-40B4-BE49-F238E27FC236}">
+                <a16:creationId xmlns:a16="http://schemas.microsoft.com/office/drawing/2014/main" id="{FA59EF92-E821-8EE0-B2AE-668B3448C902}"/>
+              </a:ext>
+            </a:extLst>
+          </p:cNvPr>
+          <p:cNvSpPr txBox="1"/>
+          <p:nvPr/>
+        </p:nvSpPr>
+        <p:spPr>
+          <a:xfrm>
+            <a:off x="795528" y="2218356"/>
+            <a:ext cx="8544908" cy="1323439"/>
+          </a:xfrm>
+          <a:prstGeom prst="rect">
+            <a:avLst/>
+          </a:prstGeom>
+          <a:noFill/>
+        </p:spPr>
+        <p:txBody>
+          <a:bodyPr wrap="square">
+            <a:spAutoFit/>
+          </a:bodyPr>
+          <a:lstStyle/>
+          <a:p>
+            <a:r>
+              <a:rPr lang="en-US" sz="1600" dirty="0" err="1">
+                <a:latin typeface="Fira Mono" panose="020B0509050000020004" pitchFamily="49" charset="0"/>
+                <a:ea typeface="Fira Mono" panose="020B0509050000020004" pitchFamily="49" charset="0"/>
+              </a:rPr>
+              <a:t>install.packages</a:t>
+            </a:r>
+            <a:r>
+              <a:rPr lang="en-US" sz="1600" dirty="0">
+                <a:latin typeface="Fira Mono" panose="020B0509050000020004" pitchFamily="49" charset="0"/>
+                <a:ea typeface="Fira Mono" panose="020B0509050000020004" pitchFamily="49" charset="0"/>
+              </a:rPr>
+              <a:t>(c(</a:t>
+            </a:r>
+          </a:p>
+          <a:p>
+            <a:r>
+              <a:rPr lang="en-US" sz="1600" dirty="0">
+                <a:latin typeface="Fira Mono" panose="020B0509050000020004" pitchFamily="49" charset="0"/>
+                <a:ea typeface="Fira Mono" panose="020B0509050000020004" pitchFamily="49" charset="0"/>
+              </a:rPr>
+              <a:t>  "</a:t>
+            </a:r>
+            <a:r>
+              <a:rPr lang="en-US" sz="1600" dirty="0" err="1">
+                <a:latin typeface="Fira Mono" panose="020B0509050000020004" pitchFamily="49" charset="0"/>
+                <a:ea typeface="Fira Mono" panose="020B0509050000020004" pitchFamily="49" charset="0"/>
+              </a:rPr>
+              <a:t>bslib</a:t>
+            </a:r>
+            <a:r>
+              <a:rPr lang="en-US" sz="1600" dirty="0">
+                <a:latin typeface="Fira Mono" panose="020B0509050000020004" pitchFamily="49" charset="0"/>
+                <a:ea typeface="Fira Mono" panose="020B0509050000020004" pitchFamily="49" charset="0"/>
+              </a:rPr>
+              <a:t>", "</a:t>
+            </a:r>
+            <a:r>
+              <a:rPr lang="en-US" sz="1600" dirty="0" err="1">
+                <a:latin typeface="Fira Mono" panose="020B0509050000020004" pitchFamily="49" charset="0"/>
+                <a:ea typeface="Fira Mono" panose="020B0509050000020004" pitchFamily="49" charset="0"/>
+              </a:rPr>
+              <a:t>dplyr</a:t>
+            </a:r>
+            <a:r>
+              <a:rPr lang="en-US" sz="1600" dirty="0">
+                <a:latin typeface="Fira Mono" panose="020B0509050000020004" pitchFamily="49" charset="0"/>
+                <a:ea typeface="Fira Mono" panose="020B0509050000020004" pitchFamily="49" charset="0"/>
+              </a:rPr>
+              <a:t>", "DT", "</a:t>
+            </a:r>
+            <a:r>
+              <a:rPr lang="en-US" sz="1600" dirty="0" err="1">
+                <a:latin typeface="Fira Mono" panose="020B0509050000020004" pitchFamily="49" charset="0"/>
+                <a:ea typeface="Fira Mono" panose="020B0509050000020004" pitchFamily="49" charset="0"/>
+              </a:rPr>
+              <a:t>emmeans</a:t>
+            </a:r>
+            <a:r>
+              <a:rPr lang="en-US" sz="1600" dirty="0">
+                <a:latin typeface="Fira Mono" panose="020B0509050000020004" pitchFamily="49" charset="0"/>
+                <a:ea typeface="Fira Mono" panose="020B0509050000020004" pitchFamily="49" charset="0"/>
+              </a:rPr>
+              <a:t>", "</a:t>
+            </a:r>
+            <a:r>
+              <a:rPr lang="en-US" sz="1600" dirty="0" err="1">
+                <a:latin typeface="Fira Mono" panose="020B0509050000020004" pitchFamily="49" charset="0"/>
+                <a:ea typeface="Fira Mono" panose="020B0509050000020004" pitchFamily="49" charset="0"/>
+              </a:rPr>
+              <a:t>fitdistrplus</a:t>
+            </a:r>
+            <a:r>
+              <a:rPr lang="en-US" sz="1600" dirty="0">
+                <a:latin typeface="Fira Mono" panose="020B0509050000020004" pitchFamily="49" charset="0"/>
+                <a:ea typeface="Fira Mono" panose="020B0509050000020004" pitchFamily="49" charset="0"/>
+              </a:rPr>
+              <a:t>", "</a:t>
+            </a:r>
+            <a:r>
+              <a:rPr lang="en-US" sz="1600" dirty="0" err="1">
+                <a:latin typeface="Fira Mono" panose="020B0509050000020004" pitchFamily="49" charset="0"/>
+                <a:ea typeface="Fira Mono" panose="020B0509050000020004" pitchFamily="49" charset="0"/>
+              </a:rPr>
+              <a:t>flextable</a:t>
+            </a:r>
+            <a:r>
+              <a:rPr lang="en-US" sz="1600" dirty="0">
+                <a:latin typeface="Fira Mono" panose="020B0509050000020004" pitchFamily="49" charset="0"/>
+                <a:ea typeface="Fira Mono" panose="020B0509050000020004" pitchFamily="49" charset="0"/>
+              </a:rPr>
+              <a:t>",</a:t>
+            </a:r>
+          </a:p>
+          <a:p>
+            <a:r>
+              <a:rPr lang="en-US" sz="1600" dirty="0">
+                <a:latin typeface="Fira Mono" panose="020B0509050000020004" pitchFamily="49" charset="0"/>
+                <a:ea typeface="Fira Mono" panose="020B0509050000020004" pitchFamily="49" charset="0"/>
+              </a:rPr>
+              <a:t>  "</a:t>
+            </a:r>
+            <a:r>
+              <a:rPr lang="en-US" sz="1600" dirty="0" err="1">
+                <a:latin typeface="Fira Mono" panose="020B0509050000020004" pitchFamily="49" charset="0"/>
+                <a:ea typeface="Fira Mono" panose="020B0509050000020004" pitchFamily="49" charset="0"/>
+              </a:rPr>
+              <a:t>GGally</a:t>
+            </a:r>
+            <a:r>
+              <a:rPr lang="en-US" sz="1600" dirty="0">
+                <a:latin typeface="Fira Mono" panose="020B0509050000020004" pitchFamily="49" charset="0"/>
+                <a:ea typeface="Fira Mono" panose="020B0509050000020004" pitchFamily="49" charset="0"/>
+              </a:rPr>
+              <a:t>", "ggplot2", "</a:t>
+            </a:r>
+            <a:r>
+              <a:rPr lang="en-US" sz="1600" dirty="0" err="1">
+                <a:latin typeface="Fira Mono" panose="020B0509050000020004" pitchFamily="49" charset="0"/>
+                <a:ea typeface="Fira Mono" panose="020B0509050000020004" pitchFamily="49" charset="0"/>
+              </a:rPr>
+              <a:t>lmerTest</a:t>
+            </a:r>
+            <a:r>
+              <a:rPr lang="en-US" sz="1600" dirty="0">
+                <a:latin typeface="Fira Mono" panose="020B0509050000020004" pitchFamily="49" charset="0"/>
+                <a:ea typeface="Fira Mono" panose="020B0509050000020004" pitchFamily="49" charset="0"/>
+              </a:rPr>
+              <a:t>", "officer", "patchwork",</a:t>
+            </a:r>
+          </a:p>
+          <a:p>
+            <a:r>
+              <a:rPr lang="en-US" sz="1600" dirty="0">
+                <a:latin typeface="Fira Mono" panose="020B0509050000020004" pitchFamily="49" charset="0"/>
+                <a:ea typeface="Fira Mono" panose="020B0509050000020004" pitchFamily="49" charset="0"/>
+              </a:rPr>
+              <a:t>  "</a:t>
+            </a:r>
+            <a:r>
+              <a:rPr lang="en-US" sz="1600" dirty="0" err="1">
+                <a:latin typeface="Fira Mono" panose="020B0509050000020004" pitchFamily="49" charset="0"/>
+                <a:ea typeface="Fira Mono" panose="020B0509050000020004" pitchFamily="49" charset="0"/>
+              </a:rPr>
+              <a:t>readxl</a:t>
+            </a:r>
+            <a:r>
+              <a:rPr lang="en-US" sz="1600" dirty="0">
+                <a:latin typeface="Fira Mono" panose="020B0509050000020004" pitchFamily="49" charset="0"/>
+                <a:ea typeface="Fira Mono" panose="020B0509050000020004" pitchFamily="49" charset="0"/>
+              </a:rPr>
+              <a:t>", "shiny", "</a:t>
+            </a:r>
+            <a:r>
+              <a:rPr lang="en-US" sz="1600" dirty="0" err="1">
+                <a:latin typeface="Fira Mono" panose="020B0509050000020004" pitchFamily="49" charset="0"/>
+                <a:ea typeface="Fira Mono" panose="020B0509050000020004" pitchFamily="49" charset="0"/>
+              </a:rPr>
+              <a:t>skimr</a:t>
+            </a:r>
+            <a:r>
+              <a:rPr lang="en-US" sz="1600" dirty="0">
+                <a:latin typeface="Fira Mono" panose="020B0509050000020004" pitchFamily="49" charset="0"/>
+                <a:ea typeface="Fira Mono" panose="020B0509050000020004" pitchFamily="49" charset="0"/>
+              </a:rPr>
+              <a:t>", "</a:t>
+            </a:r>
+            <a:r>
+              <a:rPr lang="en-US" sz="1600" dirty="0" err="1">
+                <a:latin typeface="Fira Mono" panose="020B0509050000020004" pitchFamily="49" charset="0"/>
+                <a:ea typeface="Fira Mono" panose="020B0509050000020004" pitchFamily="49" charset="0"/>
+              </a:rPr>
+              <a:t>tidyr</a:t>
+            </a:r>
+            <a:r>
+              <a:rPr lang="en-US" sz="1600" dirty="0">
+                <a:latin typeface="Fira Mono" panose="020B0509050000020004" pitchFamily="49" charset="0"/>
+                <a:ea typeface="Fira Mono" panose="020B0509050000020004" pitchFamily="49" charset="0"/>
+              </a:rPr>
+              <a:t>", "zoo"</a:t>
+            </a:r>
+          </a:p>
+          <a:p>
+            <a:r>
+              <a:rPr lang="en-US" sz="1600" dirty="0">
+                <a:latin typeface="Fira Mono" panose="020B0509050000020004" pitchFamily="49" charset="0"/>
+                <a:ea typeface="Fira Mono" panose="020B0509050000020004" pitchFamily="49" charset="0"/>
+              </a:rPr>
+              <a:t>))</a:t>
+            </a:r>
+          </a:p>
+        </p:txBody>
+      </p:sp>
+      <p:sp>
+        <p:nvSpPr>
+          <p:cNvPr id="3" name="TextBox 2">
+            <a:extLst>
+              <a:ext uri="{FF2B5EF4-FFF2-40B4-BE49-F238E27FC236}">
+                <a16:creationId xmlns:a16="http://schemas.microsoft.com/office/drawing/2014/main" id="{BE14B250-D01B-DFF1-A709-B695B282EF0F}"/>
+              </a:ext>
+            </a:extLst>
+          </p:cNvPr>
+          <p:cNvSpPr txBox="1"/>
+          <p:nvPr/>
+        </p:nvSpPr>
+        <p:spPr>
+          <a:xfrm>
+            <a:off x="795528" y="3673470"/>
+            <a:ext cx="7772400" cy="677108"/>
+          </a:xfrm>
+          <a:prstGeom prst="rect">
+            <a:avLst/>
+          </a:prstGeom>
+          <a:noFill/>
+        </p:spPr>
+        <p:txBody>
+          <a:bodyPr wrap="square">
+            <a:spAutoFit/>
+          </a:bodyPr>
+          <a:lstStyle/>
+          <a:p>
+            <a:pPr marL="285750" indent="-285750">
+              <a:buFont typeface="Arial" panose="020B0604020202020204" pitchFamily="34" charset="0"/>
+              <a:buChar char="•"/>
+            </a:pPr>
+            <a:r>
+              <a:rPr lang="en-US" sz="2000" dirty="0">
+                <a:sym typeface="Wingdings" pitchFamily="2" charset="2"/>
+              </a:rPr>
+              <a:t>Run the app with the command</a:t>
+            </a:r>
+            <a:endParaRPr lang="en-US" sz="2000" dirty="0"/>
+          </a:p>
+          <a:p>
+            <a:pPr marL="742950" lvl="1" indent="-285750">
+              <a:buFont typeface="Arial" panose="020B0604020202020204" pitchFamily="34" charset="0"/>
+              <a:buChar char="•"/>
+              <a:defRPr sz="1800">
+                <a:solidFill>
+                  <a:srgbClr val="3C3C3C"/>
+                </a:solidFill>
+              </a:defRPr>
+            </a:pPr>
+            <a:endParaRPr lang="de-DE" dirty="0"/>
+          </a:p>
+        </p:txBody>
+      </p:sp>
+      <p:sp>
+        <p:nvSpPr>
+          <p:cNvPr id="5" name="TextBox 4">
+            <a:extLst>
+              <a:ext uri="{FF2B5EF4-FFF2-40B4-BE49-F238E27FC236}">
+                <a16:creationId xmlns:a16="http://schemas.microsoft.com/office/drawing/2014/main" id="{1B3E4D73-8C9B-3CEF-B3C3-70AFECF0104A}"/>
+              </a:ext>
+            </a:extLst>
+          </p:cNvPr>
+          <p:cNvSpPr txBox="1"/>
+          <p:nvPr/>
+        </p:nvSpPr>
+        <p:spPr>
+          <a:xfrm>
+            <a:off x="795528" y="4226400"/>
+            <a:ext cx="8544908" cy="338554"/>
+          </a:xfrm>
+          <a:prstGeom prst="rect">
+            <a:avLst/>
+          </a:prstGeom>
+          <a:noFill/>
+        </p:spPr>
+        <p:txBody>
+          <a:bodyPr wrap="square">
+            <a:spAutoFit/>
+          </a:bodyPr>
+          <a:lstStyle/>
+          <a:p>
+            <a:r>
+              <a:rPr lang="en-US" sz="1600" dirty="0">
+                <a:latin typeface="Fira Mono" panose="020B0509050000020004" pitchFamily="49" charset="0"/>
+                <a:ea typeface="Fira Mono" panose="020B0509050000020004" pitchFamily="49" charset="0"/>
+              </a:rPr>
+              <a:t>shiny::</a:t>
+            </a:r>
+            <a:r>
+              <a:rPr lang="en-US" sz="1600" dirty="0" err="1">
+                <a:latin typeface="Fira Mono" panose="020B0509050000020004" pitchFamily="49" charset="0"/>
+                <a:ea typeface="Fira Mono" panose="020B0509050000020004" pitchFamily="49" charset="0"/>
+              </a:rPr>
+              <a:t>runApp</a:t>
+            </a:r>
+            <a:r>
+              <a:rPr lang="en-US" sz="1600" dirty="0">
+                <a:latin typeface="Fira Mono" panose="020B0509050000020004" pitchFamily="49" charset="0"/>
+                <a:ea typeface="Fira Mono" panose="020B0509050000020004" pitchFamily="49" charset="0"/>
+              </a:rPr>
+              <a:t>()</a:t>
+            </a:r>
+          </a:p>
+        </p:txBody>
+      </p:sp>
+    </p:spTree>
+    <p:extLst>
+      <p:ext uri="{BB962C8B-B14F-4D97-AF65-F5344CB8AC3E}">
+        <p14:creationId xmlns:p14="http://schemas.microsoft.com/office/powerpoint/2010/main" val="356127022"/>
+      </p:ext>
+    </p:extLst>
+  </p:cSld>
+  <p:clrMapOvr>
+    <a:masterClrMapping/>
+  </p:clrMapOvr>
+</p:sld>
+</file>
+
+<file path=ppt/slides/slide6.xml><?xml version="1.0" encoding="utf-8"?>
+<p:sld xmlns:a="http://schemas.openxmlformats.org/drawingml/2006/main" xmlns:r="http://schemas.openxmlformats.org/officeDocument/2006/relationships" xmlns:p="http://schemas.openxmlformats.org/presentationml/2006/main">
+  <p:cSld>
+    <p:spTree>
+      <p:nvGrpSpPr>
+        <p:cNvPr id="1" name="">
+          <a:extLst>
+            <a:ext uri="{FF2B5EF4-FFF2-40B4-BE49-F238E27FC236}">
               <a16:creationId xmlns:a16="http://schemas.microsoft.com/office/drawing/2014/main" id="{CA392F7B-3EF3-7FC5-E2A3-395E2B863D09}"/>
             </a:ext>
           </a:extLst>
@@ -5797,7 +7499,7 @@
 </p:sld>
 </file>
 
-<file path=ppt/slides/slide5.xml><?xml version="1.0" encoding="utf-8"?>
+<file path=ppt/slides/slide7.xml><?xml version="1.0" encoding="utf-8"?>
 <p:sld xmlns:a="http://schemas.openxmlformats.org/drawingml/2006/main" xmlns:r="http://schemas.openxmlformats.org/officeDocument/2006/relationships" xmlns:p="http://schemas.openxmlformats.org/presentationml/2006/main">
   <p:cSld>
     <p:spTree>
@@ -5857,357 +7559,6 @@
 </p:sld>
 </file>
 
-<file path=ppt/slides/slide6.xml><?xml version="1.0" encoding="utf-8"?>
-<p:sld xmlns:a="http://schemas.openxmlformats.org/drawingml/2006/main" xmlns:r="http://schemas.openxmlformats.org/officeDocument/2006/relationships" xmlns:p="http://schemas.openxmlformats.org/presentationml/2006/main">
-  <p:cSld>
-    <p:spTree>
-      <p:nvGrpSpPr>
-        <p:cNvPr id="1" name=""/>
-        <p:cNvGrpSpPr/>
-        <p:nvPr/>
-      </p:nvGrpSpPr>
-      <p:grpSpPr>
-        <a:xfrm>
-          <a:off x="0" y="0"/>
-          <a:ext cx="0" cy="0"/>
-          <a:chOff x="0" y="0"/>
-          <a:chExt cx="0" cy="0"/>
-        </a:xfrm>
-      </p:grpSpPr>
-      <p:sp>
-        <p:nvSpPr>
-          <p:cNvPr id="3" name="TextBox 2">
-            <a:extLst>
-              <a:ext uri="{FF2B5EF4-FFF2-40B4-BE49-F238E27FC236}">
-                <a16:creationId xmlns:a16="http://schemas.microsoft.com/office/drawing/2014/main" id="{497561EF-BC14-FB89-F5EC-1A4679BB08EE}"/>
-              </a:ext>
-            </a:extLst>
-          </p:cNvPr>
-          <p:cNvSpPr txBox="1"/>
-          <p:nvPr/>
-        </p:nvSpPr>
-        <p:spPr>
-          <a:xfrm>
-            <a:off x="105103" y="181957"/>
-            <a:ext cx="9301655" cy="6494085"/>
-          </a:xfrm>
-          <a:prstGeom prst="rect">
-            <a:avLst/>
-          </a:prstGeom>
-          <a:noFill/>
-        </p:spPr>
-        <p:txBody>
-          <a:bodyPr wrap="square">
-            <a:spAutoFit/>
-          </a:bodyPr>
-          <a:lstStyle/>
-          <a:p>
-            <a:pPr>
-              <a:buNone/>
-            </a:pPr>
-            <a:r>
-              <a:rPr lang="en-US" sz="1600" b="1" dirty="0"/>
-              <a:t>🐔 What the Different Statistical Distributions Mean</a:t>
-            </a:r>
-          </a:p>
-          <a:p>
-            <a:pPr>
-              <a:buNone/>
-            </a:pPr>
-            <a:endParaRPr lang="en-US" sz="1600" b="1" dirty="0"/>
-          </a:p>
-          <a:p>
-            <a:pPr>
-              <a:buNone/>
-            </a:pPr>
-            <a:r>
-              <a:rPr lang="en-US" sz="1600" b="1" dirty="0"/>
-              <a:t>Normal distribution</a:t>
-            </a:r>
-          </a:p>
-          <a:p>
-            <a:pPr>
-              <a:buFont typeface="Arial" panose="020B0604020202020204" pitchFamily="34" charset="0"/>
-              <a:buChar char="•"/>
-            </a:pPr>
-            <a:r>
-              <a:rPr lang="en-US" sz="1600" dirty="0"/>
-              <a:t> Classic “bell-shaped” pattern.</a:t>
-            </a:r>
-          </a:p>
-          <a:p>
-            <a:pPr>
-              <a:buFont typeface="Arial" panose="020B0604020202020204" pitchFamily="34" charset="0"/>
-              <a:buChar char="•"/>
-            </a:pPr>
-            <a:r>
-              <a:rPr lang="en-US" sz="1600" dirty="0"/>
-              <a:t> Most animals cluster around an average value.</a:t>
-            </a:r>
-          </a:p>
-          <a:p>
-            <a:pPr>
-              <a:buFont typeface="Arial" panose="020B0604020202020204" pitchFamily="34" charset="0"/>
-              <a:buChar char="•"/>
-            </a:pPr>
-            <a:r>
-              <a:rPr lang="en-US" sz="1600" dirty="0"/>
-              <a:t> Good for traits with natural biological symmetry (e.g., body weight in a uniform flock).</a:t>
-            </a:r>
-          </a:p>
-          <a:p>
-            <a:pPr>
-              <a:buNone/>
-            </a:pPr>
-            <a:endParaRPr lang="en-US" sz="1600" b="1" dirty="0"/>
-          </a:p>
-          <a:p>
-            <a:pPr>
-              <a:buNone/>
-            </a:pPr>
-            <a:r>
-              <a:rPr lang="en-US" sz="1600" b="1" dirty="0"/>
-              <a:t>Log-normal distribution</a:t>
-            </a:r>
-          </a:p>
-          <a:p>
-            <a:pPr>
-              <a:buFont typeface="Arial" panose="020B0604020202020204" pitchFamily="34" charset="0"/>
-              <a:buChar char="•"/>
-            </a:pPr>
-            <a:r>
-              <a:rPr lang="en-US" sz="1600" dirty="0"/>
-              <a:t> Always positive, with a long tail to the right.</a:t>
-            </a:r>
-          </a:p>
-          <a:p>
-            <a:pPr>
-              <a:buFont typeface="Arial" panose="020B0604020202020204" pitchFamily="34" charset="0"/>
-              <a:buChar char="•"/>
-            </a:pPr>
-            <a:r>
-              <a:rPr lang="en-US" sz="1600" dirty="0"/>
-              <a:t> Many animals have low values, few animals have very high values.</a:t>
-            </a:r>
-          </a:p>
-          <a:p>
-            <a:pPr>
-              <a:buFont typeface="Arial" panose="020B0604020202020204" pitchFamily="34" charset="0"/>
-              <a:buChar char="•"/>
-            </a:pPr>
-            <a:r>
-              <a:rPr lang="en-US" sz="1600" dirty="0"/>
-              <a:t> Typical for hormone levels, parasites, and any measurement that multiplies rather than adds.</a:t>
-            </a:r>
-          </a:p>
-          <a:p>
-            <a:pPr>
-              <a:buNone/>
-            </a:pPr>
-            <a:endParaRPr lang="en-US" sz="1600" b="1" dirty="0"/>
-          </a:p>
-          <a:p>
-            <a:pPr>
-              <a:buNone/>
-            </a:pPr>
-            <a:r>
-              <a:rPr lang="en-US" sz="1600" b="1" dirty="0"/>
-              <a:t>Gamma distribution</a:t>
-            </a:r>
-          </a:p>
-          <a:p>
-            <a:pPr>
-              <a:buFont typeface="Arial" panose="020B0604020202020204" pitchFamily="34" charset="0"/>
-              <a:buChar char="•"/>
-            </a:pPr>
-            <a:r>
-              <a:rPr lang="en-US" sz="1600" dirty="0"/>
-              <a:t> Positive-only, skewed to the right.</a:t>
-            </a:r>
-          </a:p>
-          <a:p>
-            <a:pPr>
-              <a:buFont typeface="Arial" panose="020B0604020202020204" pitchFamily="34" charset="0"/>
-              <a:buChar char="•"/>
-            </a:pPr>
-            <a:r>
-              <a:rPr lang="en-US" sz="1600" dirty="0"/>
-              <a:t> Suited for measurements that cannot go below zero and vary a lot.</a:t>
-            </a:r>
-          </a:p>
-          <a:p>
-            <a:pPr>
-              <a:buFont typeface="Arial" panose="020B0604020202020204" pitchFamily="34" charset="0"/>
-              <a:buChar char="•"/>
-            </a:pPr>
-            <a:r>
-              <a:rPr lang="en-US" sz="1600" dirty="0"/>
-              <a:t> Common for time-to-event data, inflammation markers, or enzyme activities.</a:t>
-            </a:r>
-          </a:p>
-          <a:p>
-            <a:pPr>
-              <a:buNone/>
-            </a:pPr>
-            <a:endParaRPr lang="en-US" sz="1600" b="1" dirty="0"/>
-          </a:p>
-          <a:p>
-            <a:pPr>
-              <a:buNone/>
-            </a:pPr>
-            <a:r>
-              <a:rPr lang="en-US" sz="1600" b="1" dirty="0"/>
-              <a:t>Weibull distribution</a:t>
-            </a:r>
-          </a:p>
-          <a:p>
-            <a:pPr>
-              <a:buFont typeface="Arial" panose="020B0604020202020204" pitchFamily="34" charset="0"/>
-              <a:buChar char="•"/>
-            </a:pPr>
-            <a:r>
-              <a:rPr lang="en-US" sz="1600" dirty="0"/>
-              <a:t> Flexible shape; can model early risk or late risk.</a:t>
-            </a:r>
-          </a:p>
-          <a:p>
-            <a:pPr>
-              <a:buFont typeface="Arial" panose="020B0604020202020204" pitchFamily="34" charset="0"/>
-              <a:buChar char="•"/>
-            </a:pPr>
-            <a:r>
-              <a:rPr lang="en-US" sz="1600" dirty="0"/>
-              <a:t> Widely used in survival analysis.</a:t>
-            </a:r>
-          </a:p>
-          <a:p>
-            <a:pPr>
-              <a:buFont typeface="Arial" panose="020B0604020202020204" pitchFamily="34" charset="0"/>
-              <a:buChar char="•"/>
-            </a:pPr>
-            <a:r>
-              <a:rPr lang="en-US" sz="1600" dirty="0"/>
-              <a:t> Good for time until disease, time until failure, or longevity studies.</a:t>
-            </a:r>
-          </a:p>
-          <a:p>
-            <a:pPr>
-              <a:buNone/>
-            </a:pPr>
-            <a:endParaRPr lang="en-US" sz="1600" b="1" dirty="0"/>
-          </a:p>
-          <a:p>
-            <a:pPr>
-              <a:buNone/>
-            </a:pPr>
-            <a:r>
-              <a:rPr lang="en-US" sz="1600" b="1" dirty="0"/>
-              <a:t>Exponential distribution</a:t>
-            </a:r>
-          </a:p>
-          <a:p>
-            <a:pPr>
-              <a:buFont typeface="Arial" panose="020B0604020202020204" pitchFamily="34" charset="0"/>
-              <a:buChar char="•"/>
-            </a:pPr>
-            <a:r>
-              <a:rPr lang="en-US" sz="1600" dirty="0"/>
-              <a:t> Memoryless “time-to-event” model.</a:t>
-            </a:r>
-          </a:p>
-          <a:p>
-            <a:pPr>
-              <a:buFont typeface="Arial" panose="020B0604020202020204" pitchFamily="34" charset="0"/>
-              <a:buChar char="•"/>
-            </a:pPr>
-            <a:r>
-              <a:rPr lang="en-US" sz="1600" dirty="0"/>
-              <a:t> Describes processes where the chance of an event is constant over time.</a:t>
-            </a:r>
-          </a:p>
-          <a:p>
-            <a:pPr>
-              <a:buFont typeface="Arial" panose="020B0604020202020204" pitchFamily="34" charset="0"/>
-              <a:buChar char="•"/>
-            </a:pPr>
-            <a:r>
-              <a:rPr lang="en-US" sz="1600" dirty="0"/>
-              <a:t> Useful for modeling infection waiting times or time until the next occurrence.</a:t>
-            </a:r>
-          </a:p>
-        </p:txBody>
-      </p:sp>
-    </p:spTree>
-    <p:extLst>
-      <p:ext uri="{BB962C8B-B14F-4D97-AF65-F5344CB8AC3E}">
-        <p14:creationId xmlns:p14="http://schemas.microsoft.com/office/powerpoint/2010/main" val="2519704046"/>
-      </p:ext>
-    </p:extLst>
-  </p:cSld>
-  <p:clrMapOvr>
-    <a:masterClrMapping/>
-  </p:clrMapOvr>
-</p:sld>
-</file>
-
-<file path=ppt/slides/slide7.xml><?xml version="1.0" encoding="utf-8"?>
-<p:sld xmlns:a="http://schemas.openxmlformats.org/drawingml/2006/main" xmlns:r="http://schemas.openxmlformats.org/officeDocument/2006/relationships" xmlns:p="http://schemas.openxmlformats.org/presentationml/2006/main">
-  <p:cSld>
-    <p:spTree>
-      <p:nvGrpSpPr>
-        <p:cNvPr id="1" name=""/>
-        <p:cNvGrpSpPr/>
-        <p:nvPr/>
-      </p:nvGrpSpPr>
-      <p:grpSpPr>
-        <a:xfrm>
-          <a:off x="0" y="0"/>
-          <a:ext cx="0" cy="0"/>
-          <a:chOff x="0" y="0"/>
-          <a:chExt cx="0" cy="0"/>
-        </a:xfrm>
-      </p:grpSpPr>
-      <p:sp>
-        <p:nvSpPr>
-          <p:cNvPr id="2" name="Title 1">
-            <a:extLst>
-              <a:ext uri="{FF2B5EF4-FFF2-40B4-BE49-F238E27FC236}">
-                <a16:creationId xmlns:a16="http://schemas.microsoft.com/office/drawing/2014/main" id="{71348000-8DB4-EFA8-B151-AF1410B425FC}"/>
-              </a:ext>
-            </a:extLst>
-          </p:cNvPr>
-          <p:cNvSpPr>
-            <a:spLocks noGrp="1"/>
-          </p:cNvSpPr>
-          <p:nvPr>
-            <p:ph type="title"/>
-          </p:nvPr>
-        </p:nvSpPr>
-        <p:spPr/>
-        <p:txBody>
-          <a:bodyPr/>
-          <a:lstStyle/>
-          <a:p>
-            <a:r>
-              <a:rPr lang="en-US" dirty="0"/>
-              <a:t>NOTES on LMM</a:t>
-            </a:r>
-          </a:p>
-        </p:txBody>
-      </p:sp>
-    </p:spTree>
-    <p:extLst>
-      <p:ext uri="{BB962C8B-B14F-4D97-AF65-F5344CB8AC3E}">
-        <p14:creationId xmlns:p14="http://schemas.microsoft.com/office/powerpoint/2010/main" val="346991280"/>
-      </p:ext>
-    </p:extLst>
-  </p:cSld>
-  <p:clrMapOvr>
-    <a:masterClrMapping/>
-  </p:clrMapOvr>
-</p:sld>
-</file>
-
 <file path=ppt/slides/slide8.xml><?xml version="1.0" encoding="utf-8"?>
 <p:sld xmlns:a="http://schemas.openxmlformats.org/drawingml/2006/main" xmlns:r="http://schemas.openxmlformats.org/officeDocument/2006/relationships" xmlns:p="http://schemas.openxmlformats.org/presentationml/2006/main">
   <p:cSld>
@@ -6230,7 +7581,7 @@
           <p:cNvPr id="3" name="TextBox 2">
             <a:extLst>
               <a:ext uri="{FF2B5EF4-FFF2-40B4-BE49-F238E27FC236}">
-                <a16:creationId xmlns:a16="http://schemas.microsoft.com/office/drawing/2014/main" id="{184EEA22-109C-8598-D181-3B420FE4ECED}"/>
+                <a16:creationId xmlns:a16="http://schemas.microsoft.com/office/drawing/2014/main" id="{497561EF-BC14-FB89-F5EC-1A4679BB08EE}"/>
               </a:ext>
             </a:extLst>
           </p:cNvPr>
@@ -6239,8 +7590,8 @@
         </p:nvSpPr>
         <p:spPr>
           <a:xfrm>
-            <a:off x="635876" y="117693"/>
-            <a:ext cx="8019393" cy="6740307"/>
+            <a:off x="105103" y="181957"/>
+            <a:ext cx="9301655" cy="6494085"/>
           </a:xfrm>
           <a:prstGeom prst="rect">
             <a:avLst/>
@@ -6257,23 +7608,23 @@
               <a:buNone/>
             </a:pPr>
             <a:r>
-              <a:rPr lang="en-US" b="1" dirty="0"/>
-              <a:t>🐔 Random Effects</a:t>
+              <a:rPr lang="en-US" sz="1600" b="1" dirty="0"/>
+              <a:t>🐔 What the Different Statistical Distributions Mean</a:t>
             </a:r>
           </a:p>
           <a:p>
             <a:pPr>
               <a:buNone/>
             </a:pPr>
-            <a:endParaRPr lang="en-US" b="1" dirty="0"/>
+            <a:endParaRPr lang="en-US" sz="1600" b="1" dirty="0"/>
           </a:p>
           <a:p>
             <a:pPr>
               <a:buNone/>
             </a:pPr>
             <a:r>
-              <a:rPr lang="en-US" b="1" dirty="0"/>
-              <a:t>What they represent</a:t>
+              <a:rPr lang="en-US" sz="1600" b="1" dirty="0"/>
+              <a:t>Normal distribution</a:t>
             </a:r>
           </a:p>
           <a:p>
@@ -6282,16 +7633,8 @@
               <a:buChar char="•"/>
             </a:pPr>
             <a:r>
-              <a:rPr lang="en-US" dirty="0"/>
-              <a:t> They capture </a:t>
-            </a:r>
-            <a:r>
-              <a:rPr lang="en-US" b="1" dirty="0"/>
-              <a:t>natural differences between individual animals</a:t>
-            </a:r>
-            <a:r>
-              <a:rPr lang="en-US" dirty="0"/>
-              <a:t>.</a:t>
+              <a:rPr lang="en-US" sz="1600" dirty="0"/>
+              <a:t> Classic “bell-shaped” pattern.</a:t>
             </a:r>
           </a:p>
           <a:p>
@@ -6300,8 +7643,8 @@
               <a:buChar char="•"/>
             </a:pPr>
             <a:r>
-              <a:rPr lang="en-US" dirty="0"/>
-              <a:t> Every chicken has its own baseline weight or behavior.</a:t>
+              <a:rPr lang="en-US" sz="1600" dirty="0"/>
+              <a:t> Most animals cluster around an average value.</a:t>
             </a:r>
           </a:p>
           <a:p>
@@ -6310,31 +7653,23 @@
               <a:buChar char="•"/>
             </a:pPr>
             <a:r>
-              <a:rPr lang="en-US" dirty="0"/>
-              <a:t> Random effects allow the model to </a:t>
-            </a:r>
-            <a:r>
-              <a:rPr lang="en-US" b="1" dirty="0"/>
-              <a:t>give each animal its own starting level</a:t>
-            </a:r>
-            <a:r>
-              <a:rPr lang="en-US" dirty="0"/>
-              <a:t>, instead of forcing all animals to be identical.</a:t>
+              <a:rPr lang="en-US" sz="1600" dirty="0"/>
+              <a:t> Good for traits with natural biological symmetry (e.g., body weight in a uniform flock).</a:t>
             </a:r>
           </a:p>
           <a:p>
             <a:pPr>
               <a:buNone/>
             </a:pPr>
-            <a:endParaRPr lang="en-US" b="1" dirty="0"/>
+            <a:endParaRPr lang="en-US" sz="1600" b="1" dirty="0"/>
           </a:p>
           <a:p>
             <a:pPr>
               <a:buNone/>
             </a:pPr>
             <a:r>
-              <a:rPr lang="en-US" b="1" dirty="0"/>
-              <a:t>Why we need them</a:t>
+              <a:rPr lang="en-US" sz="1600" b="1" dirty="0"/>
+              <a:t>Log-normal distribution</a:t>
             </a:r>
           </a:p>
           <a:p>
@@ -6343,16 +7678,8 @@
               <a:buChar char="•"/>
             </a:pPr>
             <a:r>
-              <a:rPr lang="en-US" dirty="0"/>
-              <a:t> Animals in the same treatment group are </a:t>
-            </a:r>
-            <a:r>
-              <a:rPr lang="en-US" i="1" dirty="0"/>
-              <a:t>not</a:t>
-            </a:r>
-            <a:r>
-              <a:rPr lang="en-US" dirty="0"/>
-              <a:t> clones.</a:t>
+              <a:rPr lang="en-US" sz="1600" dirty="0"/>
+              <a:t> Always positive, with a long tail to the right.</a:t>
             </a:r>
           </a:p>
           <a:p>
@@ -6361,8 +7688,8 @@
               <a:buChar char="•"/>
             </a:pPr>
             <a:r>
-              <a:rPr lang="en-US" dirty="0"/>
-              <a:t> Some chickens naturally grow faster or slower, regardless of treatment.</a:t>
+              <a:rPr lang="en-US" sz="1600" dirty="0"/>
+              <a:t> Many animals have low values, few animals have very high values.</a:t>
             </a:r>
           </a:p>
           <a:p>
@@ -6371,23 +7698,23 @@
               <a:buChar char="•"/>
             </a:pPr>
             <a:r>
-              <a:rPr lang="en-US" dirty="0"/>
-              <a:t> Ignoring these differences makes the analysis less accurate, more biased and too optimistic about significance.</a:t>
+              <a:rPr lang="en-US" sz="1600" dirty="0"/>
+              <a:t> Typical for hormone levels, parasites, and any measurement that multiplies rather than adds.</a:t>
             </a:r>
           </a:p>
           <a:p>
             <a:pPr>
               <a:buNone/>
             </a:pPr>
-            <a:endParaRPr lang="en-US" b="1" dirty="0"/>
+            <a:endParaRPr lang="en-US" sz="1600" b="1" dirty="0"/>
           </a:p>
           <a:p>
             <a:pPr>
               <a:buNone/>
             </a:pPr>
             <a:r>
-              <a:rPr lang="en-US" b="1" dirty="0"/>
-              <a:t>What the model does with them</a:t>
+              <a:rPr lang="en-US" sz="1600" b="1" dirty="0"/>
+              <a:t>Gamma distribution</a:t>
             </a:r>
           </a:p>
           <a:p>
@@ -6396,16 +7723,8 @@
               <a:buChar char="•"/>
             </a:pPr>
             <a:r>
-              <a:rPr lang="en-US" dirty="0"/>
-              <a:t> The model estimates how much animals </a:t>
-            </a:r>
-            <a:r>
-              <a:rPr lang="en-US" b="1" dirty="0"/>
-              <a:t>differ from each other on average</a:t>
-            </a:r>
-            <a:r>
-              <a:rPr lang="en-US" dirty="0"/>
-              <a:t>.</a:t>
+              <a:rPr lang="en-US" sz="1600" dirty="0"/>
+              <a:t> Positive-only, skewed to the right.</a:t>
             </a:r>
           </a:p>
           <a:p>
@@ -6414,8 +7733,8 @@
               <a:buChar char="•"/>
             </a:pPr>
             <a:r>
-              <a:rPr lang="en-US" dirty="0"/>
-              <a:t> It adjusts treatment effects so they are not inflated by animal-to-animal variation.</a:t>
+              <a:rPr lang="en-US" sz="1600" dirty="0"/>
+              <a:t> Suited for measurements that cannot go below zero and vary a lot.</a:t>
             </a:r>
           </a:p>
           <a:p>
@@ -6424,31 +7743,23 @@
               <a:buChar char="•"/>
             </a:pPr>
             <a:r>
-              <a:rPr lang="en-US" dirty="0"/>
-              <a:t> The random effect acts like a </a:t>
-            </a:r>
-            <a:r>
-              <a:rPr lang="en-US" b="1" dirty="0"/>
-              <a:t>baseline correction</a:t>
-            </a:r>
-            <a:r>
-              <a:rPr lang="en-US" dirty="0"/>
-              <a:t> for each individual animal.</a:t>
+              <a:rPr lang="en-US" sz="1600" dirty="0"/>
+              <a:t> Common for time-to-event data, inflammation markers, or enzyme activities.</a:t>
             </a:r>
           </a:p>
           <a:p>
             <a:pPr>
               <a:buNone/>
             </a:pPr>
-            <a:endParaRPr lang="en-US" b="1" dirty="0"/>
+            <a:endParaRPr lang="en-US" sz="1600" b="1" dirty="0"/>
           </a:p>
           <a:p>
             <a:pPr>
               <a:buNone/>
             </a:pPr>
             <a:r>
-              <a:rPr lang="en-US" b="1" dirty="0"/>
-              <a:t>Veterinary practice interpretation</a:t>
+              <a:rPr lang="en-US" sz="1600" b="1" dirty="0"/>
+              <a:t>Weibull distribution</a:t>
             </a:r>
           </a:p>
           <a:p>
@@ -6457,15 +7768,8 @@
               <a:buChar char="•"/>
             </a:pPr>
             <a:r>
-              <a:rPr lang="en-US" dirty="0"/>
-              <a:t> If random-effect variance is large:</a:t>
-            </a:r>
-            <a:br>
-              <a:rPr lang="en-US" dirty="0"/>
-            </a:br>
-            <a:r>
-              <a:rPr lang="en-US" dirty="0"/>
-              <a:t> → animals in the trial vary a lot biologically.</a:t>
+              <a:rPr lang="en-US" sz="1600" dirty="0"/>
+              <a:t> Flexible shape; can model early risk or late risk.</a:t>
             </a:r>
           </a:p>
           <a:p>
@@ -6474,15 +7778,63 @@
               <a:buChar char="•"/>
             </a:pPr>
             <a:r>
-              <a:rPr lang="en-US" dirty="0"/>
-              <a:t> If it's small:</a:t>
-            </a:r>
-            <a:br>
-              <a:rPr lang="en-US" dirty="0"/>
-            </a:br>
-            <a:r>
-              <a:rPr lang="en-US" dirty="0"/>
-              <a:t> → animals behave very similarly; group differences dominate.</a:t>
+              <a:rPr lang="en-US" sz="1600" dirty="0"/>
+              <a:t> Widely used in survival analysis.</a:t>
+            </a:r>
+          </a:p>
+          <a:p>
+            <a:pPr>
+              <a:buFont typeface="Arial" panose="020B0604020202020204" pitchFamily="34" charset="0"/>
+              <a:buChar char="•"/>
+            </a:pPr>
+            <a:r>
+              <a:rPr lang="en-US" sz="1600" dirty="0"/>
+              <a:t> Good for time until disease, time until failure, or longevity studies.</a:t>
+            </a:r>
+          </a:p>
+          <a:p>
+            <a:pPr>
+              <a:buNone/>
+            </a:pPr>
+            <a:endParaRPr lang="en-US" sz="1600" b="1" dirty="0"/>
+          </a:p>
+          <a:p>
+            <a:pPr>
+              <a:buNone/>
+            </a:pPr>
+            <a:r>
+              <a:rPr lang="en-US" sz="1600" b="1" dirty="0"/>
+              <a:t>Exponential distribution</a:t>
+            </a:r>
+          </a:p>
+          <a:p>
+            <a:pPr>
+              <a:buFont typeface="Arial" panose="020B0604020202020204" pitchFamily="34" charset="0"/>
+              <a:buChar char="•"/>
+            </a:pPr>
+            <a:r>
+              <a:rPr lang="en-US" sz="1600" dirty="0"/>
+              <a:t> Memoryless “time-to-event” model.</a:t>
+            </a:r>
+          </a:p>
+          <a:p>
+            <a:pPr>
+              <a:buFont typeface="Arial" panose="020B0604020202020204" pitchFamily="34" charset="0"/>
+              <a:buChar char="•"/>
+            </a:pPr>
+            <a:r>
+              <a:rPr lang="en-US" sz="1600" dirty="0"/>
+              <a:t> Describes processes where the chance of an event is constant over time.</a:t>
+            </a:r>
+          </a:p>
+          <a:p>
+            <a:pPr>
+              <a:buFont typeface="Arial" panose="020B0604020202020204" pitchFamily="34" charset="0"/>
+              <a:buChar char="•"/>
+            </a:pPr>
+            <a:r>
+              <a:rPr lang="en-US" sz="1600" dirty="0"/>
+              <a:t> Useful for modeling infection waiting times or time until the next occurrence.</a:t>
             </a:r>
           </a:p>
         </p:txBody>
@@ -6490,7 +7842,7 @@
     </p:spTree>
     <p:extLst>
       <p:ext uri="{BB962C8B-B14F-4D97-AF65-F5344CB8AC3E}">
-        <p14:creationId xmlns:p14="http://schemas.microsoft.com/office/powerpoint/2010/main" val="2723014488"/>
+        <p14:creationId xmlns:p14="http://schemas.microsoft.com/office/powerpoint/2010/main" val="2519704046"/>
       </p:ext>
     </p:extLst>
   </p:cSld>
@@ -6519,213 +7871,28 @@
       </p:grpSpPr>
       <p:sp>
         <p:nvSpPr>
-          <p:cNvPr id="3" name="TextBox 2">
+          <p:cNvPr id="2" name="Title 1">
             <a:extLst>
               <a:ext uri="{FF2B5EF4-FFF2-40B4-BE49-F238E27FC236}">
-                <a16:creationId xmlns:a16="http://schemas.microsoft.com/office/drawing/2014/main" id="{A2C47E32-1372-DB94-ECDF-E801FEE80F01}"/>
+                <a16:creationId xmlns:a16="http://schemas.microsoft.com/office/drawing/2014/main" id="{71348000-8DB4-EFA8-B151-AF1410B425FC}"/>
               </a:ext>
             </a:extLst>
           </p:cNvPr>
-          <p:cNvSpPr txBox="1"/>
-          <p:nvPr/>
-        </p:nvSpPr>
-        <p:spPr>
-          <a:xfrm>
-            <a:off x="273269" y="181957"/>
-            <a:ext cx="8870731" cy="5909310"/>
-          </a:xfrm>
-          <a:prstGeom prst="rect">
-            <a:avLst/>
-          </a:prstGeom>
-          <a:noFill/>
-        </p:spPr>
-        <p:txBody>
-          <a:bodyPr wrap="square">
-            <a:spAutoFit/>
-          </a:bodyPr>
+          <p:cNvSpPr>
+            <a:spLocks noGrp="1"/>
+          </p:cNvSpPr>
+          <p:nvPr>
+            <p:ph type="title"/>
+          </p:nvPr>
+        </p:nvSpPr>
+        <p:spPr/>
+        <p:txBody>
+          <a:bodyPr/>
           <a:lstStyle/>
           <a:p>
-            <a:pPr>
-              <a:buNone/>
-            </a:pPr>
-            <a:r>
-              <a:rPr lang="en-US" b="1" dirty="0"/>
-              <a:t>🐔 Intraclass Correlation Coefficient (ICC)</a:t>
-            </a:r>
-          </a:p>
-          <a:p>
-            <a:pPr>
-              <a:buNone/>
-            </a:pPr>
-            <a:endParaRPr lang="en-US" b="1" dirty="0"/>
-          </a:p>
-          <a:p>
-            <a:pPr>
-              <a:buNone/>
-            </a:pPr>
-            <a:r>
-              <a:rPr lang="en-US" b="1" dirty="0"/>
-              <a:t>What ICC measures</a:t>
-            </a:r>
-          </a:p>
-          <a:p>
-            <a:pPr>
-              <a:buFont typeface="Arial" panose="020B0604020202020204" pitchFamily="34" charset="0"/>
-              <a:buChar char="•"/>
-            </a:pPr>
             <a:r>
               <a:rPr lang="en-US" dirty="0"/>
-              <a:t> ICC tells you </a:t>
-            </a:r>
-            <a:r>
-              <a:rPr lang="en-US" b="1" dirty="0"/>
-              <a:t>how much of the total variability comes from real biological differences between animals</a:t>
-            </a:r>
-            <a:r>
-              <a:rPr lang="en-US" dirty="0"/>
-              <a:t>.</a:t>
-            </a:r>
-          </a:p>
-          <a:p>
-            <a:pPr>
-              <a:buFont typeface="Arial" panose="020B0604020202020204" pitchFamily="34" charset="0"/>
-              <a:buChar char="•"/>
-            </a:pPr>
-            <a:r>
-              <a:rPr lang="en-US" dirty="0"/>
-              <a:t> It is the </a:t>
-            </a:r>
-            <a:r>
-              <a:rPr lang="en-US" b="1" dirty="0"/>
-              <a:t>proportion of variance explained by the animal itself</a:t>
-            </a:r>
-            <a:r>
-              <a:rPr lang="en-US" dirty="0"/>
-              <a:t>, not by treatment or random noise.</a:t>
-            </a:r>
-          </a:p>
-          <a:p>
-            <a:pPr>
-              <a:buNone/>
-            </a:pPr>
-            <a:endParaRPr lang="en-US" b="1" dirty="0"/>
-          </a:p>
-          <a:p>
-            <a:pPr>
-              <a:buNone/>
-            </a:pPr>
-            <a:r>
-              <a:rPr lang="en-US" b="1" dirty="0"/>
-              <a:t>How to read ICC values</a:t>
-            </a:r>
-          </a:p>
-          <a:p>
-            <a:pPr>
-              <a:buFont typeface="Arial" panose="020B0604020202020204" pitchFamily="34" charset="0"/>
-              <a:buChar char="•"/>
-            </a:pPr>
-            <a:r>
-              <a:rPr lang="en-US" b="1" dirty="0"/>
-              <a:t> ICC ≈ 0.00–0.10 → low animal individuality</a:t>
-            </a:r>
-            <a:br>
-              <a:rPr lang="en-US" dirty="0"/>
-            </a:br>
-            <a:r>
-              <a:rPr lang="en-US" dirty="0"/>
-              <a:t>Animals behave similarly; treatment or noise dominates.</a:t>
-            </a:r>
-          </a:p>
-          <a:p>
-            <a:pPr>
-              <a:buFont typeface="Arial" panose="020B0604020202020204" pitchFamily="34" charset="0"/>
-              <a:buChar char="•"/>
-            </a:pPr>
-            <a:r>
-              <a:rPr lang="en-US" b="1" dirty="0"/>
-              <a:t> ICC ≈ 0.20–0.40 → moderate individuality</a:t>
-            </a:r>
-            <a:br>
-              <a:rPr lang="en-US" dirty="0"/>
-            </a:br>
-            <a:r>
-              <a:rPr lang="en-US" dirty="0"/>
-              <a:t>Animals have meaningful biological differences.</a:t>
-            </a:r>
-            <a:br>
-              <a:rPr lang="en-US" dirty="0"/>
-            </a:br>
-            <a:r>
-              <a:rPr lang="en-US" dirty="0"/>
-              <a:t>This is typical in growth, behavior, physiology.</a:t>
-            </a:r>
-          </a:p>
-          <a:p>
-            <a:pPr>
-              <a:buFont typeface="Arial" panose="020B0604020202020204" pitchFamily="34" charset="0"/>
-              <a:buChar char="•"/>
-            </a:pPr>
-            <a:r>
-              <a:rPr lang="en-US" b="1" dirty="0"/>
-              <a:t> ICC &gt; 0.40 → strong individuality</a:t>
-            </a:r>
-            <a:br>
-              <a:rPr lang="en-US" dirty="0"/>
-            </a:br>
-            <a:r>
-              <a:rPr lang="en-US" dirty="0"/>
-              <a:t>Each animal is quite different, and repeated measurements cluster tightly within each animal.</a:t>
-            </a:r>
-          </a:p>
-          <a:p>
-            <a:pPr>
-              <a:buNone/>
-            </a:pPr>
-            <a:endParaRPr lang="en-US" b="1" dirty="0"/>
-          </a:p>
-          <a:p>
-            <a:pPr>
-              <a:buNone/>
-            </a:pPr>
-            <a:r>
-              <a:rPr lang="en-US" b="1" dirty="0"/>
-              <a:t>What ICC means in practice</a:t>
-            </a:r>
-          </a:p>
-          <a:p>
-            <a:pPr>
-              <a:buFont typeface="Arial" panose="020B0604020202020204" pitchFamily="34" charset="0"/>
-              <a:buChar char="•"/>
-            </a:pPr>
-            <a:r>
-              <a:rPr lang="en-US" dirty="0"/>
-              <a:t> High ICC means repeated measurements from the same animal are </a:t>
-            </a:r>
-            <a:r>
-              <a:rPr lang="en-US" b="1" dirty="0"/>
-              <a:t>more similar to each other</a:t>
-            </a:r>
-            <a:r>
-              <a:rPr lang="en-US" dirty="0"/>
-              <a:t> than to measurements from other animals.</a:t>
-            </a:r>
-          </a:p>
-          <a:p>
-            <a:pPr>
-              <a:buFont typeface="Arial" panose="020B0604020202020204" pitchFamily="34" charset="0"/>
-              <a:buChar char="•"/>
-            </a:pPr>
-            <a:r>
-              <a:rPr lang="en-US" dirty="0"/>
-              <a:t> Low ICC means each animal behaves </a:t>
-            </a:r>
-            <a:r>
-              <a:rPr lang="en-US" b="1" dirty="0"/>
-              <a:t>more like the group</a:t>
-            </a:r>
-            <a:r>
-              <a:rPr lang="en-US" dirty="0"/>
-              <a:t>, with weak individuality.</a:t>
+              <a:t>NOTES on LMM</a:t>
             </a:r>
           </a:p>
         </p:txBody>
@@ -6733,7 +7900,7 @@
     </p:spTree>
     <p:extLst>
       <p:ext uri="{BB962C8B-B14F-4D97-AF65-F5344CB8AC3E}">
-        <p14:creationId xmlns:p14="http://schemas.microsoft.com/office/powerpoint/2010/main" val="2770030396"/>
+        <p14:creationId xmlns:p14="http://schemas.microsoft.com/office/powerpoint/2010/main" val="346991280"/>
       </p:ext>
     </p:extLst>
   </p:cSld>

</xml_diff>

<commit_message>
refactored barplots; changes to skim output
</commit_message>
<xml_diff>
--- a/presentations/Table_Analyzer_Overview.pptx
+++ b/presentations/Table_Analyzer_Overview.pptx
@@ -5,7 +5,7 @@
     <p:sldMasterId id="2147483648" r:id="rId1"/>
   </p:sldMasterIdLst>
   <p:notesMasterIdLst>
-    <p:notesMasterId r:id="rId15"/>
+    <p:notesMasterId r:id="rId19"/>
   </p:notesMasterIdLst>
   <p:sldIdLst>
     <p:sldId id="256" r:id="rId2"/>
@@ -16,11 +16,15 @@
     <p:sldId id="266" r:id="rId7"/>
     <p:sldId id="268" r:id="rId8"/>
     <p:sldId id="269" r:id="rId9"/>
-    <p:sldId id="262" r:id="rId10"/>
-    <p:sldId id="259" r:id="rId11"/>
-    <p:sldId id="260" r:id="rId12"/>
-    <p:sldId id="263" r:id="rId13"/>
-    <p:sldId id="265" r:id="rId14"/>
+    <p:sldId id="274" r:id="rId10"/>
+    <p:sldId id="275" r:id="rId11"/>
+    <p:sldId id="272" r:id="rId12"/>
+    <p:sldId id="273" r:id="rId13"/>
+    <p:sldId id="262" r:id="rId14"/>
+    <p:sldId id="259" r:id="rId15"/>
+    <p:sldId id="260" r:id="rId16"/>
+    <p:sldId id="263" r:id="rId17"/>
+    <p:sldId id="265" r:id="rId18"/>
   </p:sldIdLst>
   <p:sldSz cx="9144000" cy="6858000" type="screen4x3"/>
   <p:notesSz cx="6858000" cy="9144000"/>
@@ -3779,7 +3783,13 @@
   <p:cSld>
     <p:spTree>
       <p:nvGrpSpPr>
-        <p:cNvPr id="1" name=""/>
+        <p:cNvPr id="1" name="">
+          <a:extLst>
+            <a:ext uri="{FF2B5EF4-FFF2-40B4-BE49-F238E27FC236}">
+              <a16:creationId xmlns:a16="http://schemas.microsoft.com/office/drawing/2014/main" id="{D4E1F021-33C3-5E59-99EE-743AACDB37A4}"/>
+            </a:ext>
+          </a:extLst>
+        </p:cNvPr>
         <p:cNvGrpSpPr/>
         <p:nvPr/>
       </p:nvGrpSpPr>
@@ -3793,262 +3803,28 @@
       </p:grpSpPr>
       <p:sp>
         <p:nvSpPr>
-          <p:cNvPr id="3" name="TextBox 2">
+          <p:cNvPr id="2" name="Title 1">
             <a:extLst>
               <a:ext uri="{FF2B5EF4-FFF2-40B4-BE49-F238E27FC236}">
-                <a16:creationId xmlns:a16="http://schemas.microsoft.com/office/drawing/2014/main" id="{184EEA22-109C-8598-D181-3B420FE4ECED}"/>
+                <a16:creationId xmlns:a16="http://schemas.microsoft.com/office/drawing/2014/main" id="{4BE8073A-59EE-29C0-4545-580344D5A900}"/>
               </a:ext>
             </a:extLst>
           </p:cNvPr>
-          <p:cNvSpPr txBox="1"/>
-          <p:nvPr/>
-        </p:nvSpPr>
-        <p:spPr>
-          <a:xfrm>
-            <a:off x="635876" y="117693"/>
-            <a:ext cx="8019393" cy="6740307"/>
-          </a:xfrm>
-          <a:prstGeom prst="rect">
-            <a:avLst/>
-          </a:prstGeom>
-          <a:noFill/>
-        </p:spPr>
-        <p:txBody>
-          <a:bodyPr wrap="square">
-            <a:spAutoFit/>
-          </a:bodyPr>
+          <p:cNvSpPr>
+            <a:spLocks noGrp="1"/>
+          </p:cNvSpPr>
+          <p:nvPr>
+            <p:ph type="title"/>
+          </p:nvPr>
+        </p:nvSpPr>
+        <p:spPr/>
+        <p:txBody>
+          <a:bodyPr/>
           <a:lstStyle/>
           <a:p>
-            <a:pPr>
-              <a:buNone/>
-            </a:pPr>
-            <a:r>
-              <a:rPr lang="en-US" b="1" dirty="0"/>
-              <a:t>🐔 Random Effects</a:t>
-            </a:r>
-          </a:p>
-          <a:p>
-            <a:pPr>
-              <a:buNone/>
-            </a:pPr>
-            <a:endParaRPr lang="en-US" b="1" dirty="0"/>
-          </a:p>
-          <a:p>
-            <a:pPr>
-              <a:buNone/>
-            </a:pPr>
-            <a:r>
-              <a:rPr lang="en-US" b="1" dirty="0"/>
-              <a:t>What they represent</a:t>
-            </a:r>
-          </a:p>
-          <a:p>
-            <a:pPr>
-              <a:buFont typeface="Arial" panose="020B0604020202020204" pitchFamily="34" charset="0"/>
-              <a:buChar char="•"/>
-            </a:pPr>
-            <a:r>
-              <a:rPr lang="en-US" dirty="0"/>
-              <a:t> They capture </a:t>
-            </a:r>
-            <a:r>
-              <a:rPr lang="en-US" b="1" dirty="0"/>
-              <a:t>natural differences between individual animals</a:t>
-            </a:r>
-            <a:r>
-              <a:rPr lang="en-US" dirty="0"/>
-              <a:t>.</a:t>
-            </a:r>
-          </a:p>
-          <a:p>
-            <a:pPr>
-              <a:buFont typeface="Arial" panose="020B0604020202020204" pitchFamily="34" charset="0"/>
-              <a:buChar char="•"/>
-            </a:pPr>
-            <a:r>
-              <a:rPr lang="en-US" dirty="0"/>
-              <a:t> Every chicken has its own baseline weight or behavior.</a:t>
-            </a:r>
-          </a:p>
-          <a:p>
-            <a:pPr>
-              <a:buFont typeface="Arial" panose="020B0604020202020204" pitchFamily="34" charset="0"/>
-              <a:buChar char="•"/>
-            </a:pPr>
-            <a:r>
-              <a:rPr lang="en-US" dirty="0"/>
-              <a:t> Random effects allow the model to </a:t>
-            </a:r>
-            <a:r>
-              <a:rPr lang="en-US" b="1" dirty="0"/>
-              <a:t>give each animal its own starting level</a:t>
-            </a:r>
-            <a:r>
-              <a:rPr lang="en-US" dirty="0"/>
-              <a:t>, instead of forcing all animals to be identical.</a:t>
-            </a:r>
-          </a:p>
-          <a:p>
-            <a:pPr>
-              <a:buNone/>
-            </a:pPr>
-            <a:endParaRPr lang="en-US" b="1" dirty="0"/>
-          </a:p>
-          <a:p>
-            <a:pPr>
-              <a:buNone/>
-            </a:pPr>
-            <a:r>
-              <a:rPr lang="en-US" b="1" dirty="0"/>
-              <a:t>Why we need them</a:t>
-            </a:r>
-          </a:p>
-          <a:p>
-            <a:pPr>
-              <a:buFont typeface="Arial" panose="020B0604020202020204" pitchFamily="34" charset="0"/>
-              <a:buChar char="•"/>
-            </a:pPr>
-            <a:r>
-              <a:rPr lang="en-US" dirty="0"/>
-              <a:t> Animals in the same treatment group are </a:t>
-            </a:r>
-            <a:r>
-              <a:rPr lang="en-US" i="1" dirty="0"/>
-              <a:t>not</a:t>
-            </a:r>
-            <a:r>
-              <a:rPr lang="en-US" dirty="0"/>
-              <a:t> clones.</a:t>
-            </a:r>
-          </a:p>
-          <a:p>
-            <a:pPr>
-              <a:buFont typeface="Arial" panose="020B0604020202020204" pitchFamily="34" charset="0"/>
-              <a:buChar char="•"/>
-            </a:pPr>
-            <a:r>
-              <a:rPr lang="en-US" dirty="0"/>
-              <a:t> Some chickens naturally grow faster or slower, regardless of treatment.</a:t>
-            </a:r>
-          </a:p>
-          <a:p>
-            <a:pPr>
-              <a:buFont typeface="Arial" panose="020B0604020202020204" pitchFamily="34" charset="0"/>
-              <a:buChar char="•"/>
-            </a:pPr>
-            <a:r>
-              <a:rPr lang="en-US" dirty="0"/>
-              <a:t> Ignoring these differences makes the analysis less accurate, more biased and too optimistic about significance.</a:t>
-            </a:r>
-          </a:p>
-          <a:p>
-            <a:pPr>
-              <a:buNone/>
-            </a:pPr>
-            <a:endParaRPr lang="en-US" b="1" dirty="0"/>
-          </a:p>
-          <a:p>
-            <a:pPr>
-              <a:buNone/>
-            </a:pPr>
-            <a:r>
-              <a:rPr lang="en-US" b="1" dirty="0"/>
-              <a:t>What the model does with them</a:t>
-            </a:r>
-          </a:p>
-          <a:p>
-            <a:pPr>
-              <a:buFont typeface="Arial" panose="020B0604020202020204" pitchFamily="34" charset="0"/>
-              <a:buChar char="•"/>
-            </a:pPr>
-            <a:r>
-              <a:rPr lang="en-US" dirty="0"/>
-              <a:t> The model estimates how much animals </a:t>
-            </a:r>
-            <a:r>
-              <a:rPr lang="en-US" b="1" dirty="0"/>
-              <a:t>differ from each other on average</a:t>
-            </a:r>
-            <a:r>
-              <a:rPr lang="en-US" dirty="0"/>
-              <a:t>.</a:t>
-            </a:r>
-          </a:p>
-          <a:p>
-            <a:pPr>
-              <a:buFont typeface="Arial" panose="020B0604020202020204" pitchFamily="34" charset="0"/>
-              <a:buChar char="•"/>
-            </a:pPr>
-            <a:r>
-              <a:rPr lang="en-US" dirty="0"/>
-              <a:t> It adjusts treatment effects so they are not inflated by animal-to-animal variation.</a:t>
-            </a:r>
-          </a:p>
-          <a:p>
-            <a:pPr>
-              <a:buFont typeface="Arial" panose="020B0604020202020204" pitchFamily="34" charset="0"/>
-              <a:buChar char="•"/>
-            </a:pPr>
-            <a:r>
-              <a:rPr lang="en-US" dirty="0"/>
-              <a:t> The random effect acts like a </a:t>
-            </a:r>
-            <a:r>
-              <a:rPr lang="en-US" b="1" dirty="0"/>
-              <a:t>baseline correction</a:t>
-            </a:r>
-            <a:r>
-              <a:rPr lang="en-US" dirty="0"/>
-              <a:t> for each individual animal.</a:t>
-            </a:r>
-          </a:p>
-          <a:p>
-            <a:pPr>
-              <a:buNone/>
-            </a:pPr>
-            <a:endParaRPr lang="en-US" b="1" dirty="0"/>
-          </a:p>
-          <a:p>
-            <a:pPr>
-              <a:buNone/>
-            </a:pPr>
-            <a:r>
-              <a:rPr lang="en-US" b="1" dirty="0"/>
-              <a:t>Veterinary practice interpretation</a:t>
-            </a:r>
-          </a:p>
-          <a:p>
-            <a:pPr>
-              <a:buFont typeface="Arial" panose="020B0604020202020204" pitchFamily="34" charset="0"/>
-              <a:buChar char="•"/>
-            </a:pPr>
-            <a:r>
-              <a:rPr lang="en-US" dirty="0"/>
-              <a:t> If random-effect variance is large:</a:t>
-            </a:r>
-            <a:br>
-              <a:rPr lang="en-US" dirty="0"/>
-            </a:br>
-            <a:r>
-              <a:rPr lang="en-US" dirty="0"/>
-              <a:t> → animals in the trial vary a lot biologically.</a:t>
-            </a:r>
-          </a:p>
-          <a:p>
-            <a:pPr>
-              <a:buFont typeface="Arial" panose="020B0604020202020204" pitchFamily="34" charset="0"/>
-              <a:buChar char="•"/>
-            </a:pPr>
-            <a:r>
-              <a:rPr lang="en-US" dirty="0"/>
-              <a:t> If it's small:</a:t>
-            </a:r>
-            <a:br>
-              <a:rPr lang="en-US" dirty="0"/>
-            </a:br>
-            <a:r>
-              <a:rPr lang="en-US" dirty="0"/>
-              <a:t> → animals behave very similarly; group differences dominate.</a:t>
+            <a:r>
+              <a:rPr lang="en-US" dirty="0"/>
+              <a:t>NOTES on ANOVA</a:t>
             </a:r>
           </a:p>
         </p:txBody>
@@ -4056,7 +3832,7 @@
     </p:spTree>
     <p:extLst>
       <p:ext uri="{BB962C8B-B14F-4D97-AF65-F5344CB8AC3E}">
-        <p14:creationId xmlns:p14="http://schemas.microsoft.com/office/powerpoint/2010/main" val="2723014488"/>
+        <p14:creationId xmlns:p14="http://schemas.microsoft.com/office/powerpoint/2010/main" val="228436077"/>
       </p:ext>
     </p:extLst>
   </p:cSld>
@@ -4067,6 +3843,284 @@
 </file>
 
 <file path=ppt/slides/slide11.xml><?xml version="1.0" encoding="utf-8"?>
+<p:sld xmlns:a="http://schemas.openxmlformats.org/drawingml/2006/main" xmlns:r="http://schemas.openxmlformats.org/officeDocument/2006/relationships" xmlns:p="http://schemas.openxmlformats.org/presentationml/2006/main">
+  <p:cSld>
+    <p:spTree>
+      <p:nvGrpSpPr>
+        <p:cNvPr id="1" name="">
+          <a:extLst>
+            <a:ext uri="{FF2B5EF4-FFF2-40B4-BE49-F238E27FC236}">
+              <a16:creationId xmlns:a16="http://schemas.microsoft.com/office/drawing/2014/main" id="{127AF527-741A-55B0-6F97-2337B667D03B}"/>
+            </a:ext>
+          </a:extLst>
+        </p:cNvPr>
+        <p:cNvGrpSpPr/>
+        <p:nvPr/>
+      </p:nvGrpSpPr>
+      <p:grpSpPr>
+        <a:xfrm>
+          <a:off x="0" y="0"/>
+          <a:ext cx="0" cy="0"/>
+          <a:chOff x="0" y="0"/>
+          <a:chExt cx="0" cy="0"/>
+        </a:xfrm>
+      </p:grpSpPr>
+      <p:sp>
+        <p:nvSpPr>
+          <p:cNvPr id="2" name="Title 1">
+            <a:extLst>
+              <a:ext uri="{FF2B5EF4-FFF2-40B4-BE49-F238E27FC236}">
+                <a16:creationId xmlns:a16="http://schemas.microsoft.com/office/drawing/2014/main" id="{6FB597CA-0BDE-3054-8162-405E2FE21AE9}"/>
+              </a:ext>
+            </a:extLst>
+          </p:cNvPr>
+          <p:cNvSpPr>
+            <a:spLocks noGrp="1"/>
+          </p:cNvSpPr>
+          <p:nvPr>
+            <p:ph type="title"/>
+          </p:nvPr>
+        </p:nvSpPr>
+        <p:spPr/>
+        <p:txBody>
+          <a:bodyPr/>
+          <a:lstStyle/>
+          <a:p>
+            <a:r>
+              <a:rPr lang="en-US" dirty="0"/>
+              <a:t>NOTES on LM</a:t>
+            </a:r>
+          </a:p>
+        </p:txBody>
+      </p:sp>
+    </p:spTree>
+    <p:extLst>
+      <p:ext uri="{BB962C8B-B14F-4D97-AF65-F5344CB8AC3E}">
+        <p14:creationId xmlns:p14="http://schemas.microsoft.com/office/powerpoint/2010/main" val="3632641416"/>
+      </p:ext>
+    </p:extLst>
+  </p:cSld>
+  <p:clrMapOvr>
+    <a:masterClrMapping/>
+  </p:clrMapOvr>
+</p:sld>
+</file>
+
+<file path=ppt/slides/slide12.xml><?xml version="1.0" encoding="utf-8"?>
+<p:sld xmlns:a="http://schemas.openxmlformats.org/drawingml/2006/main" xmlns:r="http://schemas.openxmlformats.org/officeDocument/2006/relationships" xmlns:p="http://schemas.openxmlformats.org/presentationml/2006/main">
+  <p:cSld>
+    <p:spTree>
+      <p:nvGrpSpPr>
+        <p:cNvPr id="1" name="">
+          <a:extLst>
+            <a:ext uri="{FF2B5EF4-FFF2-40B4-BE49-F238E27FC236}">
+              <a16:creationId xmlns:a16="http://schemas.microsoft.com/office/drawing/2014/main" id="{379D9354-6C45-00D5-B7E6-7B345F75E753}"/>
+            </a:ext>
+          </a:extLst>
+        </p:cNvPr>
+        <p:cNvGrpSpPr/>
+        <p:nvPr/>
+      </p:nvGrpSpPr>
+      <p:grpSpPr>
+        <a:xfrm>
+          <a:off x="0" y="0"/>
+          <a:ext cx="0" cy="0"/>
+          <a:chOff x="0" y="0"/>
+          <a:chExt cx="0" cy="0"/>
+        </a:xfrm>
+      </p:grpSpPr>
+      <p:sp>
+        <p:nvSpPr>
+          <p:cNvPr id="3" name="TextBox 2">
+            <a:extLst>
+              <a:ext uri="{FF2B5EF4-FFF2-40B4-BE49-F238E27FC236}">
+                <a16:creationId xmlns:a16="http://schemas.microsoft.com/office/drawing/2014/main" id="{136D138D-C390-F9E6-2AC6-A07BC9CC0BCC}"/>
+              </a:ext>
+            </a:extLst>
+          </p:cNvPr>
+          <p:cNvSpPr txBox="1"/>
+          <p:nvPr/>
+        </p:nvSpPr>
+        <p:spPr>
+          <a:xfrm>
+            <a:off x="635876" y="117693"/>
+            <a:ext cx="8019393" cy="6186309"/>
+          </a:xfrm>
+          <a:prstGeom prst="rect">
+            <a:avLst/>
+          </a:prstGeom>
+          <a:noFill/>
+        </p:spPr>
+        <p:txBody>
+          <a:bodyPr wrap="square">
+            <a:spAutoFit/>
+          </a:bodyPr>
+          <a:lstStyle/>
+          <a:p>
+            <a:r>
+              <a:rPr lang="en-US" b="1" dirty="0"/>
+              <a:t>🐔 Understanding Model Diagnostics</a:t>
+            </a:r>
+          </a:p>
+          <a:p>
+            <a:endParaRPr lang="en-US" b="1" dirty="0"/>
+          </a:p>
+          <a:p>
+            <a:r>
+              <a:rPr lang="en-US" b="1" dirty="0"/>
+              <a:t>Residuals vs Fitted Plot</a:t>
+            </a:r>
+          </a:p>
+          <a:p>
+            <a:r>
+              <a:rPr lang="en-US" dirty="0"/>
+              <a:t>Shows how far the predictions are from the observed values</a:t>
+            </a:r>
+          </a:p>
+          <a:p>
+            <a:r>
+              <a:rPr lang="en-US" b="1" dirty="0"/>
+              <a:t>Good model:</a:t>
+            </a:r>
+            <a:r>
+              <a:rPr lang="en-US" dirty="0"/>
+              <a:t> points spread randomly around the horizontal line</a:t>
+            </a:r>
+          </a:p>
+          <a:p>
+            <a:r>
+              <a:rPr lang="en-US" b="1" dirty="0"/>
+              <a:t>Warning signs:</a:t>
+            </a:r>
+            <a:endParaRPr lang="en-US" dirty="0"/>
+          </a:p>
+          <a:p>
+            <a:pPr lvl="1"/>
+            <a:r>
+              <a:rPr lang="en-US" dirty="0"/>
+              <a:t>Curved pattern → model is missing something</a:t>
+            </a:r>
+          </a:p>
+          <a:p>
+            <a:pPr lvl="1"/>
+            <a:r>
+              <a:rPr lang="en-US" dirty="0"/>
+              <a:t>Funnel shape → variability is changing (heteroskedasticity)</a:t>
+            </a:r>
+          </a:p>
+          <a:p>
+            <a:pPr lvl="1"/>
+            <a:r>
+              <a:rPr lang="en-US" dirty="0"/>
+              <a:t>Outliers far away from the cloud → unusual animals or measurements</a:t>
+            </a:r>
+          </a:p>
+          <a:p>
+            <a:endParaRPr lang="en-US" b="1" dirty="0"/>
+          </a:p>
+          <a:p>
+            <a:r>
+              <a:rPr lang="en-US" b="1" dirty="0"/>
+              <a:t>Normal Q–Q Plot</a:t>
+            </a:r>
+          </a:p>
+          <a:p>
+            <a:r>
+              <a:rPr lang="en-US" dirty="0"/>
+              <a:t>Checks if the residuals follow a roughly normal distribution</a:t>
+            </a:r>
+          </a:p>
+          <a:p>
+            <a:r>
+              <a:rPr lang="en-US" b="1" dirty="0"/>
+              <a:t>Good model:</a:t>
+            </a:r>
+            <a:r>
+              <a:rPr lang="en-US" dirty="0"/>
+              <a:t> points fall close to the straight line</a:t>
+            </a:r>
+          </a:p>
+          <a:p>
+            <a:r>
+              <a:rPr lang="en-US" b="1" dirty="0"/>
+              <a:t>Warning signs:</a:t>
+            </a:r>
+            <a:endParaRPr lang="en-US" dirty="0"/>
+          </a:p>
+          <a:p>
+            <a:pPr lvl="1"/>
+            <a:r>
+              <a:rPr lang="en-US" dirty="0"/>
+              <a:t>Strong bends → skewed data</a:t>
+            </a:r>
+          </a:p>
+          <a:p>
+            <a:pPr lvl="1"/>
+            <a:r>
+              <a:rPr lang="en-US" dirty="0"/>
+              <a:t>Ends far away from the line → heavy tails or extreme values</a:t>
+            </a:r>
+          </a:p>
+          <a:p>
+            <a:pPr lvl="1"/>
+            <a:r>
+              <a:rPr lang="en-US" dirty="0"/>
+              <a:t>S-curve → treatment effects or transformations may be needed</a:t>
+            </a:r>
+          </a:p>
+          <a:p>
+            <a:endParaRPr lang="en-US" b="1" dirty="0"/>
+          </a:p>
+          <a:p>
+            <a:r>
+              <a:rPr lang="en-US" b="1" dirty="0"/>
+              <a:t>Notes</a:t>
+            </a:r>
+          </a:p>
+          <a:p>
+            <a:pPr marL="285750" indent="-285750">
+              <a:buFont typeface="Arial" panose="020B0604020202020204" pitchFamily="34" charset="0"/>
+              <a:buChar char="•"/>
+            </a:pPr>
+            <a:r>
+              <a:rPr lang="en-US" dirty="0"/>
+              <a:t>If both plots look roughly straight and even, the model is </a:t>
+            </a:r>
+            <a:r>
+              <a:rPr lang="en-US" b="1" dirty="0"/>
+              <a:t>trustworthy</a:t>
+            </a:r>
+            <a:r>
+              <a:rPr lang="en-US" dirty="0"/>
+              <a:t>.</a:t>
+            </a:r>
+          </a:p>
+          <a:p>
+            <a:pPr marL="285750" indent="-285750">
+              <a:buFont typeface="Arial" panose="020B0604020202020204" pitchFamily="34" charset="0"/>
+              <a:buChar char="•"/>
+            </a:pPr>
+            <a:r>
+              <a:rPr lang="en-US" dirty="0"/>
+              <a:t>Big deviations mean the model may need a tweak (e.g., transformation, different predictors, or a mixed model).</a:t>
+            </a:r>
+          </a:p>
+        </p:txBody>
+      </p:sp>
+    </p:spTree>
+    <p:extLst>
+      <p:ext uri="{BB962C8B-B14F-4D97-AF65-F5344CB8AC3E}">
+        <p14:creationId xmlns:p14="http://schemas.microsoft.com/office/powerpoint/2010/main" val="2351402579"/>
+      </p:ext>
+    </p:extLst>
+  </p:cSld>
+  <p:clrMapOvr>
+    <a:masterClrMapping/>
+  </p:clrMapOvr>
+</p:sld>
+</file>
+
+<file path=ppt/slides/slide13.xml><?xml version="1.0" encoding="utf-8"?>
 <p:sld xmlns:a="http://schemas.openxmlformats.org/drawingml/2006/main" xmlns:r="http://schemas.openxmlformats.org/officeDocument/2006/relationships" xmlns:p="http://schemas.openxmlformats.org/presentationml/2006/main">
   <p:cSld>
     <p:spTree>
@@ -4085,6 +4139,356 @@
       </p:grpSpPr>
       <p:sp>
         <p:nvSpPr>
+          <p:cNvPr id="2" name="Title 1">
+            <a:extLst>
+              <a:ext uri="{FF2B5EF4-FFF2-40B4-BE49-F238E27FC236}">
+                <a16:creationId xmlns:a16="http://schemas.microsoft.com/office/drawing/2014/main" id="{71348000-8DB4-EFA8-B151-AF1410B425FC}"/>
+              </a:ext>
+            </a:extLst>
+          </p:cNvPr>
+          <p:cNvSpPr>
+            <a:spLocks noGrp="1"/>
+          </p:cNvSpPr>
+          <p:nvPr>
+            <p:ph type="title"/>
+          </p:nvPr>
+        </p:nvSpPr>
+        <p:spPr/>
+        <p:txBody>
+          <a:bodyPr/>
+          <a:lstStyle/>
+          <a:p>
+            <a:r>
+              <a:rPr lang="en-US" dirty="0"/>
+              <a:t>NOTES on LMM</a:t>
+            </a:r>
+          </a:p>
+        </p:txBody>
+      </p:sp>
+    </p:spTree>
+    <p:extLst>
+      <p:ext uri="{BB962C8B-B14F-4D97-AF65-F5344CB8AC3E}">
+        <p14:creationId xmlns:p14="http://schemas.microsoft.com/office/powerpoint/2010/main" val="346991280"/>
+      </p:ext>
+    </p:extLst>
+  </p:cSld>
+  <p:clrMapOvr>
+    <a:masterClrMapping/>
+  </p:clrMapOvr>
+</p:sld>
+</file>
+
+<file path=ppt/slides/slide14.xml><?xml version="1.0" encoding="utf-8"?>
+<p:sld xmlns:a="http://schemas.openxmlformats.org/drawingml/2006/main" xmlns:r="http://schemas.openxmlformats.org/officeDocument/2006/relationships" xmlns:p="http://schemas.openxmlformats.org/presentationml/2006/main">
+  <p:cSld>
+    <p:spTree>
+      <p:nvGrpSpPr>
+        <p:cNvPr id="1" name=""/>
+        <p:cNvGrpSpPr/>
+        <p:nvPr/>
+      </p:nvGrpSpPr>
+      <p:grpSpPr>
+        <a:xfrm>
+          <a:off x="0" y="0"/>
+          <a:ext cx="0" cy="0"/>
+          <a:chOff x="0" y="0"/>
+          <a:chExt cx="0" cy="0"/>
+        </a:xfrm>
+      </p:grpSpPr>
+      <p:sp>
+        <p:nvSpPr>
+          <p:cNvPr id="3" name="TextBox 2">
+            <a:extLst>
+              <a:ext uri="{FF2B5EF4-FFF2-40B4-BE49-F238E27FC236}">
+                <a16:creationId xmlns:a16="http://schemas.microsoft.com/office/drawing/2014/main" id="{184EEA22-109C-8598-D181-3B420FE4ECED}"/>
+              </a:ext>
+            </a:extLst>
+          </p:cNvPr>
+          <p:cNvSpPr txBox="1"/>
+          <p:nvPr/>
+        </p:nvSpPr>
+        <p:spPr>
+          <a:xfrm>
+            <a:off x="635876" y="117693"/>
+            <a:ext cx="8019393" cy="6740307"/>
+          </a:xfrm>
+          <a:prstGeom prst="rect">
+            <a:avLst/>
+          </a:prstGeom>
+          <a:noFill/>
+        </p:spPr>
+        <p:txBody>
+          <a:bodyPr wrap="square">
+            <a:spAutoFit/>
+          </a:bodyPr>
+          <a:lstStyle/>
+          <a:p>
+            <a:pPr>
+              <a:buNone/>
+            </a:pPr>
+            <a:r>
+              <a:rPr lang="en-US" b="1" dirty="0"/>
+              <a:t>🐔 Random Effects</a:t>
+            </a:r>
+          </a:p>
+          <a:p>
+            <a:pPr>
+              <a:buNone/>
+            </a:pPr>
+            <a:endParaRPr lang="en-US" b="1" dirty="0"/>
+          </a:p>
+          <a:p>
+            <a:pPr>
+              <a:buNone/>
+            </a:pPr>
+            <a:r>
+              <a:rPr lang="en-US" b="1" dirty="0"/>
+              <a:t>What they represent</a:t>
+            </a:r>
+          </a:p>
+          <a:p>
+            <a:pPr>
+              <a:buFont typeface="Arial" panose="020B0604020202020204" pitchFamily="34" charset="0"/>
+              <a:buChar char="•"/>
+            </a:pPr>
+            <a:r>
+              <a:rPr lang="en-US" dirty="0"/>
+              <a:t> They capture </a:t>
+            </a:r>
+            <a:r>
+              <a:rPr lang="en-US" b="1" dirty="0"/>
+              <a:t>natural differences between individual animals</a:t>
+            </a:r>
+            <a:r>
+              <a:rPr lang="en-US" dirty="0"/>
+              <a:t>.</a:t>
+            </a:r>
+          </a:p>
+          <a:p>
+            <a:pPr>
+              <a:buFont typeface="Arial" panose="020B0604020202020204" pitchFamily="34" charset="0"/>
+              <a:buChar char="•"/>
+            </a:pPr>
+            <a:r>
+              <a:rPr lang="en-US" dirty="0"/>
+              <a:t> Every chicken has its own baseline weight or behavior.</a:t>
+            </a:r>
+          </a:p>
+          <a:p>
+            <a:pPr>
+              <a:buFont typeface="Arial" panose="020B0604020202020204" pitchFamily="34" charset="0"/>
+              <a:buChar char="•"/>
+            </a:pPr>
+            <a:r>
+              <a:rPr lang="en-US" dirty="0"/>
+              <a:t> Random effects allow the model to </a:t>
+            </a:r>
+            <a:r>
+              <a:rPr lang="en-US" b="1" dirty="0"/>
+              <a:t>give each animal its own starting level</a:t>
+            </a:r>
+            <a:r>
+              <a:rPr lang="en-US" dirty="0"/>
+              <a:t>, instead of forcing all animals to be identical.</a:t>
+            </a:r>
+          </a:p>
+          <a:p>
+            <a:pPr>
+              <a:buNone/>
+            </a:pPr>
+            <a:endParaRPr lang="en-US" b="1" dirty="0"/>
+          </a:p>
+          <a:p>
+            <a:pPr>
+              <a:buNone/>
+            </a:pPr>
+            <a:r>
+              <a:rPr lang="en-US" b="1" dirty="0"/>
+              <a:t>Why we need them</a:t>
+            </a:r>
+          </a:p>
+          <a:p>
+            <a:pPr>
+              <a:buFont typeface="Arial" panose="020B0604020202020204" pitchFamily="34" charset="0"/>
+              <a:buChar char="•"/>
+            </a:pPr>
+            <a:r>
+              <a:rPr lang="en-US" dirty="0"/>
+              <a:t> Animals in the same treatment group are </a:t>
+            </a:r>
+            <a:r>
+              <a:rPr lang="en-US" i="1" dirty="0"/>
+              <a:t>not</a:t>
+            </a:r>
+            <a:r>
+              <a:rPr lang="en-US" dirty="0"/>
+              <a:t> clones.</a:t>
+            </a:r>
+          </a:p>
+          <a:p>
+            <a:pPr>
+              <a:buFont typeface="Arial" panose="020B0604020202020204" pitchFamily="34" charset="0"/>
+              <a:buChar char="•"/>
+            </a:pPr>
+            <a:r>
+              <a:rPr lang="en-US" dirty="0"/>
+              <a:t> Some chickens naturally grow faster or slower, regardless of treatment.</a:t>
+            </a:r>
+          </a:p>
+          <a:p>
+            <a:pPr>
+              <a:buFont typeface="Arial" panose="020B0604020202020204" pitchFamily="34" charset="0"/>
+              <a:buChar char="•"/>
+            </a:pPr>
+            <a:r>
+              <a:rPr lang="en-US" dirty="0"/>
+              <a:t> Ignoring these differences makes the analysis less accurate, more biased and too optimistic about significance.</a:t>
+            </a:r>
+          </a:p>
+          <a:p>
+            <a:pPr>
+              <a:buNone/>
+            </a:pPr>
+            <a:endParaRPr lang="en-US" b="1" dirty="0"/>
+          </a:p>
+          <a:p>
+            <a:pPr>
+              <a:buNone/>
+            </a:pPr>
+            <a:r>
+              <a:rPr lang="en-US" b="1" dirty="0"/>
+              <a:t>What the model does with them</a:t>
+            </a:r>
+          </a:p>
+          <a:p>
+            <a:pPr>
+              <a:buFont typeface="Arial" panose="020B0604020202020204" pitchFamily="34" charset="0"/>
+              <a:buChar char="•"/>
+            </a:pPr>
+            <a:r>
+              <a:rPr lang="en-US" dirty="0"/>
+              <a:t> The model estimates how much animals </a:t>
+            </a:r>
+            <a:r>
+              <a:rPr lang="en-US" b="1" dirty="0"/>
+              <a:t>differ from each other on average</a:t>
+            </a:r>
+            <a:r>
+              <a:rPr lang="en-US" dirty="0"/>
+              <a:t>.</a:t>
+            </a:r>
+          </a:p>
+          <a:p>
+            <a:pPr>
+              <a:buFont typeface="Arial" panose="020B0604020202020204" pitchFamily="34" charset="0"/>
+              <a:buChar char="•"/>
+            </a:pPr>
+            <a:r>
+              <a:rPr lang="en-US" dirty="0"/>
+              <a:t> It adjusts treatment effects so they are not inflated by animal-to-animal variation.</a:t>
+            </a:r>
+          </a:p>
+          <a:p>
+            <a:pPr>
+              <a:buFont typeface="Arial" panose="020B0604020202020204" pitchFamily="34" charset="0"/>
+              <a:buChar char="•"/>
+            </a:pPr>
+            <a:r>
+              <a:rPr lang="en-US" dirty="0"/>
+              <a:t> The random effect acts like a </a:t>
+            </a:r>
+            <a:r>
+              <a:rPr lang="en-US" b="1" dirty="0"/>
+              <a:t>baseline correction</a:t>
+            </a:r>
+            <a:r>
+              <a:rPr lang="en-US" dirty="0"/>
+              <a:t> for each individual animal.</a:t>
+            </a:r>
+          </a:p>
+          <a:p>
+            <a:pPr>
+              <a:buNone/>
+            </a:pPr>
+            <a:endParaRPr lang="en-US" b="1" dirty="0"/>
+          </a:p>
+          <a:p>
+            <a:pPr>
+              <a:buNone/>
+            </a:pPr>
+            <a:r>
+              <a:rPr lang="en-US" b="1" dirty="0"/>
+              <a:t>Veterinary practice interpretation</a:t>
+            </a:r>
+          </a:p>
+          <a:p>
+            <a:pPr>
+              <a:buFont typeface="Arial" panose="020B0604020202020204" pitchFamily="34" charset="0"/>
+              <a:buChar char="•"/>
+            </a:pPr>
+            <a:r>
+              <a:rPr lang="en-US" dirty="0"/>
+              <a:t> If random-effect variance is large:</a:t>
+            </a:r>
+            <a:br>
+              <a:rPr lang="en-US" dirty="0"/>
+            </a:br>
+            <a:r>
+              <a:rPr lang="en-US" dirty="0"/>
+              <a:t> → animals in the trial vary a lot biologically.</a:t>
+            </a:r>
+          </a:p>
+          <a:p>
+            <a:pPr>
+              <a:buFont typeface="Arial" panose="020B0604020202020204" pitchFamily="34" charset="0"/>
+              <a:buChar char="•"/>
+            </a:pPr>
+            <a:r>
+              <a:rPr lang="en-US" dirty="0"/>
+              <a:t> If it's small:</a:t>
+            </a:r>
+            <a:br>
+              <a:rPr lang="en-US" dirty="0"/>
+            </a:br>
+            <a:r>
+              <a:rPr lang="en-US" dirty="0"/>
+              <a:t> → animals behave very similarly; group differences dominate.</a:t>
+            </a:r>
+          </a:p>
+        </p:txBody>
+      </p:sp>
+    </p:spTree>
+    <p:extLst>
+      <p:ext uri="{BB962C8B-B14F-4D97-AF65-F5344CB8AC3E}">
+        <p14:creationId xmlns:p14="http://schemas.microsoft.com/office/powerpoint/2010/main" val="2723014488"/>
+      </p:ext>
+    </p:extLst>
+  </p:cSld>
+  <p:clrMapOvr>
+    <a:masterClrMapping/>
+  </p:clrMapOvr>
+</p:sld>
+</file>
+
+<file path=ppt/slides/slide15.xml><?xml version="1.0" encoding="utf-8"?>
+<p:sld xmlns:a="http://schemas.openxmlformats.org/drawingml/2006/main" xmlns:r="http://schemas.openxmlformats.org/officeDocument/2006/relationships" xmlns:p="http://schemas.openxmlformats.org/presentationml/2006/main">
+  <p:cSld>
+    <p:spTree>
+      <p:nvGrpSpPr>
+        <p:cNvPr id="1" name=""/>
+        <p:cNvGrpSpPr/>
+        <p:nvPr/>
+      </p:nvGrpSpPr>
+      <p:grpSpPr>
+        <a:xfrm>
+          <a:off x="0" y="0"/>
+          <a:ext cx="0" cy="0"/>
+          <a:chOff x="0" y="0"/>
+          <a:chExt cx="0" cy="0"/>
+        </a:xfrm>
+      </p:grpSpPr>
+      <p:sp>
+        <p:nvSpPr>
           <p:cNvPr id="3" name="TextBox 2">
             <a:extLst>
               <a:ext uri="{FF2B5EF4-FFF2-40B4-BE49-F238E27FC236}">
@@ -4309,7 +4713,7 @@
 </p:sld>
 </file>
 
-<file path=ppt/slides/slide12.xml><?xml version="1.0" encoding="utf-8"?>
+<file path=ppt/slides/slide16.xml><?xml version="1.0" encoding="utf-8"?>
 <p:sld xmlns:a="http://schemas.openxmlformats.org/drawingml/2006/main" xmlns:r="http://schemas.openxmlformats.org/officeDocument/2006/relationships" xmlns:p="http://schemas.openxmlformats.org/presentationml/2006/main">
   <p:cSld>
     <p:spTree>
@@ -4373,7 +4777,7 @@
 </p:sld>
 </file>
 
-<file path=ppt/slides/slide13.xml><?xml version="1.0" encoding="utf-8"?>
+<file path=ppt/slides/slide17.xml><?xml version="1.0" encoding="utf-8"?>
 <p:sld xmlns:a="http://schemas.openxmlformats.org/drawingml/2006/main" xmlns:r="http://schemas.openxmlformats.org/officeDocument/2006/relationships" xmlns:p="http://schemas.openxmlformats.org/presentationml/2006/main">
   <p:cSld>
     <p:spTree>
@@ -7546,6 +7950,44 @@
           </a:prstGeom>
         </p:spPr>
       </p:pic>
+      <p:sp>
+        <p:nvSpPr>
+          <p:cNvPr id="5" name="TextBox 4">
+            <a:extLst>
+              <a:ext uri="{FF2B5EF4-FFF2-40B4-BE49-F238E27FC236}">
+                <a16:creationId xmlns:a16="http://schemas.microsoft.com/office/drawing/2014/main" id="{471891F4-7442-C642-A4F9-E1D264E8EFA4}"/>
+              </a:ext>
+            </a:extLst>
+          </p:cNvPr>
+          <p:cNvSpPr txBox="1"/>
+          <p:nvPr/>
+        </p:nvSpPr>
+        <p:spPr>
+          <a:xfrm>
+            <a:off x="685800" y="241002"/>
+            <a:ext cx="4572000" cy="369332"/>
+          </a:xfrm>
+          <a:prstGeom prst="rect">
+            <a:avLst/>
+          </a:prstGeom>
+          <a:noFill/>
+        </p:spPr>
+        <p:txBody>
+          <a:bodyPr wrap="square">
+            <a:spAutoFit/>
+          </a:bodyPr>
+          <a:lstStyle/>
+          <a:p>
+            <a:pPr>
+              <a:buNone/>
+            </a:pPr>
+            <a:r>
+              <a:rPr lang="en-US" b="1" dirty="0"/>
+              <a:t>🐔 Examples for different data distributions</a:t>
+            </a:r>
+          </a:p>
+        </p:txBody>
+      </p:sp>
     </p:spTree>
     <p:extLst>
       <p:ext uri="{BB962C8B-B14F-4D97-AF65-F5344CB8AC3E}">
@@ -7857,7 +8299,13 @@
   <p:cSld>
     <p:spTree>
       <p:nvGrpSpPr>
-        <p:cNvPr id="1" name=""/>
+        <p:cNvPr id="1" name="">
+          <a:extLst>
+            <a:ext uri="{FF2B5EF4-FFF2-40B4-BE49-F238E27FC236}">
+              <a16:creationId xmlns:a16="http://schemas.microsoft.com/office/drawing/2014/main" id="{DD8425F9-559C-0F6B-725C-194ECB063053}"/>
+            </a:ext>
+          </a:extLst>
+        </p:cNvPr>
         <p:cNvGrpSpPr/>
         <p:nvPr/>
       </p:nvGrpSpPr>
@@ -7871,28 +8319,232 @@
       </p:grpSpPr>
       <p:sp>
         <p:nvSpPr>
-          <p:cNvPr id="2" name="Title 1">
+          <p:cNvPr id="3" name="TextBox 2">
             <a:extLst>
               <a:ext uri="{FF2B5EF4-FFF2-40B4-BE49-F238E27FC236}">
-                <a16:creationId xmlns:a16="http://schemas.microsoft.com/office/drawing/2014/main" id="{71348000-8DB4-EFA8-B151-AF1410B425FC}"/>
+                <a16:creationId xmlns:a16="http://schemas.microsoft.com/office/drawing/2014/main" id="{19058F75-3AB2-8557-E484-EF2D859A2E13}"/>
               </a:ext>
             </a:extLst>
           </p:cNvPr>
-          <p:cNvSpPr>
-            <a:spLocks noGrp="1"/>
-          </p:cNvSpPr>
-          <p:nvPr>
-            <p:ph type="title"/>
-          </p:nvPr>
-        </p:nvSpPr>
-        <p:spPr/>
-        <p:txBody>
-          <a:bodyPr/>
+          <p:cNvSpPr txBox="1"/>
+          <p:nvPr/>
+        </p:nvSpPr>
+        <p:spPr>
+          <a:xfrm>
+            <a:off x="331075" y="565291"/>
+            <a:ext cx="8481849" cy="5078313"/>
+          </a:xfrm>
+          <a:prstGeom prst="rect">
+            <a:avLst/>
+          </a:prstGeom>
+          <a:noFill/>
+        </p:spPr>
+        <p:txBody>
+          <a:bodyPr wrap="square">
+            <a:spAutoFit/>
+          </a:bodyPr>
           <a:lstStyle/>
           <a:p>
-            <a:r>
-              <a:rPr lang="en-US" dirty="0"/>
-              <a:t>NOTES on LMM</a:t>
+            <a:pPr>
+              <a:buNone/>
+            </a:pPr>
+            <a:r>
+              <a:rPr lang="en-US" b="1" dirty="0"/>
+              <a:t>🐔 Understanding Skewness and Kurtosis</a:t>
+            </a:r>
+          </a:p>
+          <a:p>
+            <a:pPr>
+              <a:buNone/>
+            </a:pPr>
+            <a:endParaRPr lang="en-US" b="1" dirty="0"/>
+          </a:p>
+          <a:p>
+            <a:pPr>
+              <a:buNone/>
+            </a:pPr>
+            <a:r>
+              <a:rPr lang="en-US" b="1" dirty="0"/>
+              <a:t>Skewness (asymmetry of the data)</a:t>
+            </a:r>
+          </a:p>
+          <a:p>
+            <a:pPr>
+              <a:buFont typeface="Arial" panose="020B0604020202020204" pitchFamily="34" charset="0"/>
+              <a:buChar char="•"/>
+            </a:pPr>
+            <a:r>
+              <a:rPr lang="en-US" b="1" dirty="0"/>
+              <a:t> Zero skewness:</a:t>
+            </a:r>
+            <a:r>
+              <a:rPr lang="en-US" dirty="0"/>
+              <a:t> data is symmetric (classic bell shape)</a:t>
+            </a:r>
+          </a:p>
+          <a:p>
+            <a:pPr>
+              <a:buFont typeface="Arial" panose="020B0604020202020204" pitchFamily="34" charset="0"/>
+              <a:buChar char="•"/>
+            </a:pPr>
+            <a:r>
+              <a:rPr lang="en-US" b="1" dirty="0"/>
+              <a:t> Positive skewness:</a:t>
+            </a:r>
+            <a:r>
+              <a:rPr lang="en-US" dirty="0"/>
+              <a:t> long tail to the </a:t>
+            </a:r>
+            <a:r>
+              <a:rPr lang="en-US" b="1" dirty="0"/>
+              <a:t>right</a:t>
+            </a:r>
+            <a:endParaRPr lang="en-US" dirty="0"/>
+          </a:p>
+          <a:p>
+            <a:pPr marL="742950" lvl="1" indent="-285750">
+              <a:buFont typeface="Arial" panose="020B0604020202020204" pitchFamily="34" charset="0"/>
+              <a:buChar char="•"/>
+            </a:pPr>
+            <a:r>
+              <a:rPr lang="en-US" dirty="0"/>
+              <a:t>Many animals have low values, few have very high ones</a:t>
+            </a:r>
+          </a:p>
+          <a:p>
+            <a:pPr marL="742950" lvl="1" indent="-285750">
+              <a:buFont typeface="Arial" panose="020B0604020202020204" pitchFamily="34" charset="0"/>
+              <a:buChar char="•"/>
+            </a:pPr>
+            <a:r>
+              <a:rPr lang="en-US" dirty="0"/>
+              <a:t>Common for hormones, parasites, biomarkers</a:t>
+            </a:r>
+          </a:p>
+          <a:p>
+            <a:pPr>
+              <a:buFont typeface="Arial" panose="020B0604020202020204" pitchFamily="34" charset="0"/>
+              <a:buChar char="•"/>
+            </a:pPr>
+            <a:r>
+              <a:rPr lang="en-US" b="1" dirty="0"/>
+              <a:t> Negative skewness:</a:t>
+            </a:r>
+            <a:r>
+              <a:rPr lang="en-US" dirty="0"/>
+              <a:t> long tail to the </a:t>
+            </a:r>
+            <a:r>
+              <a:rPr lang="en-US" b="1" dirty="0"/>
+              <a:t>left</a:t>
+            </a:r>
+            <a:endParaRPr lang="en-US" dirty="0"/>
+          </a:p>
+          <a:p>
+            <a:pPr marL="742950" lvl="1" indent="-285750">
+              <a:buFont typeface="Arial" panose="020B0604020202020204" pitchFamily="34" charset="0"/>
+              <a:buChar char="•"/>
+            </a:pPr>
+            <a:r>
+              <a:rPr lang="en-US" dirty="0"/>
+              <a:t>Many high values, few low ones</a:t>
+            </a:r>
+          </a:p>
+          <a:p>
+            <a:pPr marL="742950" lvl="1" indent="-285750">
+              <a:buFont typeface="Arial" panose="020B0604020202020204" pitchFamily="34" charset="0"/>
+              <a:buChar char="•"/>
+            </a:pPr>
+            <a:r>
+              <a:rPr lang="en-US" dirty="0"/>
+              <a:t>Less common but possible in clinical measurements</a:t>
+            </a:r>
+          </a:p>
+          <a:p>
+            <a:pPr>
+              <a:buNone/>
+            </a:pPr>
+            <a:endParaRPr lang="en-US" dirty="0"/>
+          </a:p>
+          <a:p>
+            <a:pPr>
+              <a:buNone/>
+            </a:pPr>
+            <a:r>
+              <a:rPr lang="en-US" b="1" dirty="0"/>
+              <a:t>Kurtosis (heaviness of the tails)</a:t>
+            </a:r>
+          </a:p>
+          <a:p>
+            <a:pPr>
+              <a:buFont typeface="Arial" panose="020B0604020202020204" pitchFamily="34" charset="0"/>
+              <a:buChar char="•"/>
+            </a:pPr>
+            <a:r>
+              <a:rPr lang="en-US" b="1" dirty="0"/>
+              <a:t> Normal kurtosis = 3</a:t>
+            </a:r>
+            <a:r>
+              <a:rPr lang="en-US" dirty="0"/>
+              <a:t> (baseline)</a:t>
+            </a:r>
+          </a:p>
+          <a:p>
+            <a:pPr>
+              <a:buFont typeface="Arial" panose="020B0604020202020204" pitchFamily="34" charset="0"/>
+              <a:buChar char="•"/>
+            </a:pPr>
+            <a:r>
+              <a:rPr lang="en-US" b="1" dirty="0"/>
+              <a:t> High kurtosis (&gt; 3):</a:t>
+            </a:r>
+            <a:r>
+              <a:rPr lang="en-US" dirty="0"/>
+              <a:t> heavier tails, more extreme animals</a:t>
+            </a:r>
+          </a:p>
+          <a:p>
+            <a:pPr marL="742950" lvl="1" indent="-285750">
+              <a:buFont typeface="Arial" panose="020B0604020202020204" pitchFamily="34" charset="0"/>
+              <a:buChar char="•"/>
+            </a:pPr>
+            <a:r>
+              <a:rPr lang="en-US" dirty="0"/>
+              <a:t>Greater chance of outliers</a:t>
+            </a:r>
+          </a:p>
+          <a:p>
+            <a:pPr marL="742950" lvl="1" indent="-285750">
+              <a:buFont typeface="Arial" panose="020B0604020202020204" pitchFamily="34" charset="0"/>
+              <a:buChar char="•"/>
+            </a:pPr>
+            <a:r>
+              <a:rPr lang="en-US" dirty="0"/>
+              <a:t>Typical in disease indicators or stress markers</a:t>
+            </a:r>
+          </a:p>
+          <a:p>
+            <a:pPr>
+              <a:buFont typeface="Arial" panose="020B0604020202020204" pitchFamily="34" charset="0"/>
+              <a:buChar char="•"/>
+            </a:pPr>
+            <a:r>
+              <a:rPr lang="en-US" b="1" dirty="0"/>
+              <a:t> Low kurtosis (&lt; 3):</a:t>
+            </a:r>
+            <a:r>
+              <a:rPr lang="en-US" dirty="0"/>
+              <a:t> lighter tails, fewer outliers</a:t>
+            </a:r>
+          </a:p>
+          <a:p>
+            <a:pPr marL="742950" lvl="1" indent="-285750">
+              <a:buFont typeface="Arial" panose="020B0604020202020204" pitchFamily="34" charset="0"/>
+              <a:buChar char="•"/>
+            </a:pPr>
+            <a:r>
+              <a:rPr lang="en-US" dirty="0"/>
+              <a:t>Animals cluster tightly around the average</a:t>
             </a:r>
           </a:p>
         </p:txBody>
@@ -7900,7 +8552,7 @@
     </p:spTree>
     <p:extLst>
       <p:ext uri="{BB962C8B-B14F-4D97-AF65-F5344CB8AC3E}">
-        <p14:creationId xmlns:p14="http://schemas.microsoft.com/office/powerpoint/2010/main" val="346991280"/>
+        <p14:creationId xmlns:p14="http://schemas.microsoft.com/office/powerpoint/2010/main" val="590827808"/>
       </p:ext>
     </p:extLst>
   </p:cSld>

</xml_diff>

<commit_message>
improved model output number formatting
</commit_message>
<xml_diff>
--- a/presentations/Table_Analyzer_Overview.pptx
+++ b/presentations/Table_Analyzer_Overview.pptx
@@ -5,7 +5,7 @@
     <p:sldMasterId id="2147483648" r:id="rId1"/>
   </p:sldMasterIdLst>
   <p:notesMasterIdLst>
-    <p:notesMasterId r:id="rId20"/>
+    <p:notesMasterId r:id="rId22"/>
   </p:notesMasterIdLst>
   <p:sldIdLst>
     <p:sldId id="256" r:id="rId2"/>
@@ -18,14 +18,16 @@
     <p:sldId id="269" r:id="rId9"/>
     <p:sldId id="274" r:id="rId10"/>
     <p:sldId id="275" r:id="rId11"/>
-    <p:sldId id="276" r:id="rId12"/>
-    <p:sldId id="272" r:id="rId13"/>
-    <p:sldId id="273" r:id="rId14"/>
-    <p:sldId id="262" r:id="rId15"/>
-    <p:sldId id="259" r:id="rId16"/>
-    <p:sldId id="260" r:id="rId17"/>
-    <p:sldId id="263" r:id="rId18"/>
-    <p:sldId id="265" r:id="rId19"/>
+    <p:sldId id="277" r:id="rId12"/>
+    <p:sldId id="276" r:id="rId13"/>
+    <p:sldId id="272" r:id="rId14"/>
+    <p:sldId id="273" r:id="rId15"/>
+    <p:sldId id="278" r:id="rId16"/>
+    <p:sldId id="262" r:id="rId17"/>
+    <p:sldId id="259" r:id="rId18"/>
+    <p:sldId id="260" r:id="rId19"/>
+    <p:sldId id="263" r:id="rId20"/>
+    <p:sldId id="265" r:id="rId21"/>
   </p:sldIdLst>
   <p:sldSz cx="9144000" cy="6858000" type="screen4x3"/>
   <p:notesSz cx="6858000" cy="9144000"/>
@@ -225,7 +227,7 @@
           <a:p>
             <a:fld id="{404C4D2F-30A8-1C43-8374-9D9D8BF63153}" type="datetimeFigureOut">
               <a:rPr lang="en-US" smtClean="0"/>
-              <a:t>11/24/25</a:t>
+              <a:t>11/27/25</a:t>
             </a:fld>
             <a:endParaRPr lang="en-US"/>
           </a:p>
@@ -576,6 +578,90 @@
 </p:notes>
 </file>
 
+<file path=ppt/notesSlides/notesSlide2.xml><?xml version="1.0" encoding="utf-8"?>
+<p:notes xmlns:a="http://schemas.openxmlformats.org/drawingml/2006/main" xmlns:r="http://schemas.openxmlformats.org/officeDocument/2006/relationships" xmlns:p="http://schemas.openxmlformats.org/presentationml/2006/main">
+  <p:cSld>
+    <p:spTree>
+      <p:nvGrpSpPr>
+        <p:cNvPr id="1" name=""/>
+        <p:cNvGrpSpPr/>
+        <p:nvPr/>
+      </p:nvGrpSpPr>
+      <p:grpSpPr>
+        <a:xfrm>
+          <a:off x="0" y="0"/>
+          <a:ext cx="0" cy="0"/>
+          <a:chOff x="0" y="0"/>
+          <a:chExt cx="0" cy="0"/>
+        </a:xfrm>
+      </p:grpSpPr>
+      <p:sp>
+        <p:nvSpPr>
+          <p:cNvPr id="2" name="Slide Image Placeholder 1"/>
+          <p:cNvSpPr>
+            <a:spLocks noGrp="1" noRot="1" noChangeAspect="1"/>
+          </p:cNvSpPr>
+          <p:nvPr>
+            <p:ph type="sldImg"/>
+          </p:nvPr>
+        </p:nvSpPr>
+        <p:spPr/>
+      </p:sp>
+      <p:sp>
+        <p:nvSpPr>
+          <p:cNvPr id="3" name="Notes Placeholder 2"/>
+          <p:cNvSpPr>
+            <a:spLocks noGrp="1"/>
+          </p:cNvSpPr>
+          <p:nvPr>
+            <p:ph type="body" idx="1"/>
+          </p:nvPr>
+        </p:nvSpPr>
+        <p:spPr/>
+        <p:txBody>
+          <a:bodyPr/>
+          <a:lstStyle/>
+          <a:p>
+            <a:endParaRPr lang="en-US" dirty="0"/>
+          </a:p>
+        </p:txBody>
+      </p:sp>
+      <p:sp>
+        <p:nvSpPr>
+          <p:cNvPr id="4" name="Slide Number Placeholder 3"/>
+          <p:cNvSpPr>
+            <a:spLocks noGrp="1"/>
+          </p:cNvSpPr>
+          <p:nvPr>
+            <p:ph type="sldNum" sz="quarter" idx="5"/>
+          </p:nvPr>
+        </p:nvSpPr>
+        <p:spPr/>
+        <p:txBody>
+          <a:bodyPr/>
+          <a:lstStyle/>
+          <a:p>
+            <a:fld id="{3B911241-7DC5-2249-8C77-6E6B4E462127}" type="slidenum">
+              <a:rPr lang="en-US" smtClean="0"/>
+              <a:t>15</a:t>
+            </a:fld>
+            <a:endParaRPr lang="en-US"/>
+          </a:p>
+        </p:txBody>
+      </p:sp>
+    </p:spTree>
+    <p:extLst>
+      <p:ext uri="{BB962C8B-B14F-4D97-AF65-F5344CB8AC3E}">
+        <p14:creationId xmlns:p14="http://schemas.microsoft.com/office/powerpoint/2010/main" val="2890168472"/>
+      </p:ext>
+    </p:extLst>
+  </p:cSld>
+  <p:clrMapOvr>
+    <a:masterClrMapping/>
+  </p:clrMapOvr>
+</p:notes>
+</file>
+
 <file path=ppt/slideLayouts/slideLayout1.xml><?xml version="1.0" encoding="utf-8"?>
 <p:sldLayout xmlns:a="http://schemas.openxmlformats.org/drawingml/2006/main" xmlns:r="http://schemas.openxmlformats.org/officeDocument/2006/relationships" xmlns:p="http://schemas.openxmlformats.org/presentationml/2006/main" type="title" preserve="1">
   <p:cSld name="Title Slide">
@@ -755,7 +841,7 @@
           <a:p>
             <a:fld id="{5BCAD085-E8A6-8845-BD4E-CB4CCA059FC4}" type="datetimeFigureOut">
               <a:rPr lang="en-US" smtClean="0"/>
-              <a:t>11/24/25</a:t>
+              <a:t>11/27/25</a:t>
             </a:fld>
             <a:endParaRPr lang="en-US"/>
           </a:p>
@@ -923,7 +1009,7 @@
           <a:p>
             <a:fld id="{5BCAD085-E8A6-8845-BD4E-CB4CCA059FC4}" type="datetimeFigureOut">
               <a:rPr lang="en-US" smtClean="0"/>
-              <a:t>11/24/25</a:t>
+              <a:t>11/27/25</a:t>
             </a:fld>
             <a:endParaRPr lang="en-US"/>
           </a:p>
@@ -1101,7 +1187,7 @@
           <a:p>
             <a:fld id="{5BCAD085-E8A6-8845-BD4E-CB4CCA059FC4}" type="datetimeFigureOut">
               <a:rPr lang="en-US" smtClean="0"/>
-              <a:t>11/24/25</a:t>
+              <a:t>11/27/25</a:t>
             </a:fld>
             <a:endParaRPr lang="en-US"/>
           </a:p>
@@ -1269,7 +1355,7 @@
           <a:p>
             <a:fld id="{5BCAD085-E8A6-8845-BD4E-CB4CCA059FC4}" type="datetimeFigureOut">
               <a:rPr lang="en-US" smtClean="0"/>
-              <a:t>11/24/25</a:t>
+              <a:t>11/27/25</a:t>
             </a:fld>
             <a:endParaRPr lang="en-US"/>
           </a:p>
@@ -1514,7 +1600,7 @@
           <a:p>
             <a:fld id="{5BCAD085-E8A6-8845-BD4E-CB4CCA059FC4}" type="datetimeFigureOut">
               <a:rPr lang="en-US" smtClean="0"/>
-              <a:t>11/24/25</a:t>
+              <a:t>11/27/25</a:t>
             </a:fld>
             <a:endParaRPr lang="en-US"/>
           </a:p>
@@ -1799,7 +1885,7 @@
           <a:p>
             <a:fld id="{5BCAD085-E8A6-8845-BD4E-CB4CCA059FC4}" type="datetimeFigureOut">
               <a:rPr lang="en-US" smtClean="0"/>
-              <a:t>11/24/25</a:t>
+              <a:t>11/27/25</a:t>
             </a:fld>
             <a:endParaRPr lang="en-US"/>
           </a:p>
@@ -2218,7 +2304,7 @@
           <a:p>
             <a:fld id="{5BCAD085-E8A6-8845-BD4E-CB4CCA059FC4}" type="datetimeFigureOut">
               <a:rPr lang="en-US" smtClean="0"/>
-              <a:t>11/24/25</a:t>
+              <a:t>11/27/25</a:t>
             </a:fld>
             <a:endParaRPr lang="en-US"/>
           </a:p>
@@ -2335,7 +2421,7 @@
           <a:p>
             <a:fld id="{5BCAD085-E8A6-8845-BD4E-CB4CCA059FC4}" type="datetimeFigureOut">
               <a:rPr lang="en-US" smtClean="0"/>
-              <a:t>11/24/25</a:t>
+              <a:t>11/27/25</a:t>
             </a:fld>
             <a:endParaRPr lang="en-US"/>
           </a:p>
@@ -2430,7 +2516,7 @@
           <a:p>
             <a:fld id="{5BCAD085-E8A6-8845-BD4E-CB4CCA059FC4}" type="datetimeFigureOut">
               <a:rPr lang="en-US" smtClean="0"/>
-              <a:t>11/24/25</a:t>
+              <a:t>11/27/25</a:t>
             </a:fld>
             <a:endParaRPr lang="en-US"/>
           </a:p>
@@ -2705,7 +2791,7 @@
           <a:p>
             <a:fld id="{5BCAD085-E8A6-8845-BD4E-CB4CCA059FC4}" type="datetimeFigureOut">
               <a:rPr lang="en-US" smtClean="0"/>
-              <a:t>11/24/25</a:t>
+              <a:t>11/27/25</a:t>
             </a:fld>
             <a:endParaRPr lang="en-US"/>
           </a:p>
@@ -2957,7 +3043,7 @@
           <a:p>
             <a:fld id="{5BCAD085-E8A6-8845-BD4E-CB4CCA059FC4}" type="datetimeFigureOut">
               <a:rPr lang="en-US" smtClean="0"/>
-              <a:t>11/24/25</a:t>
+              <a:t>11/27/25</a:t>
             </a:fld>
             <a:endParaRPr lang="en-US"/>
           </a:p>
@@ -3180,7 +3266,7 @@
           <a:p>
             <a:fld id="{5BCAD085-E8A6-8845-BD4E-CB4CCA059FC4}" type="datetimeFigureOut">
               <a:rPr lang="en-US" smtClean="0"/>
-              <a:t>11/24/25</a:t>
+              <a:t>11/27/25</a:t>
             </a:fld>
             <a:endParaRPr lang="en-US"/>
           </a:p>
@@ -3848,6 +3934,283 @@
   <p:cSld>
     <p:spTree>
       <p:nvGrpSpPr>
+        <p:cNvPr id="1" name="">
+          <a:extLst>
+            <a:ext uri="{FF2B5EF4-FFF2-40B4-BE49-F238E27FC236}">
+              <a16:creationId xmlns:a16="http://schemas.microsoft.com/office/drawing/2014/main" id="{4739A113-0BEE-FBEB-17DE-E00F202C74AB}"/>
+            </a:ext>
+          </a:extLst>
+        </p:cNvPr>
+        <p:cNvGrpSpPr/>
+        <p:nvPr/>
+      </p:nvGrpSpPr>
+      <p:grpSpPr>
+        <a:xfrm>
+          <a:off x="0" y="0"/>
+          <a:ext cx="0" cy="0"/>
+          <a:chOff x="0" y="0"/>
+          <a:chExt cx="0" cy="0"/>
+        </a:xfrm>
+      </p:grpSpPr>
+      <p:sp>
+        <p:nvSpPr>
+          <p:cNvPr id="4" name="TextBox 3">
+            <a:extLst>
+              <a:ext uri="{FF2B5EF4-FFF2-40B4-BE49-F238E27FC236}">
+                <a16:creationId xmlns:a16="http://schemas.microsoft.com/office/drawing/2014/main" id="{BF2759BD-FF1B-0C4C-94A4-E527F66FE7C4}"/>
+              </a:ext>
+            </a:extLst>
+          </p:cNvPr>
+          <p:cNvSpPr txBox="1"/>
+          <p:nvPr/>
+        </p:nvSpPr>
+        <p:spPr>
+          <a:xfrm>
+            <a:off x="105104" y="249475"/>
+            <a:ext cx="9038896" cy="5078313"/>
+          </a:xfrm>
+          <a:prstGeom prst="rect">
+            <a:avLst/>
+          </a:prstGeom>
+          <a:noFill/>
+        </p:spPr>
+        <p:txBody>
+          <a:bodyPr wrap="square">
+            <a:spAutoFit/>
+          </a:bodyPr>
+          <a:lstStyle/>
+          <a:p>
+            <a:pPr>
+              <a:buNone/>
+            </a:pPr>
+            <a:r>
+              <a:rPr lang="en-US" b="1" dirty="0"/>
+              <a:t>🐔 What the Type III ANOVA Table Shows</a:t>
+            </a:r>
+          </a:p>
+          <a:p>
+            <a:pPr>
+              <a:buNone/>
+            </a:pPr>
+            <a:endParaRPr lang="en-US" b="1" dirty="0"/>
+          </a:p>
+          <a:p>
+            <a:pPr>
+              <a:buNone/>
+            </a:pPr>
+            <a:r>
+              <a:rPr lang="en-US" b="1" dirty="0"/>
+              <a:t>What it is</a:t>
+            </a:r>
+          </a:p>
+          <a:p>
+            <a:pPr>
+              <a:buFont typeface="Arial" panose="020B0604020202020204" pitchFamily="34" charset="0"/>
+              <a:buChar char="•"/>
+            </a:pPr>
+            <a:r>
+              <a:rPr lang="en-US" dirty="0"/>
+              <a:t> A table that tests whether each factor in the model has an </a:t>
+            </a:r>
+            <a:r>
+              <a:rPr lang="en-US" b="1" dirty="0"/>
+              <a:t>overall effect</a:t>
+            </a:r>
+            <a:r>
+              <a:rPr lang="en-US" dirty="0"/>
+              <a:t> on the outcome</a:t>
+            </a:r>
+          </a:p>
+          <a:p>
+            <a:pPr>
+              <a:buFont typeface="Arial" panose="020B0604020202020204" pitchFamily="34" charset="0"/>
+              <a:buChar char="•"/>
+            </a:pPr>
+            <a:r>
+              <a:rPr lang="en-US" dirty="0"/>
+              <a:t> It uses all data to answer:</a:t>
+            </a:r>
+            <a:br>
+              <a:rPr lang="en-US" dirty="0"/>
+            </a:br>
+            <a:r>
+              <a:rPr lang="en-US" b="1" dirty="0"/>
+              <a:t>“Does this variable influence the response?”</a:t>
+            </a:r>
+            <a:endParaRPr lang="en-US" dirty="0"/>
+          </a:p>
+          <a:p>
+            <a:pPr>
+              <a:buNone/>
+            </a:pPr>
+            <a:endParaRPr lang="en-US" b="1" dirty="0"/>
+          </a:p>
+          <a:p>
+            <a:pPr>
+              <a:buNone/>
+            </a:pPr>
+            <a:r>
+              <a:rPr lang="en-US" b="1" dirty="0"/>
+              <a:t>What it tells you</a:t>
+            </a:r>
+          </a:p>
+          <a:p>
+            <a:pPr>
+              <a:buFont typeface="Arial" panose="020B0604020202020204" pitchFamily="34" charset="0"/>
+              <a:buChar char="•"/>
+            </a:pPr>
+            <a:r>
+              <a:rPr lang="en-US" b="1" dirty="0"/>
+              <a:t> Significance (p-value):</a:t>
+            </a:r>
+            <a:r>
+              <a:rPr lang="en-US" dirty="0"/>
+              <a:t> whether the variable influences the response</a:t>
+            </a:r>
+          </a:p>
+          <a:p>
+            <a:pPr>
+              <a:buFont typeface="Arial" panose="020B0604020202020204" pitchFamily="34" charset="0"/>
+              <a:buChar char="•"/>
+            </a:pPr>
+            <a:r>
+              <a:rPr lang="en-US" b="1" dirty="0"/>
+              <a:t> F-value:</a:t>
+            </a:r>
+            <a:r>
+              <a:rPr lang="en-US" dirty="0"/>
+              <a:t> how strong that influence is</a:t>
+            </a:r>
+          </a:p>
+          <a:p>
+            <a:pPr>
+              <a:buFont typeface="Arial" panose="020B0604020202020204" pitchFamily="34" charset="0"/>
+              <a:buChar char="•"/>
+            </a:pPr>
+            <a:r>
+              <a:rPr lang="en-US" dirty="0"/>
+              <a:t> Works for main effects and interactions (e.g., Treatment, Week, </a:t>
+            </a:r>
+            <a:r>
+              <a:rPr lang="en-US" dirty="0" err="1"/>
+              <a:t>Treatment×Week</a:t>
+            </a:r>
+            <a:r>
+              <a:rPr lang="en-US" dirty="0"/>
+              <a:t>)</a:t>
+            </a:r>
+          </a:p>
+          <a:p>
+            <a:pPr>
+              <a:buNone/>
+            </a:pPr>
+            <a:endParaRPr lang="en-US" b="1" dirty="0"/>
+          </a:p>
+          <a:p>
+            <a:pPr>
+              <a:buNone/>
+            </a:pPr>
+            <a:r>
+              <a:rPr lang="en-US" b="1" dirty="0"/>
+              <a:t>What it does </a:t>
+            </a:r>
+            <a:r>
+              <a:rPr lang="en-US" b="1" i="1" dirty="0"/>
+              <a:t>not</a:t>
+            </a:r>
+            <a:r>
+              <a:rPr lang="en-US" b="1" dirty="0"/>
+              <a:t> tell you</a:t>
+            </a:r>
+          </a:p>
+          <a:p>
+            <a:pPr>
+              <a:buFont typeface="Arial" panose="020B0604020202020204" pitchFamily="34" charset="0"/>
+              <a:buChar char="•"/>
+            </a:pPr>
+            <a:r>
+              <a:rPr lang="en-US" dirty="0"/>
+              <a:t> No information about </a:t>
+            </a:r>
+            <a:r>
+              <a:rPr lang="en-US" b="1" dirty="0"/>
+              <a:t>direction</a:t>
+            </a:r>
+            <a:endParaRPr lang="en-US" dirty="0"/>
+          </a:p>
+          <a:p>
+            <a:pPr marL="742950" lvl="1" indent="-285750">
+              <a:buFont typeface="Arial" panose="020B0604020202020204" pitchFamily="34" charset="0"/>
+              <a:buChar char="•"/>
+            </a:pPr>
+            <a:r>
+              <a:rPr lang="en-US" dirty="0"/>
+              <a:t>It does </a:t>
+            </a:r>
+            <a:r>
+              <a:rPr lang="en-US" i="1" dirty="0"/>
+              <a:t>not</a:t>
+            </a:r>
+            <a:r>
+              <a:rPr lang="en-US" dirty="0"/>
+              <a:t> say whether a group is higher or lower</a:t>
+            </a:r>
+          </a:p>
+          <a:p>
+            <a:pPr>
+              <a:buFont typeface="Arial" panose="020B0604020202020204" pitchFamily="34" charset="0"/>
+              <a:buChar char="•"/>
+            </a:pPr>
+            <a:r>
+              <a:rPr lang="en-US" dirty="0"/>
+              <a:t> No information about </a:t>
+            </a:r>
+            <a:r>
+              <a:rPr lang="en-US" b="1" dirty="0"/>
+              <a:t>which groups differ</a:t>
+            </a:r>
+            <a:endParaRPr lang="en-US" dirty="0"/>
+          </a:p>
+          <a:p>
+            <a:pPr marL="742950" lvl="1" indent="-285750">
+              <a:buFont typeface="Arial" panose="020B0604020202020204" pitchFamily="34" charset="0"/>
+              <a:buChar char="•"/>
+            </a:pPr>
+            <a:r>
+              <a:rPr lang="en-US" dirty="0"/>
+              <a:t>It only tests the variable as a whole</a:t>
+            </a:r>
+          </a:p>
+          <a:p>
+            <a:pPr>
+              <a:buFont typeface="Arial" panose="020B0604020202020204" pitchFamily="34" charset="0"/>
+              <a:buChar char="•"/>
+            </a:pPr>
+            <a:r>
+              <a:rPr lang="en-US" dirty="0"/>
+              <a:t> No estimated means or contrasts</a:t>
+            </a:r>
+          </a:p>
+        </p:txBody>
+      </p:sp>
+    </p:spTree>
+    <p:extLst>
+      <p:ext uri="{BB962C8B-B14F-4D97-AF65-F5344CB8AC3E}">
+        <p14:creationId xmlns:p14="http://schemas.microsoft.com/office/powerpoint/2010/main" val="325401457"/>
+      </p:ext>
+    </p:extLst>
+  </p:cSld>
+  <p:clrMapOvr>
+    <a:masterClrMapping/>
+  </p:clrMapOvr>
+</p:sld>
+</file>
+
+<file path=ppt/slides/slide12.xml><?xml version="1.0" encoding="utf-8"?>
+<p:sld xmlns:a="http://schemas.openxmlformats.org/drawingml/2006/main" xmlns:r="http://schemas.openxmlformats.org/officeDocument/2006/relationships" xmlns:p="http://schemas.openxmlformats.org/presentationml/2006/main">
+  <p:cSld>
+    <p:spTree>
+      <p:nvGrpSpPr>
         <p:cNvPr id="1" name=""/>
         <p:cNvGrpSpPr/>
         <p:nvPr/>
@@ -4079,7 +4442,7 @@
 </p:sld>
 </file>
 
-<file path=ppt/slides/slide12.xml><?xml version="1.0" encoding="utf-8"?>
+<file path=ppt/slides/slide13.xml><?xml version="1.0" encoding="utf-8"?>
 <p:sld xmlns:a="http://schemas.openxmlformats.org/drawingml/2006/main" xmlns:r="http://schemas.openxmlformats.org/officeDocument/2006/relationships" xmlns:p="http://schemas.openxmlformats.org/presentationml/2006/main">
   <p:cSld>
     <p:spTree>
@@ -4143,7 +4506,7 @@
 </p:sld>
 </file>
 
-<file path=ppt/slides/slide13.xml><?xml version="1.0" encoding="utf-8"?>
+<file path=ppt/slides/slide14.xml><?xml version="1.0" encoding="utf-8"?>
 <p:sld xmlns:a="http://schemas.openxmlformats.org/drawingml/2006/main" xmlns:r="http://schemas.openxmlformats.org/officeDocument/2006/relationships" xmlns:p="http://schemas.openxmlformats.org/presentationml/2006/main">
   <p:cSld>
     <p:spTree>
@@ -4348,64 +4711,6 @@
     <p:extLst>
       <p:ext uri="{BB962C8B-B14F-4D97-AF65-F5344CB8AC3E}">
         <p14:creationId xmlns:p14="http://schemas.microsoft.com/office/powerpoint/2010/main" val="2351402579"/>
-      </p:ext>
-    </p:extLst>
-  </p:cSld>
-  <p:clrMapOvr>
-    <a:masterClrMapping/>
-  </p:clrMapOvr>
-</p:sld>
-</file>
-
-<file path=ppt/slides/slide14.xml><?xml version="1.0" encoding="utf-8"?>
-<p:sld xmlns:a="http://schemas.openxmlformats.org/drawingml/2006/main" xmlns:r="http://schemas.openxmlformats.org/officeDocument/2006/relationships" xmlns:p="http://schemas.openxmlformats.org/presentationml/2006/main">
-  <p:cSld>
-    <p:spTree>
-      <p:nvGrpSpPr>
-        <p:cNvPr id="1" name=""/>
-        <p:cNvGrpSpPr/>
-        <p:nvPr/>
-      </p:nvGrpSpPr>
-      <p:grpSpPr>
-        <a:xfrm>
-          <a:off x="0" y="0"/>
-          <a:ext cx="0" cy="0"/>
-          <a:chOff x="0" y="0"/>
-          <a:chExt cx="0" cy="0"/>
-        </a:xfrm>
-      </p:grpSpPr>
-      <p:sp>
-        <p:nvSpPr>
-          <p:cNvPr id="2" name="Title 1">
-            <a:extLst>
-              <a:ext uri="{FF2B5EF4-FFF2-40B4-BE49-F238E27FC236}">
-                <a16:creationId xmlns:a16="http://schemas.microsoft.com/office/drawing/2014/main" id="{71348000-8DB4-EFA8-B151-AF1410B425FC}"/>
-              </a:ext>
-            </a:extLst>
-          </p:cNvPr>
-          <p:cNvSpPr>
-            <a:spLocks noGrp="1"/>
-          </p:cNvSpPr>
-          <p:nvPr>
-            <p:ph type="title"/>
-          </p:nvPr>
-        </p:nvSpPr>
-        <p:spPr/>
-        <p:txBody>
-          <a:bodyPr/>
-          <a:lstStyle/>
-          <a:p>
-            <a:r>
-              <a:rPr lang="en-US" dirty="0"/>
-              <a:t>NOTES on LMM</a:t>
-            </a:r>
-          </a:p>
-        </p:txBody>
-      </p:sp>
-    </p:spTree>
-    <p:extLst>
-      <p:ext uri="{BB962C8B-B14F-4D97-AF65-F5344CB8AC3E}">
-        <p14:creationId xmlns:p14="http://schemas.microsoft.com/office/powerpoint/2010/main" val="346991280"/>
       </p:ext>
     </p:extLst>
   </p:cSld>
@@ -4437,7 +4742,7 @@
           <p:cNvPr id="3" name="TextBox 2">
             <a:extLst>
               <a:ext uri="{FF2B5EF4-FFF2-40B4-BE49-F238E27FC236}">
-                <a16:creationId xmlns:a16="http://schemas.microsoft.com/office/drawing/2014/main" id="{184EEA22-109C-8598-D181-3B420FE4ECED}"/>
+                <a16:creationId xmlns:a16="http://schemas.microsoft.com/office/drawing/2014/main" id="{C6A916B4-23AB-2881-BFE9-2322424629F7}"/>
               </a:ext>
             </a:extLst>
           </p:cNvPr>
@@ -4446,8 +4751,8 @@
         </p:nvSpPr>
         <p:spPr>
           <a:xfrm>
-            <a:off x="635876" y="117693"/>
-            <a:ext cx="8019393" cy="6740307"/>
+            <a:off x="160020" y="144460"/>
+            <a:ext cx="8983980" cy="5816977"/>
           </a:xfrm>
           <a:prstGeom prst="rect">
             <a:avLst/>
@@ -4464,23 +4769,101 @@
               <a:buNone/>
             </a:pPr>
             <a:r>
-              <a:rPr lang="en-US" b="1" dirty="0"/>
-              <a:t>🐔 Random Effects</a:t>
-            </a:r>
-          </a:p>
-          <a:p>
-            <a:pPr>
-              <a:buNone/>
-            </a:pPr>
-            <a:endParaRPr lang="en-US" b="1" dirty="0"/>
-          </a:p>
-          <a:p>
-            <a:pPr>
-              <a:buNone/>
-            </a:pPr>
-            <a:r>
-              <a:rPr lang="en-US" b="1" dirty="0"/>
-              <a:t>What they represent</a:t>
+              <a:rPr lang="en-US" sz="1200" b="1" dirty="0"/>
+              <a:t>How to Interpret the Estimates</a:t>
+            </a:r>
+          </a:p>
+          <a:p>
+            <a:pPr>
+              <a:buNone/>
+            </a:pPr>
+            <a:endParaRPr lang="en-US" sz="1200" b="1" dirty="0"/>
+          </a:p>
+          <a:p>
+            <a:pPr>
+              <a:buNone/>
+            </a:pPr>
+            <a:r>
+              <a:rPr lang="en-US" sz="1200" dirty="0"/>
+              <a:t>The </a:t>
+            </a:r>
+            <a:r>
+              <a:rPr lang="en-US" sz="1200" b="1" dirty="0"/>
+              <a:t>Intercept</a:t>
+            </a:r>
+            <a:r>
+              <a:rPr lang="en-US" sz="1200" dirty="0"/>
+              <a:t> is the predicted value for the </a:t>
+            </a:r>
+            <a:r>
+              <a:rPr lang="en-US" sz="1200" b="1" dirty="0"/>
+              <a:t>reference animal</a:t>
+            </a:r>
+            <a:r>
+              <a:rPr lang="en-US" sz="1200" dirty="0"/>
+              <a:t>:</a:t>
+            </a:r>
+            <a:br>
+              <a:rPr lang="en-US" sz="1200" dirty="0"/>
+            </a:br>
+            <a:r>
+              <a:rPr lang="en-US" sz="1200" dirty="0"/>
+              <a:t>Control + Normal diet + </a:t>
+            </a:r>
+            <a:r>
+              <a:rPr lang="en-US" sz="1200" dirty="0" err="1"/>
+              <a:t>HeartRate</a:t>
+            </a:r>
+            <a:r>
+              <a:rPr lang="en-US" sz="1200" dirty="0"/>
+              <a:t> = 0 + Glucose = 0</a:t>
+            </a:r>
+            <a:br>
+              <a:rPr lang="en-US" sz="1200" dirty="0"/>
+            </a:br>
+            <a:r>
+              <a:rPr lang="en-US" sz="1200" dirty="0"/>
+              <a:t>→ </a:t>
+            </a:r>
+            <a:r>
+              <a:rPr lang="en-US" sz="1200" b="1" dirty="0"/>
+              <a:t>8.59</a:t>
+            </a:r>
+            <a:endParaRPr lang="en-US" sz="1200" dirty="0"/>
+          </a:p>
+          <a:p>
+            <a:pPr>
+              <a:buNone/>
+            </a:pPr>
+            <a:r>
+              <a:rPr lang="en-US" sz="1200" dirty="0"/>
+              <a:t>Each estimate shows </a:t>
+            </a:r>
+            <a:r>
+              <a:rPr lang="en-US" sz="1200" b="1" dirty="0"/>
+              <a:t>how much to add or subtract</a:t>
+            </a:r>
+            <a:r>
+              <a:rPr lang="en-US" sz="1200" dirty="0"/>
+              <a:t> when that part changes.</a:t>
+            </a:r>
+          </a:p>
+          <a:p>
+            <a:pPr>
+              <a:buNone/>
+            </a:pPr>
+            <a:br>
+              <a:rPr lang="en-US" sz="1200" dirty="0"/>
+            </a:br>
+            <a:endParaRPr lang="en-US" sz="1200" dirty="0"/>
+          </a:p>
+          <a:p>
+            <a:pPr>
+              <a:buNone/>
+            </a:pPr>
+            <a:r>
+              <a:rPr lang="en-US" sz="1200" b="1" dirty="0"/>
+              <a:t>Treatment effects</a:t>
             </a:r>
           </a:p>
           <a:p>
@@ -4489,17 +4872,21 @@
               <a:buChar char="•"/>
             </a:pPr>
             <a:r>
-              <a:rPr lang="en-US" dirty="0"/>
-              <a:t> They capture </a:t>
-            </a:r>
-            <a:r>
-              <a:rPr lang="en-US" b="1" dirty="0"/>
-              <a:t>natural differences between individual animals</a:t>
-            </a:r>
-            <a:r>
-              <a:rPr lang="en-US" dirty="0"/>
-              <a:t>.</a:t>
-            </a:r>
+              <a:rPr lang="en-US" sz="1200" b="1" dirty="0"/>
+              <a:t> Drug A: +1.49</a:t>
+            </a:r>
+            <a:br>
+              <a:rPr lang="en-US" sz="1200" dirty="0"/>
+            </a:br>
+            <a:r>
+              <a:rPr lang="en-US" sz="1200" dirty="0"/>
+              <a:t>→ Control (8.59) → Drug A = </a:t>
+            </a:r>
+            <a:r>
+              <a:rPr lang="en-US" sz="1200" b="1" dirty="0"/>
+              <a:t>8.59 + 1.49 = 10.08</a:t>
+            </a:r>
+            <a:endParaRPr lang="en-US" sz="1200" dirty="0"/>
           </a:p>
           <a:p>
             <a:pPr>
@@ -4507,8 +4894,35 @@
               <a:buChar char="•"/>
             </a:pPr>
             <a:r>
-              <a:rPr lang="en-US" dirty="0"/>
-              <a:t> Every chicken has its own baseline weight or behavior.</a:t>
+              <a:rPr lang="en-US" sz="1200" b="1" dirty="0"/>
+              <a:t> Drug B: +2.95</a:t>
+            </a:r>
+            <a:br>
+              <a:rPr lang="en-US" sz="1200" dirty="0"/>
+            </a:br>
+            <a:r>
+              <a:rPr lang="en-US" sz="1200" dirty="0"/>
+              <a:t>→ Control (8.59) → Drug B = </a:t>
+            </a:r>
+            <a:r>
+              <a:rPr lang="en-US" sz="1200" b="1" dirty="0"/>
+              <a:t>8.59 + 2.95 = 11.54</a:t>
+            </a:r>
+            <a:endParaRPr lang="en-US" sz="1200" dirty="0"/>
+          </a:p>
+          <a:p>
+            <a:pPr>
+              <a:buNone/>
+            </a:pPr>
+            <a:endParaRPr lang="en-US" sz="1200" b="1" dirty="0"/>
+          </a:p>
+          <a:p>
+            <a:pPr>
+              <a:buNone/>
+            </a:pPr>
+            <a:r>
+              <a:rPr lang="en-US" sz="1200" b="1" dirty="0"/>
+              <a:t>Diet effect</a:t>
             </a:r>
           </a:p>
           <a:p>
@@ -4517,31 +4931,39 @@
               <a:buChar char="•"/>
             </a:pPr>
             <a:r>
-              <a:rPr lang="en-US" dirty="0"/>
-              <a:t> Random effects allow the model to </a:t>
-            </a:r>
-            <a:r>
-              <a:rPr lang="en-US" b="1" dirty="0"/>
-              <a:t>give each animal its own starting level</a:t>
-            </a:r>
-            <a:r>
-              <a:rPr lang="en-US" dirty="0"/>
-              <a:t>, instead of forcing all animals to be identical.</a:t>
-            </a:r>
-          </a:p>
-          <a:p>
-            <a:pPr>
-              <a:buNone/>
-            </a:pPr>
-            <a:endParaRPr lang="en-US" b="1" dirty="0"/>
-          </a:p>
-          <a:p>
-            <a:pPr>
-              <a:buNone/>
-            </a:pPr>
-            <a:r>
-              <a:rPr lang="en-US" b="1" dirty="0"/>
-              <a:t>Why we need them</a:t>
+              <a:rPr lang="en-US" sz="1200" b="1" dirty="0"/>
+              <a:t> High-Fat diet: +1.14</a:t>
+            </a:r>
+            <a:br>
+              <a:rPr lang="en-US" sz="1200" dirty="0"/>
+            </a:br>
+            <a:r>
+              <a:rPr lang="en-US" sz="1200"/>
+              <a:t>→ Low-Fat </a:t>
+            </a:r>
+            <a:r>
+              <a:rPr lang="en-US" sz="1200" dirty="0"/>
+              <a:t>diet (8.59) → High-Fat = </a:t>
+            </a:r>
+            <a:r>
+              <a:rPr lang="en-US" sz="1200" b="1" dirty="0"/>
+              <a:t>8.59 + 1.14 = 9.73</a:t>
+            </a:r>
+            <a:endParaRPr lang="en-US" sz="1200" dirty="0"/>
+          </a:p>
+          <a:p>
+            <a:pPr>
+              <a:buNone/>
+            </a:pPr>
+            <a:endParaRPr lang="en-US" sz="1200" b="1" dirty="0"/>
+          </a:p>
+          <a:p>
+            <a:pPr>
+              <a:buNone/>
+            </a:pPr>
+            <a:r>
+              <a:rPr lang="en-US" sz="1200" b="1" dirty="0"/>
+              <a:t>Numeric predictors</a:t>
             </a:r>
           </a:p>
           <a:p>
@@ -4550,17 +4972,29 @@
               <a:buChar char="•"/>
             </a:pPr>
             <a:r>
-              <a:rPr lang="en-US" dirty="0"/>
-              <a:t> Animals in the same treatment group are </a:t>
-            </a:r>
-            <a:r>
-              <a:rPr lang="en-US" i="1" dirty="0"/>
-              <a:t>not</a:t>
-            </a:r>
-            <a:r>
-              <a:rPr lang="en-US" dirty="0"/>
-              <a:t> clones.</a:t>
-            </a:r>
+              <a:rPr lang="en-US" sz="1200" b="1" dirty="0"/>
+              <a:t> </a:t>
+            </a:r>
+            <a:r>
+              <a:rPr lang="en-US" sz="1200" b="1" dirty="0" err="1"/>
+              <a:t>HeartRate</a:t>
+            </a:r>
+            <a:r>
+              <a:rPr lang="en-US" sz="1200" b="1" dirty="0"/>
+              <a:t>: +0.015 per unit</a:t>
+            </a:r>
+            <a:br>
+              <a:rPr lang="en-US" sz="1200" dirty="0"/>
+            </a:br>
+            <a:r>
+              <a:rPr lang="en-US" sz="1200" dirty="0"/>
+              <a:t>→ HR = 100 → </a:t>
+            </a:r>
+            <a:r>
+              <a:rPr lang="en-US" sz="1200" b="1" dirty="0"/>
+              <a:t>8.59 + 100×0.015 = 10.09</a:t>
+            </a:r>
+            <a:endParaRPr lang="en-US" sz="1200" dirty="0"/>
           </a:p>
           <a:p>
             <a:pPr>
@@ -4568,8 +5002,42 @@
               <a:buChar char="•"/>
             </a:pPr>
             <a:r>
-              <a:rPr lang="en-US" dirty="0"/>
-              <a:t> Some chickens naturally grow faster or slower, regardless of treatment.</a:t>
+              <a:rPr lang="en-US" sz="1200" b="1" dirty="0"/>
+              <a:t> Glucose: +0.00001 per unit</a:t>
+            </a:r>
+            <a:br>
+              <a:rPr lang="en-US" sz="1200" dirty="0"/>
+            </a:br>
+            <a:r>
+              <a:rPr lang="en-US" sz="1200" dirty="0"/>
+              <a:t>→ negligible change (even at high values)</a:t>
+            </a:r>
+          </a:p>
+          <a:p>
+            <a:pPr>
+              <a:buNone/>
+            </a:pPr>
+            <a:br>
+              <a:rPr lang="en-US" sz="1200" dirty="0"/>
+            </a:br>
+            <a:endParaRPr lang="en-US" sz="1200" dirty="0"/>
+          </a:p>
+          <a:p>
+            <a:pPr>
+              <a:buNone/>
+            </a:pPr>
+            <a:r>
+              <a:rPr lang="en-US" sz="1200" b="1" dirty="0"/>
+              <a:t>Interactions (two things changing together)</a:t>
+            </a:r>
+          </a:p>
+          <a:p>
+            <a:pPr>
+              <a:buNone/>
+            </a:pPr>
+            <a:r>
+              <a:rPr lang="en-US" sz="1200" dirty="0"/>
+              <a:t>Show whether the combination differs from simply adding both effects.</a:t>
             </a:r>
           </a:p>
           <a:p>
@@ -4578,24 +5046,21 @@
               <a:buChar char="•"/>
             </a:pPr>
             <a:r>
-              <a:rPr lang="en-US" dirty="0"/>
-              <a:t> Ignoring these differences makes the analysis less accurate, more biased and too optimistic about significance.</a:t>
-            </a:r>
-          </a:p>
-          <a:p>
-            <a:pPr>
-              <a:buNone/>
-            </a:pPr>
-            <a:endParaRPr lang="en-US" b="1" dirty="0"/>
-          </a:p>
-          <a:p>
-            <a:pPr>
-              <a:buNone/>
-            </a:pPr>
-            <a:r>
-              <a:rPr lang="en-US" b="1" dirty="0"/>
-              <a:t>What the model does with them</a:t>
-            </a:r>
+              <a:rPr lang="en-US" sz="1200" b="1" dirty="0"/>
+              <a:t> Drug A × High-Fat: –0.078</a:t>
+            </a:r>
+            <a:br>
+              <a:rPr lang="en-US" sz="1200" dirty="0"/>
+            </a:br>
+            <a:r>
+              <a:rPr lang="en-US" sz="1200" dirty="0"/>
+              <a:t>→ 8.59 + 1.49 + 1.14 </a:t>
+            </a:r>
+            <a:r>
+              <a:rPr lang="en-US" sz="1200" b="1" dirty="0"/>
+              <a:t>– 0.078 = 11.15</a:t>
+            </a:r>
+            <a:endParaRPr lang="en-US" sz="1200" dirty="0"/>
           </a:p>
           <a:p>
             <a:pPr>
@@ -4603,101 +5068,320 @@
               <a:buChar char="•"/>
             </a:pPr>
             <a:r>
-              <a:rPr lang="en-US" dirty="0"/>
-              <a:t> The model estimates how much animals </a:t>
-            </a:r>
-            <a:r>
-              <a:rPr lang="en-US" b="1" dirty="0"/>
-              <a:t>differ from each other on average</a:t>
-            </a:r>
-            <a:r>
-              <a:rPr lang="en-US" dirty="0"/>
-              <a:t>.</a:t>
-            </a:r>
-          </a:p>
-          <a:p>
-            <a:pPr>
-              <a:buFont typeface="Arial" panose="020B0604020202020204" pitchFamily="34" charset="0"/>
-              <a:buChar char="•"/>
-            </a:pPr>
-            <a:r>
-              <a:rPr lang="en-US" dirty="0"/>
-              <a:t> It adjusts treatment effects so they are not inflated by animal-to-animal variation.</a:t>
-            </a:r>
-          </a:p>
-          <a:p>
-            <a:pPr>
-              <a:buFont typeface="Arial" panose="020B0604020202020204" pitchFamily="34" charset="0"/>
-              <a:buChar char="•"/>
-            </a:pPr>
-            <a:r>
-              <a:rPr lang="en-US" dirty="0"/>
-              <a:t> The random effect acts like a </a:t>
-            </a:r>
-            <a:r>
-              <a:rPr lang="en-US" b="1" dirty="0"/>
-              <a:t>baseline correction</a:t>
-            </a:r>
-            <a:r>
-              <a:rPr lang="en-US" dirty="0"/>
-              <a:t> for each individual animal.</a:t>
-            </a:r>
-          </a:p>
-          <a:p>
-            <a:pPr>
-              <a:buNone/>
-            </a:pPr>
-            <a:endParaRPr lang="en-US" b="1" dirty="0"/>
-          </a:p>
-          <a:p>
-            <a:pPr>
-              <a:buNone/>
-            </a:pPr>
-            <a:r>
-              <a:rPr lang="en-US" b="1" dirty="0"/>
-              <a:t>Veterinary practice interpretation</a:t>
-            </a:r>
-          </a:p>
-          <a:p>
-            <a:pPr>
-              <a:buFont typeface="Arial" panose="020B0604020202020204" pitchFamily="34" charset="0"/>
-              <a:buChar char="•"/>
-            </a:pPr>
-            <a:r>
-              <a:rPr lang="en-US" dirty="0"/>
-              <a:t> If random-effect variance is large:</a:t>
+              <a:rPr lang="en-US" sz="1200" b="1" dirty="0"/>
+              <a:t> Drug B × High-Fat: –0.275</a:t>
             </a:r>
             <a:br>
-              <a:rPr lang="en-US" dirty="0"/>
+              <a:rPr lang="en-US" sz="1200" dirty="0"/>
             </a:br>
             <a:r>
-              <a:rPr lang="en-US" dirty="0"/>
-              <a:t> → animals in the trial vary a lot biologically.</a:t>
-            </a:r>
-          </a:p>
-          <a:p>
-            <a:pPr>
-              <a:buFont typeface="Arial" panose="020B0604020202020204" pitchFamily="34" charset="0"/>
-              <a:buChar char="•"/>
-            </a:pPr>
-            <a:r>
-              <a:rPr lang="en-US" dirty="0"/>
-              <a:t> If it's small:</a:t>
-            </a:r>
-            <a:br>
-              <a:rPr lang="en-US" dirty="0"/>
-            </a:br>
-            <a:r>
-              <a:rPr lang="en-US" dirty="0"/>
-              <a:t> → animals behave very similarly; group differences dominate.</a:t>
-            </a:r>
+              <a:rPr lang="en-US" sz="1200" dirty="0"/>
+              <a:t>→ 8.59 + 2.95 + 1.14 </a:t>
+            </a:r>
+            <a:r>
+              <a:rPr lang="en-US" sz="1200" b="1" dirty="0"/>
+              <a:t>– 0.275 = 12.40</a:t>
+            </a:r>
+            <a:endParaRPr lang="en-US" sz="1200" dirty="0"/>
+          </a:p>
+        </p:txBody>
+      </p:sp>
+      <p:sp>
+        <p:nvSpPr>
+          <p:cNvPr id="5" name="TextBox 4">
+            <a:extLst>
+              <a:ext uri="{FF2B5EF4-FFF2-40B4-BE49-F238E27FC236}">
+                <a16:creationId xmlns:a16="http://schemas.microsoft.com/office/drawing/2014/main" id="{4CC18B8D-05FC-D59A-EE14-0595BB104087}"/>
+              </a:ext>
+            </a:extLst>
+          </p:cNvPr>
+          <p:cNvSpPr txBox="1"/>
+          <p:nvPr/>
+        </p:nvSpPr>
+        <p:spPr>
+          <a:xfrm>
+            <a:off x="4321854" y="1627887"/>
+            <a:ext cx="4937760" cy="1323439"/>
+          </a:xfrm>
+          <a:prstGeom prst="rect">
+            <a:avLst/>
+          </a:prstGeom>
+          <a:noFill/>
+        </p:spPr>
+        <p:txBody>
+          <a:bodyPr wrap="square">
+            <a:spAutoFit/>
+          </a:bodyPr>
+          <a:lstStyle/>
+          <a:p>
+            <a:r>
+              <a:rPr lang="en-US" sz="800" dirty="0">
+                <a:latin typeface="Fira Mono" panose="020B0509050000020004" pitchFamily="49" charset="0"/>
+                <a:ea typeface="Fira Mono" panose="020B0509050000020004" pitchFamily="49" charset="0"/>
+              </a:rPr>
+              <a:t>Coefficients:</a:t>
+            </a:r>
+          </a:p>
+          <a:p>
+            <a:r>
+              <a:rPr lang="en-US" sz="800" dirty="0">
+                <a:latin typeface="Fira Mono" panose="020B0509050000020004" pitchFamily="49" charset="0"/>
+                <a:ea typeface="Fira Mono" panose="020B0509050000020004" pitchFamily="49" charset="0"/>
+              </a:rPr>
+              <a:t>                       Term  Estimate </a:t>
+            </a:r>
+            <a:r>
+              <a:rPr lang="en-US" sz="800" dirty="0" err="1">
+                <a:latin typeface="Fira Mono" panose="020B0509050000020004" pitchFamily="49" charset="0"/>
+                <a:ea typeface="Fira Mono" panose="020B0509050000020004" pitchFamily="49" charset="0"/>
+              </a:rPr>
+              <a:t>Std.Error</a:t>
+            </a:r>
+            <a:r>
+              <a:rPr lang="en-US" sz="800" dirty="0">
+                <a:latin typeface="Fira Mono" panose="020B0509050000020004" pitchFamily="49" charset="0"/>
+                <a:ea typeface="Fira Mono" panose="020B0509050000020004" pitchFamily="49" charset="0"/>
+              </a:rPr>
+              <a:t> Statistic  </a:t>
+            </a:r>
+            <a:r>
+              <a:rPr lang="en-US" sz="800" dirty="0" err="1">
+                <a:latin typeface="Fira Mono" panose="020B0509050000020004" pitchFamily="49" charset="0"/>
+                <a:ea typeface="Fira Mono" panose="020B0509050000020004" pitchFamily="49" charset="0"/>
+              </a:rPr>
+              <a:t>p.value</a:t>
+            </a:r>
+            <a:endParaRPr lang="en-US" sz="800" dirty="0">
+              <a:latin typeface="Fira Mono" panose="020B0509050000020004" pitchFamily="49" charset="0"/>
+              <a:ea typeface="Fira Mono" panose="020B0509050000020004" pitchFamily="49" charset="0"/>
+            </a:endParaRPr>
+          </a:p>
+          <a:p>
+            <a:r>
+              <a:rPr lang="en-US" sz="800" dirty="0">
+                <a:latin typeface="Fira Mono" panose="020B0509050000020004" pitchFamily="49" charset="0"/>
+                <a:ea typeface="Fira Mono" panose="020B0509050000020004" pitchFamily="49" charset="0"/>
+              </a:rPr>
+              <a:t>                (Intercept)  8.591096  3.271296  2.626206  0.00984</a:t>
+            </a:r>
+          </a:p>
+          <a:p>
+            <a:r>
+              <a:rPr lang="en-US" sz="800" dirty="0">
+                <a:latin typeface="Fira Mono" panose="020B0509050000020004" pitchFamily="49" charset="0"/>
+                <a:ea typeface="Fira Mono" panose="020B0509050000020004" pitchFamily="49" charset="0"/>
+              </a:rPr>
+              <a:t>             </a:t>
+            </a:r>
+            <a:r>
+              <a:rPr lang="en-US" sz="800" dirty="0" err="1">
+                <a:latin typeface="Fira Mono" panose="020B0509050000020004" pitchFamily="49" charset="0"/>
+                <a:ea typeface="Fira Mono" panose="020B0509050000020004" pitchFamily="49" charset="0"/>
+              </a:rPr>
+              <a:t>TreatmentDrugA</a:t>
+            </a:r>
+            <a:r>
+              <a:rPr lang="en-US" sz="800" dirty="0">
+                <a:latin typeface="Fira Mono" panose="020B0509050000020004" pitchFamily="49" charset="0"/>
+                <a:ea typeface="Fira Mono" panose="020B0509050000020004" pitchFamily="49" charset="0"/>
+              </a:rPr>
+              <a:t>  1.487336  0.307605  4.835212 &lt; 0.0001</a:t>
+            </a:r>
+          </a:p>
+          <a:p>
+            <a:r>
+              <a:rPr lang="en-US" sz="800" dirty="0">
+                <a:latin typeface="Fira Mono" panose="020B0509050000020004" pitchFamily="49" charset="0"/>
+                <a:ea typeface="Fira Mono" panose="020B0509050000020004" pitchFamily="49" charset="0"/>
+              </a:rPr>
+              <a:t>             </a:t>
+            </a:r>
+            <a:r>
+              <a:rPr lang="en-US" sz="800" dirty="0" err="1">
+                <a:latin typeface="Fira Mono" panose="020B0509050000020004" pitchFamily="49" charset="0"/>
+                <a:ea typeface="Fira Mono" panose="020B0509050000020004" pitchFamily="49" charset="0"/>
+              </a:rPr>
+              <a:t>TreatmentDrugB</a:t>
+            </a:r>
+            <a:r>
+              <a:rPr lang="en-US" sz="800" dirty="0">
+                <a:latin typeface="Fira Mono" panose="020B0509050000020004" pitchFamily="49" charset="0"/>
+                <a:ea typeface="Fira Mono" panose="020B0509050000020004" pitchFamily="49" charset="0"/>
+              </a:rPr>
+              <a:t>  2.951441  0.350845  8.412374 &lt; 0.0001</a:t>
+            </a:r>
+          </a:p>
+          <a:p>
+            <a:r>
+              <a:rPr lang="en-US" sz="800" dirty="0">
+                <a:latin typeface="Fira Mono" panose="020B0509050000020004" pitchFamily="49" charset="0"/>
+                <a:ea typeface="Fira Mono" panose="020B0509050000020004" pitchFamily="49" charset="0"/>
+              </a:rPr>
+              <a:t>                </a:t>
+            </a:r>
+            <a:r>
+              <a:rPr lang="en-US" sz="800" dirty="0" err="1">
+                <a:latin typeface="Fira Mono" panose="020B0509050000020004" pitchFamily="49" charset="0"/>
+                <a:ea typeface="Fira Mono" panose="020B0509050000020004" pitchFamily="49" charset="0"/>
+              </a:rPr>
+              <a:t>DietHighFat</a:t>
+            </a:r>
+            <a:r>
+              <a:rPr lang="en-US" sz="800" dirty="0">
+                <a:latin typeface="Fira Mono" panose="020B0509050000020004" pitchFamily="49" charset="0"/>
+                <a:ea typeface="Fira Mono" panose="020B0509050000020004" pitchFamily="49" charset="0"/>
+              </a:rPr>
+              <a:t>  1.139293  0.339371  3.357068  0.00108</a:t>
+            </a:r>
+          </a:p>
+          <a:p>
+            <a:r>
+              <a:rPr lang="en-US" sz="800" dirty="0">
+                <a:latin typeface="Fira Mono" panose="020B0509050000020004" pitchFamily="49" charset="0"/>
+                <a:ea typeface="Fira Mono" panose="020B0509050000020004" pitchFamily="49" charset="0"/>
+              </a:rPr>
+              <a:t>                  </a:t>
+            </a:r>
+            <a:r>
+              <a:rPr lang="en-US" sz="800" dirty="0" err="1">
+                <a:latin typeface="Fira Mono" panose="020B0509050000020004" pitchFamily="49" charset="0"/>
+                <a:ea typeface="Fira Mono" panose="020B0509050000020004" pitchFamily="49" charset="0"/>
+              </a:rPr>
+              <a:t>HeartRate</a:t>
+            </a:r>
+            <a:r>
+              <a:rPr lang="en-US" sz="800" dirty="0">
+                <a:latin typeface="Fira Mono" panose="020B0509050000020004" pitchFamily="49" charset="0"/>
+                <a:ea typeface="Fira Mono" panose="020B0509050000020004" pitchFamily="49" charset="0"/>
+              </a:rPr>
+              <a:t>  0.015424  0.034168  0.451411  0.65257</a:t>
+            </a:r>
+          </a:p>
+          <a:p>
+            <a:r>
+              <a:rPr lang="en-US" sz="800" dirty="0">
+                <a:latin typeface="Fira Mono" panose="020B0509050000020004" pitchFamily="49" charset="0"/>
+                <a:ea typeface="Fira Mono" panose="020B0509050000020004" pitchFamily="49" charset="0"/>
+              </a:rPr>
+              <a:t>                    Glucose  0.000012  0.017572  0.000674  0.99946</a:t>
+            </a:r>
+          </a:p>
+          <a:p>
+            <a:r>
+              <a:rPr lang="en-US" sz="800" dirty="0">
+                <a:latin typeface="Fira Mono" panose="020B0509050000020004" pitchFamily="49" charset="0"/>
+                <a:ea typeface="Fira Mono" panose="020B0509050000020004" pitchFamily="49" charset="0"/>
+              </a:rPr>
+              <a:t> </a:t>
+            </a:r>
+            <a:r>
+              <a:rPr lang="en-US" sz="800" dirty="0" err="1">
+                <a:latin typeface="Fira Mono" panose="020B0509050000020004" pitchFamily="49" charset="0"/>
+                <a:ea typeface="Fira Mono" panose="020B0509050000020004" pitchFamily="49" charset="0"/>
+              </a:rPr>
+              <a:t>TreatmentDrugA:DietHighFat</a:t>
+            </a:r>
+            <a:r>
+              <a:rPr lang="en-US" sz="800" dirty="0">
+                <a:latin typeface="Fira Mono" panose="020B0509050000020004" pitchFamily="49" charset="0"/>
+                <a:ea typeface="Fira Mono" panose="020B0509050000020004" pitchFamily="49" charset="0"/>
+              </a:rPr>
+              <a:t> -0.078163  0.421136 -0.185601  0.85309</a:t>
+            </a:r>
+          </a:p>
+          <a:p>
+            <a:r>
+              <a:rPr lang="en-US" sz="800" dirty="0">
+                <a:latin typeface="Fira Mono" panose="020B0509050000020004" pitchFamily="49" charset="0"/>
+                <a:ea typeface="Fira Mono" panose="020B0509050000020004" pitchFamily="49" charset="0"/>
+              </a:rPr>
+              <a:t> </a:t>
+            </a:r>
+            <a:r>
+              <a:rPr lang="en-US" sz="800" dirty="0" err="1">
+                <a:latin typeface="Fira Mono" panose="020B0509050000020004" pitchFamily="49" charset="0"/>
+                <a:ea typeface="Fira Mono" panose="020B0509050000020004" pitchFamily="49" charset="0"/>
+              </a:rPr>
+              <a:t>TreatmentDrugB:DietHighFat</a:t>
+            </a:r>
+            <a:r>
+              <a:rPr lang="en-US" sz="800" dirty="0">
+                <a:latin typeface="Fira Mono" panose="020B0509050000020004" pitchFamily="49" charset="0"/>
+                <a:ea typeface="Fira Mono" panose="020B0509050000020004" pitchFamily="49" charset="0"/>
+              </a:rPr>
+              <a:t> -0.275312  0.443040 -0.621417  0.53559 </a:t>
+            </a:r>
+          </a:p>
+        </p:txBody>
+      </p:sp>
+      <p:sp>
+        <p:nvSpPr>
+          <p:cNvPr id="6" name="TextBox 5">
+            <a:extLst>
+              <a:ext uri="{FF2B5EF4-FFF2-40B4-BE49-F238E27FC236}">
+                <a16:creationId xmlns:a16="http://schemas.microsoft.com/office/drawing/2014/main" id="{8F016CFD-B79B-708E-F335-4CF51A25248E}"/>
+              </a:ext>
+            </a:extLst>
+          </p:cNvPr>
+          <p:cNvSpPr txBox="1"/>
+          <p:nvPr/>
+        </p:nvSpPr>
+        <p:spPr>
+          <a:xfrm>
+            <a:off x="9375228" y="3279228"/>
+            <a:ext cx="184731" cy="369332"/>
+          </a:xfrm>
+          <a:prstGeom prst="rect">
+            <a:avLst/>
+          </a:prstGeom>
+          <a:noFill/>
+        </p:spPr>
+        <p:txBody>
+          <a:bodyPr wrap="none" rtlCol="0">
+            <a:spAutoFit/>
+          </a:bodyPr>
+          <a:lstStyle/>
+          <a:p>
+            <a:endParaRPr lang="en-US" dirty="0"/>
+          </a:p>
+        </p:txBody>
+      </p:sp>
+      <p:sp>
+        <p:nvSpPr>
+          <p:cNvPr id="8" name="TextBox 7">
+            <a:extLst>
+              <a:ext uri="{FF2B5EF4-FFF2-40B4-BE49-F238E27FC236}">
+                <a16:creationId xmlns:a16="http://schemas.microsoft.com/office/drawing/2014/main" id="{B4F2DC70-D222-D871-D2FC-5815430BC722}"/>
+              </a:ext>
+            </a:extLst>
+          </p:cNvPr>
+          <p:cNvSpPr txBox="1"/>
+          <p:nvPr/>
+        </p:nvSpPr>
+        <p:spPr>
+          <a:xfrm>
+            <a:off x="-1083013" y="713362"/>
+            <a:ext cx="184731" cy="369332"/>
+          </a:xfrm>
+          <a:prstGeom prst="rect">
+            <a:avLst/>
+          </a:prstGeom>
+          <a:noFill/>
+        </p:spPr>
+        <p:txBody>
+          <a:bodyPr wrap="none" rtlCol="0">
+            <a:spAutoFit/>
+          </a:bodyPr>
+          <a:lstStyle/>
+          <a:p>
+            <a:endParaRPr lang="en-US" dirty="0"/>
           </a:p>
         </p:txBody>
       </p:sp>
     </p:spTree>
     <p:extLst>
       <p:ext uri="{BB962C8B-B14F-4D97-AF65-F5344CB8AC3E}">
-        <p14:creationId xmlns:p14="http://schemas.microsoft.com/office/powerpoint/2010/main" val="2723014488"/>
+        <p14:creationId xmlns:p14="http://schemas.microsoft.com/office/powerpoint/2010/main" val="2508344690"/>
       </p:ext>
     </p:extLst>
   </p:cSld>
@@ -4726,6 +5410,356 @@
       </p:grpSpPr>
       <p:sp>
         <p:nvSpPr>
+          <p:cNvPr id="2" name="Title 1">
+            <a:extLst>
+              <a:ext uri="{FF2B5EF4-FFF2-40B4-BE49-F238E27FC236}">
+                <a16:creationId xmlns:a16="http://schemas.microsoft.com/office/drawing/2014/main" id="{71348000-8DB4-EFA8-B151-AF1410B425FC}"/>
+              </a:ext>
+            </a:extLst>
+          </p:cNvPr>
+          <p:cNvSpPr>
+            <a:spLocks noGrp="1"/>
+          </p:cNvSpPr>
+          <p:nvPr>
+            <p:ph type="title"/>
+          </p:nvPr>
+        </p:nvSpPr>
+        <p:spPr/>
+        <p:txBody>
+          <a:bodyPr/>
+          <a:lstStyle/>
+          <a:p>
+            <a:r>
+              <a:rPr lang="en-US" dirty="0"/>
+              <a:t>NOTES on LMM</a:t>
+            </a:r>
+          </a:p>
+        </p:txBody>
+      </p:sp>
+    </p:spTree>
+    <p:extLst>
+      <p:ext uri="{BB962C8B-B14F-4D97-AF65-F5344CB8AC3E}">
+        <p14:creationId xmlns:p14="http://schemas.microsoft.com/office/powerpoint/2010/main" val="346991280"/>
+      </p:ext>
+    </p:extLst>
+  </p:cSld>
+  <p:clrMapOvr>
+    <a:masterClrMapping/>
+  </p:clrMapOvr>
+</p:sld>
+</file>
+
+<file path=ppt/slides/slide17.xml><?xml version="1.0" encoding="utf-8"?>
+<p:sld xmlns:a="http://schemas.openxmlformats.org/drawingml/2006/main" xmlns:r="http://schemas.openxmlformats.org/officeDocument/2006/relationships" xmlns:p="http://schemas.openxmlformats.org/presentationml/2006/main">
+  <p:cSld>
+    <p:spTree>
+      <p:nvGrpSpPr>
+        <p:cNvPr id="1" name=""/>
+        <p:cNvGrpSpPr/>
+        <p:nvPr/>
+      </p:nvGrpSpPr>
+      <p:grpSpPr>
+        <a:xfrm>
+          <a:off x="0" y="0"/>
+          <a:ext cx="0" cy="0"/>
+          <a:chOff x="0" y="0"/>
+          <a:chExt cx="0" cy="0"/>
+        </a:xfrm>
+      </p:grpSpPr>
+      <p:sp>
+        <p:nvSpPr>
+          <p:cNvPr id="3" name="TextBox 2">
+            <a:extLst>
+              <a:ext uri="{FF2B5EF4-FFF2-40B4-BE49-F238E27FC236}">
+                <a16:creationId xmlns:a16="http://schemas.microsoft.com/office/drawing/2014/main" id="{184EEA22-109C-8598-D181-3B420FE4ECED}"/>
+              </a:ext>
+            </a:extLst>
+          </p:cNvPr>
+          <p:cNvSpPr txBox="1"/>
+          <p:nvPr/>
+        </p:nvSpPr>
+        <p:spPr>
+          <a:xfrm>
+            <a:off x="635876" y="117693"/>
+            <a:ext cx="8019393" cy="6740307"/>
+          </a:xfrm>
+          <a:prstGeom prst="rect">
+            <a:avLst/>
+          </a:prstGeom>
+          <a:noFill/>
+        </p:spPr>
+        <p:txBody>
+          <a:bodyPr wrap="square">
+            <a:spAutoFit/>
+          </a:bodyPr>
+          <a:lstStyle/>
+          <a:p>
+            <a:pPr>
+              <a:buNone/>
+            </a:pPr>
+            <a:r>
+              <a:rPr lang="en-US" b="1" dirty="0"/>
+              <a:t>🐔 Random Effects</a:t>
+            </a:r>
+          </a:p>
+          <a:p>
+            <a:pPr>
+              <a:buNone/>
+            </a:pPr>
+            <a:endParaRPr lang="en-US" b="1" dirty="0"/>
+          </a:p>
+          <a:p>
+            <a:pPr>
+              <a:buNone/>
+            </a:pPr>
+            <a:r>
+              <a:rPr lang="en-US" b="1" dirty="0"/>
+              <a:t>What they represent</a:t>
+            </a:r>
+          </a:p>
+          <a:p>
+            <a:pPr>
+              <a:buFont typeface="Arial" panose="020B0604020202020204" pitchFamily="34" charset="0"/>
+              <a:buChar char="•"/>
+            </a:pPr>
+            <a:r>
+              <a:rPr lang="en-US" dirty="0"/>
+              <a:t> They capture </a:t>
+            </a:r>
+            <a:r>
+              <a:rPr lang="en-US" b="1" dirty="0"/>
+              <a:t>natural differences between individual animals</a:t>
+            </a:r>
+            <a:r>
+              <a:rPr lang="en-US" dirty="0"/>
+              <a:t>.</a:t>
+            </a:r>
+          </a:p>
+          <a:p>
+            <a:pPr>
+              <a:buFont typeface="Arial" panose="020B0604020202020204" pitchFamily="34" charset="0"/>
+              <a:buChar char="•"/>
+            </a:pPr>
+            <a:r>
+              <a:rPr lang="en-US" dirty="0"/>
+              <a:t> Every chicken has its own baseline weight or behavior.</a:t>
+            </a:r>
+          </a:p>
+          <a:p>
+            <a:pPr>
+              <a:buFont typeface="Arial" panose="020B0604020202020204" pitchFamily="34" charset="0"/>
+              <a:buChar char="•"/>
+            </a:pPr>
+            <a:r>
+              <a:rPr lang="en-US" dirty="0"/>
+              <a:t> Random effects allow the model to </a:t>
+            </a:r>
+            <a:r>
+              <a:rPr lang="en-US" b="1" dirty="0"/>
+              <a:t>give each animal its own starting level</a:t>
+            </a:r>
+            <a:r>
+              <a:rPr lang="en-US" dirty="0"/>
+              <a:t>, instead of forcing all animals to be identical.</a:t>
+            </a:r>
+          </a:p>
+          <a:p>
+            <a:pPr>
+              <a:buNone/>
+            </a:pPr>
+            <a:endParaRPr lang="en-US" b="1" dirty="0"/>
+          </a:p>
+          <a:p>
+            <a:pPr>
+              <a:buNone/>
+            </a:pPr>
+            <a:r>
+              <a:rPr lang="en-US" b="1" dirty="0"/>
+              <a:t>Why we need them</a:t>
+            </a:r>
+          </a:p>
+          <a:p>
+            <a:pPr>
+              <a:buFont typeface="Arial" panose="020B0604020202020204" pitchFamily="34" charset="0"/>
+              <a:buChar char="•"/>
+            </a:pPr>
+            <a:r>
+              <a:rPr lang="en-US" dirty="0"/>
+              <a:t> Animals in the same treatment group are </a:t>
+            </a:r>
+            <a:r>
+              <a:rPr lang="en-US" i="1" dirty="0"/>
+              <a:t>not</a:t>
+            </a:r>
+            <a:r>
+              <a:rPr lang="en-US" dirty="0"/>
+              <a:t> clones.</a:t>
+            </a:r>
+          </a:p>
+          <a:p>
+            <a:pPr>
+              <a:buFont typeface="Arial" panose="020B0604020202020204" pitchFamily="34" charset="0"/>
+              <a:buChar char="•"/>
+            </a:pPr>
+            <a:r>
+              <a:rPr lang="en-US" dirty="0"/>
+              <a:t> Some chickens naturally grow faster or slower, regardless of treatment.</a:t>
+            </a:r>
+          </a:p>
+          <a:p>
+            <a:pPr>
+              <a:buFont typeface="Arial" panose="020B0604020202020204" pitchFamily="34" charset="0"/>
+              <a:buChar char="•"/>
+            </a:pPr>
+            <a:r>
+              <a:rPr lang="en-US" dirty="0"/>
+              <a:t> Ignoring these differences makes the analysis less accurate, more biased and too optimistic about significance.</a:t>
+            </a:r>
+          </a:p>
+          <a:p>
+            <a:pPr>
+              <a:buNone/>
+            </a:pPr>
+            <a:endParaRPr lang="en-US" b="1" dirty="0"/>
+          </a:p>
+          <a:p>
+            <a:pPr>
+              <a:buNone/>
+            </a:pPr>
+            <a:r>
+              <a:rPr lang="en-US" b="1" dirty="0"/>
+              <a:t>What the model does with them</a:t>
+            </a:r>
+          </a:p>
+          <a:p>
+            <a:pPr>
+              <a:buFont typeface="Arial" panose="020B0604020202020204" pitchFamily="34" charset="0"/>
+              <a:buChar char="•"/>
+            </a:pPr>
+            <a:r>
+              <a:rPr lang="en-US" dirty="0"/>
+              <a:t> The model estimates how much animals </a:t>
+            </a:r>
+            <a:r>
+              <a:rPr lang="en-US" b="1" dirty="0"/>
+              <a:t>differ from each other on average</a:t>
+            </a:r>
+            <a:r>
+              <a:rPr lang="en-US" dirty="0"/>
+              <a:t>.</a:t>
+            </a:r>
+          </a:p>
+          <a:p>
+            <a:pPr>
+              <a:buFont typeface="Arial" panose="020B0604020202020204" pitchFamily="34" charset="0"/>
+              <a:buChar char="•"/>
+            </a:pPr>
+            <a:r>
+              <a:rPr lang="en-US" dirty="0"/>
+              <a:t> It adjusts treatment effects so they are not inflated by animal-to-animal variation.</a:t>
+            </a:r>
+          </a:p>
+          <a:p>
+            <a:pPr>
+              <a:buFont typeface="Arial" panose="020B0604020202020204" pitchFamily="34" charset="0"/>
+              <a:buChar char="•"/>
+            </a:pPr>
+            <a:r>
+              <a:rPr lang="en-US" dirty="0"/>
+              <a:t> The random effect acts like a </a:t>
+            </a:r>
+            <a:r>
+              <a:rPr lang="en-US" b="1" dirty="0"/>
+              <a:t>baseline correction</a:t>
+            </a:r>
+            <a:r>
+              <a:rPr lang="en-US" dirty="0"/>
+              <a:t> for each individual animal.</a:t>
+            </a:r>
+          </a:p>
+          <a:p>
+            <a:pPr>
+              <a:buNone/>
+            </a:pPr>
+            <a:endParaRPr lang="en-US" b="1" dirty="0"/>
+          </a:p>
+          <a:p>
+            <a:pPr>
+              <a:buNone/>
+            </a:pPr>
+            <a:r>
+              <a:rPr lang="en-US" b="1" dirty="0"/>
+              <a:t>Veterinary practice interpretation</a:t>
+            </a:r>
+          </a:p>
+          <a:p>
+            <a:pPr>
+              <a:buFont typeface="Arial" panose="020B0604020202020204" pitchFamily="34" charset="0"/>
+              <a:buChar char="•"/>
+            </a:pPr>
+            <a:r>
+              <a:rPr lang="en-US" dirty="0"/>
+              <a:t> If random-effect variance is large:</a:t>
+            </a:r>
+            <a:br>
+              <a:rPr lang="en-US" dirty="0"/>
+            </a:br>
+            <a:r>
+              <a:rPr lang="en-US" dirty="0"/>
+              <a:t> → animals in the trial vary a lot biologically.</a:t>
+            </a:r>
+          </a:p>
+          <a:p>
+            <a:pPr>
+              <a:buFont typeface="Arial" panose="020B0604020202020204" pitchFamily="34" charset="0"/>
+              <a:buChar char="•"/>
+            </a:pPr>
+            <a:r>
+              <a:rPr lang="en-US" dirty="0"/>
+              <a:t> If it's small:</a:t>
+            </a:r>
+            <a:br>
+              <a:rPr lang="en-US" dirty="0"/>
+            </a:br>
+            <a:r>
+              <a:rPr lang="en-US" dirty="0"/>
+              <a:t> → animals behave very similarly; group differences dominate.</a:t>
+            </a:r>
+          </a:p>
+        </p:txBody>
+      </p:sp>
+    </p:spTree>
+    <p:extLst>
+      <p:ext uri="{BB962C8B-B14F-4D97-AF65-F5344CB8AC3E}">
+        <p14:creationId xmlns:p14="http://schemas.microsoft.com/office/powerpoint/2010/main" val="2723014488"/>
+      </p:ext>
+    </p:extLst>
+  </p:cSld>
+  <p:clrMapOvr>
+    <a:masterClrMapping/>
+  </p:clrMapOvr>
+</p:sld>
+</file>
+
+<file path=ppt/slides/slide18.xml><?xml version="1.0" encoding="utf-8"?>
+<p:sld xmlns:a="http://schemas.openxmlformats.org/drawingml/2006/main" xmlns:r="http://schemas.openxmlformats.org/officeDocument/2006/relationships" xmlns:p="http://schemas.openxmlformats.org/presentationml/2006/main">
+  <p:cSld>
+    <p:spTree>
+      <p:nvGrpSpPr>
+        <p:cNvPr id="1" name=""/>
+        <p:cNvGrpSpPr/>
+        <p:nvPr/>
+      </p:nvGrpSpPr>
+      <p:grpSpPr>
+        <a:xfrm>
+          <a:off x="0" y="0"/>
+          <a:ext cx="0" cy="0"/>
+          <a:chOff x="0" y="0"/>
+          <a:chExt cx="0" cy="0"/>
+        </a:xfrm>
+      </p:grpSpPr>
+      <p:sp>
+        <p:nvSpPr>
           <p:cNvPr id="3" name="TextBox 2">
             <a:extLst>
               <a:ext uri="{FF2B5EF4-FFF2-40B4-BE49-F238E27FC236}">
@@ -4950,7 +5984,7 @@
 </p:sld>
 </file>
 
-<file path=ppt/slides/slide17.xml><?xml version="1.0" encoding="utf-8"?>
+<file path=ppt/slides/slide19.xml><?xml version="1.0" encoding="utf-8"?>
 <p:sld xmlns:a="http://schemas.openxmlformats.org/drawingml/2006/main" xmlns:r="http://schemas.openxmlformats.org/officeDocument/2006/relationships" xmlns:p="http://schemas.openxmlformats.org/presentationml/2006/main">
   <p:cSld>
     <p:spTree>
@@ -5005,652 +6039,6 @@
     <p:extLst>
       <p:ext uri="{BB962C8B-B14F-4D97-AF65-F5344CB8AC3E}">
         <p14:creationId xmlns:p14="http://schemas.microsoft.com/office/powerpoint/2010/main" val="1646739362"/>
-      </p:ext>
-    </p:extLst>
-  </p:cSld>
-  <p:clrMapOvr>
-    <a:masterClrMapping/>
-  </p:clrMapOvr>
-</p:sld>
-</file>
-
-<file path=ppt/slides/slide18.xml><?xml version="1.0" encoding="utf-8"?>
-<p:sld xmlns:a="http://schemas.openxmlformats.org/drawingml/2006/main" xmlns:r="http://schemas.openxmlformats.org/officeDocument/2006/relationships" xmlns:p="http://schemas.openxmlformats.org/presentationml/2006/main">
-  <p:cSld>
-    <p:spTree>
-      <p:nvGrpSpPr>
-        <p:cNvPr id="1" name="">
-          <a:extLst>
-            <a:ext uri="{FF2B5EF4-FFF2-40B4-BE49-F238E27FC236}">
-              <a16:creationId xmlns:a16="http://schemas.microsoft.com/office/drawing/2014/main" id="{498961D4-A409-0CCA-2366-A2A339784C35}"/>
-            </a:ext>
-          </a:extLst>
-        </p:cNvPr>
-        <p:cNvGrpSpPr/>
-        <p:nvPr/>
-      </p:nvGrpSpPr>
-      <p:grpSpPr>
-        <a:xfrm>
-          <a:off x="0" y="0"/>
-          <a:ext cx="0" cy="0"/>
-          <a:chOff x="0" y="0"/>
-          <a:chExt cx="0" cy="0"/>
-        </a:xfrm>
-      </p:grpSpPr>
-      <p:sp>
-        <p:nvSpPr>
-          <p:cNvPr id="6" name="TextBox 5">
-            <a:extLst>
-              <a:ext uri="{FF2B5EF4-FFF2-40B4-BE49-F238E27FC236}">
-                <a16:creationId xmlns:a16="http://schemas.microsoft.com/office/drawing/2014/main" id="{BABBF7E7-4397-9A8E-5361-4241BE9843B7}"/>
-              </a:ext>
-            </a:extLst>
-          </p:cNvPr>
-          <p:cNvSpPr txBox="1"/>
-          <p:nvPr/>
-        </p:nvSpPr>
-        <p:spPr>
-          <a:xfrm>
-            <a:off x="204952" y="612844"/>
-            <a:ext cx="7709338" cy="2862322"/>
-          </a:xfrm>
-          <a:prstGeom prst="rect">
-            <a:avLst/>
-          </a:prstGeom>
-          <a:noFill/>
-        </p:spPr>
-        <p:txBody>
-          <a:bodyPr wrap="square">
-            <a:spAutoFit/>
-          </a:bodyPr>
-          <a:lstStyle/>
-          <a:p>
-            <a:pPr>
-              <a:buNone/>
-            </a:pPr>
-            <a:r>
-              <a:rPr lang="en-US" b="1" dirty="0"/>
-              <a:t>🐔 How to Interpret PCA </a:t>
-            </a:r>
-          </a:p>
-          <a:p>
-            <a:pPr>
-              <a:buNone/>
-            </a:pPr>
-            <a:endParaRPr lang="en-US" b="1" dirty="0"/>
-          </a:p>
-          <a:p>
-            <a:pPr>
-              <a:buNone/>
-            </a:pPr>
-            <a:endParaRPr lang="en-US" b="1" dirty="0"/>
-          </a:p>
-          <a:p>
-            <a:pPr>
-              <a:buNone/>
-            </a:pPr>
-            <a:endParaRPr lang="en-US" b="1" dirty="0"/>
-          </a:p>
-          <a:p>
-            <a:pPr>
-              <a:buNone/>
-            </a:pPr>
-            <a:endParaRPr lang="en-US" b="1" dirty="0"/>
-          </a:p>
-          <a:p>
-            <a:pPr>
-              <a:buNone/>
-            </a:pPr>
-            <a:endParaRPr lang="en-US" b="1" dirty="0"/>
-          </a:p>
-          <a:p>
-            <a:pPr>
-              <a:buNone/>
-            </a:pPr>
-            <a:endParaRPr lang="en-US" b="1" dirty="0"/>
-          </a:p>
-          <a:p>
-            <a:pPr>
-              <a:buNone/>
-            </a:pPr>
-            <a:endParaRPr lang="en-US" b="1" dirty="0"/>
-          </a:p>
-          <a:p>
-            <a:pPr>
-              <a:buNone/>
-            </a:pPr>
-            <a:endParaRPr lang="en-US" b="1" dirty="0"/>
-          </a:p>
-          <a:p>
-            <a:pPr>
-              <a:buNone/>
-            </a:pPr>
-            <a:endParaRPr lang="en-US" b="1" dirty="0"/>
-          </a:p>
-        </p:txBody>
-      </p:sp>
-      <p:sp>
-        <p:nvSpPr>
-          <p:cNvPr id="4" name="TextBox 3">
-            <a:extLst>
-              <a:ext uri="{FF2B5EF4-FFF2-40B4-BE49-F238E27FC236}">
-                <a16:creationId xmlns:a16="http://schemas.microsoft.com/office/drawing/2014/main" id="{9D2A610C-E699-6D0E-4A74-F14E40BF6778}"/>
-              </a:ext>
-            </a:extLst>
-          </p:cNvPr>
-          <p:cNvSpPr txBox="1"/>
-          <p:nvPr/>
-        </p:nvSpPr>
-        <p:spPr>
-          <a:xfrm>
-            <a:off x="357351" y="1661747"/>
-            <a:ext cx="4440622" cy="1938992"/>
-          </a:xfrm>
-          <a:prstGeom prst="rect">
-            <a:avLst/>
-          </a:prstGeom>
-          <a:noFill/>
-        </p:spPr>
-        <p:txBody>
-          <a:bodyPr wrap="square">
-            <a:spAutoFit/>
-          </a:bodyPr>
-          <a:lstStyle/>
-          <a:p>
-            <a:pPr algn="l">
-              <a:buNone/>
-            </a:pPr>
-            <a:r>
-              <a:rPr lang="en-US" sz="800" b="0" i="0" dirty="0">
-                <a:solidFill>
-                  <a:srgbClr val="000000"/>
-                </a:solidFill>
-                <a:effectLst/>
-                <a:latin typeface="Fira Mono" panose="020B0509050000020004" pitchFamily="49" charset="0"/>
-              </a:rPr>
-              <a:t>── PCA Summary ──</a:t>
-            </a:r>
-          </a:p>
-          <a:p>
-            <a:pPr algn="l">
-              <a:buNone/>
-            </a:pPr>
-            <a:r>
-              <a:rPr lang="en-US" sz="800" b="0" i="0" dirty="0">
-                <a:solidFill>
-                  <a:srgbClr val="000000"/>
-                </a:solidFill>
-                <a:effectLst/>
-                <a:latin typeface="Fira Mono" panose="020B0509050000020004" pitchFamily="49" charset="0"/>
-              </a:rPr>
-              <a:t>Importance of components:</a:t>
-            </a:r>
-          </a:p>
-          <a:p>
-            <a:pPr algn="l">
-              <a:buNone/>
-            </a:pPr>
-            <a:r>
-              <a:rPr lang="en-US" sz="800" b="0" i="0" dirty="0">
-                <a:solidFill>
-                  <a:srgbClr val="000000"/>
-                </a:solidFill>
-                <a:effectLst/>
-                <a:latin typeface="Fira Mono" panose="020B0509050000020004" pitchFamily="49" charset="0"/>
-              </a:rPr>
-              <a:t>                          PC1    PC2    PC3    PC4     PC5     PC6</a:t>
-            </a:r>
-          </a:p>
-          <a:p>
-            <a:pPr algn="l">
-              <a:buNone/>
-            </a:pPr>
-            <a:r>
-              <a:rPr lang="en-US" sz="800" b="0" i="0" dirty="0">
-                <a:solidFill>
-                  <a:srgbClr val="000000"/>
-                </a:solidFill>
-                <a:effectLst/>
-                <a:latin typeface="Fira Mono" panose="020B0509050000020004" pitchFamily="49" charset="0"/>
-              </a:rPr>
-              <a:t>Standard deviation     1.4475 1.1806 0.9907 0.7925 0.69433 0.64737</a:t>
-            </a:r>
-          </a:p>
-          <a:p>
-            <a:pPr algn="l">
-              <a:buNone/>
-            </a:pPr>
-            <a:r>
-              <a:rPr lang="en-US" sz="800" b="0" i="0" dirty="0">
-                <a:solidFill>
-                  <a:srgbClr val="000000"/>
-                </a:solidFill>
-                <a:effectLst/>
-                <a:latin typeface="Fira Mono" panose="020B0509050000020004" pitchFamily="49" charset="0"/>
-              </a:rPr>
-              <a:t>Proportion of Variance 0.3492 0.2323 0.1636 0.1047 0.08035 0.06985</a:t>
-            </a:r>
-          </a:p>
-          <a:p>
-            <a:pPr algn="l">
-              <a:buNone/>
-            </a:pPr>
-            <a:r>
-              <a:rPr lang="en-US" sz="800" b="0" i="0" dirty="0">
-                <a:solidFill>
-                  <a:srgbClr val="000000"/>
-                </a:solidFill>
-                <a:effectLst/>
-                <a:latin typeface="Fira Mono" panose="020B0509050000020004" pitchFamily="49" charset="0"/>
-              </a:rPr>
-              <a:t>Cumulative Proportion  0.3492 0.5815 0.7451 0.8498 0.93015 1.00000</a:t>
-            </a:r>
-          </a:p>
-          <a:p>
-            <a:pPr algn="l">
-              <a:buNone/>
-            </a:pPr>
-            <a:endParaRPr lang="en-US" sz="800" b="0" i="0" dirty="0">
-              <a:solidFill>
-                <a:srgbClr val="000000"/>
-              </a:solidFill>
-              <a:effectLst/>
-              <a:latin typeface="Fira Mono" panose="020B0509050000020004" pitchFamily="49" charset="0"/>
-            </a:endParaRPr>
-          </a:p>
-          <a:p>
-            <a:pPr algn="l">
-              <a:buNone/>
-            </a:pPr>
-            <a:r>
-              <a:rPr lang="en-US" sz="800" b="0" i="0" dirty="0">
-                <a:solidFill>
-                  <a:srgbClr val="000000"/>
-                </a:solidFill>
-                <a:effectLst/>
-                <a:latin typeface="Fira Mono" panose="020B0509050000020004" pitchFamily="49" charset="0"/>
-              </a:rPr>
-              <a:t>── PCA Loadings (rotation matrix) ──</a:t>
-            </a:r>
-          </a:p>
-          <a:p>
-            <a:pPr algn="l">
-              <a:buNone/>
-            </a:pPr>
-            <a:r>
-              <a:rPr lang="en-US" sz="800" b="0" i="0" dirty="0">
-                <a:solidFill>
-                  <a:srgbClr val="000000"/>
-                </a:solidFill>
-                <a:effectLst/>
-                <a:latin typeface="Fira Mono" panose="020B0509050000020004" pitchFamily="49" charset="0"/>
-              </a:rPr>
-              <a:t>                   PC1    PC2    PC3    PC4    PC5    PC6</a:t>
-            </a:r>
-          </a:p>
-          <a:p>
-            <a:pPr algn="l">
-              <a:buNone/>
-            </a:pPr>
-            <a:r>
-              <a:rPr lang="en-US" sz="800" b="0" i="0" dirty="0" err="1">
-                <a:solidFill>
-                  <a:srgbClr val="000000"/>
-                </a:solidFill>
-                <a:effectLst/>
-                <a:latin typeface="Fira Mono" panose="020B0509050000020004" pitchFamily="49" charset="0"/>
-              </a:rPr>
-              <a:t>Weight_baseline</a:t>
-            </a:r>
-            <a:r>
-              <a:rPr lang="en-US" sz="800" b="0" i="0" dirty="0">
-                <a:solidFill>
-                  <a:srgbClr val="000000"/>
-                </a:solidFill>
-                <a:effectLst/>
-                <a:latin typeface="Fira Mono" panose="020B0509050000020004" pitchFamily="49" charset="0"/>
-              </a:rPr>
-              <a:t> -0.062 -0.227 -0.965  0.046  0.001  0.106</a:t>
-            </a:r>
-          </a:p>
-          <a:p>
-            <a:pPr algn="l">
-              <a:buNone/>
-            </a:pPr>
-            <a:r>
-              <a:rPr lang="en-US" sz="800" b="0" i="0" dirty="0">
-                <a:solidFill>
-                  <a:srgbClr val="000000"/>
-                </a:solidFill>
-                <a:effectLst/>
-                <a:latin typeface="Fira Mono" panose="020B0509050000020004" pitchFamily="49" charset="0"/>
-              </a:rPr>
-              <a:t>Cortisol        -0.587  0.034 -0.057  0.035 -0.013 -0.806</a:t>
-            </a:r>
-          </a:p>
-          <a:p>
-            <a:pPr algn="l">
-              <a:buNone/>
-            </a:pPr>
-            <a:r>
-              <a:rPr lang="en-US" sz="800" b="0" i="0" dirty="0">
-                <a:solidFill>
-                  <a:srgbClr val="000000"/>
-                </a:solidFill>
-                <a:effectLst/>
-                <a:latin typeface="Fira Mono" panose="020B0509050000020004" pitchFamily="49" charset="0"/>
-              </a:rPr>
-              <a:t>Glucose         -0.482 -0.388  0.159  0.048  0.701  0.314</a:t>
-            </a:r>
-          </a:p>
-          <a:p>
-            <a:pPr algn="l">
-              <a:buNone/>
-            </a:pPr>
-            <a:r>
-              <a:rPr lang="en-US" sz="800" b="0" i="0" dirty="0" err="1">
-                <a:solidFill>
-                  <a:srgbClr val="000000"/>
-                </a:solidFill>
-                <a:effectLst/>
-                <a:latin typeface="Fira Mono" panose="020B0509050000020004" pitchFamily="49" charset="0"/>
-              </a:rPr>
-              <a:t>FeedIntake</a:t>
-            </a:r>
-            <a:r>
-              <a:rPr lang="en-US" sz="800" b="0" i="0" dirty="0">
-                <a:solidFill>
-                  <a:srgbClr val="000000"/>
-                </a:solidFill>
-                <a:effectLst/>
-                <a:latin typeface="Fira Mono" panose="020B0509050000020004" pitchFamily="49" charset="0"/>
-              </a:rPr>
-              <a:t>       0.172 -0.662  0.092 -0.685 -0.138 -0.187</a:t>
-            </a:r>
-          </a:p>
-          <a:p>
-            <a:pPr algn="l">
-              <a:buNone/>
-            </a:pPr>
-            <a:r>
-              <a:rPr lang="en-US" sz="800" b="0" i="0" dirty="0" err="1">
-                <a:solidFill>
-                  <a:srgbClr val="000000"/>
-                </a:solidFill>
-                <a:effectLst/>
-                <a:latin typeface="Fira Mono" panose="020B0509050000020004" pitchFamily="49" charset="0"/>
-              </a:rPr>
-              <a:t>HeartRate</a:t>
-            </a:r>
-            <a:r>
-              <a:rPr lang="en-US" sz="800" b="0" i="0" dirty="0">
-                <a:solidFill>
-                  <a:srgbClr val="000000"/>
-                </a:solidFill>
-                <a:effectLst/>
-                <a:latin typeface="Fira Mono" panose="020B0509050000020004" pitchFamily="49" charset="0"/>
-              </a:rPr>
-              <a:t>        0.296 -0.570  0.125  0.719 -0.093 -0.216</a:t>
-            </a:r>
-          </a:p>
-          <a:p>
-            <a:pPr algn="l">
-              <a:buNone/>
-            </a:pPr>
-            <a:r>
-              <a:rPr lang="en-US" sz="800" b="0" i="0" dirty="0" err="1">
-                <a:solidFill>
-                  <a:srgbClr val="000000"/>
-                </a:solidFill>
-                <a:effectLst/>
-                <a:latin typeface="Fira Mono" panose="020B0509050000020004" pitchFamily="49" charset="0"/>
-              </a:rPr>
-              <a:t>BodyTemp</a:t>
-            </a:r>
-            <a:r>
-              <a:rPr lang="en-US" sz="800" b="0" i="0" dirty="0">
-                <a:solidFill>
-                  <a:srgbClr val="000000"/>
-                </a:solidFill>
-                <a:effectLst/>
-                <a:latin typeface="Fira Mono" panose="020B0509050000020004" pitchFamily="49" charset="0"/>
-              </a:rPr>
-              <a:t>        -0.550 -0.185  0.126  0.088 -0.693  0.399</a:t>
-            </a:r>
-          </a:p>
-        </p:txBody>
-      </p:sp>
-      <p:sp>
-        <p:nvSpPr>
-          <p:cNvPr id="10" name="TextBox 9">
-            <a:extLst>
-              <a:ext uri="{FF2B5EF4-FFF2-40B4-BE49-F238E27FC236}">
-                <a16:creationId xmlns:a16="http://schemas.microsoft.com/office/drawing/2014/main" id="{28219FDC-BED7-E0F8-0107-163E3A20E6FD}"/>
-              </a:ext>
-            </a:extLst>
-          </p:cNvPr>
-          <p:cNvSpPr txBox="1"/>
-          <p:nvPr/>
-        </p:nvSpPr>
-        <p:spPr>
-          <a:xfrm>
-            <a:off x="4703380" y="1074509"/>
-            <a:ext cx="4572000" cy="4801314"/>
-          </a:xfrm>
-          <a:prstGeom prst="rect">
-            <a:avLst/>
-          </a:prstGeom>
-          <a:noFill/>
-        </p:spPr>
-        <p:txBody>
-          <a:bodyPr wrap="square">
-            <a:spAutoFit/>
-          </a:bodyPr>
-          <a:lstStyle/>
-          <a:p>
-            <a:r>
-              <a:rPr lang="en-US" b="1" dirty="0"/>
-              <a:t>1. Standard deviations (PC strength)</a:t>
-            </a:r>
-          </a:p>
-          <a:p>
-            <a:r>
-              <a:rPr lang="en-US" dirty="0"/>
-              <a:t>Each principal component has a </a:t>
-            </a:r>
-            <a:r>
-              <a:rPr lang="en-US" b="1" dirty="0"/>
-              <a:t>standard deviation</a:t>
-            </a:r>
-            <a:r>
-              <a:rPr lang="en-US" dirty="0"/>
-              <a:t> showing how widely animals spread along that axis.</a:t>
-            </a:r>
-          </a:p>
-          <a:p>
-            <a:r>
-              <a:rPr lang="en-US" b="1" dirty="0"/>
-              <a:t>Bigger SD = more biological variation captured.</a:t>
-            </a:r>
-            <a:endParaRPr lang="en-US" dirty="0"/>
-          </a:p>
-          <a:p>
-            <a:pPr lvl="1"/>
-            <a:r>
-              <a:rPr lang="en-US" dirty="0"/>
-              <a:t>PC1 SD = </a:t>
-            </a:r>
-            <a:r>
-              <a:rPr lang="en-US" b="1" dirty="0"/>
-              <a:t>1.45</a:t>
-            </a:r>
-            <a:r>
-              <a:rPr lang="en-US" dirty="0"/>
-              <a:t> → strongest pattern</a:t>
-            </a:r>
-          </a:p>
-          <a:p>
-            <a:pPr lvl="1"/>
-            <a:r>
-              <a:rPr lang="en-US" dirty="0"/>
-              <a:t>PC2 SD = </a:t>
-            </a:r>
-            <a:r>
-              <a:rPr lang="en-US" b="1" dirty="0"/>
-              <a:t>1.18</a:t>
-            </a:r>
-            <a:endParaRPr lang="en-US" dirty="0"/>
-          </a:p>
-          <a:p>
-            <a:pPr lvl="1"/>
-            <a:r>
-              <a:rPr lang="en-US" dirty="0"/>
-              <a:t>PC3 SD = </a:t>
-            </a:r>
-            <a:r>
-              <a:rPr lang="en-US" b="1" dirty="0"/>
-              <a:t>0.99</a:t>
-            </a:r>
-          </a:p>
-          <a:p>
-            <a:pPr lvl="1"/>
-            <a:endParaRPr lang="en-US" dirty="0"/>
-          </a:p>
-          <a:p>
-            <a:r>
-              <a:rPr lang="en-US" b="1" dirty="0"/>
-              <a:t>2. Proportion of variance (importance)</a:t>
-            </a:r>
-          </a:p>
-          <a:p>
-            <a:r>
-              <a:rPr lang="en-US" dirty="0"/>
-              <a:t>Tells how much of the entire dataset each PC explains.</a:t>
-            </a:r>
-          </a:p>
-          <a:p>
-            <a:r>
-              <a:rPr lang="en-US" b="1" dirty="0"/>
-              <a:t>PC1 = 35%</a:t>
-            </a:r>
-            <a:r>
-              <a:rPr lang="en-US" dirty="0"/>
-              <a:t>, </a:t>
-            </a:r>
-            <a:r>
-              <a:rPr lang="en-US" b="1" dirty="0"/>
-              <a:t>PC2 = 23%</a:t>
-            </a:r>
-            <a:r>
-              <a:rPr lang="en-US" dirty="0"/>
-              <a:t>, </a:t>
-            </a:r>
-            <a:r>
-              <a:rPr lang="en-US" b="1" dirty="0"/>
-              <a:t>PC3 = 16%</a:t>
-            </a:r>
-            <a:endParaRPr lang="en-US" dirty="0"/>
-          </a:p>
-          <a:p>
-            <a:r>
-              <a:rPr lang="en-US" dirty="0"/>
-              <a:t>PC1 + PC2 = </a:t>
-            </a:r>
-            <a:r>
-              <a:rPr lang="en-US" b="1" dirty="0"/>
-              <a:t>58%</a:t>
-            </a:r>
-            <a:r>
-              <a:rPr lang="en-US" dirty="0"/>
-              <a:t> → more than half of all differences between animals.</a:t>
-            </a:r>
-          </a:p>
-          <a:p>
-            <a:endParaRPr lang="en-US" dirty="0"/>
-          </a:p>
-        </p:txBody>
-      </p:sp>
-      <p:sp>
-        <p:nvSpPr>
-          <p:cNvPr id="12" name="TextBox 11">
-            <a:extLst>
-              <a:ext uri="{FF2B5EF4-FFF2-40B4-BE49-F238E27FC236}">
-                <a16:creationId xmlns:a16="http://schemas.microsoft.com/office/drawing/2014/main" id="{C53B9A57-5078-437C-207C-D3D33CE7D652}"/>
-              </a:ext>
-            </a:extLst>
-          </p:cNvPr>
-          <p:cNvSpPr txBox="1"/>
-          <p:nvPr/>
-        </p:nvSpPr>
-        <p:spPr>
-          <a:xfrm>
-            <a:off x="270642" y="4465482"/>
-            <a:ext cx="4614040" cy="2031325"/>
-          </a:xfrm>
-          <a:prstGeom prst="rect">
-            <a:avLst/>
-          </a:prstGeom>
-          <a:noFill/>
-        </p:spPr>
-        <p:txBody>
-          <a:bodyPr wrap="square">
-            <a:spAutoFit/>
-          </a:bodyPr>
-          <a:lstStyle/>
-          <a:p>
-            <a:r>
-              <a:rPr lang="en-US" b="1" dirty="0"/>
-              <a:t>3. Loadings (what each PC represents biologically)</a:t>
-            </a:r>
-          </a:p>
-          <a:p>
-            <a:r>
-              <a:rPr lang="en-US" dirty="0"/>
-              <a:t>Loadings show </a:t>
-            </a:r>
-            <a:r>
-              <a:rPr lang="en-US" b="1" dirty="0"/>
-              <a:t>how each original measurement contributes</a:t>
-            </a:r>
-            <a:r>
-              <a:rPr lang="en-US" dirty="0"/>
-              <a:t> to a PC.</a:t>
-            </a:r>
-          </a:p>
-          <a:p>
-            <a:r>
-              <a:rPr lang="en-US" b="1" dirty="0"/>
-              <a:t>Large absolute values</a:t>
-            </a:r>
-            <a:r>
-              <a:rPr lang="en-US" dirty="0"/>
-              <a:t> = strong influence.</a:t>
-            </a:r>
-          </a:p>
-          <a:p>
-            <a:r>
-              <a:rPr lang="en-US" b="1" dirty="0"/>
-              <a:t>Same sign</a:t>
-            </a:r>
-            <a:r>
-              <a:rPr lang="en-US" dirty="0"/>
-              <a:t> = variables increase together; </a:t>
-            </a:r>
-            <a:r>
-              <a:rPr lang="en-US" b="1" dirty="0"/>
-              <a:t>opposite sign</a:t>
-            </a:r>
-            <a:r>
-              <a:rPr lang="en-US" dirty="0"/>
-              <a:t> = move in opposite directions.</a:t>
-            </a:r>
-          </a:p>
-        </p:txBody>
-      </p:sp>
-    </p:spTree>
-    <p:extLst>
-      <p:ext uri="{BB962C8B-B14F-4D97-AF65-F5344CB8AC3E}">
-        <p14:creationId xmlns:p14="http://schemas.microsoft.com/office/powerpoint/2010/main" val="2548628455"/>
       </p:ext>
     </p:extLst>
   </p:cSld>
@@ -6261,6 +6649,652 @@
       </p:par>
     </p:tnLst>
   </p:timing>
+</p:sld>
+</file>
+
+<file path=ppt/slides/slide20.xml><?xml version="1.0" encoding="utf-8"?>
+<p:sld xmlns:a="http://schemas.openxmlformats.org/drawingml/2006/main" xmlns:r="http://schemas.openxmlformats.org/officeDocument/2006/relationships" xmlns:p="http://schemas.openxmlformats.org/presentationml/2006/main">
+  <p:cSld>
+    <p:spTree>
+      <p:nvGrpSpPr>
+        <p:cNvPr id="1" name="">
+          <a:extLst>
+            <a:ext uri="{FF2B5EF4-FFF2-40B4-BE49-F238E27FC236}">
+              <a16:creationId xmlns:a16="http://schemas.microsoft.com/office/drawing/2014/main" id="{498961D4-A409-0CCA-2366-A2A339784C35}"/>
+            </a:ext>
+          </a:extLst>
+        </p:cNvPr>
+        <p:cNvGrpSpPr/>
+        <p:nvPr/>
+      </p:nvGrpSpPr>
+      <p:grpSpPr>
+        <a:xfrm>
+          <a:off x="0" y="0"/>
+          <a:ext cx="0" cy="0"/>
+          <a:chOff x="0" y="0"/>
+          <a:chExt cx="0" cy="0"/>
+        </a:xfrm>
+      </p:grpSpPr>
+      <p:sp>
+        <p:nvSpPr>
+          <p:cNvPr id="6" name="TextBox 5">
+            <a:extLst>
+              <a:ext uri="{FF2B5EF4-FFF2-40B4-BE49-F238E27FC236}">
+                <a16:creationId xmlns:a16="http://schemas.microsoft.com/office/drawing/2014/main" id="{BABBF7E7-4397-9A8E-5361-4241BE9843B7}"/>
+              </a:ext>
+            </a:extLst>
+          </p:cNvPr>
+          <p:cNvSpPr txBox="1"/>
+          <p:nvPr/>
+        </p:nvSpPr>
+        <p:spPr>
+          <a:xfrm>
+            <a:off x="204952" y="612844"/>
+            <a:ext cx="7709338" cy="2862322"/>
+          </a:xfrm>
+          <a:prstGeom prst="rect">
+            <a:avLst/>
+          </a:prstGeom>
+          <a:noFill/>
+        </p:spPr>
+        <p:txBody>
+          <a:bodyPr wrap="square">
+            <a:spAutoFit/>
+          </a:bodyPr>
+          <a:lstStyle/>
+          <a:p>
+            <a:pPr>
+              <a:buNone/>
+            </a:pPr>
+            <a:r>
+              <a:rPr lang="en-US" b="1" dirty="0"/>
+              <a:t>🐔 How to Interpret PCA </a:t>
+            </a:r>
+          </a:p>
+          <a:p>
+            <a:pPr>
+              <a:buNone/>
+            </a:pPr>
+            <a:endParaRPr lang="en-US" b="1" dirty="0"/>
+          </a:p>
+          <a:p>
+            <a:pPr>
+              <a:buNone/>
+            </a:pPr>
+            <a:endParaRPr lang="en-US" b="1" dirty="0"/>
+          </a:p>
+          <a:p>
+            <a:pPr>
+              <a:buNone/>
+            </a:pPr>
+            <a:endParaRPr lang="en-US" b="1" dirty="0"/>
+          </a:p>
+          <a:p>
+            <a:pPr>
+              <a:buNone/>
+            </a:pPr>
+            <a:endParaRPr lang="en-US" b="1" dirty="0"/>
+          </a:p>
+          <a:p>
+            <a:pPr>
+              <a:buNone/>
+            </a:pPr>
+            <a:endParaRPr lang="en-US" b="1" dirty="0"/>
+          </a:p>
+          <a:p>
+            <a:pPr>
+              <a:buNone/>
+            </a:pPr>
+            <a:endParaRPr lang="en-US" b="1" dirty="0"/>
+          </a:p>
+          <a:p>
+            <a:pPr>
+              <a:buNone/>
+            </a:pPr>
+            <a:endParaRPr lang="en-US" b="1" dirty="0"/>
+          </a:p>
+          <a:p>
+            <a:pPr>
+              <a:buNone/>
+            </a:pPr>
+            <a:endParaRPr lang="en-US" b="1" dirty="0"/>
+          </a:p>
+          <a:p>
+            <a:pPr>
+              <a:buNone/>
+            </a:pPr>
+            <a:endParaRPr lang="en-US" b="1" dirty="0"/>
+          </a:p>
+        </p:txBody>
+      </p:sp>
+      <p:sp>
+        <p:nvSpPr>
+          <p:cNvPr id="4" name="TextBox 3">
+            <a:extLst>
+              <a:ext uri="{FF2B5EF4-FFF2-40B4-BE49-F238E27FC236}">
+                <a16:creationId xmlns:a16="http://schemas.microsoft.com/office/drawing/2014/main" id="{9D2A610C-E699-6D0E-4A74-F14E40BF6778}"/>
+              </a:ext>
+            </a:extLst>
+          </p:cNvPr>
+          <p:cNvSpPr txBox="1"/>
+          <p:nvPr/>
+        </p:nvSpPr>
+        <p:spPr>
+          <a:xfrm>
+            <a:off x="357351" y="1661747"/>
+            <a:ext cx="4440622" cy="1938992"/>
+          </a:xfrm>
+          <a:prstGeom prst="rect">
+            <a:avLst/>
+          </a:prstGeom>
+          <a:noFill/>
+        </p:spPr>
+        <p:txBody>
+          <a:bodyPr wrap="square">
+            <a:spAutoFit/>
+          </a:bodyPr>
+          <a:lstStyle/>
+          <a:p>
+            <a:pPr algn="l">
+              <a:buNone/>
+            </a:pPr>
+            <a:r>
+              <a:rPr lang="en-US" sz="800" b="0" i="0" dirty="0">
+                <a:solidFill>
+                  <a:srgbClr val="000000"/>
+                </a:solidFill>
+                <a:effectLst/>
+                <a:latin typeface="Fira Mono" panose="020B0509050000020004" pitchFamily="49" charset="0"/>
+              </a:rPr>
+              <a:t>── PCA Summary ──</a:t>
+            </a:r>
+          </a:p>
+          <a:p>
+            <a:pPr algn="l">
+              <a:buNone/>
+            </a:pPr>
+            <a:r>
+              <a:rPr lang="en-US" sz="800" b="0" i="0" dirty="0">
+                <a:solidFill>
+                  <a:srgbClr val="000000"/>
+                </a:solidFill>
+                <a:effectLst/>
+                <a:latin typeface="Fira Mono" panose="020B0509050000020004" pitchFamily="49" charset="0"/>
+              </a:rPr>
+              <a:t>Importance of components:</a:t>
+            </a:r>
+          </a:p>
+          <a:p>
+            <a:pPr algn="l">
+              <a:buNone/>
+            </a:pPr>
+            <a:r>
+              <a:rPr lang="en-US" sz="800" b="0" i="0" dirty="0">
+                <a:solidFill>
+                  <a:srgbClr val="000000"/>
+                </a:solidFill>
+                <a:effectLst/>
+                <a:latin typeface="Fira Mono" panose="020B0509050000020004" pitchFamily="49" charset="0"/>
+              </a:rPr>
+              <a:t>                          PC1    PC2    PC3    PC4     PC5     PC6</a:t>
+            </a:r>
+          </a:p>
+          <a:p>
+            <a:pPr algn="l">
+              <a:buNone/>
+            </a:pPr>
+            <a:r>
+              <a:rPr lang="en-US" sz="800" b="0" i="0" dirty="0">
+                <a:solidFill>
+                  <a:srgbClr val="000000"/>
+                </a:solidFill>
+                <a:effectLst/>
+                <a:latin typeface="Fira Mono" panose="020B0509050000020004" pitchFamily="49" charset="0"/>
+              </a:rPr>
+              <a:t>Standard deviation     1.4475 1.1806 0.9907 0.7925 0.69433 0.64737</a:t>
+            </a:r>
+          </a:p>
+          <a:p>
+            <a:pPr algn="l">
+              <a:buNone/>
+            </a:pPr>
+            <a:r>
+              <a:rPr lang="en-US" sz="800" b="0" i="0" dirty="0">
+                <a:solidFill>
+                  <a:srgbClr val="000000"/>
+                </a:solidFill>
+                <a:effectLst/>
+                <a:latin typeface="Fira Mono" panose="020B0509050000020004" pitchFamily="49" charset="0"/>
+              </a:rPr>
+              <a:t>Proportion of Variance 0.3492 0.2323 0.1636 0.1047 0.08035 0.06985</a:t>
+            </a:r>
+          </a:p>
+          <a:p>
+            <a:pPr algn="l">
+              <a:buNone/>
+            </a:pPr>
+            <a:r>
+              <a:rPr lang="en-US" sz="800" b="0" i="0" dirty="0">
+                <a:solidFill>
+                  <a:srgbClr val="000000"/>
+                </a:solidFill>
+                <a:effectLst/>
+                <a:latin typeface="Fira Mono" panose="020B0509050000020004" pitchFamily="49" charset="0"/>
+              </a:rPr>
+              <a:t>Cumulative Proportion  0.3492 0.5815 0.7451 0.8498 0.93015 1.00000</a:t>
+            </a:r>
+          </a:p>
+          <a:p>
+            <a:pPr algn="l">
+              <a:buNone/>
+            </a:pPr>
+            <a:endParaRPr lang="en-US" sz="800" b="0" i="0" dirty="0">
+              <a:solidFill>
+                <a:srgbClr val="000000"/>
+              </a:solidFill>
+              <a:effectLst/>
+              <a:latin typeface="Fira Mono" panose="020B0509050000020004" pitchFamily="49" charset="0"/>
+            </a:endParaRPr>
+          </a:p>
+          <a:p>
+            <a:pPr algn="l">
+              <a:buNone/>
+            </a:pPr>
+            <a:r>
+              <a:rPr lang="en-US" sz="800" b="0" i="0" dirty="0">
+                <a:solidFill>
+                  <a:srgbClr val="000000"/>
+                </a:solidFill>
+                <a:effectLst/>
+                <a:latin typeface="Fira Mono" panose="020B0509050000020004" pitchFamily="49" charset="0"/>
+              </a:rPr>
+              <a:t>── PCA Loadings (rotation matrix) ──</a:t>
+            </a:r>
+          </a:p>
+          <a:p>
+            <a:pPr algn="l">
+              <a:buNone/>
+            </a:pPr>
+            <a:r>
+              <a:rPr lang="en-US" sz="800" b="0" i="0" dirty="0">
+                <a:solidFill>
+                  <a:srgbClr val="000000"/>
+                </a:solidFill>
+                <a:effectLst/>
+                <a:latin typeface="Fira Mono" panose="020B0509050000020004" pitchFamily="49" charset="0"/>
+              </a:rPr>
+              <a:t>                   PC1    PC2    PC3    PC4    PC5    PC6</a:t>
+            </a:r>
+          </a:p>
+          <a:p>
+            <a:pPr algn="l">
+              <a:buNone/>
+            </a:pPr>
+            <a:r>
+              <a:rPr lang="en-US" sz="800" b="0" i="0" dirty="0" err="1">
+                <a:solidFill>
+                  <a:srgbClr val="000000"/>
+                </a:solidFill>
+                <a:effectLst/>
+                <a:latin typeface="Fira Mono" panose="020B0509050000020004" pitchFamily="49" charset="0"/>
+              </a:rPr>
+              <a:t>Weight_baseline</a:t>
+            </a:r>
+            <a:r>
+              <a:rPr lang="en-US" sz="800" b="0" i="0" dirty="0">
+                <a:solidFill>
+                  <a:srgbClr val="000000"/>
+                </a:solidFill>
+                <a:effectLst/>
+                <a:latin typeface="Fira Mono" panose="020B0509050000020004" pitchFamily="49" charset="0"/>
+              </a:rPr>
+              <a:t> -0.062 -0.227 -0.965  0.046  0.001  0.106</a:t>
+            </a:r>
+          </a:p>
+          <a:p>
+            <a:pPr algn="l">
+              <a:buNone/>
+            </a:pPr>
+            <a:r>
+              <a:rPr lang="en-US" sz="800" b="0" i="0" dirty="0">
+                <a:solidFill>
+                  <a:srgbClr val="000000"/>
+                </a:solidFill>
+                <a:effectLst/>
+                <a:latin typeface="Fira Mono" panose="020B0509050000020004" pitchFamily="49" charset="0"/>
+              </a:rPr>
+              <a:t>Cortisol        -0.587  0.034 -0.057  0.035 -0.013 -0.806</a:t>
+            </a:r>
+          </a:p>
+          <a:p>
+            <a:pPr algn="l">
+              <a:buNone/>
+            </a:pPr>
+            <a:r>
+              <a:rPr lang="en-US" sz="800" b="0" i="0" dirty="0">
+                <a:solidFill>
+                  <a:srgbClr val="000000"/>
+                </a:solidFill>
+                <a:effectLst/>
+                <a:latin typeface="Fira Mono" panose="020B0509050000020004" pitchFamily="49" charset="0"/>
+              </a:rPr>
+              <a:t>Glucose         -0.482 -0.388  0.159  0.048  0.701  0.314</a:t>
+            </a:r>
+          </a:p>
+          <a:p>
+            <a:pPr algn="l">
+              <a:buNone/>
+            </a:pPr>
+            <a:r>
+              <a:rPr lang="en-US" sz="800" b="0" i="0" dirty="0" err="1">
+                <a:solidFill>
+                  <a:srgbClr val="000000"/>
+                </a:solidFill>
+                <a:effectLst/>
+                <a:latin typeface="Fira Mono" panose="020B0509050000020004" pitchFamily="49" charset="0"/>
+              </a:rPr>
+              <a:t>FeedIntake</a:t>
+            </a:r>
+            <a:r>
+              <a:rPr lang="en-US" sz="800" b="0" i="0" dirty="0">
+                <a:solidFill>
+                  <a:srgbClr val="000000"/>
+                </a:solidFill>
+                <a:effectLst/>
+                <a:latin typeface="Fira Mono" panose="020B0509050000020004" pitchFamily="49" charset="0"/>
+              </a:rPr>
+              <a:t>       0.172 -0.662  0.092 -0.685 -0.138 -0.187</a:t>
+            </a:r>
+          </a:p>
+          <a:p>
+            <a:pPr algn="l">
+              <a:buNone/>
+            </a:pPr>
+            <a:r>
+              <a:rPr lang="en-US" sz="800" b="0" i="0" dirty="0" err="1">
+                <a:solidFill>
+                  <a:srgbClr val="000000"/>
+                </a:solidFill>
+                <a:effectLst/>
+                <a:latin typeface="Fira Mono" panose="020B0509050000020004" pitchFamily="49" charset="0"/>
+              </a:rPr>
+              <a:t>HeartRate</a:t>
+            </a:r>
+            <a:r>
+              <a:rPr lang="en-US" sz="800" b="0" i="0" dirty="0">
+                <a:solidFill>
+                  <a:srgbClr val="000000"/>
+                </a:solidFill>
+                <a:effectLst/>
+                <a:latin typeface="Fira Mono" panose="020B0509050000020004" pitchFamily="49" charset="0"/>
+              </a:rPr>
+              <a:t>        0.296 -0.570  0.125  0.719 -0.093 -0.216</a:t>
+            </a:r>
+          </a:p>
+          <a:p>
+            <a:pPr algn="l">
+              <a:buNone/>
+            </a:pPr>
+            <a:r>
+              <a:rPr lang="en-US" sz="800" b="0" i="0" dirty="0" err="1">
+                <a:solidFill>
+                  <a:srgbClr val="000000"/>
+                </a:solidFill>
+                <a:effectLst/>
+                <a:latin typeface="Fira Mono" panose="020B0509050000020004" pitchFamily="49" charset="0"/>
+              </a:rPr>
+              <a:t>BodyTemp</a:t>
+            </a:r>
+            <a:r>
+              <a:rPr lang="en-US" sz="800" b="0" i="0" dirty="0">
+                <a:solidFill>
+                  <a:srgbClr val="000000"/>
+                </a:solidFill>
+                <a:effectLst/>
+                <a:latin typeface="Fira Mono" panose="020B0509050000020004" pitchFamily="49" charset="0"/>
+              </a:rPr>
+              <a:t>        -0.550 -0.185  0.126  0.088 -0.693  0.399</a:t>
+            </a:r>
+          </a:p>
+        </p:txBody>
+      </p:sp>
+      <p:sp>
+        <p:nvSpPr>
+          <p:cNvPr id="10" name="TextBox 9">
+            <a:extLst>
+              <a:ext uri="{FF2B5EF4-FFF2-40B4-BE49-F238E27FC236}">
+                <a16:creationId xmlns:a16="http://schemas.microsoft.com/office/drawing/2014/main" id="{28219FDC-BED7-E0F8-0107-163E3A20E6FD}"/>
+              </a:ext>
+            </a:extLst>
+          </p:cNvPr>
+          <p:cNvSpPr txBox="1"/>
+          <p:nvPr/>
+        </p:nvSpPr>
+        <p:spPr>
+          <a:xfrm>
+            <a:off x="4703380" y="1074509"/>
+            <a:ext cx="4572000" cy="4801314"/>
+          </a:xfrm>
+          <a:prstGeom prst="rect">
+            <a:avLst/>
+          </a:prstGeom>
+          <a:noFill/>
+        </p:spPr>
+        <p:txBody>
+          <a:bodyPr wrap="square">
+            <a:spAutoFit/>
+          </a:bodyPr>
+          <a:lstStyle/>
+          <a:p>
+            <a:r>
+              <a:rPr lang="en-US" b="1" dirty="0"/>
+              <a:t>1. Standard deviations (PC strength)</a:t>
+            </a:r>
+          </a:p>
+          <a:p>
+            <a:r>
+              <a:rPr lang="en-US" dirty="0"/>
+              <a:t>Each principal component has a </a:t>
+            </a:r>
+            <a:r>
+              <a:rPr lang="en-US" b="1" dirty="0"/>
+              <a:t>standard deviation</a:t>
+            </a:r>
+            <a:r>
+              <a:rPr lang="en-US" dirty="0"/>
+              <a:t> showing how widely animals spread along that axis.</a:t>
+            </a:r>
+          </a:p>
+          <a:p>
+            <a:r>
+              <a:rPr lang="en-US" b="1" dirty="0"/>
+              <a:t>Bigger SD = more biological variation captured.</a:t>
+            </a:r>
+            <a:endParaRPr lang="en-US" dirty="0"/>
+          </a:p>
+          <a:p>
+            <a:pPr lvl="1"/>
+            <a:r>
+              <a:rPr lang="en-US" dirty="0"/>
+              <a:t>PC1 SD = </a:t>
+            </a:r>
+            <a:r>
+              <a:rPr lang="en-US" b="1" dirty="0"/>
+              <a:t>1.45</a:t>
+            </a:r>
+            <a:r>
+              <a:rPr lang="en-US" dirty="0"/>
+              <a:t> → strongest pattern</a:t>
+            </a:r>
+          </a:p>
+          <a:p>
+            <a:pPr lvl="1"/>
+            <a:r>
+              <a:rPr lang="en-US" dirty="0"/>
+              <a:t>PC2 SD = </a:t>
+            </a:r>
+            <a:r>
+              <a:rPr lang="en-US" b="1" dirty="0"/>
+              <a:t>1.18</a:t>
+            </a:r>
+            <a:endParaRPr lang="en-US" dirty="0"/>
+          </a:p>
+          <a:p>
+            <a:pPr lvl="1"/>
+            <a:r>
+              <a:rPr lang="en-US" dirty="0"/>
+              <a:t>PC3 SD = </a:t>
+            </a:r>
+            <a:r>
+              <a:rPr lang="en-US" b="1" dirty="0"/>
+              <a:t>0.99</a:t>
+            </a:r>
+          </a:p>
+          <a:p>
+            <a:pPr lvl="1"/>
+            <a:endParaRPr lang="en-US" dirty="0"/>
+          </a:p>
+          <a:p>
+            <a:r>
+              <a:rPr lang="en-US" b="1" dirty="0"/>
+              <a:t>2. Proportion of variance (importance)</a:t>
+            </a:r>
+          </a:p>
+          <a:p>
+            <a:r>
+              <a:rPr lang="en-US" dirty="0"/>
+              <a:t>Tells how much of the entire dataset each PC explains.</a:t>
+            </a:r>
+          </a:p>
+          <a:p>
+            <a:r>
+              <a:rPr lang="en-US" b="1" dirty="0"/>
+              <a:t>PC1 = 35%</a:t>
+            </a:r>
+            <a:r>
+              <a:rPr lang="en-US" dirty="0"/>
+              <a:t>, </a:t>
+            </a:r>
+            <a:r>
+              <a:rPr lang="en-US" b="1" dirty="0"/>
+              <a:t>PC2 = 23%</a:t>
+            </a:r>
+            <a:r>
+              <a:rPr lang="en-US" dirty="0"/>
+              <a:t>, </a:t>
+            </a:r>
+            <a:r>
+              <a:rPr lang="en-US" b="1" dirty="0"/>
+              <a:t>PC3 = 16%</a:t>
+            </a:r>
+            <a:endParaRPr lang="en-US" dirty="0"/>
+          </a:p>
+          <a:p>
+            <a:r>
+              <a:rPr lang="en-US" dirty="0"/>
+              <a:t>PC1 + PC2 = </a:t>
+            </a:r>
+            <a:r>
+              <a:rPr lang="en-US" b="1" dirty="0"/>
+              <a:t>58%</a:t>
+            </a:r>
+            <a:r>
+              <a:rPr lang="en-US" dirty="0"/>
+              <a:t> → more than half of all differences between animals.</a:t>
+            </a:r>
+          </a:p>
+          <a:p>
+            <a:endParaRPr lang="en-US" dirty="0"/>
+          </a:p>
+        </p:txBody>
+      </p:sp>
+      <p:sp>
+        <p:nvSpPr>
+          <p:cNvPr id="12" name="TextBox 11">
+            <a:extLst>
+              <a:ext uri="{FF2B5EF4-FFF2-40B4-BE49-F238E27FC236}">
+                <a16:creationId xmlns:a16="http://schemas.microsoft.com/office/drawing/2014/main" id="{C53B9A57-5078-437C-207C-D3D33CE7D652}"/>
+              </a:ext>
+            </a:extLst>
+          </p:cNvPr>
+          <p:cNvSpPr txBox="1"/>
+          <p:nvPr/>
+        </p:nvSpPr>
+        <p:spPr>
+          <a:xfrm>
+            <a:off x="270642" y="4465482"/>
+            <a:ext cx="4614040" cy="2031325"/>
+          </a:xfrm>
+          <a:prstGeom prst="rect">
+            <a:avLst/>
+          </a:prstGeom>
+          <a:noFill/>
+        </p:spPr>
+        <p:txBody>
+          <a:bodyPr wrap="square">
+            <a:spAutoFit/>
+          </a:bodyPr>
+          <a:lstStyle/>
+          <a:p>
+            <a:r>
+              <a:rPr lang="en-US" b="1" dirty="0"/>
+              <a:t>3. Loadings (what each PC represents biologically)</a:t>
+            </a:r>
+          </a:p>
+          <a:p>
+            <a:r>
+              <a:rPr lang="en-US" dirty="0"/>
+              <a:t>Loadings show </a:t>
+            </a:r>
+            <a:r>
+              <a:rPr lang="en-US" b="1" dirty="0"/>
+              <a:t>how each original measurement contributes</a:t>
+            </a:r>
+            <a:r>
+              <a:rPr lang="en-US" dirty="0"/>
+              <a:t> to a PC.</a:t>
+            </a:r>
+          </a:p>
+          <a:p>
+            <a:r>
+              <a:rPr lang="en-US" b="1" dirty="0"/>
+              <a:t>Large absolute values</a:t>
+            </a:r>
+            <a:r>
+              <a:rPr lang="en-US" dirty="0"/>
+              <a:t> = strong influence.</a:t>
+            </a:r>
+          </a:p>
+          <a:p>
+            <a:r>
+              <a:rPr lang="en-US" b="1" dirty="0"/>
+              <a:t>Same sign</a:t>
+            </a:r>
+            <a:r>
+              <a:rPr lang="en-US" dirty="0"/>
+              <a:t> = variables increase together; </a:t>
+            </a:r>
+            <a:r>
+              <a:rPr lang="en-US" b="1" dirty="0"/>
+              <a:t>opposite sign</a:t>
+            </a:r>
+            <a:r>
+              <a:rPr lang="en-US" dirty="0"/>
+              <a:t> = move in opposite directions.</a:t>
+            </a:r>
+          </a:p>
+        </p:txBody>
+      </p:sp>
+    </p:spTree>
+    <p:extLst>
+      <p:ext uri="{BB962C8B-B14F-4D97-AF65-F5344CB8AC3E}">
+        <p14:creationId xmlns:p14="http://schemas.microsoft.com/office/powerpoint/2010/main" val="2548628455"/>
+      </p:ext>
+    </p:extLst>
+  </p:cSld>
+  <p:clrMapOvr>
+    <a:masterClrMapping/>
+  </p:clrMapOvr>
 </p:sld>
 </file>
 

</xml_diff>

<commit_message>
fixed bug in pca colors
</commit_message>
<xml_diff>
--- a/presentations/Table_Analyzer_Overview.pptx
+++ b/presentations/Table_Analyzer_Overview.pptx
@@ -4938,12 +4938,8 @@
               <a:rPr lang="en-US" sz="1200" dirty="0"/>
             </a:br>
             <a:r>
-              <a:rPr lang="en-US" sz="1200"/>
-              <a:t>→ Low-Fat </a:t>
-            </a:r>
-            <a:r>
               <a:rPr lang="en-US" sz="1200" dirty="0"/>
-              <a:t>diet (8.59) → High-Fat = </a:t>
+              <a:t>→ Low-Fat diet (8.59) → High-Fat = </a:t>
             </a:r>
             <a:r>
               <a:rPr lang="en-US" sz="1200" b="1" dirty="0"/>
@@ -5311,70 +5307,6 @@
               </a:rPr>
               <a:t> -0.275312  0.443040 -0.621417  0.53559 </a:t>
             </a:r>
-          </a:p>
-        </p:txBody>
-      </p:sp>
-      <p:sp>
-        <p:nvSpPr>
-          <p:cNvPr id="6" name="TextBox 5">
-            <a:extLst>
-              <a:ext uri="{FF2B5EF4-FFF2-40B4-BE49-F238E27FC236}">
-                <a16:creationId xmlns:a16="http://schemas.microsoft.com/office/drawing/2014/main" id="{8F016CFD-B79B-708E-F335-4CF51A25248E}"/>
-              </a:ext>
-            </a:extLst>
-          </p:cNvPr>
-          <p:cNvSpPr txBox="1"/>
-          <p:nvPr/>
-        </p:nvSpPr>
-        <p:spPr>
-          <a:xfrm>
-            <a:off x="9375228" y="3279228"/>
-            <a:ext cx="184731" cy="369332"/>
-          </a:xfrm>
-          <a:prstGeom prst="rect">
-            <a:avLst/>
-          </a:prstGeom>
-          <a:noFill/>
-        </p:spPr>
-        <p:txBody>
-          <a:bodyPr wrap="none" rtlCol="0">
-            <a:spAutoFit/>
-          </a:bodyPr>
-          <a:lstStyle/>
-          <a:p>
-            <a:endParaRPr lang="en-US" dirty="0"/>
-          </a:p>
-        </p:txBody>
-      </p:sp>
-      <p:sp>
-        <p:nvSpPr>
-          <p:cNvPr id="8" name="TextBox 7">
-            <a:extLst>
-              <a:ext uri="{FF2B5EF4-FFF2-40B4-BE49-F238E27FC236}">
-                <a16:creationId xmlns:a16="http://schemas.microsoft.com/office/drawing/2014/main" id="{B4F2DC70-D222-D871-D2FC-5815430BC722}"/>
-              </a:ext>
-            </a:extLst>
-          </p:cNvPr>
-          <p:cNvSpPr txBox="1"/>
-          <p:nvPr/>
-        </p:nvSpPr>
-        <p:spPr>
-          <a:xfrm>
-            <a:off x="-1083013" y="713362"/>
-            <a:ext cx="184731" cy="369332"/>
-          </a:xfrm>
-          <a:prstGeom prst="rect">
-            <a:avLst/>
-          </a:prstGeom>
-          <a:noFill/>
-        </p:spPr>
-        <p:txBody>
-          <a:bodyPr wrap="none" rtlCol="0">
-            <a:spAutoFit/>
-          </a:bodyPr>
-          <a:lstStyle/>
-          <a:p>
-            <a:endParaRPr lang="en-US" dirty="0"/>
           </a:p>
         </p:txBody>
       </p:sp>

</xml_diff>

<commit_message>
fixed various bugs in regression module
</commit_message>
<xml_diff>
--- a/presentations/Table_Analyzer_Overview.pptx
+++ b/presentations/Table_Analyzer_Overview.pptx
@@ -5,7 +5,7 @@
     <p:sldMasterId id="2147483648" r:id="rId1"/>
   </p:sldMasterIdLst>
   <p:notesMasterIdLst>
-    <p:notesMasterId r:id="rId22"/>
+    <p:notesMasterId r:id="rId26"/>
   </p:notesMasterIdLst>
   <p:sldIdLst>
     <p:sldId id="256" r:id="rId2"/>
@@ -25,9 +25,13 @@
     <p:sldId id="278" r:id="rId16"/>
     <p:sldId id="262" r:id="rId17"/>
     <p:sldId id="259" r:id="rId18"/>
-    <p:sldId id="260" r:id="rId19"/>
-    <p:sldId id="263" r:id="rId20"/>
-    <p:sldId id="265" r:id="rId21"/>
+    <p:sldId id="283" r:id="rId19"/>
+    <p:sldId id="260" r:id="rId20"/>
+    <p:sldId id="281" r:id="rId21"/>
+    <p:sldId id="263" r:id="rId22"/>
+    <p:sldId id="265" r:id="rId23"/>
+    <p:sldId id="280" r:id="rId24"/>
+    <p:sldId id="279" r:id="rId25"/>
   </p:sldIdLst>
   <p:sldSz cx="9144000" cy="6858000" type="screen4x3"/>
   <p:notesSz cx="6858000" cy="9144000"/>
@@ -227,7 +231,7 @@
           <a:p>
             <a:fld id="{404C4D2F-30A8-1C43-8374-9D9D8BF63153}" type="datetimeFigureOut">
               <a:rPr lang="en-US" smtClean="0"/>
-              <a:t>11/27/25</a:t>
+              <a:t>11/29/2025</a:t>
             </a:fld>
             <a:endParaRPr lang="en-US"/>
           </a:p>
@@ -841,7 +845,7 @@
           <a:p>
             <a:fld id="{5BCAD085-E8A6-8845-BD4E-CB4CCA059FC4}" type="datetimeFigureOut">
               <a:rPr lang="en-US" smtClean="0"/>
-              <a:t>11/27/25</a:t>
+              <a:t>11/29/2025</a:t>
             </a:fld>
             <a:endParaRPr lang="en-US"/>
           </a:p>
@@ -1009,7 +1013,7 @@
           <a:p>
             <a:fld id="{5BCAD085-E8A6-8845-BD4E-CB4CCA059FC4}" type="datetimeFigureOut">
               <a:rPr lang="en-US" smtClean="0"/>
-              <a:t>11/27/25</a:t>
+              <a:t>11/29/2025</a:t>
             </a:fld>
             <a:endParaRPr lang="en-US"/>
           </a:p>
@@ -1187,7 +1191,7 @@
           <a:p>
             <a:fld id="{5BCAD085-E8A6-8845-BD4E-CB4CCA059FC4}" type="datetimeFigureOut">
               <a:rPr lang="en-US" smtClean="0"/>
-              <a:t>11/27/25</a:t>
+              <a:t>11/29/2025</a:t>
             </a:fld>
             <a:endParaRPr lang="en-US"/>
           </a:p>
@@ -1355,7 +1359,7 @@
           <a:p>
             <a:fld id="{5BCAD085-E8A6-8845-BD4E-CB4CCA059FC4}" type="datetimeFigureOut">
               <a:rPr lang="en-US" smtClean="0"/>
-              <a:t>11/27/25</a:t>
+              <a:t>11/29/2025</a:t>
             </a:fld>
             <a:endParaRPr lang="en-US"/>
           </a:p>
@@ -1600,7 +1604,7 @@
           <a:p>
             <a:fld id="{5BCAD085-E8A6-8845-BD4E-CB4CCA059FC4}" type="datetimeFigureOut">
               <a:rPr lang="en-US" smtClean="0"/>
-              <a:t>11/27/25</a:t>
+              <a:t>11/29/2025</a:t>
             </a:fld>
             <a:endParaRPr lang="en-US"/>
           </a:p>
@@ -1885,7 +1889,7 @@
           <a:p>
             <a:fld id="{5BCAD085-E8A6-8845-BD4E-CB4CCA059FC4}" type="datetimeFigureOut">
               <a:rPr lang="en-US" smtClean="0"/>
-              <a:t>11/27/25</a:t>
+              <a:t>11/29/2025</a:t>
             </a:fld>
             <a:endParaRPr lang="en-US"/>
           </a:p>
@@ -2304,7 +2308,7 @@
           <a:p>
             <a:fld id="{5BCAD085-E8A6-8845-BD4E-CB4CCA059FC4}" type="datetimeFigureOut">
               <a:rPr lang="en-US" smtClean="0"/>
-              <a:t>11/27/25</a:t>
+              <a:t>11/29/2025</a:t>
             </a:fld>
             <a:endParaRPr lang="en-US"/>
           </a:p>
@@ -2421,7 +2425,7 @@
           <a:p>
             <a:fld id="{5BCAD085-E8A6-8845-BD4E-CB4CCA059FC4}" type="datetimeFigureOut">
               <a:rPr lang="en-US" smtClean="0"/>
-              <a:t>11/27/25</a:t>
+              <a:t>11/29/2025</a:t>
             </a:fld>
             <a:endParaRPr lang="en-US"/>
           </a:p>
@@ -2516,7 +2520,7 @@
           <a:p>
             <a:fld id="{5BCAD085-E8A6-8845-BD4E-CB4CCA059FC4}" type="datetimeFigureOut">
               <a:rPr lang="en-US" smtClean="0"/>
-              <a:t>11/27/25</a:t>
+              <a:t>11/29/2025</a:t>
             </a:fld>
             <a:endParaRPr lang="en-US"/>
           </a:p>
@@ -2791,7 +2795,7 @@
           <a:p>
             <a:fld id="{5BCAD085-E8A6-8845-BD4E-CB4CCA059FC4}" type="datetimeFigureOut">
               <a:rPr lang="en-US" smtClean="0"/>
-              <a:t>11/27/25</a:t>
+              <a:t>11/29/2025</a:t>
             </a:fld>
             <a:endParaRPr lang="en-US"/>
           </a:p>
@@ -3043,7 +3047,7 @@
           <a:p>
             <a:fld id="{5BCAD085-E8A6-8845-BD4E-CB4CCA059FC4}" type="datetimeFigureOut">
               <a:rPr lang="en-US" smtClean="0"/>
-              <a:t>11/27/25</a:t>
+              <a:t>11/29/2025</a:t>
             </a:fld>
             <a:endParaRPr lang="en-US"/>
           </a:p>
@@ -3266,7 +3270,7 @@
           <a:p>
             <a:fld id="{5BCAD085-E8A6-8845-BD4E-CB4CCA059FC4}" type="datetimeFigureOut">
               <a:rPr lang="en-US" smtClean="0"/>
-              <a:t>11/27/25</a:t>
+              <a:t>11/29/2025</a:t>
             </a:fld>
             <a:endParaRPr lang="en-US"/>
           </a:p>
@@ -5692,6 +5696,181 @@
       </p:grpSpPr>
       <p:sp>
         <p:nvSpPr>
+          <p:cNvPr id="13" name="TextBox 12">
+            <a:extLst>
+              <a:ext uri="{FF2B5EF4-FFF2-40B4-BE49-F238E27FC236}">
+                <a16:creationId xmlns:a16="http://schemas.microsoft.com/office/drawing/2014/main" id="{0052D8DB-AB54-F64B-24C4-20307CEF4E6A}"/>
+              </a:ext>
+            </a:extLst>
+          </p:cNvPr>
+          <p:cNvSpPr txBox="1"/>
+          <p:nvPr/>
+        </p:nvSpPr>
+        <p:spPr>
+          <a:xfrm>
+            <a:off x="603504" y="510689"/>
+            <a:ext cx="7936992" cy="5355312"/>
+          </a:xfrm>
+          <a:prstGeom prst="rect">
+            <a:avLst/>
+          </a:prstGeom>
+          <a:noFill/>
+        </p:spPr>
+        <p:txBody>
+          <a:bodyPr wrap="square">
+            <a:spAutoFit/>
+          </a:bodyPr>
+          <a:lstStyle/>
+          <a:p>
+            <a:r>
+              <a:rPr lang="en-US" b="1" dirty="0"/>
+              <a:t>🐔</a:t>
+            </a:r>
+            <a:r>
+              <a:rPr lang="en-GB" dirty="0"/>
+              <a:t> </a:t>
+            </a:r>
+            <a:r>
+              <a:rPr lang="en-GB" b="1" dirty="0"/>
+              <a:t>Crossed vs Nested Random Effects (Why They Matter)</a:t>
+            </a:r>
+          </a:p>
+          <a:p>
+            <a:endParaRPr lang="en-GB" dirty="0"/>
+          </a:p>
+          <a:p>
+            <a:r>
+              <a:rPr lang="en-GB" b="1" dirty="0"/>
+              <a:t>Nested (A inside B)</a:t>
+            </a:r>
+          </a:p>
+          <a:p>
+            <a:r>
+              <a:rPr lang="en-GB" dirty="0"/>
+              <a:t>•	Use when one group lives inside another</a:t>
+            </a:r>
+          </a:p>
+          <a:p>
+            <a:r>
+              <a:rPr lang="en-GB" dirty="0"/>
+              <a:t>•	Example: Birds within Farms → (1 | Farm/Bird)</a:t>
+            </a:r>
+          </a:p>
+          <a:p>
+            <a:r>
+              <a:rPr lang="en-GB" dirty="0"/>
+              <a:t>✔ Bird IDs repeat across farms</a:t>
+            </a:r>
+          </a:p>
+          <a:p>
+            <a:r>
+              <a:rPr lang="en-GB" dirty="0"/>
+              <a:t>•	Tells us: How much farms differ, and how much birds differ inside each farm</a:t>
+            </a:r>
+          </a:p>
+          <a:p>
+            <a:r>
+              <a:rPr lang="en-GB" dirty="0"/>
+              <a:t>________________________________________</a:t>
+            </a:r>
+          </a:p>
+          <a:p>
+            <a:r>
+              <a:rPr lang="en-GB" b="1" dirty="0"/>
+              <a:t>Crossed (Independent groups)</a:t>
+            </a:r>
+          </a:p>
+          <a:p>
+            <a:r>
+              <a:rPr lang="en-GB" dirty="0"/>
+              <a:t>•	Two sources of variation act separately</a:t>
+            </a:r>
+          </a:p>
+          <a:p>
+            <a:r>
+              <a:rPr lang="en-GB" dirty="0"/>
+              <a:t>•	Example: Bird × Technician → (1 | Bird) + (1 | Technician)</a:t>
+            </a:r>
+          </a:p>
+          <a:p>
+            <a:r>
+              <a:rPr lang="en-GB" dirty="0"/>
+              <a:t>✔ Any technician can handle any bird</a:t>
+            </a:r>
+          </a:p>
+          <a:p>
+            <a:r>
+              <a:rPr lang="en-GB" dirty="0"/>
+              <a:t>•	Tells us: How much variation comes from birds vs handlers</a:t>
+            </a:r>
+          </a:p>
+          <a:p>
+            <a:r>
+              <a:rPr lang="en-GB" dirty="0"/>
+              <a:t>________________________________________</a:t>
+            </a:r>
+          </a:p>
+          <a:p>
+            <a:r>
+              <a:rPr lang="en-GB" b="1" dirty="0"/>
+              <a:t>Why Important in Animal Trials</a:t>
+            </a:r>
+          </a:p>
+          <a:p>
+            <a:r>
+              <a:rPr lang="en-GB" dirty="0"/>
+              <a:t>•	Prevents farm or handler effects from hiding true diet or treatment effects</a:t>
+            </a:r>
+          </a:p>
+          <a:p>
+            <a:r>
+              <a:rPr lang="en-GB" dirty="0"/>
+              <a:t>•	Ensures we correctly model where variability comes from</a:t>
+            </a:r>
+          </a:p>
+          <a:p>
+            <a:r>
+              <a:rPr lang="en-GB" dirty="0"/>
+              <a:t>•	Leads to more accurate and trustworthy conclusions for flock management</a:t>
+            </a:r>
+          </a:p>
+          <a:p>
+            <a:endParaRPr lang="en-GB" dirty="0"/>
+          </a:p>
+        </p:txBody>
+      </p:sp>
+    </p:spTree>
+    <p:extLst>
+      <p:ext uri="{BB962C8B-B14F-4D97-AF65-F5344CB8AC3E}">
+        <p14:creationId xmlns:p14="http://schemas.microsoft.com/office/powerpoint/2010/main" val="2167941313"/>
+      </p:ext>
+    </p:extLst>
+  </p:cSld>
+  <p:clrMapOvr>
+    <a:masterClrMapping/>
+  </p:clrMapOvr>
+</p:sld>
+</file>
+
+<file path=ppt/slides/slide19.xml><?xml version="1.0" encoding="utf-8"?>
+<p:sld xmlns:a="http://schemas.openxmlformats.org/drawingml/2006/main" xmlns:r="http://schemas.openxmlformats.org/officeDocument/2006/relationships" xmlns:p="http://schemas.openxmlformats.org/presentationml/2006/main">
+  <p:cSld>
+    <p:spTree>
+      <p:nvGrpSpPr>
+        <p:cNvPr id="1" name=""/>
+        <p:cNvGrpSpPr/>
+        <p:nvPr/>
+      </p:nvGrpSpPr>
+      <p:grpSpPr>
+        <a:xfrm>
+          <a:off x="0" y="0"/>
+          <a:ext cx="0" cy="0"/>
+          <a:chOff x="0" y="0"/>
+          <a:chExt cx="0" cy="0"/>
+        </a:xfrm>
+      </p:grpSpPr>
+      <p:sp>
+        <p:nvSpPr>
           <p:cNvPr id="3" name="TextBox 2">
             <a:extLst>
               <a:ext uri="{FF2B5EF4-FFF2-40B4-BE49-F238E27FC236}">
@@ -5907,70 +6086,6 @@
     <p:extLst>
       <p:ext uri="{BB962C8B-B14F-4D97-AF65-F5344CB8AC3E}">
         <p14:creationId xmlns:p14="http://schemas.microsoft.com/office/powerpoint/2010/main" val="2770030396"/>
-      </p:ext>
-    </p:extLst>
-  </p:cSld>
-  <p:clrMapOvr>
-    <a:masterClrMapping/>
-  </p:clrMapOvr>
-</p:sld>
-</file>
-
-<file path=ppt/slides/slide19.xml><?xml version="1.0" encoding="utf-8"?>
-<p:sld xmlns:a="http://schemas.openxmlformats.org/drawingml/2006/main" xmlns:r="http://schemas.openxmlformats.org/officeDocument/2006/relationships" xmlns:p="http://schemas.openxmlformats.org/presentationml/2006/main">
-  <p:cSld>
-    <p:spTree>
-      <p:nvGrpSpPr>
-        <p:cNvPr id="1" name="">
-          <a:extLst>
-            <a:ext uri="{FF2B5EF4-FFF2-40B4-BE49-F238E27FC236}">
-              <a16:creationId xmlns:a16="http://schemas.microsoft.com/office/drawing/2014/main" id="{0422C693-2DDA-4516-F114-168172E1FA93}"/>
-            </a:ext>
-          </a:extLst>
-        </p:cNvPr>
-        <p:cNvGrpSpPr/>
-        <p:nvPr/>
-      </p:nvGrpSpPr>
-      <p:grpSpPr>
-        <a:xfrm>
-          <a:off x="0" y="0"/>
-          <a:ext cx="0" cy="0"/>
-          <a:chOff x="0" y="0"/>
-          <a:chExt cx="0" cy="0"/>
-        </a:xfrm>
-      </p:grpSpPr>
-      <p:sp>
-        <p:nvSpPr>
-          <p:cNvPr id="2" name="Title 1">
-            <a:extLst>
-              <a:ext uri="{FF2B5EF4-FFF2-40B4-BE49-F238E27FC236}">
-                <a16:creationId xmlns:a16="http://schemas.microsoft.com/office/drawing/2014/main" id="{4D3E04D5-C666-B927-1436-9983B7522F01}"/>
-              </a:ext>
-            </a:extLst>
-          </p:cNvPr>
-          <p:cNvSpPr>
-            <a:spLocks noGrp="1"/>
-          </p:cNvSpPr>
-          <p:nvPr>
-            <p:ph type="title"/>
-          </p:nvPr>
-        </p:nvSpPr>
-        <p:spPr/>
-        <p:txBody>
-          <a:bodyPr/>
-          <a:lstStyle/>
-          <a:p>
-            <a:r>
-              <a:rPr lang="en-US" dirty="0"/>
-              <a:t>NOTES on PCA</a:t>
-            </a:r>
-          </a:p>
-        </p:txBody>
-      </p:sp>
-    </p:spTree>
-    <p:extLst>
-      <p:ext uri="{BB962C8B-B14F-4D97-AF65-F5344CB8AC3E}">
-        <p14:creationId xmlns:p14="http://schemas.microsoft.com/office/powerpoint/2010/main" val="1646739362"/>
       </p:ext>
     </p:extLst>
   </p:cSld>
@@ -6589,6 +6704,342 @@
   <p:cSld>
     <p:spTree>
       <p:nvGrpSpPr>
+        <p:cNvPr id="1" name=""/>
+        <p:cNvGrpSpPr/>
+        <p:nvPr/>
+      </p:nvGrpSpPr>
+      <p:grpSpPr>
+        <a:xfrm>
+          <a:off x="0" y="0"/>
+          <a:ext cx="0" cy="0"/>
+          <a:chOff x="0" y="0"/>
+          <a:chExt cx="0" cy="0"/>
+        </a:xfrm>
+      </p:grpSpPr>
+      <p:sp>
+        <p:nvSpPr>
+          <p:cNvPr id="11" name="TextBox 10">
+            <a:extLst>
+              <a:ext uri="{FF2B5EF4-FFF2-40B4-BE49-F238E27FC236}">
+                <a16:creationId xmlns:a16="http://schemas.microsoft.com/office/drawing/2014/main" id="{E772C965-4429-5580-C4F9-862D4DFF3202}"/>
+              </a:ext>
+            </a:extLst>
+          </p:cNvPr>
+          <p:cNvSpPr txBox="1"/>
+          <p:nvPr/>
+        </p:nvSpPr>
+        <p:spPr>
+          <a:xfrm>
+            <a:off x="273269" y="181957"/>
+            <a:ext cx="5072720" cy="6463308"/>
+          </a:xfrm>
+          <a:prstGeom prst="rect">
+            <a:avLst/>
+          </a:prstGeom>
+          <a:noFill/>
+        </p:spPr>
+        <p:txBody>
+          <a:bodyPr wrap="square">
+            <a:spAutoFit/>
+          </a:bodyPr>
+          <a:lstStyle/>
+          <a:p>
+            <a:pPr>
+              <a:buNone/>
+            </a:pPr>
+            <a:r>
+              <a:rPr lang="en-US" b="1" dirty="0"/>
+              <a:t>🐔</a:t>
+            </a:r>
+            <a:r>
+              <a:rPr lang="en-GB" b="1" dirty="0"/>
+              <a:t> How to </a:t>
+            </a:r>
+            <a:r>
+              <a:rPr lang="en-GB" b="1" dirty="0" err="1"/>
+              <a:t>Interprete</a:t>
+            </a:r>
+            <a:r>
+              <a:rPr lang="en-GB" b="1" dirty="0"/>
+              <a:t> Random Effects in the Model</a:t>
+            </a:r>
+          </a:p>
+          <a:p>
+            <a:endParaRPr lang="en-GB" b="1" dirty="0"/>
+          </a:p>
+          <a:p>
+            <a:pPr>
+              <a:buNone/>
+            </a:pPr>
+            <a:r>
+              <a:rPr lang="en-GB" b="1" dirty="0"/>
+              <a:t>Farm (0% variance)</a:t>
+            </a:r>
+          </a:p>
+          <a:p>
+            <a:pPr>
+              <a:buNone/>
+            </a:pPr>
+            <a:r>
+              <a:rPr lang="en-GB" dirty="0"/>
+              <a:t>•	Farms show no real difference in growth performance.</a:t>
+            </a:r>
+          </a:p>
+          <a:p>
+            <a:pPr>
+              <a:buNone/>
+            </a:pPr>
+            <a:r>
+              <a:rPr lang="en-GB" dirty="0"/>
+              <a:t>•	Diet effects are not confounded by farm.</a:t>
+            </a:r>
+          </a:p>
+          <a:p>
+            <a:pPr>
+              <a:buNone/>
+            </a:pPr>
+            <a:r>
+              <a:rPr lang="en-GB" b="1" dirty="0"/>
+              <a:t>Bird within Farm (~0.76 variance; ICC ≈ 2.5%)</a:t>
+            </a:r>
+          </a:p>
+          <a:p>
+            <a:pPr>
+              <a:buNone/>
+            </a:pPr>
+            <a:r>
+              <a:rPr lang="en-GB" b="1" dirty="0"/>
+              <a:t>•</a:t>
+            </a:r>
+            <a:r>
+              <a:rPr lang="en-GB" dirty="0"/>
+              <a:t>	Birds differ slightly from each other, as expected in biology.</a:t>
+            </a:r>
+          </a:p>
+          <a:p>
+            <a:pPr>
+              <a:buNone/>
+            </a:pPr>
+            <a:r>
+              <a:rPr lang="en-GB" dirty="0"/>
+              <a:t>•	Only 2–3% of all variability is due to bird-to-bird differences.</a:t>
+            </a:r>
+          </a:p>
+          <a:p>
+            <a:pPr>
+              <a:buNone/>
+            </a:pPr>
+            <a:r>
+              <a:rPr lang="en-GB" b="1" dirty="0"/>
+              <a:t>Residual Variance (≈ 29.7)</a:t>
+            </a:r>
+          </a:p>
+          <a:p>
+            <a:pPr>
+              <a:buNone/>
+            </a:pPr>
+            <a:r>
+              <a:rPr lang="en-GB" dirty="0"/>
+              <a:t>•	Most variation comes from normal measurement and individual noise.</a:t>
+            </a:r>
+          </a:p>
+          <a:p>
+            <a:pPr>
+              <a:buNone/>
+            </a:pPr>
+            <a:r>
+              <a:rPr lang="en-GB" dirty="0"/>
+              <a:t>•	This is typical in animal-level traits.</a:t>
+            </a:r>
+          </a:p>
+          <a:p>
+            <a:pPr>
+              <a:buNone/>
+            </a:pPr>
+            <a:r>
+              <a:rPr lang="en-GB" b="1" dirty="0"/>
+              <a:t>________________________________________</a:t>
+            </a:r>
+          </a:p>
+          <a:p>
+            <a:pPr>
+              <a:buNone/>
+            </a:pPr>
+            <a:r>
+              <a:rPr lang="en-GB" b="1" dirty="0"/>
+              <a:t>🐣 Key Take-Home Message</a:t>
+            </a:r>
+          </a:p>
+          <a:p>
+            <a:pPr>
+              <a:buNone/>
+            </a:pPr>
+            <a:r>
+              <a:rPr lang="en-GB" b="1" dirty="0"/>
+              <a:t>•</a:t>
+            </a:r>
+            <a:r>
+              <a:rPr lang="en-GB" dirty="0"/>
+              <a:t>	Farm effect: none</a:t>
+            </a:r>
+          </a:p>
+          <a:p>
+            <a:pPr>
+              <a:buNone/>
+            </a:pPr>
+            <a:r>
+              <a:rPr lang="en-GB" dirty="0"/>
+              <a:t>•	Bird effect: small</a:t>
+            </a:r>
+          </a:p>
+          <a:p>
+            <a:pPr>
+              <a:buNone/>
+            </a:pPr>
+            <a:r>
+              <a:rPr lang="en-GB" dirty="0"/>
+              <a:t>•	Main variability: individual noise</a:t>
+            </a:r>
+          </a:p>
+          <a:p>
+            <a:pPr>
+              <a:buNone/>
+            </a:pPr>
+            <a:r>
+              <a:rPr lang="en-GB" dirty="0"/>
+              <a:t>•	Diet effects should be interpreted knowing that </a:t>
+            </a:r>
+            <a:r>
+              <a:rPr lang="en-GB" b="1" dirty="0"/>
+              <a:t>animal-to-animal differences are minimal</a:t>
+            </a:r>
+            <a:r>
+              <a:rPr lang="en-GB" dirty="0"/>
+              <a:t>, and </a:t>
+            </a:r>
+            <a:r>
+              <a:rPr lang="en-GB" b="1" dirty="0"/>
+              <a:t>farm does not confound the results</a:t>
+            </a:r>
+            <a:r>
+              <a:rPr lang="en-GB" dirty="0"/>
+              <a:t>.</a:t>
+            </a:r>
+          </a:p>
+        </p:txBody>
+      </p:sp>
+      <p:pic>
+        <p:nvPicPr>
+          <p:cNvPr id="23" name="Picture 22">
+            <a:extLst>
+              <a:ext uri="{FF2B5EF4-FFF2-40B4-BE49-F238E27FC236}">
+                <a16:creationId xmlns:a16="http://schemas.microsoft.com/office/drawing/2014/main" id="{1F4C4925-F0B6-2A14-323E-1318D8CAD574}"/>
+              </a:ext>
+            </a:extLst>
+          </p:cNvPr>
+          <p:cNvPicPr>
+            <a:picLocks noChangeAspect="1"/>
+          </p:cNvPicPr>
+          <p:nvPr/>
+        </p:nvPicPr>
+        <p:blipFill>
+          <a:blip r:embed="rId2"/>
+          <a:stretch>
+            <a:fillRect/>
+          </a:stretch>
+        </p:blipFill>
+        <p:spPr>
+          <a:xfrm>
+            <a:off x="5345989" y="746414"/>
+            <a:ext cx="3524742" cy="2324424"/>
+          </a:xfrm>
+          <a:prstGeom prst="rect">
+            <a:avLst/>
+          </a:prstGeom>
+        </p:spPr>
+      </p:pic>
+    </p:spTree>
+    <p:extLst>
+      <p:ext uri="{BB962C8B-B14F-4D97-AF65-F5344CB8AC3E}">
+        <p14:creationId xmlns:p14="http://schemas.microsoft.com/office/powerpoint/2010/main" val="353018404"/>
+      </p:ext>
+    </p:extLst>
+  </p:cSld>
+  <p:clrMapOvr>
+    <a:masterClrMapping/>
+  </p:clrMapOvr>
+</p:sld>
+</file>
+
+<file path=ppt/slides/slide21.xml><?xml version="1.0" encoding="utf-8"?>
+<p:sld xmlns:a="http://schemas.openxmlformats.org/drawingml/2006/main" xmlns:r="http://schemas.openxmlformats.org/officeDocument/2006/relationships" xmlns:p="http://schemas.openxmlformats.org/presentationml/2006/main">
+  <p:cSld>
+    <p:spTree>
+      <p:nvGrpSpPr>
+        <p:cNvPr id="1" name="">
+          <a:extLst>
+            <a:ext uri="{FF2B5EF4-FFF2-40B4-BE49-F238E27FC236}">
+              <a16:creationId xmlns:a16="http://schemas.microsoft.com/office/drawing/2014/main" id="{0422C693-2DDA-4516-F114-168172E1FA93}"/>
+            </a:ext>
+          </a:extLst>
+        </p:cNvPr>
+        <p:cNvGrpSpPr/>
+        <p:nvPr/>
+      </p:nvGrpSpPr>
+      <p:grpSpPr>
+        <a:xfrm>
+          <a:off x="0" y="0"/>
+          <a:ext cx="0" cy="0"/>
+          <a:chOff x="0" y="0"/>
+          <a:chExt cx="0" cy="0"/>
+        </a:xfrm>
+      </p:grpSpPr>
+      <p:sp>
+        <p:nvSpPr>
+          <p:cNvPr id="2" name="Title 1">
+            <a:extLst>
+              <a:ext uri="{FF2B5EF4-FFF2-40B4-BE49-F238E27FC236}">
+                <a16:creationId xmlns:a16="http://schemas.microsoft.com/office/drawing/2014/main" id="{4D3E04D5-C666-B927-1436-9983B7522F01}"/>
+              </a:ext>
+            </a:extLst>
+          </p:cNvPr>
+          <p:cNvSpPr>
+            <a:spLocks noGrp="1"/>
+          </p:cNvSpPr>
+          <p:nvPr>
+            <p:ph type="title"/>
+          </p:nvPr>
+        </p:nvSpPr>
+        <p:spPr/>
+        <p:txBody>
+          <a:bodyPr/>
+          <a:lstStyle/>
+          <a:p>
+            <a:r>
+              <a:rPr lang="en-US" dirty="0"/>
+              <a:t>NOTES on PCA</a:t>
+            </a:r>
+          </a:p>
+        </p:txBody>
+      </p:sp>
+    </p:spTree>
+    <p:extLst>
+      <p:ext uri="{BB962C8B-B14F-4D97-AF65-F5344CB8AC3E}">
+        <p14:creationId xmlns:p14="http://schemas.microsoft.com/office/powerpoint/2010/main" val="1646739362"/>
+      </p:ext>
+    </p:extLst>
+  </p:cSld>
+  <p:clrMapOvr>
+    <a:masterClrMapping/>
+  </p:clrMapOvr>
+</p:sld>
+</file>
+
+<file path=ppt/slides/slide22.xml><?xml version="1.0" encoding="utf-8"?>
+<p:sld xmlns:a="http://schemas.openxmlformats.org/drawingml/2006/main" xmlns:r="http://schemas.openxmlformats.org/officeDocument/2006/relationships" xmlns:p="http://schemas.openxmlformats.org/presentationml/2006/main">
+  <p:cSld>
+    <p:spTree>
+      <p:nvGrpSpPr>
         <p:cNvPr id="1" name="">
           <a:extLst>
             <a:ext uri="{FF2B5EF4-FFF2-40B4-BE49-F238E27FC236}">
@@ -7221,6 +7672,500 @@
     <p:extLst>
       <p:ext uri="{BB962C8B-B14F-4D97-AF65-F5344CB8AC3E}">
         <p14:creationId xmlns:p14="http://schemas.microsoft.com/office/powerpoint/2010/main" val="2548628455"/>
+      </p:ext>
+    </p:extLst>
+  </p:cSld>
+  <p:clrMapOvr>
+    <a:masterClrMapping/>
+  </p:clrMapOvr>
+</p:sld>
+</file>
+
+<file path=ppt/slides/slide23.xml><?xml version="1.0" encoding="utf-8"?>
+<p:sld xmlns:a="http://schemas.openxmlformats.org/drawingml/2006/main" xmlns:r="http://schemas.openxmlformats.org/officeDocument/2006/relationships" xmlns:p="http://schemas.openxmlformats.org/presentationml/2006/main">
+  <p:cSld>
+    <p:spTree>
+      <p:nvGrpSpPr>
+        <p:cNvPr id="1" name=""/>
+        <p:cNvGrpSpPr/>
+        <p:nvPr/>
+      </p:nvGrpSpPr>
+      <p:grpSpPr>
+        <a:xfrm>
+          <a:off x="0" y="0"/>
+          <a:ext cx="0" cy="0"/>
+          <a:chOff x="0" y="0"/>
+          <a:chExt cx="0" cy="0"/>
+        </a:xfrm>
+      </p:grpSpPr>
+      <p:sp>
+        <p:nvSpPr>
+          <p:cNvPr id="2" name="TextBox 1">
+            <a:extLst>
+              <a:ext uri="{FF2B5EF4-FFF2-40B4-BE49-F238E27FC236}">
+                <a16:creationId xmlns:a16="http://schemas.microsoft.com/office/drawing/2014/main" id="{489512E7-A2D8-6096-56C4-C59CFBE43764}"/>
+              </a:ext>
+            </a:extLst>
+          </p:cNvPr>
+          <p:cNvSpPr txBox="1"/>
+          <p:nvPr/>
+        </p:nvSpPr>
+        <p:spPr>
+          <a:xfrm>
+            <a:off x="208344" y="231386"/>
+            <a:ext cx="8194876" cy="369332"/>
+          </a:xfrm>
+          <a:prstGeom prst="rect">
+            <a:avLst/>
+          </a:prstGeom>
+          <a:noFill/>
+        </p:spPr>
+        <p:txBody>
+          <a:bodyPr wrap="square">
+            <a:spAutoFit/>
+          </a:bodyPr>
+          <a:lstStyle/>
+          <a:p>
+            <a:pPr>
+              <a:buNone/>
+            </a:pPr>
+            <a:r>
+              <a:rPr lang="en-US" b="1" dirty="0"/>
+              <a:t>🐔 Example of results derived from PCA on a vaccination trial simulated dataset (1)</a:t>
+            </a:r>
+          </a:p>
+        </p:txBody>
+      </p:sp>
+      <p:pic>
+        <p:nvPicPr>
+          <p:cNvPr id="4" name="Picture 3" descr="A group of colored dots&#10;&#10;AI-generated content may be incorrect.">
+            <a:extLst>
+              <a:ext uri="{FF2B5EF4-FFF2-40B4-BE49-F238E27FC236}">
+                <a16:creationId xmlns:a16="http://schemas.microsoft.com/office/drawing/2014/main" id="{B084ED12-5C40-7F5F-C294-368904C93E2C}"/>
+              </a:ext>
+            </a:extLst>
+          </p:cNvPr>
+          <p:cNvPicPr>
+            <a:picLocks noChangeAspect="1"/>
+          </p:cNvPicPr>
+          <p:nvPr/>
+        </p:nvPicPr>
+        <p:blipFill>
+          <a:blip r:embed="rId2"/>
+          <a:stretch>
+            <a:fillRect/>
+          </a:stretch>
+        </p:blipFill>
+        <p:spPr>
+          <a:xfrm>
+            <a:off x="1422239" y="859528"/>
+            <a:ext cx="5767086" cy="5767086"/>
+          </a:xfrm>
+          <a:prstGeom prst="rect">
+            <a:avLst/>
+          </a:prstGeom>
+        </p:spPr>
+      </p:pic>
+    </p:spTree>
+    <p:extLst>
+      <p:ext uri="{BB962C8B-B14F-4D97-AF65-F5344CB8AC3E}">
+        <p14:creationId xmlns:p14="http://schemas.microsoft.com/office/powerpoint/2010/main" val="1652076736"/>
+      </p:ext>
+    </p:extLst>
+  </p:cSld>
+  <p:clrMapOvr>
+    <a:masterClrMapping/>
+  </p:clrMapOvr>
+</p:sld>
+</file>
+
+<file path=ppt/slides/slide24.xml><?xml version="1.0" encoding="utf-8"?>
+<p:sld xmlns:a="http://schemas.openxmlformats.org/drawingml/2006/main" xmlns:r="http://schemas.openxmlformats.org/officeDocument/2006/relationships" xmlns:p="http://schemas.openxmlformats.org/presentationml/2006/main">
+  <p:cSld>
+    <p:spTree>
+      <p:nvGrpSpPr>
+        <p:cNvPr id="1" name=""/>
+        <p:cNvGrpSpPr/>
+        <p:nvPr/>
+      </p:nvGrpSpPr>
+      <p:grpSpPr>
+        <a:xfrm>
+          <a:off x="0" y="0"/>
+          <a:ext cx="0" cy="0"/>
+          <a:chOff x="0" y="0"/>
+          <a:chExt cx="0" cy="0"/>
+        </a:xfrm>
+      </p:grpSpPr>
+      <p:sp>
+        <p:nvSpPr>
+          <p:cNvPr id="3" name="TextBox 2">
+            <a:extLst>
+              <a:ext uri="{FF2B5EF4-FFF2-40B4-BE49-F238E27FC236}">
+                <a16:creationId xmlns:a16="http://schemas.microsoft.com/office/drawing/2014/main" id="{385CB2FA-53AD-06C6-1A54-77D9AEDD1EBA}"/>
+              </a:ext>
+            </a:extLst>
+          </p:cNvPr>
+          <p:cNvSpPr txBox="1"/>
+          <p:nvPr/>
+        </p:nvSpPr>
+        <p:spPr>
+          <a:xfrm>
+            <a:off x="231494" y="594402"/>
+            <a:ext cx="8704162" cy="6001643"/>
+          </a:xfrm>
+          <a:prstGeom prst="rect">
+            <a:avLst/>
+          </a:prstGeom>
+          <a:noFill/>
+        </p:spPr>
+        <p:txBody>
+          <a:bodyPr wrap="square">
+            <a:spAutoFit/>
+          </a:bodyPr>
+          <a:lstStyle/>
+          <a:p>
+            <a:pPr>
+              <a:buNone/>
+            </a:pPr>
+            <a:r>
+              <a:rPr lang="en-GB" sz="1600" b="1" dirty="0"/>
+              <a:t>Day 0</a:t>
+            </a:r>
+          </a:p>
+          <a:p>
+            <a:pPr>
+              <a:buFont typeface="Arial" panose="020B0604020202020204" pitchFamily="34" charset="0"/>
+              <a:buChar char="•"/>
+            </a:pPr>
+            <a:r>
+              <a:rPr lang="en-GB" sz="1600" dirty="0"/>
+              <a:t> All three groups largely overlap around the origin.</a:t>
+            </a:r>
+          </a:p>
+          <a:p>
+            <a:pPr>
+              <a:buFont typeface="Arial" panose="020B0604020202020204" pitchFamily="34" charset="0"/>
+              <a:buChar char="•"/>
+            </a:pPr>
+            <a:r>
+              <a:rPr lang="en-GB" sz="1600" dirty="0"/>
+              <a:t> No clear difference yet → everyone at baseline immune state.</a:t>
+            </a:r>
+          </a:p>
+          <a:p>
+            <a:pPr>
+              <a:buNone/>
+            </a:pPr>
+            <a:endParaRPr lang="en-GB" sz="1600" b="1" dirty="0"/>
+          </a:p>
+          <a:p>
+            <a:pPr>
+              <a:buNone/>
+            </a:pPr>
+            <a:r>
+              <a:rPr lang="en-GB" sz="1600" b="1" dirty="0"/>
+              <a:t>Day 3</a:t>
+            </a:r>
+          </a:p>
+          <a:p>
+            <a:pPr>
+              <a:buFont typeface="Arial" panose="020B0604020202020204" pitchFamily="34" charset="0"/>
+              <a:buChar char="•"/>
+            </a:pPr>
+            <a:r>
+              <a:rPr lang="en-GB" sz="1600" b="1" dirty="0"/>
+              <a:t> Non-vaccinated</a:t>
+            </a:r>
+            <a:r>
+              <a:rPr lang="en-GB" sz="1600" dirty="0"/>
+              <a:t> (red) shift to the </a:t>
+            </a:r>
+            <a:r>
+              <a:rPr lang="en-GB" sz="1600" b="1" dirty="0"/>
+              <a:t>left</a:t>
+            </a:r>
+            <a:r>
+              <a:rPr lang="en-GB" sz="1600" dirty="0"/>
+              <a:t> (negative PC1):</a:t>
+            </a:r>
+          </a:p>
+          <a:p>
+            <a:pPr marL="742950" lvl="1" indent="-285750">
+              <a:buFont typeface="Arial" panose="020B0604020202020204" pitchFamily="34" charset="0"/>
+              <a:buChar char="•"/>
+            </a:pPr>
+            <a:r>
+              <a:rPr lang="en-GB" sz="1600" dirty="0"/>
+              <a:t>Driven by higher </a:t>
+            </a:r>
+            <a:r>
+              <a:rPr lang="en-GB" sz="1600" b="1" dirty="0"/>
+              <a:t>Neutrophils, IL-6 score, Monocytes</a:t>
+            </a:r>
+            <a:r>
+              <a:rPr lang="en-GB" sz="1600" dirty="0"/>
+              <a:t> (arrows pointing left).</a:t>
+            </a:r>
+          </a:p>
+          <a:p>
+            <a:pPr>
+              <a:buFont typeface="Arial" panose="020B0604020202020204" pitchFamily="34" charset="0"/>
+              <a:buChar char="•"/>
+            </a:pPr>
+            <a:r>
+              <a:rPr lang="en-GB" sz="1600" b="1" dirty="0"/>
+              <a:t> Vaccinated</a:t>
+            </a:r>
+            <a:r>
+              <a:rPr lang="en-GB" sz="1600" dirty="0"/>
+              <a:t> (yellow) are slightly to the </a:t>
+            </a:r>
+            <a:r>
+              <a:rPr lang="en-GB" sz="1600" b="1" dirty="0"/>
+              <a:t>right</a:t>
+            </a:r>
+            <a:r>
+              <a:rPr lang="en-GB" sz="1600" dirty="0"/>
+              <a:t> (more lymphoid/NK markers).</a:t>
+            </a:r>
+          </a:p>
+          <a:p>
+            <a:pPr>
+              <a:buFont typeface="Arial" panose="020B0604020202020204" pitchFamily="34" charset="0"/>
+              <a:buChar char="•"/>
+            </a:pPr>
+            <a:r>
+              <a:rPr lang="en-GB" sz="1600" b="1" dirty="0"/>
+              <a:t> Controls</a:t>
+            </a:r>
+            <a:r>
+              <a:rPr lang="en-GB" sz="1600" dirty="0"/>
+              <a:t> (blue) remain central and lower.</a:t>
+            </a:r>
+          </a:p>
+          <a:p>
+            <a:pPr>
+              <a:buNone/>
+            </a:pPr>
+            <a:endParaRPr lang="en-GB" sz="1600" b="1" dirty="0"/>
+          </a:p>
+          <a:p>
+            <a:pPr>
+              <a:buNone/>
+            </a:pPr>
+            <a:r>
+              <a:rPr lang="en-GB" sz="1600" b="1" dirty="0"/>
+              <a:t>Day 7</a:t>
+            </a:r>
+          </a:p>
+          <a:p>
+            <a:pPr>
+              <a:buFont typeface="Arial" panose="020B0604020202020204" pitchFamily="34" charset="0"/>
+              <a:buChar char="•"/>
+            </a:pPr>
+            <a:r>
+              <a:rPr lang="en-GB" sz="1600" b="1" dirty="0"/>
+              <a:t> Non-vaccinated</a:t>
+            </a:r>
+            <a:r>
+              <a:rPr lang="en-GB" sz="1600" dirty="0"/>
+              <a:t> are still clearly separated from controls but now mainly </a:t>
+            </a:r>
+            <a:r>
+              <a:rPr lang="en-GB" sz="1600" b="1" dirty="0"/>
+              <a:t>upwards</a:t>
+            </a:r>
+            <a:r>
+              <a:rPr lang="en-GB" sz="1600" dirty="0"/>
+              <a:t> along PC2:</a:t>
+            </a:r>
+          </a:p>
+          <a:p>
+            <a:pPr marL="742950" lvl="1" indent="-285750">
+              <a:buFont typeface="Arial" panose="020B0604020202020204" pitchFamily="34" charset="0"/>
+              <a:buChar char="•"/>
+            </a:pPr>
+            <a:r>
+              <a:rPr lang="en-GB" sz="1600" dirty="0"/>
+              <a:t>In the direction of </a:t>
+            </a:r>
+            <a:r>
+              <a:rPr lang="en-GB" sz="1600" b="1" dirty="0"/>
+              <a:t>CD8, IgM, IgG, PD1_Tcells</a:t>
+            </a:r>
+            <a:r>
+              <a:rPr lang="en-GB" sz="1600" dirty="0"/>
+              <a:t> → strong adaptive T-cell / antibody response.</a:t>
+            </a:r>
+          </a:p>
+          <a:p>
+            <a:pPr>
+              <a:buFont typeface="Arial" panose="020B0604020202020204" pitchFamily="34" charset="0"/>
+              <a:buChar char="•"/>
+            </a:pPr>
+            <a:r>
+              <a:rPr lang="en-GB" sz="1600" b="1" dirty="0"/>
+              <a:t> Vaccinated</a:t>
+            </a:r>
+            <a:r>
+              <a:rPr lang="en-GB" sz="1600" dirty="0"/>
+              <a:t> sit between non-vaccinated and controls, showing a milder adaptive response.</a:t>
+            </a:r>
+          </a:p>
+          <a:p>
+            <a:pPr>
+              <a:buFont typeface="Arial" panose="020B0604020202020204" pitchFamily="34" charset="0"/>
+              <a:buChar char="•"/>
+            </a:pPr>
+            <a:r>
+              <a:rPr lang="en-GB" sz="1600" b="1" dirty="0"/>
+              <a:t> Controls</a:t>
+            </a:r>
+            <a:r>
+              <a:rPr lang="en-GB" sz="1600" dirty="0"/>
+              <a:t> remain compact near the lower centre.</a:t>
+            </a:r>
+          </a:p>
+          <a:p>
+            <a:pPr>
+              <a:buNone/>
+            </a:pPr>
+            <a:endParaRPr lang="en-GB" sz="1600" b="1" dirty="0"/>
+          </a:p>
+          <a:p>
+            <a:pPr>
+              <a:buNone/>
+            </a:pPr>
+            <a:r>
+              <a:rPr lang="en-GB" sz="1600" b="1" dirty="0"/>
+              <a:t>Day 14</a:t>
+            </a:r>
+          </a:p>
+          <a:p>
+            <a:pPr>
+              <a:buFont typeface="Arial" panose="020B0604020202020204" pitchFamily="34" charset="0"/>
+              <a:buChar char="•"/>
+            </a:pPr>
+            <a:r>
+              <a:rPr lang="en-GB" sz="1600" dirty="0"/>
+              <a:t> Clouds start to move back toward each other:</a:t>
+            </a:r>
+          </a:p>
+          <a:p>
+            <a:pPr marL="742950" lvl="1" indent="-285750">
+              <a:buFont typeface="Arial" panose="020B0604020202020204" pitchFamily="34" charset="0"/>
+              <a:buChar char="•"/>
+            </a:pPr>
+            <a:r>
+              <a:rPr lang="en-GB" sz="1600" b="1" dirty="0"/>
+              <a:t>Vaccinated</a:t>
+            </a:r>
+            <a:r>
+              <a:rPr lang="en-GB" sz="1600" dirty="0"/>
+              <a:t> move closer to controls.</a:t>
+            </a:r>
+          </a:p>
+          <a:p>
+            <a:pPr marL="742950" lvl="1" indent="-285750">
+              <a:buFont typeface="Arial" panose="020B0604020202020204" pitchFamily="34" charset="0"/>
+              <a:buChar char="•"/>
+            </a:pPr>
+            <a:r>
+              <a:rPr lang="en-GB" sz="1600" b="1" dirty="0"/>
+              <a:t>Non-vaccinated</a:t>
+            </a:r>
+            <a:r>
+              <a:rPr lang="en-GB" sz="1600" dirty="0"/>
+              <a:t> remain somewhat higher (residual CD8/IgG/IgM signal).</a:t>
+            </a:r>
+          </a:p>
+          <a:p>
+            <a:pPr>
+              <a:buNone/>
+            </a:pPr>
+            <a:endParaRPr lang="en-GB" sz="1600" b="1" dirty="0"/>
+          </a:p>
+          <a:p>
+            <a:pPr>
+              <a:buNone/>
+            </a:pPr>
+            <a:r>
+              <a:rPr lang="en-GB" sz="1600" b="1" dirty="0"/>
+              <a:t>Day 28</a:t>
+            </a:r>
+          </a:p>
+          <a:p>
+            <a:pPr>
+              <a:buFont typeface="Arial" panose="020B0604020202020204" pitchFamily="34" charset="0"/>
+              <a:buChar char="•"/>
+            </a:pPr>
+            <a:r>
+              <a:rPr lang="en-GB" sz="1600" b="1" dirty="0"/>
+              <a:t> Vaccinated</a:t>
+            </a:r>
+            <a:r>
+              <a:rPr lang="en-GB" sz="1600" dirty="0"/>
+              <a:t> almost overlap with controls.</a:t>
+            </a:r>
+          </a:p>
+          <a:p>
+            <a:pPr>
+              <a:buFont typeface="Arial" panose="020B0604020202020204" pitchFamily="34" charset="0"/>
+              <a:buChar char="•"/>
+            </a:pPr>
+            <a:r>
+              <a:rPr lang="en-GB" sz="1600" b="1" dirty="0"/>
+              <a:t> Non-vaccinated</a:t>
+            </a:r>
+            <a:r>
+              <a:rPr lang="en-GB" sz="1600" dirty="0"/>
+              <a:t> are still a bit higher in PC2 but much closer than at Day 3–7.</a:t>
+            </a:r>
+          </a:p>
+        </p:txBody>
+      </p:sp>
+      <p:sp>
+        <p:nvSpPr>
+          <p:cNvPr id="5" name="TextBox 4">
+            <a:extLst>
+              <a:ext uri="{FF2B5EF4-FFF2-40B4-BE49-F238E27FC236}">
+                <a16:creationId xmlns:a16="http://schemas.microsoft.com/office/drawing/2014/main" id="{719739D2-9D14-BA4B-3C42-65FF1E489197}"/>
+              </a:ext>
+            </a:extLst>
+          </p:cNvPr>
+          <p:cNvSpPr txBox="1"/>
+          <p:nvPr/>
+        </p:nvSpPr>
+        <p:spPr>
+          <a:xfrm>
+            <a:off x="208344" y="231386"/>
+            <a:ext cx="8194876" cy="369332"/>
+          </a:xfrm>
+          <a:prstGeom prst="rect">
+            <a:avLst/>
+          </a:prstGeom>
+          <a:noFill/>
+        </p:spPr>
+        <p:txBody>
+          <a:bodyPr wrap="square">
+            <a:spAutoFit/>
+          </a:bodyPr>
+          <a:lstStyle/>
+          <a:p>
+            <a:pPr>
+              <a:buNone/>
+            </a:pPr>
+            <a:r>
+              <a:rPr lang="en-US" b="1" dirty="0"/>
+              <a:t>🐔 Example of results derived from PCA on a vaccination trial simulated dataset (2)</a:t>
+            </a:r>
+          </a:p>
+        </p:txBody>
+      </p:sp>
+    </p:spTree>
+    <p:extLst>
+      <p:ext uri="{BB962C8B-B14F-4D97-AF65-F5344CB8AC3E}">
+        <p14:creationId xmlns:p14="http://schemas.microsoft.com/office/powerpoint/2010/main" val="1007045973"/>
       </p:ext>
     </p:extLst>
   </p:cSld>

</xml_diff>

<commit_message>
refined descriptive summary help and added first version of user manual
</commit_message>
<xml_diff>
--- a/presentations/Table_Analyzer_Overview.pptx
+++ b/presentations/Table_Analyzer_Overview.pptx
@@ -231,7 +231,7 @@
           <a:p>
             <a:fld id="{404C4D2F-30A8-1C43-8374-9D9D8BF63153}" type="datetimeFigureOut">
               <a:rPr lang="en-US" smtClean="0"/>
-              <a:t>11/29/2025</a:t>
+              <a:t>12/1/25</a:t>
             </a:fld>
             <a:endParaRPr lang="en-US"/>
           </a:p>
@@ -845,7 +845,7 @@
           <a:p>
             <a:fld id="{5BCAD085-E8A6-8845-BD4E-CB4CCA059FC4}" type="datetimeFigureOut">
               <a:rPr lang="en-US" smtClean="0"/>
-              <a:t>11/29/2025</a:t>
+              <a:t>12/1/25</a:t>
             </a:fld>
             <a:endParaRPr lang="en-US"/>
           </a:p>
@@ -1013,7 +1013,7 @@
           <a:p>
             <a:fld id="{5BCAD085-E8A6-8845-BD4E-CB4CCA059FC4}" type="datetimeFigureOut">
               <a:rPr lang="en-US" smtClean="0"/>
-              <a:t>11/29/2025</a:t>
+              <a:t>12/1/25</a:t>
             </a:fld>
             <a:endParaRPr lang="en-US"/>
           </a:p>
@@ -1191,7 +1191,7 @@
           <a:p>
             <a:fld id="{5BCAD085-E8A6-8845-BD4E-CB4CCA059FC4}" type="datetimeFigureOut">
               <a:rPr lang="en-US" smtClean="0"/>
-              <a:t>11/29/2025</a:t>
+              <a:t>12/1/25</a:t>
             </a:fld>
             <a:endParaRPr lang="en-US"/>
           </a:p>
@@ -1359,7 +1359,7 @@
           <a:p>
             <a:fld id="{5BCAD085-E8A6-8845-BD4E-CB4CCA059FC4}" type="datetimeFigureOut">
               <a:rPr lang="en-US" smtClean="0"/>
-              <a:t>11/29/2025</a:t>
+              <a:t>12/1/25</a:t>
             </a:fld>
             <a:endParaRPr lang="en-US"/>
           </a:p>
@@ -1604,7 +1604,7 @@
           <a:p>
             <a:fld id="{5BCAD085-E8A6-8845-BD4E-CB4CCA059FC4}" type="datetimeFigureOut">
               <a:rPr lang="en-US" smtClean="0"/>
-              <a:t>11/29/2025</a:t>
+              <a:t>12/1/25</a:t>
             </a:fld>
             <a:endParaRPr lang="en-US"/>
           </a:p>
@@ -1889,7 +1889,7 @@
           <a:p>
             <a:fld id="{5BCAD085-E8A6-8845-BD4E-CB4CCA059FC4}" type="datetimeFigureOut">
               <a:rPr lang="en-US" smtClean="0"/>
-              <a:t>11/29/2025</a:t>
+              <a:t>12/1/25</a:t>
             </a:fld>
             <a:endParaRPr lang="en-US"/>
           </a:p>
@@ -2308,7 +2308,7 @@
           <a:p>
             <a:fld id="{5BCAD085-E8A6-8845-BD4E-CB4CCA059FC4}" type="datetimeFigureOut">
               <a:rPr lang="en-US" smtClean="0"/>
-              <a:t>11/29/2025</a:t>
+              <a:t>12/1/25</a:t>
             </a:fld>
             <a:endParaRPr lang="en-US"/>
           </a:p>
@@ -2425,7 +2425,7 @@
           <a:p>
             <a:fld id="{5BCAD085-E8A6-8845-BD4E-CB4CCA059FC4}" type="datetimeFigureOut">
               <a:rPr lang="en-US" smtClean="0"/>
-              <a:t>11/29/2025</a:t>
+              <a:t>12/1/25</a:t>
             </a:fld>
             <a:endParaRPr lang="en-US"/>
           </a:p>
@@ -2520,7 +2520,7 @@
           <a:p>
             <a:fld id="{5BCAD085-E8A6-8845-BD4E-CB4CCA059FC4}" type="datetimeFigureOut">
               <a:rPr lang="en-US" smtClean="0"/>
-              <a:t>11/29/2025</a:t>
+              <a:t>12/1/25</a:t>
             </a:fld>
             <a:endParaRPr lang="en-US"/>
           </a:p>
@@ -2795,7 +2795,7 @@
           <a:p>
             <a:fld id="{5BCAD085-E8A6-8845-BD4E-CB4CCA059FC4}" type="datetimeFigureOut">
               <a:rPr lang="en-US" smtClean="0"/>
-              <a:t>11/29/2025</a:t>
+              <a:t>12/1/25</a:t>
             </a:fld>
             <a:endParaRPr lang="en-US"/>
           </a:p>
@@ -3047,7 +3047,7 @@
           <a:p>
             <a:fld id="{5BCAD085-E8A6-8845-BD4E-CB4CCA059FC4}" type="datetimeFigureOut">
               <a:rPr lang="en-US" smtClean="0"/>
-              <a:t>11/29/2025</a:t>
+              <a:t>12/1/25</a:t>
             </a:fld>
             <a:endParaRPr lang="en-US"/>
           </a:p>
@@ -3270,7 +3270,7 @@
           <a:p>
             <a:fld id="{5BCAD085-E8A6-8845-BD4E-CB4CCA059FC4}" type="datetimeFigureOut">
               <a:rPr lang="en-US" smtClean="0"/>
-              <a:t>11/29/2025</a:t>
+              <a:t>12/1/25</a:t>
             </a:fld>
             <a:endParaRPr lang="en-US"/>
           </a:p>
@@ -9742,8 +9742,8 @@
         </p:nvSpPr>
         <p:spPr>
           <a:xfrm>
-            <a:off x="795528" y="2218356"/>
-            <a:ext cx="8544908" cy="1323439"/>
+            <a:off x="795528" y="2381342"/>
+            <a:ext cx="8544908" cy="1015663"/>
           </a:xfrm>
           <a:prstGeom prst="rect">
             <a:avLst/>
@@ -9757,14 +9757,14 @@
           <a:lstStyle/>
           <a:p>
             <a:r>
-              <a:rPr lang="en-US" sz="1600" dirty="0" err="1">
+              <a:rPr lang="en-US" sz="1200" dirty="0" err="1">
                 <a:latin typeface="Fira Mono" panose="020B0509050000020004" pitchFamily="49" charset="0"/>
                 <a:ea typeface="Fira Mono" panose="020B0509050000020004" pitchFamily="49" charset="0"/>
               </a:rPr>
               <a:t>install.packages</a:t>
             </a:r>
             <a:r>
-              <a:rPr lang="en-US" sz="1600" dirty="0">
+              <a:rPr lang="en-US" sz="1200" dirty="0">
                 <a:latin typeface="Fira Mono" panose="020B0509050000020004" pitchFamily="49" charset="0"/>
                 <a:ea typeface="Fira Mono" panose="020B0509050000020004" pitchFamily="49" charset="0"/>
               </a:rPr>
@@ -9773,165 +9773,179 @@
           </a:p>
           <a:p>
             <a:r>
-              <a:rPr lang="en-US" sz="1600" dirty="0">
+              <a:rPr lang="en-US" sz="1200" dirty="0">
                 <a:latin typeface="Fira Mono" panose="020B0509050000020004" pitchFamily="49" charset="0"/>
                 <a:ea typeface="Fira Mono" panose="020B0509050000020004" pitchFamily="49" charset="0"/>
               </a:rPr>
               <a:t>  "</a:t>
             </a:r>
             <a:r>
-              <a:rPr lang="en-US" sz="1600" dirty="0" err="1">
+              <a:rPr lang="en-US" sz="1200" dirty="0" err="1">
                 <a:latin typeface="Fira Mono" panose="020B0509050000020004" pitchFamily="49" charset="0"/>
                 <a:ea typeface="Fira Mono" panose="020B0509050000020004" pitchFamily="49" charset="0"/>
               </a:rPr>
               <a:t>bslib</a:t>
             </a:r>
             <a:r>
-              <a:rPr lang="en-US" sz="1600" dirty="0">
+              <a:rPr lang="en-US" sz="1200" dirty="0">
+                <a:latin typeface="Fira Mono" panose="020B0509050000020004" pitchFamily="49" charset="0"/>
+                <a:ea typeface="Fira Mono" panose="020B0509050000020004" pitchFamily="49" charset="0"/>
+              </a:rPr>
+              <a:t>", "car" "</a:t>
+            </a:r>
+            <a:r>
+              <a:rPr lang="en-US" sz="1200" dirty="0" err="1">
+                <a:latin typeface="Fira Mono" panose="020B0509050000020004" pitchFamily="49" charset="0"/>
+                <a:ea typeface="Fira Mono" panose="020B0509050000020004" pitchFamily="49" charset="0"/>
+              </a:rPr>
+              <a:t>dplyr</a:t>
+            </a:r>
+            <a:r>
+              <a:rPr lang="en-US" sz="1200" dirty="0">
+                <a:latin typeface="Fira Mono" panose="020B0509050000020004" pitchFamily="49" charset="0"/>
+                <a:ea typeface="Fira Mono" panose="020B0509050000020004" pitchFamily="49" charset="0"/>
+              </a:rPr>
+              <a:t>", "DT", "</a:t>
+            </a:r>
+            <a:r>
+              <a:rPr lang="en-US" sz="1200" dirty="0" err="1">
+                <a:latin typeface="Fira Mono" panose="020B0509050000020004" pitchFamily="49" charset="0"/>
+                <a:ea typeface="Fira Mono" panose="020B0509050000020004" pitchFamily="49" charset="0"/>
+              </a:rPr>
+              <a:t>emmeans</a:t>
+            </a:r>
+            <a:r>
+              <a:rPr lang="en-US" sz="1200" dirty="0">
                 <a:latin typeface="Fira Mono" panose="020B0509050000020004" pitchFamily="49" charset="0"/>
                 <a:ea typeface="Fira Mono" panose="020B0509050000020004" pitchFamily="49" charset="0"/>
               </a:rPr>
               <a:t>", "</a:t>
             </a:r>
             <a:r>
-              <a:rPr lang="en-US" sz="1600" dirty="0" err="1">
+              <a:rPr lang="en-US" sz="1200" dirty="0" err="1">
                 <a:latin typeface="Fira Mono" panose="020B0509050000020004" pitchFamily="49" charset="0"/>
                 <a:ea typeface="Fira Mono" panose="020B0509050000020004" pitchFamily="49" charset="0"/>
               </a:rPr>
-              <a:t>dplyr</a:t>
-            </a:r>
-            <a:r>
-              <a:rPr lang="en-US" sz="1600" dirty="0">
-                <a:latin typeface="Fira Mono" panose="020B0509050000020004" pitchFamily="49" charset="0"/>
-                <a:ea typeface="Fira Mono" panose="020B0509050000020004" pitchFamily="49" charset="0"/>
-              </a:rPr>
-              <a:t>", "DT", "</a:t>
-            </a:r>
-            <a:r>
-              <a:rPr lang="en-US" sz="1600" dirty="0" err="1">
-                <a:latin typeface="Fira Mono" panose="020B0509050000020004" pitchFamily="49" charset="0"/>
-                <a:ea typeface="Fira Mono" panose="020B0509050000020004" pitchFamily="49" charset="0"/>
-              </a:rPr>
-              <a:t>emmeans</a:t>
-            </a:r>
-            <a:r>
-              <a:rPr lang="en-US" sz="1600" dirty="0">
+              <a:t>fitdistrplus</a:t>
+            </a:r>
+            <a:r>
+              <a:rPr lang="en-US" sz="1200" dirty="0">
                 <a:latin typeface="Fira Mono" panose="020B0509050000020004" pitchFamily="49" charset="0"/>
                 <a:ea typeface="Fira Mono" panose="020B0509050000020004" pitchFamily="49" charset="0"/>
               </a:rPr>
               <a:t>", "</a:t>
             </a:r>
             <a:r>
-              <a:rPr lang="en-US" sz="1600" dirty="0" err="1">
+              <a:rPr lang="en-US" sz="1200" dirty="0" err="1">
                 <a:latin typeface="Fira Mono" panose="020B0509050000020004" pitchFamily="49" charset="0"/>
                 <a:ea typeface="Fira Mono" panose="020B0509050000020004" pitchFamily="49" charset="0"/>
               </a:rPr>
-              <a:t>fitdistrplus</a:t>
-            </a:r>
-            <a:r>
-              <a:rPr lang="en-US" sz="1600" dirty="0">
+              <a:t>flextable</a:t>
+            </a:r>
+            <a:r>
+              <a:rPr lang="en-US" sz="1200" dirty="0">
+                <a:latin typeface="Fira Mono" panose="020B0509050000020004" pitchFamily="49" charset="0"/>
+                <a:ea typeface="Fira Mono" panose="020B0509050000020004" pitchFamily="49" charset="0"/>
+              </a:rPr>
+              <a:t>",</a:t>
+            </a:r>
+          </a:p>
+          <a:p>
+            <a:r>
+              <a:rPr lang="en-US" sz="1200" dirty="0">
+                <a:latin typeface="Fira Mono" panose="020B0509050000020004" pitchFamily="49" charset="0"/>
+                <a:ea typeface="Fira Mono" panose="020B0509050000020004" pitchFamily="49" charset="0"/>
+              </a:rPr>
+              <a:t>  "</a:t>
+            </a:r>
+            <a:r>
+              <a:rPr lang="en-US" sz="1200" dirty="0" err="1">
+                <a:latin typeface="Fira Mono" panose="020B0509050000020004" pitchFamily="49" charset="0"/>
+                <a:ea typeface="Fira Mono" panose="020B0509050000020004" pitchFamily="49" charset="0"/>
+              </a:rPr>
+              <a:t>GGally</a:t>
+            </a:r>
+            <a:r>
+              <a:rPr lang="en-US" sz="1200" dirty="0">
+                <a:latin typeface="Fira Mono" panose="020B0509050000020004" pitchFamily="49" charset="0"/>
+                <a:ea typeface="Fira Mono" panose="020B0509050000020004" pitchFamily="49" charset="0"/>
+              </a:rPr>
+              <a:t>", "ggplot2", "</a:t>
+            </a:r>
+            <a:r>
+              <a:rPr lang="en-US" sz="1200" dirty="0" err="1">
+                <a:latin typeface="Fira Mono" panose="020B0509050000020004" pitchFamily="49" charset="0"/>
+                <a:ea typeface="Fira Mono" panose="020B0509050000020004" pitchFamily="49" charset="0"/>
+              </a:rPr>
+              <a:t>ggrepel</a:t>
+            </a:r>
+            <a:r>
+              <a:rPr lang="en-US" sz="1200" dirty="0">
                 <a:latin typeface="Fira Mono" panose="020B0509050000020004" pitchFamily="49" charset="0"/>
                 <a:ea typeface="Fira Mono" panose="020B0509050000020004" pitchFamily="49" charset="0"/>
               </a:rPr>
               <a:t>", "</a:t>
             </a:r>
             <a:r>
-              <a:rPr lang="en-US" sz="1600" dirty="0" err="1">
+              <a:rPr lang="en-US" sz="1200" dirty="0" err="1">
                 <a:latin typeface="Fira Mono" panose="020B0509050000020004" pitchFamily="49" charset="0"/>
                 <a:ea typeface="Fira Mono" panose="020B0509050000020004" pitchFamily="49" charset="0"/>
               </a:rPr>
-              <a:t>flextable</a:t>
-            </a:r>
-            <a:r>
-              <a:rPr lang="en-US" sz="1600" dirty="0">
+              <a:t>lmerTest</a:t>
+            </a:r>
+            <a:r>
+              <a:rPr lang="en-US" sz="1200" dirty="0">
                 <a:latin typeface="Fira Mono" panose="020B0509050000020004" pitchFamily="49" charset="0"/>
                 <a:ea typeface="Fira Mono" panose="020B0509050000020004" pitchFamily="49" charset="0"/>
               </a:rPr>
-              <a:t>",</a:t>
-            </a:r>
-          </a:p>
-          <a:p>
-            <a:r>
-              <a:rPr lang="en-US" sz="1600" dirty="0">
+              <a:t>", "officer", "patchwork",</a:t>
+            </a:r>
+          </a:p>
+          <a:p>
+            <a:r>
+              <a:rPr lang="en-US" sz="1200" dirty="0">
                 <a:latin typeface="Fira Mono" panose="020B0509050000020004" pitchFamily="49" charset="0"/>
                 <a:ea typeface="Fira Mono" panose="020B0509050000020004" pitchFamily="49" charset="0"/>
               </a:rPr>
               <a:t>  "</a:t>
             </a:r>
             <a:r>
-              <a:rPr lang="en-US" sz="1600" dirty="0" err="1">
-                <a:latin typeface="Fira Mono" panose="020B0509050000020004" pitchFamily="49" charset="0"/>
-                <a:ea typeface="Fira Mono" panose="020B0509050000020004" pitchFamily="49" charset="0"/>
-              </a:rPr>
-              <a:t>GGally</a:t>
-            </a:r>
-            <a:r>
-              <a:rPr lang="en-US" sz="1600" dirty="0">
-                <a:latin typeface="Fira Mono" panose="020B0509050000020004" pitchFamily="49" charset="0"/>
-                <a:ea typeface="Fira Mono" panose="020B0509050000020004" pitchFamily="49" charset="0"/>
-              </a:rPr>
-              <a:t>", "ggplot2", "</a:t>
-            </a:r>
-            <a:r>
-              <a:rPr lang="en-US" sz="1600" dirty="0" err="1">
-                <a:latin typeface="Fira Mono" panose="020B0509050000020004" pitchFamily="49" charset="0"/>
-                <a:ea typeface="Fira Mono" panose="020B0509050000020004" pitchFamily="49" charset="0"/>
-              </a:rPr>
-              <a:t>lmerTest</a:t>
-            </a:r>
-            <a:r>
-              <a:rPr lang="en-US" sz="1600" dirty="0">
-                <a:latin typeface="Fira Mono" panose="020B0509050000020004" pitchFamily="49" charset="0"/>
-                <a:ea typeface="Fira Mono" panose="020B0509050000020004" pitchFamily="49" charset="0"/>
-              </a:rPr>
-              <a:t>", "officer", "patchwork",</a:t>
-            </a:r>
-          </a:p>
-          <a:p>
-            <a:r>
-              <a:rPr lang="en-US" sz="1600" dirty="0">
-                <a:latin typeface="Fira Mono" panose="020B0509050000020004" pitchFamily="49" charset="0"/>
-                <a:ea typeface="Fira Mono" panose="020B0509050000020004" pitchFamily="49" charset="0"/>
-              </a:rPr>
-              <a:t>  "</a:t>
-            </a:r>
-            <a:r>
-              <a:rPr lang="en-US" sz="1600" dirty="0" err="1">
+              <a:rPr lang="en-US" sz="1200" dirty="0" err="1">
                 <a:latin typeface="Fira Mono" panose="020B0509050000020004" pitchFamily="49" charset="0"/>
                 <a:ea typeface="Fira Mono" panose="020B0509050000020004" pitchFamily="49" charset="0"/>
               </a:rPr>
               <a:t>readxl</a:t>
             </a:r>
             <a:r>
-              <a:rPr lang="en-US" sz="1600" dirty="0">
+              <a:rPr lang="en-US" sz="1200" dirty="0">
                 <a:latin typeface="Fira Mono" panose="020B0509050000020004" pitchFamily="49" charset="0"/>
                 <a:ea typeface="Fira Mono" panose="020B0509050000020004" pitchFamily="49" charset="0"/>
               </a:rPr>
               <a:t>", "shiny", "</a:t>
             </a:r>
             <a:r>
-              <a:rPr lang="en-US" sz="1600" dirty="0" err="1">
+              <a:rPr lang="en-US" sz="1200" dirty="0" err="1">
                 <a:latin typeface="Fira Mono" panose="020B0509050000020004" pitchFamily="49" charset="0"/>
                 <a:ea typeface="Fira Mono" panose="020B0509050000020004" pitchFamily="49" charset="0"/>
               </a:rPr>
               <a:t>skimr</a:t>
             </a:r>
             <a:r>
-              <a:rPr lang="en-US" sz="1600" dirty="0">
+              <a:rPr lang="en-US" sz="1200" dirty="0">
                 <a:latin typeface="Fira Mono" panose="020B0509050000020004" pitchFamily="49" charset="0"/>
                 <a:ea typeface="Fira Mono" panose="020B0509050000020004" pitchFamily="49" charset="0"/>
               </a:rPr>
               <a:t>", "</a:t>
             </a:r>
             <a:r>
-              <a:rPr lang="en-US" sz="1600" dirty="0" err="1">
+              <a:rPr lang="en-US" sz="1200" dirty="0" err="1">
                 <a:latin typeface="Fira Mono" panose="020B0509050000020004" pitchFamily="49" charset="0"/>
                 <a:ea typeface="Fira Mono" panose="020B0509050000020004" pitchFamily="49" charset="0"/>
               </a:rPr>
               <a:t>tidyr</a:t>
             </a:r>
             <a:r>
-              <a:rPr lang="en-US" sz="1600" dirty="0">
+              <a:rPr lang="en-US" sz="1200" dirty="0">
                 <a:latin typeface="Fira Mono" panose="020B0509050000020004" pitchFamily="49" charset="0"/>
                 <a:ea typeface="Fira Mono" panose="020B0509050000020004" pitchFamily="49" charset="0"/>
               </a:rPr>
@@ -9940,7 +9954,7 @@
           </a:p>
           <a:p>
             <a:r>
-              <a:rPr lang="en-US" sz="1600" dirty="0">
+              <a:rPr lang="en-US" sz="1200" dirty="0">
                 <a:latin typeface="Fira Mono" panose="020B0509050000020004" pitchFamily="49" charset="0"/>
                 <a:ea typeface="Fira Mono" panose="020B0509050000020004" pitchFamily="49" charset="0"/>
               </a:rPr>
@@ -10018,7 +10032,7 @@
         <p:spPr>
           <a:xfrm>
             <a:off x="795528" y="4226400"/>
-            <a:ext cx="8544908" cy="338554"/>
+            <a:ext cx="8544908" cy="276999"/>
           </a:xfrm>
           <a:prstGeom prst="rect">
             <a:avLst/>
@@ -10032,21 +10046,21 @@
           <a:lstStyle/>
           <a:p>
             <a:r>
-              <a:rPr lang="en-US" sz="1600" dirty="0">
+              <a:rPr lang="en-US" sz="1200" dirty="0">
                 <a:latin typeface="Fira Mono" panose="020B0509050000020004" pitchFamily="49" charset="0"/>
                 <a:ea typeface="Fira Mono" panose="020B0509050000020004" pitchFamily="49" charset="0"/>
               </a:rPr>
               <a:t>shiny::</a:t>
             </a:r>
             <a:r>
-              <a:rPr lang="en-US" sz="1600" dirty="0" err="1">
+              <a:rPr lang="en-US" sz="1200" dirty="0" err="1">
                 <a:latin typeface="Fira Mono" panose="020B0509050000020004" pitchFamily="49" charset="0"/>
                 <a:ea typeface="Fira Mono" panose="020B0509050000020004" pitchFamily="49" charset="0"/>
               </a:rPr>
               <a:t>runApp</a:t>
             </a:r>
             <a:r>
-              <a:rPr lang="en-US" sz="1600" dirty="0">
+              <a:rPr lang="en-US" sz="1200" dirty="0">
                 <a:latin typeface="Fira Mono" panose="020B0509050000020004" pitchFamily="49" charset="0"/>
                 <a:ea typeface="Fira Mono" panose="020B0509050000020004" pitchFamily="49" charset="0"/>
               </a:rPr>

</xml_diff>

<commit_message>
final refinements for version v1.00
</commit_message>
<xml_diff>
--- a/presentations/Table_Analyzer_Overview.pptx
+++ b/presentations/Table_Analyzer_Overview.pptx
@@ -583,6 +583,109 @@
 </file>
 
 <file path=ppt/notesSlides/notesSlide2.xml><?xml version="1.0" encoding="utf-8"?>
+<p:notes xmlns:a="http://schemas.openxmlformats.org/drawingml/2006/main" xmlns:r="http://schemas.openxmlformats.org/officeDocument/2006/relationships" xmlns:p="http://schemas.openxmlformats.org/presentationml/2006/main">
+  <p:cSld>
+    <p:spTree>
+      <p:nvGrpSpPr>
+        <p:cNvPr id="1" name=""/>
+        <p:cNvGrpSpPr/>
+        <p:nvPr/>
+      </p:nvGrpSpPr>
+      <p:grpSpPr>
+        <a:xfrm>
+          <a:off x="0" y="0"/>
+          <a:ext cx="0" cy="0"/>
+          <a:chOff x="0" y="0"/>
+          <a:chExt cx="0" cy="0"/>
+        </a:xfrm>
+      </p:grpSpPr>
+      <p:sp>
+        <p:nvSpPr>
+          <p:cNvPr id="2" name="Slide Image Placeholder 1"/>
+          <p:cNvSpPr>
+            <a:spLocks noGrp="1" noRot="1" noChangeAspect="1"/>
+          </p:cNvSpPr>
+          <p:nvPr>
+            <p:ph type="sldImg"/>
+          </p:nvPr>
+        </p:nvSpPr>
+        <p:spPr/>
+      </p:sp>
+      <p:sp>
+        <p:nvSpPr>
+          <p:cNvPr id="3" name="Notes Placeholder 2"/>
+          <p:cNvSpPr>
+            <a:spLocks noGrp="1"/>
+          </p:cNvSpPr>
+          <p:nvPr>
+            <p:ph type="body" idx="1"/>
+          </p:nvPr>
+        </p:nvSpPr>
+        <p:spPr/>
+        <p:txBody>
+          <a:bodyPr/>
+          <a:lstStyle/>
+          <a:p>
+            <a:r>
+              <a:rPr lang="en-US" dirty="0"/>
+              <a:t>Non-parametric tests are not recommended, see: https://</a:t>
+            </a:r>
+            <a:r>
+              <a:rPr lang="en-US" dirty="0" err="1"/>
+              <a:t>www.youtube.com</a:t>
+            </a:r>
+            <a:r>
+              <a:rPr lang="en-US" dirty="0"/>
+              <a:t>/</a:t>
+            </a:r>
+            <a:r>
+              <a:rPr lang="en-US" dirty="0" err="1"/>
+              <a:t>watch?v</a:t>
+            </a:r>
+            <a:r>
+              <a:rPr lang="en-US" dirty="0"/>
+              <a:t>=qee6b7vl2O0</a:t>
+            </a:r>
+          </a:p>
+        </p:txBody>
+      </p:sp>
+      <p:sp>
+        <p:nvSpPr>
+          <p:cNvPr id="4" name="Slide Number Placeholder 3"/>
+          <p:cNvSpPr>
+            <a:spLocks noGrp="1"/>
+          </p:cNvSpPr>
+          <p:nvPr>
+            <p:ph type="sldNum" sz="quarter" idx="5"/>
+          </p:nvPr>
+        </p:nvSpPr>
+        <p:spPr/>
+        <p:txBody>
+          <a:bodyPr/>
+          <a:lstStyle/>
+          <a:p>
+            <a:fld id="{3B911241-7DC5-2249-8C77-6E6B4E462127}" type="slidenum">
+              <a:rPr lang="en-US" smtClean="0"/>
+              <a:t>3</a:t>
+            </a:fld>
+            <a:endParaRPr lang="en-US"/>
+          </a:p>
+        </p:txBody>
+      </p:sp>
+    </p:spTree>
+    <p:extLst>
+      <p:ext uri="{BB962C8B-B14F-4D97-AF65-F5344CB8AC3E}">
+        <p14:creationId xmlns:p14="http://schemas.microsoft.com/office/powerpoint/2010/main" val="4081771071"/>
+      </p:ext>
+    </p:extLst>
+  </p:cSld>
+  <p:clrMapOvr>
+    <a:masterClrMapping/>
+  </p:clrMapOvr>
+</p:notes>
+</file>
+
+<file path=ppt/notesSlides/notesSlide3.xml><?xml version="1.0" encoding="utf-8"?>
 <p:notes xmlns:a="http://schemas.openxmlformats.org/drawingml/2006/main" xmlns:r="http://schemas.openxmlformats.org/officeDocument/2006/relationships" xmlns:p="http://schemas.openxmlformats.org/presentationml/2006/main">
   <p:cSld>
     <p:spTree>
@@ -4756,7 +4859,7 @@
         <p:spPr>
           <a:xfrm>
             <a:off x="160020" y="144460"/>
-            <a:ext cx="8983980" cy="5816977"/>
+            <a:ext cx="8983980" cy="6001643"/>
           </a:xfrm>
           <a:prstGeom prst="rect">
             <a:avLst/>
@@ -4812,7 +4915,7 @@
             </a:br>
             <a:r>
               <a:rPr lang="en-US" sz="1200" dirty="0"/>
-              <a:t>Control + Normal diet + </a:t>
+              <a:t>Control + Low-Fat diet + </a:t>
             </a:r>
             <a:r>
               <a:rPr lang="en-US" sz="1200" dirty="0" err="1"/>
@@ -5324,6 +5427,591 @@
   <p:clrMapOvr>
     <a:masterClrMapping/>
   </p:clrMapOvr>
+  <p:timing>
+    <p:tnLst>
+      <p:par>
+        <p:cTn id="1" dur="indefinite" restart="never" nodeType="tmRoot">
+          <p:childTnLst>
+            <p:seq concurrent="1" nextAc="seek">
+              <p:cTn id="2" dur="indefinite" nodeType="mainSeq">
+                <p:childTnLst>
+                  <p:par>
+                    <p:cTn id="3" fill="hold">
+                      <p:stCondLst>
+                        <p:cond delay="indefinite"/>
+                      </p:stCondLst>
+                      <p:childTnLst>
+                        <p:par>
+                          <p:cTn id="4" fill="hold">
+                            <p:stCondLst>
+                              <p:cond delay="0"/>
+                            </p:stCondLst>
+                            <p:childTnLst>
+                              <p:par>
+                                <p:cTn id="5" presetID="1" presetClass="entr" presetSubtype="0" fill="hold" nodeType="clickEffect">
+                                  <p:stCondLst>
+                                    <p:cond delay="0"/>
+                                  </p:stCondLst>
+                                  <p:childTnLst>
+                                    <p:set>
+                                      <p:cBhvr>
+                                        <p:cTn id="6" dur="1" fill="hold">
+                                          <p:stCondLst>
+                                            <p:cond delay="0"/>
+                                          </p:stCondLst>
+                                        </p:cTn>
+                                        <p:tgtEl>
+                                          <p:spTgt spid="3">
+                                            <p:txEl>
+                                              <p:pRg st="2" end="2"/>
+                                            </p:txEl>
+                                          </p:spTgt>
+                                        </p:tgtEl>
+                                        <p:attrNameLst>
+                                          <p:attrName>style.visibility</p:attrName>
+                                        </p:attrNameLst>
+                                      </p:cBhvr>
+                                      <p:to>
+                                        <p:strVal val="visible"/>
+                                      </p:to>
+                                    </p:set>
+                                  </p:childTnLst>
+                                </p:cTn>
+                              </p:par>
+                              <p:par>
+                                <p:cTn id="7" presetID="1" presetClass="entr" presetSubtype="0" fill="hold" nodeType="withEffect">
+                                  <p:stCondLst>
+                                    <p:cond delay="0"/>
+                                  </p:stCondLst>
+                                  <p:childTnLst>
+                                    <p:set>
+                                      <p:cBhvr>
+                                        <p:cTn id="8" dur="1" fill="hold">
+                                          <p:stCondLst>
+                                            <p:cond delay="0"/>
+                                          </p:stCondLst>
+                                        </p:cTn>
+                                        <p:tgtEl>
+                                          <p:spTgt spid="3">
+                                            <p:txEl>
+                                              <p:pRg st="3" end="3"/>
+                                            </p:txEl>
+                                          </p:spTgt>
+                                        </p:tgtEl>
+                                        <p:attrNameLst>
+                                          <p:attrName>style.visibility</p:attrName>
+                                        </p:attrNameLst>
+                                      </p:cBhvr>
+                                      <p:to>
+                                        <p:strVal val="visible"/>
+                                      </p:to>
+                                    </p:set>
+                                  </p:childTnLst>
+                                </p:cTn>
+                              </p:par>
+                              <p:par>
+                                <p:cTn id="9" presetID="1" presetClass="entr" presetSubtype="0" fill="hold" nodeType="withEffect">
+                                  <p:stCondLst>
+                                    <p:cond delay="0"/>
+                                  </p:stCondLst>
+                                  <p:childTnLst>
+                                    <p:set>
+                                      <p:cBhvr>
+                                        <p:cTn id="10" dur="1" fill="hold">
+                                          <p:stCondLst>
+                                            <p:cond delay="0"/>
+                                          </p:stCondLst>
+                                        </p:cTn>
+                                        <p:tgtEl>
+                                          <p:spTgt spid="3">
+                                            <p:txEl>
+                                              <p:pRg st="4" end="4"/>
+                                            </p:txEl>
+                                          </p:spTgt>
+                                        </p:tgtEl>
+                                        <p:attrNameLst>
+                                          <p:attrName>style.visibility</p:attrName>
+                                        </p:attrNameLst>
+                                      </p:cBhvr>
+                                      <p:to>
+                                        <p:strVal val="visible"/>
+                                      </p:to>
+                                    </p:set>
+                                  </p:childTnLst>
+                                </p:cTn>
+                              </p:par>
+                            </p:childTnLst>
+                          </p:cTn>
+                        </p:par>
+                      </p:childTnLst>
+                    </p:cTn>
+                  </p:par>
+                  <p:par>
+                    <p:cTn id="11" fill="hold">
+                      <p:stCondLst>
+                        <p:cond delay="indefinite"/>
+                      </p:stCondLst>
+                      <p:childTnLst>
+                        <p:par>
+                          <p:cTn id="12" fill="hold">
+                            <p:stCondLst>
+                              <p:cond delay="0"/>
+                            </p:stCondLst>
+                            <p:childTnLst>
+                              <p:par>
+                                <p:cTn id="13" presetID="1" presetClass="entr" presetSubtype="0" fill="hold" nodeType="clickEffect">
+                                  <p:stCondLst>
+                                    <p:cond delay="0"/>
+                                  </p:stCondLst>
+                                  <p:childTnLst>
+                                    <p:set>
+                                      <p:cBhvr>
+                                        <p:cTn id="14" dur="1" fill="hold">
+                                          <p:stCondLst>
+                                            <p:cond delay="0"/>
+                                          </p:stCondLst>
+                                        </p:cTn>
+                                        <p:tgtEl>
+                                          <p:spTgt spid="3">
+                                            <p:txEl>
+                                              <p:pRg st="5" end="5"/>
+                                            </p:txEl>
+                                          </p:spTgt>
+                                        </p:tgtEl>
+                                        <p:attrNameLst>
+                                          <p:attrName>style.visibility</p:attrName>
+                                        </p:attrNameLst>
+                                      </p:cBhvr>
+                                      <p:to>
+                                        <p:strVal val="visible"/>
+                                      </p:to>
+                                    </p:set>
+                                  </p:childTnLst>
+                                </p:cTn>
+                              </p:par>
+                              <p:par>
+                                <p:cTn id="15" presetID="1" presetClass="entr" presetSubtype="0" fill="hold" nodeType="withEffect">
+                                  <p:stCondLst>
+                                    <p:cond delay="0"/>
+                                  </p:stCondLst>
+                                  <p:childTnLst>
+                                    <p:set>
+                                      <p:cBhvr>
+                                        <p:cTn id="16" dur="1" fill="hold">
+                                          <p:stCondLst>
+                                            <p:cond delay="0"/>
+                                          </p:stCondLst>
+                                        </p:cTn>
+                                        <p:tgtEl>
+                                          <p:spTgt spid="3">
+                                            <p:txEl>
+                                              <p:pRg st="6" end="6"/>
+                                            </p:txEl>
+                                          </p:spTgt>
+                                        </p:tgtEl>
+                                        <p:attrNameLst>
+                                          <p:attrName>style.visibility</p:attrName>
+                                        </p:attrNameLst>
+                                      </p:cBhvr>
+                                      <p:to>
+                                        <p:strVal val="visible"/>
+                                      </p:to>
+                                    </p:set>
+                                  </p:childTnLst>
+                                </p:cTn>
+                              </p:par>
+                              <p:par>
+                                <p:cTn id="17" presetID="1" presetClass="entr" presetSubtype="0" fill="hold" nodeType="withEffect">
+                                  <p:stCondLst>
+                                    <p:cond delay="0"/>
+                                  </p:stCondLst>
+                                  <p:childTnLst>
+                                    <p:set>
+                                      <p:cBhvr>
+                                        <p:cTn id="18" dur="1" fill="hold">
+                                          <p:stCondLst>
+                                            <p:cond delay="0"/>
+                                          </p:stCondLst>
+                                        </p:cTn>
+                                        <p:tgtEl>
+                                          <p:spTgt spid="3">
+                                            <p:txEl>
+                                              <p:pRg st="7" end="7"/>
+                                            </p:txEl>
+                                          </p:spTgt>
+                                        </p:tgtEl>
+                                        <p:attrNameLst>
+                                          <p:attrName>style.visibility</p:attrName>
+                                        </p:attrNameLst>
+                                      </p:cBhvr>
+                                      <p:to>
+                                        <p:strVal val="visible"/>
+                                      </p:to>
+                                    </p:set>
+                                  </p:childTnLst>
+                                </p:cTn>
+                              </p:par>
+                            </p:childTnLst>
+                          </p:cTn>
+                        </p:par>
+                      </p:childTnLst>
+                    </p:cTn>
+                  </p:par>
+                  <p:par>
+                    <p:cTn id="19" fill="hold">
+                      <p:stCondLst>
+                        <p:cond delay="indefinite"/>
+                      </p:stCondLst>
+                      <p:childTnLst>
+                        <p:par>
+                          <p:cTn id="20" fill="hold">
+                            <p:stCondLst>
+                              <p:cond delay="0"/>
+                            </p:stCondLst>
+                            <p:childTnLst>
+                              <p:par>
+                                <p:cTn id="21" presetID="1" presetClass="entr" presetSubtype="0" fill="hold" nodeType="clickEffect">
+                                  <p:stCondLst>
+                                    <p:cond delay="0"/>
+                                  </p:stCondLst>
+                                  <p:childTnLst>
+                                    <p:set>
+                                      <p:cBhvr>
+                                        <p:cTn id="22" dur="1" fill="hold">
+                                          <p:stCondLst>
+                                            <p:cond delay="0"/>
+                                          </p:stCondLst>
+                                        </p:cTn>
+                                        <p:tgtEl>
+                                          <p:spTgt spid="3">
+                                            <p:txEl>
+                                              <p:pRg st="9" end="9"/>
+                                            </p:txEl>
+                                          </p:spTgt>
+                                        </p:tgtEl>
+                                        <p:attrNameLst>
+                                          <p:attrName>style.visibility</p:attrName>
+                                        </p:attrNameLst>
+                                      </p:cBhvr>
+                                      <p:to>
+                                        <p:strVal val="visible"/>
+                                      </p:to>
+                                    </p:set>
+                                  </p:childTnLst>
+                                </p:cTn>
+                              </p:par>
+                              <p:par>
+                                <p:cTn id="23" presetID="1" presetClass="entr" presetSubtype="0" fill="hold" nodeType="withEffect">
+                                  <p:stCondLst>
+                                    <p:cond delay="0"/>
+                                  </p:stCondLst>
+                                  <p:childTnLst>
+                                    <p:set>
+                                      <p:cBhvr>
+                                        <p:cTn id="24" dur="1" fill="hold">
+                                          <p:stCondLst>
+                                            <p:cond delay="0"/>
+                                          </p:stCondLst>
+                                        </p:cTn>
+                                        <p:tgtEl>
+                                          <p:spTgt spid="3">
+                                            <p:txEl>
+                                              <p:pRg st="10" end="10"/>
+                                            </p:txEl>
+                                          </p:spTgt>
+                                        </p:tgtEl>
+                                        <p:attrNameLst>
+                                          <p:attrName>style.visibility</p:attrName>
+                                        </p:attrNameLst>
+                                      </p:cBhvr>
+                                      <p:to>
+                                        <p:strVal val="visible"/>
+                                      </p:to>
+                                    </p:set>
+                                  </p:childTnLst>
+                                </p:cTn>
+                              </p:par>
+                            </p:childTnLst>
+                          </p:cTn>
+                        </p:par>
+                      </p:childTnLst>
+                    </p:cTn>
+                  </p:par>
+                  <p:par>
+                    <p:cTn id="25" fill="hold">
+                      <p:stCondLst>
+                        <p:cond delay="indefinite"/>
+                      </p:stCondLst>
+                      <p:childTnLst>
+                        <p:par>
+                          <p:cTn id="26" fill="hold">
+                            <p:stCondLst>
+                              <p:cond delay="0"/>
+                            </p:stCondLst>
+                            <p:childTnLst>
+                              <p:par>
+                                <p:cTn id="27" presetID="1" presetClass="entr" presetSubtype="0" fill="hold" nodeType="clickEffect">
+                                  <p:stCondLst>
+                                    <p:cond delay="0"/>
+                                  </p:stCondLst>
+                                  <p:childTnLst>
+                                    <p:set>
+                                      <p:cBhvr>
+                                        <p:cTn id="28" dur="1" fill="hold">
+                                          <p:stCondLst>
+                                            <p:cond delay="0"/>
+                                          </p:stCondLst>
+                                        </p:cTn>
+                                        <p:tgtEl>
+                                          <p:spTgt spid="3">
+                                            <p:txEl>
+                                              <p:pRg st="12" end="12"/>
+                                            </p:txEl>
+                                          </p:spTgt>
+                                        </p:tgtEl>
+                                        <p:attrNameLst>
+                                          <p:attrName>style.visibility</p:attrName>
+                                        </p:attrNameLst>
+                                      </p:cBhvr>
+                                      <p:to>
+                                        <p:strVal val="visible"/>
+                                      </p:to>
+                                    </p:set>
+                                  </p:childTnLst>
+                                </p:cTn>
+                              </p:par>
+                              <p:par>
+                                <p:cTn id="29" presetID="1" presetClass="entr" presetSubtype="0" fill="hold" nodeType="withEffect">
+                                  <p:stCondLst>
+                                    <p:cond delay="0"/>
+                                  </p:stCondLst>
+                                  <p:childTnLst>
+                                    <p:set>
+                                      <p:cBhvr>
+                                        <p:cTn id="30" dur="1" fill="hold">
+                                          <p:stCondLst>
+                                            <p:cond delay="0"/>
+                                          </p:stCondLst>
+                                        </p:cTn>
+                                        <p:tgtEl>
+                                          <p:spTgt spid="3">
+                                            <p:txEl>
+                                              <p:pRg st="13" end="13"/>
+                                            </p:txEl>
+                                          </p:spTgt>
+                                        </p:tgtEl>
+                                        <p:attrNameLst>
+                                          <p:attrName>style.visibility</p:attrName>
+                                        </p:attrNameLst>
+                                      </p:cBhvr>
+                                      <p:to>
+                                        <p:strVal val="visible"/>
+                                      </p:to>
+                                    </p:set>
+                                  </p:childTnLst>
+                                </p:cTn>
+                              </p:par>
+                              <p:par>
+                                <p:cTn id="31" presetID="1" presetClass="entr" presetSubtype="0" fill="hold" nodeType="withEffect">
+                                  <p:stCondLst>
+                                    <p:cond delay="0"/>
+                                  </p:stCondLst>
+                                  <p:childTnLst>
+                                    <p:set>
+                                      <p:cBhvr>
+                                        <p:cTn id="32" dur="1" fill="hold">
+                                          <p:stCondLst>
+                                            <p:cond delay="0"/>
+                                          </p:stCondLst>
+                                        </p:cTn>
+                                        <p:tgtEl>
+                                          <p:spTgt spid="3">
+                                            <p:txEl>
+                                              <p:pRg st="14" end="14"/>
+                                            </p:txEl>
+                                          </p:spTgt>
+                                        </p:tgtEl>
+                                        <p:attrNameLst>
+                                          <p:attrName>style.visibility</p:attrName>
+                                        </p:attrNameLst>
+                                      </p:cBhvr>
+                                      <p:to>
+                                        <p:strVal val="visible"/>
+                                      </p:to>
+                                    </p:set>
+                                  </p:childTnLst>
+                                </p:cTn>
+                              </p:par>
+                            </p:childTnLst>
+                          </p:cTn>
+                        </p:par>
+                      </p:childTnLst>
+                    </p:cTn>
+                  </p:par>
+                  <p:par>
+                    <p:cTn id="33" fill="hold">
+                      <p:stCondLst>
+                        <p:cond delay="indefinite"/>
+                      </p:stCondLst>
+                      <p:childTnLst>
+                        <p:par>
+                          <p:cTn id="34" fill="hold">
+                            <p:stCondLst>
+                              <p:cond delay="0"/>
+                            </p:stCondLst>
+                            <p:childTnLst>
+                              <p:par>
+                                <p:cTn id="35" presetID="1" presetClass="entr" presetSubtype="0" fill="hold" nodeType="clickEffect">
+                                  <p:stCondLst>
+                                    <p:cond delay="0"/>
+                                  </p:stCondLst>
+                                  <p:childTnLst>
+                                    <p:set>
+                                      <p:cBhvr>
+                                        <p:cTn id="36" dur="1" fill="hold">
+                                          <p:stCondLst>
+                                            <p:cond delay="0"/>
+                                          </p:stCondLst>
+                                        </p:cTn>
+                                        <p:tgtEl>
+                                          <p:spTgt spid="3">
+                                            <p:txEl>
+                                              <p:pRg st="16" end="16"/>
+                                            </p:txEl>
+                                          </p:spTgt>
+                                        </p:tgtEl>
+                                        <p:attrNameLst>
+                                          <p:attrName>style.visibility</p:attrName>
+                                        </p:attrNameLst>
+                                      </p:cBhvr>
+                                      <p:to>
+                                        <p:strVal val="visible"/>
+                                      </p:to>
+                                    </p:set>
+                                  </p:childTnLst>
+                                </p:cTn>
+                              </p:par>
+                              <p:par>
+                                <p:cTn id="37" presetID="1" presetClass="entr" presetSubtype="0" fill="hold" nodeType="withEffect">
+                                  <p:stCondLst>
+                                    <p:cond delay="0"/>
+                                  </p:stCondLst>
+                                  <p:childTnLst>
+                                    <p:set>
+                                      <p:cBhvr>
+                                        <p:cTn id="38" dur="1" fill="hold">
+                                          <p:stCondLst>
+                                            <p:cond delay="0"/>
+                                          </p:stCondLst>
+                                        </p:cTn>
+                                        <p:tgtEl>
+                                          <p:spTgt spid="3">
+                                            <p:txEl>
+                                              <p:pRg st="17" end="17"/>
+                                            </p:txEl>
+                                          </p:spTgt>
+                                        </p:tgtEl>
+                                        <p:attrNameLst>
+                                          <p:attrName>style.visibility</p:attrName>
+                                        </p:attrNameLst>
+                                      </p:cBhvr>
+                                      <p:to>
+                                        <p:strVal val="visible"/>
+                                      </p:to>
+                                    </p:set>
+                                  </p:childTnLst>
+                                </p:cTn>
+                              </p:par>
+                              <p:par>
+                                <p:cTn id="39" presetID="1" presetClass="entr" presetSubtype="0" fill="hold" nodeType="withEffect">
+                                  <p:stCondLst>
+                                    <p:cond delay="0"/>
+                                  </p:stCondLst>
+                                  <p:childTnLst>
+                                    <p:set>
+                                      <p:cBhvr>
+                                        <p:cTn id="40" dur="1" fill="hold">
+                                          <p:stCondLst>
+                                            <p:cond delay="0"/>
+                                          </p:stCondLst>
+                                        </p:cTn>
+                                        <p:tgtEl>
+                                          <p:spTgt spid="3">
+                                            <p:txEl>
+                                              <p:pRg st="18" end="18"/>
+                                            </p:txEl>
+                                          </p:spTgt>
+                                        </p:tgtEl>
+                                        <p:attrNameLst>
+                                          <p:attrName>style.visibility</p:attrName>
+                                        </p:attrNameLst>
+                                      </p:cBhvr>
+                                      <p:to>
+                                        <p:strVal val="visible"/>
+                                      </p:to>
+                                    </p:set>
+                                  </p:childTnLst>
+                                </p:cTn>
+                              </p:par>
+                              <p:par>
+                                <p:cTn id="41" presetID="1" presetClass="entr" presetSubtype="0" fill="hold" nodeType="withEffect">
+                                  <p:stCondLst>
+                                    <p:cond delay="0"/>
+                                  </p:stCondLst>
+                                  <p:childTnLst>
+                                    <p:set>
+                                      <p:cBhvr>
+                                        <p:cTn id="42" dur="1" fill="hold">
+                                          <p:stCondLst>
+                                            <p:cond delay="0"/>
+                                          </p:stCondLst>
+                                        </p:cTn>
+                                        <p:tgtEl>
+                                          <p:spTgt spid="3">
+                                            <p:txEl>
+                                              <p:pRg st="19" end="19"/>
+                                            </p:txEl>
+                                          </p:spTgt>
+                                        </p:tgtEl>
+                                        <p:attrNameLst>
+                                          <p:attrName>style.visibility</p:attrName>
+                                        </p:attrNameLst>
+                                      </p:cBhvr>
+                                      <p:to>
+                                        <p:strVal val="visible"/>
+                                      </p:to>
+                                    </p:set>
+                                  </p:childTnLst>
+                                </p:cTn>
+                              </p:par>
+                            </p:childTnLst>
+                          </p:cTn>
+                        </p:par>
+                      </p:childTnLst>
+                    </p:cTn>
+                  </p:par>
+                </p:childTnLst>
+              </p:cTn>
+              <p:prevCondLst>
+                <p:cond evt="onPrev" delay="0">
+                  <p:tgtEl>
+                    <p:sldTgt/>
+                  </p:tgtEl>
+                </p:cond>
+              </p:prevCondLst>
+              <p:nextCondLst>
+                <p:cond evt="onNext" delay="0">
+                  <p:tgtEl>
+                    <p:sldTgt/>
+                  </p:tgtEl>
+                </p:cond>
+              </p:nextCondLst>
+            </p:seq>
+          </p:childTnLst>
+        </p:cTn>
+      </p:par>
+    </p:tnLst>
+  </p:timing>
 </p:sld>
 </file>
 

</xml_diff>